<commit_message>
Game Object Creation and Deletion Tutorial Renewal
- Generate function set random
  position value

- PPT Data Update

- Delete and add resource data
</commit_message>
<xml_diff>
--- a/Assets/Class/Instantiate & Destroy/PPT Data/Instatiate and Destroy Example.pptx
+++ b/Assets/Class/Instantiate & Destroy/PPT Data/Instatiate and Destroy Example.pptx
@@ -2,23 +2,23 @@
 <file path=ppt/presentation.xml><?xml version="1.0" encoding="utf-8"?>
 <p:presentation xmlns:a="http://schemas.openxmlformats.org/drawingml/2006/main" xmlns:r="http://schemas.openxmlformats.org/officeDocument/2006/relationships" xmlns:p="http://schemas.openxmlformats.org/presentationml/2006/main" xmlns:p14="http://schemas.microsoft.com/office/powerpoint/2010/main" saveSubsetFonts="1" firstSlideNum="0">
   <p:sldMasterIdLst>
-    <p:sldMasterId id="2147485747" r:id="rId12"/>
+    <p:sldMasterId id="2147485770" r:id="rId12"/>
   </p:sldMasterIdLst>
   <p:notesMasterIdLst>
     <p:notesMasterId r:id="rId14"/>
   </p:notesMasterIdLst>
   <p:sldIdLst>
     <p:sldId id="293" r:id="rId16"/>
-    <p:sldId id="294" r:id="rId18"/>
-    <p:sldId id="295" r:id="rId20"/>
-    <p:sldId id="288" r:id="rId22"/>
-    <p:sldId id="296" r:id="rId24"/>
-    <p:sldId id="289" r:id="rId26"/>
-    <p:sldId id="297" r:id="rId28"/>
-    <p:sldId id="298" r:id="rId30"/>
-    <p:sldId id="299" r:id="rId32"/>
-    <p:sldId id="300" r:id="rId34"/>
-    <p:sldId id="287" r:id="rId36"/>
+    <p:sldId id="294" r:id="rId17"/>
+    <p:sldId id="295" r:id="rId18"/>
+    <p:sldId id="288" r:id="rId19"/>
+    <p:sldId id="296" r:id="rId20"/>
+    <p:sldId id="289" r:id="rId21"/>
+    <p:sldId id="297" r:id="rId22"/>
+    <p:sldId id="298" r:id="rId23"/>
+    <p:sldId id="299" r:id="rId24"/>
+    <p:sldId id="300" r:id="rId25"/>
+    <p:sldId id="287" r:id="rId27"/>
   </p:sldIdLst>
   <p:sldSz cx="12192000" cy="6858000"/>
   <p:notesSz cx="6858000" cy="9144000"/>
@@ -7031,153 +7031,6 @@
           </a:p>
         </p:txBody>
       </p:sp>
-      <p:sp>
-        <p:nvSpPr>
-          <p:cNvPr id="1037" name="Rect 0"/>
-          <p:cNvSpPr txBox="1">
-            <a:spLocks/>
-          </p:cNvSpPr>
-          <p:nvPr/>
-        </p:nvSpPr>
-        <p:spPr>
-          <a:xfrm rot="0">
-            <a:off x="6863715" y="4577715"/>
-            <a:ext cx="4442460" cy="1508125"/>
-          </a:xfrm>
-          <a:prstGeom prst="rect"/>
-          <a:noFill/>
-          <a:ln w="0">
-            <a:noFill/>
-            <a:prstDash/>
-          </a:ln>
-        </p:spPr>
-        <p:txBody>
-          <a:bodyPr wrap="square" lIns="89535" tIns="46355" rIns="89535" bIns="46355" numCol="1" vert="horz" anchor="t">
-            <a:spAutoFit/>
-          </a:bodyPr>
-          <a:lstStyle/>
-          <a:p>
-            <a:pPr marL="0" indent="0" algn="l" latinLnBrk="0" hangingPunct="1">
-              <a:buFontTx/>
-              <a:buNone/>
-            </a:pPr>
-            <a:r>
-              <a:rPr sz="2000" b="1">
-                <a:solidFill>
-                  <a:srgbClr val="0611F2"/>
-                </a:solidFill>
-                <a:latin typeface="맑은 고딕" charset="0"/>
-                <a:ea typeface="맑은 고딕" charset="0"/>
-              </a:rPr>
-              <a:t>2</a:t>
-            </a:r>
-            <a:r>
-              <a:rPr sz="2000" b="1">
-                <a:solidFill>
-                  <a:srgbClr val="0611F2"/>
-                </a:solidFill>
-                <a:latin typeface="맑은 고딕" charset="0"/>
-                <a:ea typeface="맑은 고딕" charset="0"/>
-              </a:rPr>
-              <a:t>. </a:t>
-            </a:r>
-            <a:r>
-              <a:rPr lang="ko-KR" sz="1800">
-                <a:latin typeface="맑은 고딕" charset="0"/>
-                <a:ea typeface="맑은 고딕" charset="0"/>
-              </a:rPr>
-              <a:t>그다음</a:t>
-            </a:r>
-            <a:r>
-              <a:rPr lang="ko-KR" sz="1800">
-                <a:latin typeface="맑은 고딕" charset="0"/>
-                <a:ea typeface="맑은 고딕" charset="0"/>
-              </a:rPr>
-              <a:t> </a:t>
-            </a:r>
-            <a:r>
-              <a:rPr lang="ko-KR" sz="1800">
-                <a:latin typeface="맑은 고딕" charset="0"/>
-                <a:ea typeface="맑은 고딕" charset="0"/>
-              </a:rPr>
-              <a:t>Window에서</a:t>
-            </a:r>
-            <a:r>
-              <a:rPr lang="ko-KR" sz="1800">
-                <a:latin typeface="맑은 고딕" charset="0"/>
-                <a:ea typeface="맑은 고딕" charset="0"/>
-              </a:rPr>
-              <a:t> </a:t>
-            </a:r>
-            <a:r>
-              <a:rPr lang="ko-KR" sz="1800">
-                <a:latin typeface="맑은 고딕" charset="0"/>
-                <a:ea typeface="맑은 고딕" charset="0"/>
-              </a:rPr>
-              <a:t>Asset</a:t>
-            </a:r>
-            <a:r>
-              <a:rPr lang="ko-KR" sz="1800">
-                <a:latin typeface="맑은 고딕" charset="0"/>
-                <a:ea typeface="맑은 고딕" charset="0"/>
-              </a:rPr>
-              <a:t> </a:t>
-            </a:r>
-            <a:r>
-              <a:rPr lang="ko-KR" sz="1800">
-                <a:latin typeface="맑은 고딕" charset="0"/>
-                <a:ea typeface="맑은 고딕" charset="0"/>
-              </a:rPr>
-              <a:t>Store를</a:t>
-            </a:r>
-            <a:r>
-              <a:rPr lang="ko-KR" sz="1800">
-                <a:latin typeface="맑은 고딕" charset="0"/>
-                <a:ea typeface="맑은 고딕" charset="0"/>
-              </a:rPr>
-              <a:t> </a:t>
-            </a:r>
-            <a:r>
-              <a:rPr lang="ko-KR" sz="1800">
-                <a:latin typeface="맑은 고딕" charset="0"/>
-                <a:ea typeface="맑은 고딕" charset="0"/>
-              </a:rPr>
-              <a:t>선택합니다. </a:t>
-            </a:r>
-            <a:endParaRPr lang="ko-KR" altLang="en-US" sz="1800">
-              <a:latin typeface="맑은 고딕" charset="0"/>
-              <a:ea typeface="맑은 고딕" charset="0"/>
-            </a:endParaRPr>
-          </a:p>
-          <a:p>
-            <a:pPr marL="0" indent="0" algn="l" latinLnBrk="0" hangingPunct="1">
-              <a:buFontTx/>
-              <a:buNone/>
-            </a:pPr>
-            <a:endParaRPr lang="ko-KR" altLang="en-US" sz="1800">
-              <a:latin typeface="맑은 고딕" charset="0"/>
-              <a:ea typeface="맑은 고딕" charset="0"/>
-            </a:endParaRPr>
-          </a:p>
-          <a:p>
-            <a:pPr marL="0" indent="0" algn="l" latinLnBrk="0" hangingPunct="1">
-              <a:buFontTx/>
-              <a:buNone/>
-            </a:pPr>
-            <a:r>
-              <a:rPr lang="ko-KR" sz="1800">
-                <a:latin typeface="맑은 고딕" charset="0"/>
-                <a:ea typeface="맑은 고딕" charset="0"/>
-              </a:rPr>
-              <a:t>그리고 Asset Store에서 Stones를 검색하고 Stones 에셋을 선택합니다.</a:t>
-            </a:r>
-            <a:endParaRPr lang="ko-KR" altLang="en-US" sz="1800">
-              <a:latin typeface="맑은 고딕" charset="0"/>
-              <a:ea typeface="맑은 고딕" charset="0"/>
-            </a:endParaRPr>
-          </a:p>
-        </p:txBody>
-      </p:sp>
       <p:pic>
         <p:nvPicPr>
           <p:cNvPr id="1042" name="그림 58"/>
@@ -7292,7 +7145,7 @@
       </p:sp>
       <p:pic>
         <p:nvPicPr>
-          <p:cNvPr id="1045" name="그림 65" descr="C:/Users/Admin1/AppData/Roaming/PolarisOffice/ETemp/16684_11126392/fImage28282796334.png"/>
+          <p:cNvPr id="1045" name="그림 65"/>
           <p:cNvPicPr>
             <a:picLocks noChangeAspect="1"/>
           </p:cNvPicPr>
@@ -7358,36 +7211,7 @@
       </p:cxnSp>
       <p:pic>
         <p:nvPicPr>
-          <p:cNvPr id="1048" name="그림 71" descr="C:/Users/Admin1/AppData/Roaming/PolarisOffice/ETemp/16684_11126392/fImage4331572829169.png"/>
-          <p:cNvPicPr>
-            <a:picLocks noChangeAspect="1"/>
-          </p:cNvPicPr>
-          <p:nvPr/>
-        </p:nvPicPr>
-        <p:blipFill rotWithShape="1">
-          <a:blip r:embed="rId6" cstate="hqprint">
-            <a:extLst>
-              <a:ext uri="{28A0092B-C50C-407E-A947-70E740481C1C}">
-                <a14:useLocalDpi xmlns:a14="http://schemas.microsoft.com/office/drawing/2010/main"/>
-              </a:ext>
-            </a:extLst>
-          </a:blip>
-          <a:stretch>
-            <a:fillRect/>
-          </a:stretch>
-        </p:blipFill>
-        <p:spPr>
-          <a:xfrm rot="0">
-            <a:off x="6866890" y="1280160"/>
-            <a:ext cx="4431665" cy="3143885"/>
-          </a:xfrm>
-          <a:prstGeom prst="rect"/>
-          <a:noFill/>
-        </p:spPr>
-      </p:pic>
-      <p:pic>
-        <p:nvPicPr>
-          <p:cNvPr id="1049" name="그림 1" descr="C:/Users/Admin1/AppData/Roaming/PolarisOffice/ETemp/16684_11126392/fImage453129141.png"/>
+          <p:cNvPr id="1049" name="그림 1"/>
           <p:cNvPicPr>
             <a:picLocks noChangeAspect="1"/>
           </p:cNvPicPr>
@@ -7409,6 +7233,187 @@
           <a:xfrm rot="0">
             <a:off x="3769995" y="1278890"/>
             <a:ext cx="1543685" cy="1672590"/>
+          </a:xfrm>
+          <a:prstGeom prst="roundRect"/>
+          <a:solidFill>
+            <a:srgbClr val="EDEDED"/>
+          </a:solidFill>
+        </p:spPr>
+      </p:pic>
+      <p:sp>
+        <p:nvSpPr>
+          <p:cNvPr id="1050" name="텍스트 상자 1"/>
+          <p:cNvSpPr txBox="1">
+            <a:spLocks/>
+          </p:cNvSpPr>
+          <p:nvPr/>
+        </p:nvSpPr>
+        <p:spPr>
+          <a:xfrm rot="0">
+            <a:off x="6817995" y="4297680"/>
+            <a:ext cx="4140835" cy="1784985"/>
+          </a:xfrm>
+          <a:prstGeom prst="rect"/>
+          <a:noFill/>
+          <a:ln w="0">
+            <a:noFill/>
+            <a:prstDash/>
+          </a:ln>
+        </p:spPr>
+        <p:txBody>
+          <a:bodyPr wrap="square" lIns="89535" tIns="46355" rIns="89535" bIns="46355" numCol="1" vert="horz" anchor="t">
+            <a:spAutoFit/>
+          </a:bodyPr>
+          <a:lstStyle/>
+          <a:p>
+            <a:pPr marL="0" indent="0" algn="l" latinLnBrk="0" hangingPunct="1">
+              <a:buFontTx/>
+              <a:buNone/>
+            </a:pPr>
+            <a:r>
+              <a:rPr lang="ko-KR" sz="2000" b="1">
+                <a:solidFill>
+                  <a:srgbClr val="0611F2"/>
+                </a:solidFill>
+                <a:latin typeface="맑은 고딕" charset="0"/>
+                <a:ea typeface="맑은 고딕" charset="0"/>
+              </a:rPr>
+              <a:t>2</a:t>
+            </a:r>
+            <a:r>
+              <a:rPr sz="2000" b="1">
+                <a:solidFill>
+                  <a:srgbClr val="0611F2"/>
+                </a:solidFill>
+                <a:latin typeface="맑은 고딕" charset="0"/>
+                <a:ea typeface="맑은 고딕" charset="0"/>
+              </a:rPr>
+              <a:t>. </a:t>
+            </a:r>
+            <a:r>
+              <a:rPr lang="ko-KR" sz="1800">
+                <a:latin typeface="맑은 고딕" charset="0"/>
+                <a:ea typeface="맑은 고딕" charset="0"/>
+              </a:rPr>
+              <a:t>그다음 버튼을 생성하고 버튼</a:t>
+            </a:r>
+            <a:r>
+              <a:rPr lang="ko-KR" sz="1800">
+                <a:latin typeface="맑은 고딕" charset="0"/>
+                <a:ea typeface="맑은 고딕" charset="0"/>
+              </a:rPr>
+              <a:t>의 </a:t>
+            </a:r>
+            <a:r>
+              <a:rPr lang="ko-KR" sz="1800">
+                <a:latin typeface="맑은 고딕" charset="0"/>
+                <a:ea typeface="맑은 고딕" charset="0"/>
+              </a:rPr>
+              <a:t> 이름을 Generic Create Button으로 변경합니다.</a:t>
+            </a:r>
+            <a:endParaRPr lang="ko-KR" altLang="en-US" sz="1800">
+              <a:latin typeface="맑은 고딕" charset="0"/>
+              <a:ea typeface="맑은 고딕" charset="0"/>
+            </a:endParaRPr>
+          </a:p>
+          <a:p>
+            <a:pPr marL="0" indent="0" algn="l" latinLnBrk="0" hangingPunct="1">
+              <a:buFontTx/>
+              <a:buNone/>
+            </a:pPr>
+            <a:endParaRPr lang="ko-KR" altLang="en-US" sz="1800">
+              <a:latin typeface="맑은 고딕" charset="0"/>
+              <a:ea typeface="맑은 고딕" charset="0"/>
+            </a:endParaRPr>
+          </a:p>
+          <a:p>
+            <a:pPr marL="0" indent="0" algn="l" latinLnBrk="0" hangingPunct="1">
+              <a:buFontTx/>
+              <a:buNone/>
+            </a:pPr>
+            <a:r>
+              <a:rPr lang="ko-KR" sz="1800">
+                <a:latin typeface="맑은 고딕" charset="0"/>
+                <a:ea typeface="맑은 고딕" charset="0"/>
+              </a:rPr>
+              <a:t>그</a:t>
+            </a:r>
+            <a:r>
+              <a:rPr lang="ko-KR" sz="1800">
+                <a:latin typeface="맑은 고딕" charset="0"/>
+                <a:ea typeface="맑은 고딕" charset="0"/>
+              </a:rPr>
+              <a:t>런 다음</a:t>
+            </a:r>
+            <a:r>
+              <a:rPr lang="ko-KR" sz="1800">
+                <a:latin typeface="맑은 고딕" charset="0"/>
+                <a:ea typeface="맑은 고딕" charset="0"/>
+              </a:rPr>
+              <a:t> Generic Create Button의 하위 오브젝트 Text를 선택합니다.</a:t>
+            </a:r>
+            <a:endParaRPr lang="ko-KR" altLang="en-US" sz="1800">
+              <a:latin typeface="맑은 고딕" charset="0"/>
+              <a:ea typeface="맑은 고딕" charset="0"/>
+            </a:endParaRPr>
+          </a:p>
+        </p:txBody>
+      </p:sp>
+      <p:pic>
+        <p:nvPicPr>
+          <p:cNvPr id="1051" name="그림 2" descr="C:/Users/Admin1/AppData/Roaming/PolarisOffice/ETemp/20572_22936136/fImage191383915447.png"/>
+          <p:cNvPicPr>
+            <a:picLocks noChangeAspect="1"/>
+          </p:cNvPicPr>
+          <p:nvPr/>
+        </p:nvPicPr>
+        <p:blipFill rotWithShape="1">
+          <a:blip r:embed="rId9" cstate="hqprint">
+            <a:extLst>
+              <a:ext uri="{28A0092B-C50C-407E-A947-70E740481C1C}">
+                <a14:useLocalDpi xmlns:a14="http://schemas.microsoft.com/office/drawing/2010/main"/>
+              </a:ext>
+            </a:extLst>
+          </a:blip>
+          <a:stretch>
+            <a:fillRect/>
+          </a:stretch>
+        </p:blipFill>
+        <p:spPr>
+          <a:xfrm rot="0">
+            <a:off x="6814820" y="1277620"/>
+            <a:ext cx="2265045" cy="2894965"/>
+          </a:xfrm>
+          <a:prstGeom prst="roundRect"/>
+          <a:solidFill>
+            <a:srgbClr val="EDEDED"/>
+          </a:solidFill>
+        </p:spPr>
+      </p:pic>
+      <p:pic>
+        <p:nvPicPr>
+          <p:cNvPr id="1052" name="그림 3" descr="C:/Users/Admin1/AppData/Roaming/PolarisOffice/ETemp/20572_22936136/fImage51191929169.png"/>
+          <p:cNvPicPr>
+            <a:picLocks noChangeAspect="1"/>
+          </p:cNvPicPr>
+          <p:nvPr/>
+        </p:nvPicPr>
+        <p:blipFill rotWithShape="1">
+          <a:blip r:embed="rId10" cstate="hqprint">
+            <a:extLst>
+              <a:ext uri="{28A0092B-C50C-407E-A947-70E740481C1C}">
+                <a14:useLocalDpi xmlns:a14="http://schemas.microsoft.com/office/drawing/2010/main"/>
+              </a:ext>
+            </a:extLst>
+          </a:blip>
+          <a:stretch>
+            <a:fillRect/>
+          </a:stretch>
+        </p:blipFill>
+        <p:spPr>
+          <a:xfrm rot="0">
+            <a:off x="9326880" y="1770380"/>
+            <a:ext cx="1631315" cy="1922145"/>
           </a:xfrm>
           <a:prstGeom prst="roundRect"/>
           <a:solidFill>
@@ -8042,8 +8047,8 @@
         </p:nvSpPr>
         <p:spPr>
           <a:xfrm rot="0">
-            <a:off x="992505" y="1619885"/>
-            <a:ext cx="4362450" cy="3969385"/>
+            <a:off x="1047750" y="1619885"/>
+            <a:ext cx="4307840" cy="4246245"/>
           </a:xfrm>
           <a:prstGeom prst="rect"/>
           <a:noFill/>
@@ -8067,21 +8072,7 @@
                 <a:latin typeface="맑은 고딕" charset="0"/>
                 <a:ea typeface="맑은 고딕" charset="0"/>
               </a:rPr>
-              <a:t>Destroy( )</a:t>
-            </a:r>
-            <a:r>
-              <a:rPr lang="ko-KR" sz="1800">
-                <a:latin typeface="맑은 고딕" charset="0"/>
-                <a:ea typeface="맑은 고딕" charset="0"/>
-              </a:rPr>
-              <a:t> </a:t>
-            </a:r>
-            <a:r>
-              <a:rPr lang="ko-KR" sz="1800">
-                <a:latin typeface="맑은 고딕" charset="0"/>
-                <a:ea typeface="맑은 고딕" charset="0"/>
-              </a:rPr>
-              <a:t>함수는 게임 오브젝트를 파괴하는 함수입니다.</a:t>
+              <a:t>Destroy( ) 함수는 게임 오브젝트를 파괴하는 함수입니다.</a:t>
             </a:r>
             <a:endParaRPr lang="ko-KR" altLang="en-US" sz="1800">
               <a:latin typeface="맑은 고딕" charset="0"/>
@@ -8135,28 +8126,7 @@
                 <a:latin typeface="맑은 고딕" charset="0"/>
                 <a:ea typeface="맑은 고딕" charset="0"/>
               </a:rPr>
-              <a:t>Destroy( )</a:t>
-            </a:r>
-            <a:r>
-              <a:rPr lang="ko-KR" sz="1800">
-                <a:latin typeface="맑은 고딕" charset="0"/>
-                <a:ea typeface="맑은 고딕" charset="0"/>
-              </a:rPr>
-              <a:t> </a:t>
-            </a:r>
-            <a:r>
-              <a:rPr lang="ko-KR" sz="1800">
-                <a:latin typeface="맑은 고딕" charset="0"/>
-                <a:ea typeface="맑은 고딕" charset="0"/>
-              </a:rPr>
-              <a:t>함수</a:t>
-            </a:r>
-            <a:r>
-              <a:rPr lang="ko-KR" sz="1800">
-                <a:latin typeface="맑은 고딕" charset="0"/>
-                <a:ea typeface="맑은 고딕" charset="0"/>
-              </a:rPr>
-              <a:t>로 게임 오브젝트를 파괴하게 되면 메모리 공간에는 동적으로 할당한 게임 오브젝트의 메모리가 남아있습니다.</a:t>
+              <a:t>게임 오브젝트가 메모리에서 해제되면 Object의 == 연산자 오버로딩으로 인하여 해제된 객체를 확인할 수 있습니다.</a:t>
             </a:r>
             <a:endParaRPr lang="ko-KR" altLang="en-US" sz="1800">
               <a:latin typeface="맑은 고딕" charset="0"/>
@@ -8183,13 +8153,30 @@
                 <a:latin typeface="맑은 고딕" charset="0"/>
                 <a:ea typeface="맑은 고딕" charset="0"/>
               </a:rPr>
-              <a:t>하지만, 특정 시점에서 자동으로 메모리를 관리하는 가비지 컬렉터가 동작하여 메모리를 해제시켜 줍니다.</a:t>
+              <a:t>객체가 메모리에서 해제되었을 때</a:t>
             </a:r>
             <a:endParaRPr lang="ko-KR" altLang="en-US" sz="1800">
               <a:latin typeface="맑은 고딕" charset="0"/>
               <a:ea typeface="맑은 고딕" charset="0"/>
             </a:endParaRPr>
           </a:p>
+          <a:p>
+            <a:pPr marL="0" indent="0" algn="l" latinLnBrk="0" hangingPunct="1">
+              <a:buFontTx/>
+              <a:buNone/>
+            </a:pPr>
+            <a:r>
+              <a:rPr lang="ko-KR" sz="1800">
+                <a:latin typeface="맑은 고딕" charset="0"/>
+                <a:ea typeface="맑은 고딕" charset="0"/>
+              </a:rPr>
+              <a:t>객체를 참조하는 참조 변수들은 허상 포인터가 되지 않도록 null을 가리키도록 설정합니다.</a:t>
+            </a:r>
+            <a:endParaRPr lang="ko-KR" altLang="en-US" sz="1800">
+              <a:latin typeface="맑은 고딕" charset="0"/>
+              <a:ea typeface="맑은 고딕" charset="0"/>
+            </a:endParaRPr>
+          </a:p>
         </p:txBody>
       </p:sp>
       <p:sp>
@@ -8202,8 +8189,8 @@
         </p:nvSpPr>
         <p:spPr>
           <a:xfrm rot="0">
-            <a:off x="6808470" y="4639945"/>
-            <a:ext cx="4157345" cy="1200785"/>
+            <a:off x="6817360" y="4385945"/>
+            <a:ext cx="4145280" cy="1477645"/>
           </a:xfrm>
           <a:prstGeom prst="rect"/>
           <a:noFill/>
@@ -8227,7 +8214,14 @@
                 <a:latin typeface="맑은 고딕" charset="0"/>
                 <a:ea typeface="맑은 고딕" charset="0"/>
               </a:rPr>
-              <a:t>게임 오브젝트를 한 번에 많이 파괴하게 되면 일시적으로 가비지 컬렉터가 메모리를 해제할 때 어느 정도 시간이 소요될 수 있습니다.</a:t>
+              <a:t>Destroy( ) 함수로 게임 오브젝트를 </a:t>
+            </a:r>
+            <a:r>
+              <a:rPr lang="ko-KR" sz="1800">
+                <a:latin typeface="맑은 고딕" charset="0"/>
+                <a:ea typeface="맑은 고딕" charset="0"/>
+              </a:rPr>
+              <a:t>파괴했을 때 C++ nativeObject는 메모리에서 해제되며, C# UnityEngine.Object는 객체이기 때문에 해제되지 않습니다.</a:t>
             </a:r>
             <a:endParaRPr lang="ko-KR" altLang="en-US" sz="1800">
               <a:latin typeface="맑은 고딕" charset="0"/>
@@ -8238,17 +8232,17 @@
       </p:sp>
       <p:pic>
         <p:nvPicPr>
-          <p:cNvPr id="1110" name="그림 24" descr="C:/Users/Admin1/AppData/Roaming/PolarisOffice/ETemp/16684_11126392/fImage187452986500.png"/>
+          <p:cNvPr id="1110" name="그림 24" descr="C:/Users/Admin1/AppData/Roaming/PolarisOffice/ETemp/20572_22936136/fImage187452986500.png"/>
           <p:cNvPicPr>
             <a:picLocks noChangeAspect="1"/>
           </p:cNvPicPr>
           <p:nvPr/>
         </p:nvPicPr>
         <p:blipFill rotWithShape="1">
-          <a:blip r:embed="rId12" cstate="print">
+          <a:blip r:embed="rId12" cstate="hqprint">
             <a:extLst>
               <a:ext uri="{28A0092B-C50C-407E-A947-70E740481C1C}">
-                <a14:useLocalDpi xmlns:a14="http://schemas.microsoft.com/office/drawing/2010/main" val="0"/>
+                <a14:useLocalDpi xmlns:a14="http://schemas.microsoft.com/office/drawing/2010/main"/>
               </a:ext>
             </a:extLst>
           </a:blip>
@@ -8259,7 +8253,7 @@
         <p:spPr>
           <a:xfrm rot="0">
             <a:off x="6816725" y="1612265"/>
-            <a:ext cx="4140835" cy="2844165"/>
+            <a:ext cx="4141470" cy="2635250"/>
           </a:xfrm>
           <a:prstGeom prst="roundRect"/>
           <a:solidFill>
@@ -8369,7 +8363,7 @@
       </p:sp>
       <p:sp>
         <p:nvSpPr>
-          <p:cNvPr id="1037" name="Rect 0"/>
+          <p:cNvPr id="1032" name="텍스트 상자 6"/>
           <p:cNvSpPr txBox="1">
             <a:spLocks/>
           </p:cNvSpPr>
@@ -8377,8 +8371,8 @@
         </p:nvSpPr>
         <p:spPr>
           <a:xfrm rot="0">
-            <a:off x="6816725" y="2125345"/>
-            <a:ext cx="4157345" cy="400685"/>
+            <a:off x="1395730" y="5154295"/>
+            <a:ext cx="3959225" cy="954405"/>
           </a:xfrm>
           <a:prstGeom prst="rect"/>
           <a:noFill/>
@@ -8405,7 +8399,7 @@
                 <a:latin typeface="맑은 고딕" charset="0"/>
                 <a:ea typeface="맑은 고딕" charset="0"/>
               </a:rPr>
-              <a:t>5</a:t>
+              <a:t>3</a:t>
             </a:r>
             <a:r>
               <a:rPr sz="2000" b="1">
@@ -8422,7 +8416,14 @@
                 <a:latin typeface="맑은 고딕" charset="0"/>
                 <a:ea typeface="맑은 고딕" charset="0"/>
               </a:rPr>
-              <a:t>그다음 Open in Unity를 선택합니다.</a:t>
+              <a:t>이제</a:t>
+            </a:r>
+            <a:r>
+              <a:rPr lang="ko-KR" sz="1800">
+                <a:latin typeface="맑은 고딕" charset="0"/>
+                <a:ea typeface="맑은 고딕" charset="0"/>
+              </a:rPr>
+              <a:t> Generic Create Button의 Text에 Genenric Stone Create로 정의합니다.</a:t>
             </a:r>
             <a:endParaRPr lang="ko-KR" altLang="en-US" sz="1800">
               <a:latin typeface="맑은 고딕" charset="0"/>
@@ -8431,111 +8432,16 @@
           </a:p>
         </p:txBody>
       </p:sp>
-      <p:sp>
-        <p:nvSpPr>
-          <p:cNvPr id="1044" name="Rect 0"/>
-          <p:cNvSpPr txBox="1">
-            <a:spLocks/>
-          </p:cNvSpPr>
-          <p:nvPr/>
-        </p:nvSpPr>
-        <p:spPr>
-          <a:xfrm rot="0">
-            <a:off x="1473835" y="2953385"/>
-            <a:ext cx="3896995" cy="677545"/>
-          </a:xfrm>
-          <a:prstGeom prst="rect"/>
-          <a:noFill/>
-          <a:ln w="0">
-            <a:noFill/>
-            <a:prstDash/>
-          </a:ln>
-        </p:spPr>
-        <p:txBody>
-          <a:bodyPr wrap="square" lIns="89535" tIns="46355" rIns="89535" bIns="46355" numCol="1" vert="horz" anchor="t">
-            <a:spAutoFit/>
-          </a:bodyPr>
-          <a:lstStyle/>
-          <a:p>
-            <a:pPr marL="0" indent="0" algn="l" latinLnBrk="0" hangingPunct="1">
-              <a:buFontTx/>
-              <a:buNone/>
-            </a:pPr>
-            <a:r>
-              <a:rPr sz="2000" b="1">
-                <a:solidFill>
-                  <a:srgbClr val="0611F2"/>
-                </a:solidFill>
-                <a:latin typeface="맑은 고딕" charset="0"/>
-                <a:ea typeface="맑은 고딕" charset="0"/>
-              </a:rPr>
-              <a:t>3</a:t>
-            </a:r>
-            <a:r>
-              <a:rPr sz="2000" b="1">
-                <a:solidFill>
-                  <a:srgbClr val="0611F2"/>
-                </a:solidFill>
-                <a:latin typeface="맑은 고딕" charset="0"/>
-                <a:ea typeface="맑은 고딕" charset="0"/>
-              </a:rPr>
-              <a:t>. </a:t>
-            </a:r>
-            <a:r>
-              <a:rPr lang="ko-KR" sz="1800">
-                <a:latin typeface="맑은 고딕" charset="0"/>
-                <a:ea typeface="맑은 고딕" charset="0"/>
-              </a:rPr>
-              <a:t>그런 다음 Stones 에셋에서 Add to My Assets를 선택합니다.</a:t>
-            </a:r>
-            <a:endParaRPr lang="ko-KR" altLang="en-US" sz="1800">
-              <a:latin typeface="맑은 고딕" charset="0"/>
-              <a:ea typeface="맑은 고딕" charset="0"/>
-            </a:endParaRPr>
-          </a:p>
-        </p:txBody>
-      </p:sp>
       <p:pic>
         <p:nvPicPr>
-          <p:cNvPr id="1049" name="그림 73"/>
+          <p:cNvPr id="1033" name="그림 7" descr="C:/Users/Admin1/AppData/Roaming/PolarisOffice/ETemp/20572_22936136/fImage396362805724.png"/>
           <p:cNvPicPr>
             <a:picLocks noChangeAspect="1"/>
           </p:cNvPicPr>
           <p:nvPr/>
         </p:nvPicPr>
         <p:blipFill rotWithShape="1">
-          <a:blip r:embed="rId2" cstate="print">
-            <a:extLst>
-              <a:ext uri="{28A0092B-C50C-407E-A947-70E740481C1C}">
-                <a14:useLocalDpi xmlns:a14="http://schemas.microsoft.com/office/drawing/2010/main" val="0"/>
-              </a:ext>
-            </a:extLst>
-          </a:blip>
-          <a:stretch>
-            <a:fillRect/>
-          </a:stretch>
-        </p:blipFill>
-        <p:spPr>
-          <a:xfrm rot="0">
-            <a:off x="1471295" y="1280160"/>
-            <a:ext cx="3899535" cy="1630045"/>
-          </a:xfrm>
-          <a:prstGeom prst="roundRect"/>
-          <a:solidFill>
-            <a:srgbClr val="EDEDED"/>
-          </a:solidFill>
-        </p:spPr>
-      </p:pic>
-      <p:pic>
-        <p:nvPicPr>
-          <p:cNvPr id="1050" name="그림 76" descr="C:/Users/Admin1/AppData/Roaming/PolarisOffice/ETemp/20484_12237088/fImage364812981478.png"/>
-          <p:cNvPicPr>
-            <a:picLocks noChangeAspect="1"/>
-          </p:cNvPicPr>
-          <p:nvPr/>
-        </p:nvPicPr>
-        <p:blipFill rotWithShape="1">
-          <a:blip r:embed="rId3" cstate="hqprint">
+          <a:blip r:embed="rId7" cstate="hqprint">
             <a:extLst>
               <a:ext uri="{28A0092B-C50C-407E-A947-70E740481C1C}">
                 <a14:useLocalDpi xmlns:a14="http://schemas.microsoft.com/office/drawing/2010/main"/>
@@ -8548,18 +8454,16 @@
         </p:blipFill>
         <p:spPr>
           <a:xfrm rot="0">
-            <a:off x="1463040" y="3749675"/>
-            <a:ext cx="3908425" cy="1946275"/>
-          </a:xfrm>
-          <a:prstGeom prst="roundRect"/>
-          <a:solidFill>
-            <a:srgbClr val="EDEDED"/>
-          </a:solidFill>
+            <a:off x="1397000" y="1373505"/>
+            <a:ext cx="3957320" cy="3669030"/>
+          </a:xfrm>
+          <a:prstGeom prst="rect"/>
+          <a:noFill/>
         </p:spPr>
       </p:pic>
       <p:sp>
         <p:nvSpPr>
-          <p:cNvPr id="1051" name="텍스트 상자 77"/>
+          <p:cNvPr id="1034" name="텍스트 상자 8"/>
           <p:cNvSpPr txBox="1">
             <a:spLocks/>
           </p:cNvSpPr>
@@ -8567,8 +8471,8 @@
         </p:nvSpPr>
         <p:spPr>
           <a:xfrm rot="0">
-            <a:off x="1470660" y="5826760"/>
-            <a:ext cx="3896995" cy="400685"/>
+            <a:off x="6801485" y="5149850"/>
+            <a:ext cx="4218305" cy="954405"/>
           </a:xfrm>
           <a:prstGeom prst="rect"/>
           <a:noFill/>
@@ -8612,7 +8516,7 @@
                 <a:latin typeface="맑은 고딕" charset="0"/>
                 <a:ea typeface="맑은 고딕" charset="0"/>
               </a:rPr>
-              <a:t>그리고 Accept를 선택합니다.</a:t>
+              <a:t>그다음으로 Generic Create Button을 선택하고 On Click 함수에 Event를 추가합니다.</a:t>
             </a:r>
             <a:endParaRPr lang="ko-KR" altLang="en-US" sz="1800">
               <a:latin typeface="맑은 고딕" charset="0"/>
@@ -8623,45 +8527,14 @@
       </p:sp>
       <p:pic>
         <p:nvPicPr>
-          <p:cNvPr id="1052" name="그림 78"/>
+          <p:cNvPr id="1035" name="그림 9" descr="C:/Users/Admin1/AppData/Roaming/PolarisOffice/ETemp/20572_22936136/fImage384292811478.png"/>
           <p:cNvPicPr>
             <a:picLocks noChangeAspect="1"/>
           </p:cNvPicPr>
           <p:nvPr/>
         </p:nvPicPr>
         <p:blipFill rotWithShape="1">
-          <a:blip r:embed="rId4" cstate="print">
-            <a:extLst>
-              <a:ext uri="{28A0092B-C50C-407E-A947-70E740481C1C}">
-                <a14:useLocalDpi xmlns:a14="http://schemas.microsoft.com/office/drawing/2010/main" val="0"/>
-              </a:ext>
-            </a:extLst>
-          </a:blip>
-          <a:stretch>
-            <a:fillRect/>
-          </a:stretch>
-        </p:blipFill>
-        <p:spPr>
-          <a:xfrm rot="0">
-            <a:off x="6824980" y="1278890"/>
-            <a:ext cx="4140835" cy="725170"/>
-          </a:xfrm>
-          <a:prstGeom prst="roundRect"/>
-          <a:solidFill>
-            <a:srgbClr val="EDEDED"/>
-          </a:solidFill>
-        </p:spPr>
-      </p:pic>
-      <p:pic>
-        <p:nvPicPr>
-          <p:cNvPr id="1053" name="그림 81" descr="C:/Users/Admin1/AppData/Roaming/PolarisOffice/ETemp/20484_12237088/fImage1348413016962.png"/>
-          <p:cNvPicPr>
-            <a:picLocks noChangeAspect="1"/>
-          </p:cNvPicPr>
-          <p:nvPr/>
-        </p:nvPicPr>
-        <p:blipFill rotWithShape="1">
-          <a:blip r:embed="rId5" cstate="hqprint">
+          <a:blip r:embed="rId8" cstate="hqprint">
             <a:extLst>
               <a:ext uri="{28A0092B-C50C-407E-A947-70E740481C1C}">
                 <a14:useLocalDpi xmlns:a14="http://schemas.microsoft.com/office/drawing/2010/main"/>
@@ -8674,77 +8547,13 @@
         </p:blipFill>
         <p:spPr>
           <a:xfrm rot="0">
-            <a:off x="6816725" y="2701925"/>
-            <a:ext cx="4156075" cy="2369820"/>
+            <a:off x="6797040" y="1373505"/>
+            <a:ext cx="4225925" cy="3634740"/>
           </a:xfrm>
           <a:prstGeom prst="rect"/>
           <a:noFill/>
         </p:spPr>
       </p:pic>
-      <p:sp>
-        <p:nvSpPr>
-          <p:cNvPr id="1054" name="텍스트 상자 82"/>
-          <p:cNvSpPr txBox="1">
-            <a:spLocks/>
-          </p:cNvSpPr>
-          <p:nvPr/>
-        </p:nvSpPr>
-        <p:spPr>
-          <a:xfrm rot="0">
-            <a:off x="6812915" y="5250180"/>
-            <a:ext cx="4161155" cy="954405"/>
-          </a:xfrm>
-          <a:prstGeom prst="rect"/>
-          <a:noFill/>
-          <a:ln w="0">
-            <a:noFill/>
-            <a:prstDash/>
-          </a:ln>
-        </p:spPr>
-        <p:txBody>
-          <a:bodyPr wrap="square" lIns="89535" tIns="46355" rIns="89535" bIns="46355" numCol="1" vert="horz" anchor="t">
-            <a:spAutoFit/>
-          </a:bodyPr>
-          <a:lstStyle/>
-          <a:p>
-            <a:pPr marL="0" indent="0" algn="l" latinLnBrk="0" hangingPunct="1">
-              <a:buFontTx/>
-              <a:buNone/>
-            </a:pPr>
-            <a:r>
-              <a:rPr lang="ko-KR" sz="2000" b="1">
-                <a:solidFill>
-                  <a:srgbClr val="0611F2"/>
-                </a:solidFill>
-                <a:latin typeface="맑은 고딕" charset="0"/>
-                <a:ea typeface="맑은 고딕" charset="0"/>
-              </a:rPr>
-              <a:t>6</a:t>
-            </a:r>
-            <a:r>
-              <a:rPr sz="2000" b="1">
-                <a:solidFill>
-                  <a:srgbClr val="0611F2"/>
-                </a:solidFill>
-                <a:latin typeface="맑은 고딕" charset="0"/>
-                <a:ea typeface="맑은 고딕" charset="0"/>
-              </a:rPr>
-              <a:t>. </a:t>
-            </a:r>
-            <a:r>
-              <a:rPr lang="ko-KR" sz="1800">
-                <a:latin typeface="맑은 고딕" charset="0"/>
-                <a:ea typeface="맑은 고딕" charset="0"/>
-              </a:rPr>
-              <a:t>그리고 유니티에서 Stones 에셋이 My Assets에 추가되었고 그다음 Download를 선택합니다.</a:t>
-            </a:r>
-            <a:endParaRPr lang="ko-KR" altLang="en-US" sz="1800">
-              <a:latin typeface="맑은 고딕" charset="0"/>
-              <a:ea typeface="맑은 고딕" charset="0"/>
-            </a:endParaRPr>
-          </a:p>
-        </p:txBody>
-      </p:sp>
     </p:spTree>
   </p:cSld>
   <p:clrMapOvr>
@@ -8847,7 +8656,7 @@
       </p:sp>
       <p:sp>
         <p:nvSpPr>
-          <p:cNvPr id="1051" name="Rect 0"/>
+          <p:cNvPr id="1054" name="Rect 0"/>
           <p:cNvSpPr txBox="1">
             <a:spLocks/>
           </p:cNvSpPr>
@@ -8855,8 +8664,8 @@
         </p:nvSpPr>
         <p:spPr>
           <a:xfrm rot="0">
-            <a:off x="1354455" y="4671695"/>
-            <a:ext cx="4024630" cy="1508125"/>
+            <a:off x="6810375" y="4114800"/>
+            <a:ext cx="4151630" cy="2061845"/>
           </a:xfrm>
           <a:prstGeom prst="rect"/>
           <a:noFill/>
@@ -8883,7 +8692,7 @@
                 <a:latin typeface="맑은 고딕" charset="0"/>
                 <a:ea typeface="맑은 고딕" charset="0"/>
               </a:rPr>
-              <a:t>7</a:t>
+              <a:t>6</a:t>
             </a:r>
             <a:r>
               <a:rPr sz="2000" b="1">
@@ -8900,7 +8709,28 @@
                 <a:latin typeface="맑은 고딕" charset="0"/>
                 <a:ea typeface="맑은 고딕" charset="0"/>
               </a:rPr>
-              <a:t>Download가 완료되면 Import를 선택합니다.</a:t>
+              <a:t>그</a:t>
+            </a:r>
+            <a:r>
+              <a:rPr lang="ko-KR" sz="1800">
+                <a:latin typeface="맑은 고딕" charset="0"/>
+                <a:ea typeface="맑은 고딕" charset="0"/>
+              </a:rPr>
+              <a:t>런 </a:t>
+            </a:r>
+            <a:r>
+              <a:rPr lang="ko-KR" sz="1800">
+                <a:latin typeface="맑은 고딕" charset="0"/>
+                <a:ea typeface="맑은 고딕" charset="0"/>
+              </a:rPr>
+              <a:t>다음 Create 스크립트에서 게임 오브젝트 변수와 </a:t>
+            </a:r>
+            <a:r>
+              <a:rPr lang="ko-KR" sz="1800">
+                <a:latin typeface="맑은 고딕" charset="0"/>
+                <a:ea typeface="맑은 고딕" charset="0"/>
+              </a:rPr>
+              <a:t>Transform 배열을 선언합니다.</a:t>
             </a:r>
             <a:endParaRPr lang="ko-KR" altLang="en-US" sz="1800">
               <a:latin typeface="맑은 고딕" charset="0"/>
@@ -8927,7 +8757,7 @@
                 <a:latin typeface="맑은 고딕" charset="0"/>
                 <a:ea typeface="맑은 고딕" charset="0"/>
               </a:rPr>
-              <a:t>그런 다음 Stones의 구성 요소를 전체 선택한 다음 Import를 합니다.</a:t>
+              <a:t>그러고 나서 GenericCreate( ) 함수에 생성할 게임 오브젝트와 생성되는 위치 그리고 회전 값을 설정합니다.</a:t>
             </a:r>
             <a:endParaRPr lang="ko-KR" altLang="en-US" sz="1800">
               <a:latin typeface="맑은 고딕" charset="0"/>
@@ -8936,80 +8766,16 @@
           </a:p>
         </p:txBody>
       </p:sp>
-      <p:sp>
-        <p:nvSpPr>
-          <p:cNvPr id="1054" name="Rect 0"/>
-          <p:cNvSpPr txBox="1">
-            <a:spLocks/>
-          </p:cNvSpPr>
-          <p:nvPr/>
-        </p:nvSpPr>
-        <p:spPr>
-          <a:xfrm rot="0">
-            <a:off x="6812915" y="2748915"/>
-            <a:ext cx="4144645" cy="954405"/>
-          </a:xfrm>
-          <a:prstGeom prst="rect"/>
-          <a:noFill/>
-          <a:ln w="0">
-            <a:noFill/>
-            <a:prstDash/>
-          </a:ln>
-        </p:spPr>
-        <p:txBody>
-          <a:bodyPr wrap="square" lIns="89535" tIns="46355" rIns="89535" bIns="46355" numCol="1" vert="horz" anchor="t">
-            <a:spAutoFit/>
-          </a:bodyPr>
-          <a:lstStyle/>
-          <a:p>
-            <a:pPr marL="0" indent="0" algn="l" latinLnBrk="0" hangingPunct="1">
-              <a:buFontTx/>
-              <a:buNone/>
-            </a:pPr>
-            <a:r>
-              <a:rPr lang="ko-KR" sz="2000" b="1">
-                <a:solidFill>
-                  <a:srgbClr val="0611F2"/>
-                </a:solidFill>
-                <a:latin typeface="맑은 고딕" charset="0"/>
-                <a:ea typeface="맑은 고딕" charset="0"/>
-              </a:rPr>
-              <a:t>8</a:t>
-            </a:r>
-            <a:r>
-              <a:rPr sz="2000" b="1">
-                <a:solidFill>
-                  <a:srgbClr val="0611F2"/>
-                </a:solidFill>
-                <a:latin typeface="맑은 고딕" charset="0"/>
-                <a:ea typeface="맑은 고딕" charset="0"/>
-              </a:rPr>
-              <a:t>. </a:t>
-            </a:r>
-            <a:r>
-              <a:rPr lang="ko-KR" sz="1800">
-                <a:latin typeface="맑은 고딕" charset="0"/>
-                <a:ea typeface="맑은 고딕" charset="0"/>
-              </a:rPr>
-              <a:t>그다음 Create 스크립트에서 게임 오브젝트 변수와 게임 오브젝트를 생성하는 함수를 선언합니다.</a:t>
-            </a:r>
-            <a:endParaRPr lang="ko-KR" altLang="en-US" sz="1800">
-              <a:latin typeface="맑은 고딕" charset="0"/>
-              <a:ea typeface="맑은 고딕" charset="0"/>
-            </a:endParaRPr>
-          </a:p>
-        </p:txBody>
-      </p:sp>
       <p:pic>
         <p:nvPicPr>
-          <p:cNvPr id="1056" name="그림 84"/>
+          <p:cNvPr id="1062" name="그림 10" descr="C:/Users/Admin1/AppData/Roaming/PolarisOffice/ETemp/20572_22936136/fImage1877317641.png"/>
           <p:cNvPicPr>
             <a:picLocks noChangeAspect="1"/>
           </p:cNvPicPr>
           <p:nvPr/>
         </p:nvPicPr>
         <p:blipFill rotWithShape="1">
-          <a:blip r:embed="rId2" cstate="print">
+          <a:blip r:embed="rId8" cstate="print">
             <a:extLst>
               <a:ext uri="{28A0092B-C50C-407E-A947-70E740481C1C}">
                 <a14:useLocalDpi xmlns:a14="http://schemas.microsoft.com/office/drawing/2010/main" val="0"/>
@@ -9022,23 +8788,89 @@
         </p:blipFill>
         <p:spPr>
           <a:xfrm rot="0">
-            <a:off x="3857625" y="1278255"/>
-            <a:ext cx="1521460" cy="3202940"/>
+            <a:off x="1404620" y="1421130"/>
+            <a:ext cx="2572385" cy="3914140"/>
+          </a:xfrm>
+          <a:prstGeom prst="roundRect"/>
+          <a:solidFill>
+            <a:srgbClr val="EDEDED"/>
+          </a:solidFill>
+        </p:spPr>
+      </p:pic>
+      <p:sp>
+        <p:nvSpPr>
+          <p:cNvPr id="1063" name="텍스트 상자 13"/>
+          <p:cNvSpPr txBox="1">
+            <a:spLocks/>
+          </p:cNvSpPr>
+          <p:nvPr/>
+        </p:nvSpPr>
+        <p:spPr>
+          <a:xfrm rot="0">
+            <a:off x="1396365" y="5499100"/>
+            <a:ext cx="3985895" cy="677545"/>
           </a:xfrm>
           <a:prstGeom prst="rect"/>
           <a:noFill/>
-        </p:spPr>
-      </p:pic>
+          <a:ln w="0">
+            <a:noFill/>
+            <a:prstDash/>
+          </a:ln>
+        </p:spPr>
+        <p:txBody>
+          <a:bodyPr wrap="square" lIns="89535" tIns="46355" rIns="89535" bIns="46355" numCol="1" vert="horz" anchor="t">
+            <a:spAutoFit/>
+          </a:bodyPr>
+          <a:lstStyle/>
+          <a:p>
+            <a:pPr marL="0" indent="0" algn="l" latinLnBrk="0" hangingPunct="1">
+              <a:buFontTx/>
+              <a:buNone/>
+            </a:pPr>
+            <a:r>
+              <a:rPr sz="2000" b="1">
+                <a:solidFill>
+                  <a:srgbClr val="0611F2"/>
+                </a:solidFill>
+                <a:latin typeface="맑은 고딕" charset="0"/>
+                <a:ea typeface="맑은 고딕" charset="0"/>
+              </a:rPr>
+              <a:t>5</a:t>
+            </a:r>
+            <a:r>
+              <a:rPr sz="2000" b="1">
+                <a:solidFill>
+                  <a:srgbClr val="0611F2"/>
+                </a:solidFill>
+                <a:latin typeface="맑은 고딕" charset="0"/>
+                <a:ea typeface="맑은 고딕" charset="0"/>
+              </a:rPr>
+              <a:t>. </a:t>
+            </a:r>
+            <a:r>
+              <a:rPr lang="ko-KR" sz="1800">
+                <a:latin typeface="맑은 고딕" charset="0"/>
+                <a:ea typeface="맑은 고딕" charset="0"/>
+              </a:rPr>
+              <a:t>그리고 3D Object를 선택하여 Plane 게임 오브젝트를 생성합니다.</a:t>
+            </a:r>
+            <a:endParaRPr lang="ko-KR" altLang="en-US" sz="1800">
+              <a:latin typeface="맑은 고딕" charset="0"/>
+              <a:ea typeface="맑은 고딕" charset="0"/>
+            </a:endParaRPr>
+          </a:p>
+        </p:txBody>
+      </p:sp>
       <p:pic>
         <p:nvPicPr>
-          <p:cNvPr id="1057" name="그림 87"/>
+          <p:cNvPr id="1064" name="그림 14" descr="C:/Users/Admin1/AppData/Roaming/PolarisOffice/ETemp/20572_22936136/fImage60931788467.png"/>
           <p:cNvPicPr>
             <a:picLocks noChangeAspect="1"/>
           </p:cNvPicPr>
           <p:nvPr/>
         </p:nvPicPr>
         <p:blipFill rotWithShape="1">
-          <a:blip r:embed="rId3" cstate="print">
+          <a:blip r:embed="rId9" cstate="print">
             <a:extLst>
               <a:ext uri="{28A0092B-C50C-407E-A947-70E740481C1C}">
                 <a14:useLocalDpi xmlns:a14="http://schemas.microsoft.com/office/drawing/2010/main" val="0"/>
@@ -9051,23 +8883,25 @@
         </p:blipFill>
         <p:spPr>
           <a:xfrm rot="0">
-            <a:off x="1355090" y="1280795"/>
-            <a:ext cx="2386330" cy="3200400"/>
-          </a:xfrm>
-          <a:prstGeom prst="rect"/>
-          <a:noFill/>
+            <a:off x="4111625" y="2159000"/>
+            <a:ext cx="1262380" cy="2287270"/>
+          </a:xfrm>
+          <a:prstGeom prst="roundRect"/>
+          <a:solidFill>
+            <a:srgbClr val="EDEDED"/>
+          </a:solidFill>
         </p:spPr>
       </p:pic>
       <p:pic>
         <p:nvPicPr>
-          <p:cNvPr id="1058" name="그림 88"/>
+          <p:cNvPr id="1065" name="그림 17" descr="C:/Users/Admin1/AppData/Roaming/PolarisOffice/ETemp/20572_22936136/fImage468631796334.png"/>
           <p:cNvPicPr>
             <a:picLocks noChangeAspect="1"/>
           </p:cNvPicPr>
           <p:nvPr/>
         </p:nvPicPr>
         <p:blipFill rotWithShape="1">
-          <a:blip r:embed="rId4" cstate="print">
+          <a:blip r:embed="rId10" cstate="print">
             <a:extLst>
               <a:ext uri="{28A0092B-C50C-407E-A947-70E740481C1C}">
                 <a14:useLocalDpi xmlns:a14="http://schemas.microsoft.com/office/drawing/2010/main" val="0"/>
@@ -9080,8 +8914,8 @@
         </p:blipFill>
         <p:spPr>
           <a:xfrm rot="0">
-            <a:off x="6816725" y="1194435"/>
-            <a:ext cx="4149090" cy="1477010"/>
+            <a:off x="6810375" y="1421130"/>
+            <a:ext cx="4152265" cy="2524760"/>
           </a:xfrm>
           <a:prstGeom prst="roundRect"/>
           <a:solidFill>
@@ -9089,128 +8923,6 @@
           </a:solidFill>
         </p:spPr>
       </p:pic>
-      <p:pic>
-        <p:nvPicPr>
-          <p:cNvPr id="1059" name="그림 91"/>
-          <p:cNvPicPr>
-            <a:picLocks noChangeAspect="1"/>
-          </p:cNvPicPr>
-          <p:nvPr/>
-        </p:nvPicPr>
-        <p:blipFill rotWithShape="1">
-          <a:blip r:embed="rId5" cstate="print">
-            <a:extLst>
-              <a:ext uri="{28A0092B-C50C-407E-A947-70E740481C1C}">
-                <a14:useLocalDpi xmlns:a14="http://schemas.microsoft.com/office/drawing/2010/main" val="0"/>
-              </a:ext>
-            </a:extLst>
-          </a:blip>
-          <a:stretch>
-            <a:fillRect/>
-          </a:stretch>
-        </p:blipFill>
-        <p:spPr>
-          <a:xfrm rot="0">
-            <a:off x="6813550" y="3890645"/>
-            <a:ext cx="1624965" cy="1198880"/>
-          </a:xfrm>
-          <a:prstGeom prst="rect"/>
-          <a:noFill/>
-        </p:spPr>
-      </p:pic>
-      <p:pic>
-        <p:nvPicPr>
-          <p:cNvPr id="1060" name="그림 92"/>
-          <p:cNvPicPr>
-            <a:picLocks noChangeAspect="1"/>
-          </p:cNvPicPr>
-          <p:nvPr/>
-        </p:nvPicPr>
-        <p:blipFill rotWithShape="1">
-          <a:blip r:embed="rId6" cstate="print">
-            <a:extLst>
-              <a:ext uri="{28A0092B-C50C-407E-A947-70E740481C1C}">
-                <a14:useLocalDpi xmlns:a14="http://schemas.microsoft.com/office/drawing/2010/main" val="0"/>
-              </a:ext>
-            </a:extLst>
-          </a:blip>
-          <a:stretch>
-            <a:fillRect/>
-          </a:stretch>
-        </p:blipFill>
-        <p:spPr>
-          <a:xfrm rot="0">
-            <a:off x="8645525" y="3898265"/>
-            <a:ext cx="2138045" cy="1181100"/>
-          </a:xfrm>
-          <a:prstGeom prst="rect"/>
-          <a:noFill/>
-        </p:spPr>
-      </p:pic>
-      <p:sp>
-        <p:nvSpPr>
-          <p:cNvPr id="1061" name="텍스트 상자 95"/>
-          <p:cNvSpPr txBox="1">
-            <a:spLocks/>
-          </p:cNvSpPr>
-          <p:nvPr/>
-        </p:nvSpPr>
-        <p:spPr>
-          <a:xfrm rot="0">
-            <a:off x="6817995" y="5222875"/>
-            <a:ext cx="4144645" cy="954405"/>
-          </a:xfrm>
-          <a:prstGeom prst="rect"/>
-          <a:noFill/>
-          <a:ln w="0">
-            <a:noFill/>
-            <a:prstDash/>
-          </a:ln>
-        </p:spPr>
-        <p:txBody>
-          <a:bodyPr wrap="square" lIns="89535" tIns="46355" rIns="89535" bIns="46355" numCol="1" vert="horz" anchor="t">
-            <a:spAutoFit/>
-          </a:bodyPr>
-          <a:lstStyle/>
-          <a:p>
-            <a:pPr marL="0" indent="0" algn="l" latinLnBrk="0" hangingPunct="1">
-              <a:buFontTx/>
-              <a:buNone/>
-            </a:pPr>
-            <a:r>
-              <a:rPr lang="ko-KR" sz="2000" b="1">
-                <a:solidFill>
-                  <a:srgbClr val="0611F2"/>
-                </a:solidFill>
-                <a:latin typeface="맑은 고딕" charset="0"/>
-                <a:ea typeface="맑은 고딕" charset="0"/>
-              </a:rPr>
-              <a:t>9</a:t>
-            </a:r>
-            <a:r>
-              <a:rPr sz="2000" b="1">
-                <a:solidFill>
-                  <a:srgbClr val="0611F2"/>
-                </a:solidFill>
-                <a:latin typeface="맑은 고딕" charset="0"/>
-                <a:ea typeface="맑은 고딕" charset="0"/>
-              </a:rPr>
-              <a:t>. </a:t>
-            </a:r>
-            <a:r>
-              <a:rPr lang="ko-KR" sz="1800">
-                <a:latin typeface="맑은 고딕" charset="0"/>
-                <a:ea typeface="맑은 고딕" charset="0"/>
-              </a:rPr>
-              <a:t>그리고 유니티 프로젝트 폴더에 Model을 선택하고 Stone_3 게임 오브젝트를 선택합니다.</a:t>
-            </a:r>
-            <a:endParaRPr lang="ko-KR" altLang="en-US" sz="1800">
-              <a:latin typeface="맑은 고딕" charset="0"/>
-              <a:ea typeface="맑은 고딕" charset="0"/>
-            </a:endParaRPr>
-          </a:p>
-        </p:txBody>
-      </p:sp>
     </p:spTree>
   </p:cSld>
   <p:clrMapOvr>
@@ -9310,9 +9022,9 @@
           <p:nvPr/>
         </p:nvSpPr>
         <p:spPr>
-          <a:xfrm rot="0">
+          <a:xfrm>
             <a:off x="1172845" y="1414145"/>
-            <a:ext cx="4182745" cy="4523105"/>
+            <a:ext cx="4183380" cy="4523105"/>
           </a:xfrm>
           <a:prstGeom prst="rect"/>
           <a:noFill/>
@@ -9363,7 +9075,35 @@
                 <a:latin typeface="맑은 고딕" charset="0"/>
                 <a:ea typeface="맑은 고딕" charset="0"/>
               </a:rPr>
-              <a:t>그리고 생성할 때 생성 위치와 생성 방향을 설정할 수 있습니다.</a:t>
+              <a:t>그리고 생성할 때 생성</a:t>
+            </a:r>
+            <a:r>
+              <a:rPr lang="ko-KR" sz="1800">
+                <a:latin typeface="맑은 고딕" charset="0"/>
+                <a:ea typeface="맑은 고딕" charset="0"/>
+              </a:rPr>
+              <a:t>되는</a:t>
+            </a:r>
+            <a:r>
+              <a:rPr lang="ko-KR" sz="1800">
+                <a:latin typeface="맑은 고딕" charset="0"/>
+                <a:ea typeface="맑은 고딕" charset="0"/>
+              </a:rPr>
+              <a:t> 위치와 생성</a:t>
+            </a:r>
+            <a:r>
+              <a:rPr lang="ko-KR" sz="1800">
+                <a:latin typeface="맑은 고딕" charset="0"/>
+                <a:ea typeface="맑은 고딕" charset="0"/>
+              </a:rPr>
+              <a:t>될 때</a:t>
+            </a:r>
+            <a:r>
+              <a:rPr lang="ko-KR" sz="1800">
+                <a:latin typeface="맑은 고딕" charset="0"/>
+                <a:ea typeface="맑은 고딕" charset="0"/>
+              </a:rPr>
+              <a:t> 방향을 설정할 수 있습니다.</a:t>
             </a:r>
             <a:endParaRPr lang="ko-KR" altLang="en-US" sz="1800">
               <a:latin typeface="맑은 고딕" charset="0"/>
@@ -9471,7 +9211,7 @@
       </p:sp>
       <p:pic>
         <p:nvPicPr>
-          <p:cNvPr id="1036" name="그림 1" descr="C:/Users/Admin1/AppData/Roaming/PolarisOffice/ETemp/16684_11126392/fImage29139941.png"/>
+          <p:cNvPr id="1036" name="그림 1" descr="C:/Users/Admin1/AppData/Roaming/PolarisOffice/ETemp/20572_22936136/fImage29139941.png"/>
           <p:cNvPicPr>
             <a:picLocks noChangeAspect="1"/>
           </p:cNvPicPr>
@@ -9492,7 +9232,7 @@
         <p:spPr>
           <a:xfrm rot="0">
             <a:off x="6804660" y="1421765"/>
-            <a:ext cx="1949450" cy="3416935"/>
+            <a:ext cx="4077970" cy="3417570"/>
           </a:xfrm>
           <a:prstGeom prst="roundRect"/>
           <a:solidFill>
@@ -9546,7 +9286,7 @@
       </p:sp>
       <p:pic>
         <p:nvPicPr>
-          <p:cNvPr id="1044" name="그림 145" descr="C:/Users/Admin1/AppData/Roaming/PolarisOffice/ETemp/16684_11126392/fImage688723905436.png"/>
+          <p:cNvPr id="1044" name="그림 145"/>
           <p:cNvPicPr>
             <a:picLocks noChangeAspect="1"/>
           </p:cNvPicPr>
@@ -9568,122 +9308,6 @@
           <a:xfrm rot="0">
             <a:off x="1174115" y="3100070"/>
             <a:ext cx="4173220" cy="1805305"/>
-          </a:xfrm>
-          <a:prstGeom prst="rect"/>
-          <a:noFill/>
-        </p:spPr>
-      </p:pic>
-      <p:pic>
-        <p:nvPicPr>
-          <p:cNvPr id="1045" name="그림 28" descr="C:/Users/Admin1/AppData/Roaming/PolarisOffice/ETemp/16684_11126392/fImage19045630041.png"/>
-          <p:cNvPicPr>
-            <a:picLocks noChangeAspect="1"/>
-          </p:cNvPicPr>
-          <p:nvPr/>
-        </p:nvPicPr>
-        <p:blipFill rotWithShape="1">
-          <a:blip r:embed="rId14" cstate="hqprint">
-            <a:extLst>
-              <a:ext uri="{28A0092B-C50C-407E-A947-70E740481C1C}">
-                <a14:useLocalDpi xmlns:a14="http://schemas.microsoft.com/office/drawing/2010/main"/>
-              </a:ext>
-            </a:extLst>
-          </a:blip>
-          <a:stretch>
-            <a:fillRect/>
-          </a:stretch>
-        </p:blipFill>
-        <p:spPr>
-          <a:xfrm rot="0">
-            <a:off x="9254490" y="2597150"/>
-            <a:ext cx="1157605" cy="574675"/>
-          </a:xfrm>
-          <a:prstGeom prst="rect"/>
-          <a:noFill/>
-        </p:spPr>
-      </p:pic>
-      <p:pic>
-        <p:nvPicPr>
-          <p:cNvPr id="1047" name="그림 32" descr="C:/Users/Admin1/AppData/Roaming/PolarisOffice/ETemp/16684_11126392/fImage1904563046334.png"/>
-          <p:cNvPicPr>
-            <a:picLocks noChangeAspect="1"/>
-          </p:cNvPicPr>
-          <p:nvPr/>
-        </p:nvPicPr>
-        <p:blipFill rotWithShape="1">
-          <a:blip r:embed="rId16" cstate="hqprint">
-            <a:extLst>
-              <a:ext uri="{28A0092B-C50C-407E-A947-70E740481C1C}">
-                <a14:useLocalDpi xmlns:a14="http://schemas.microsoft.com/office/drawing/2010/main"/>
-              </a:ext>
-            </a:extLst>
-          </a:blip>
-          <a:stretch>
-            <a:fillRect/>
-          </a:stretch>
-        </p:blipFill>
-        <p:spPr>
-          <a:xfrm rot="0">
-            <a:off x="9250045" y="3403600"/>
-            <a:ext cx="1153160" cy="574675"/>
-          </a:xfrm>
-          <a:prstGeom prst="rect"/>
-          <a:noFill/>
-        </p:spPr>
-      </p:pic>
-      <p:pic>
-        <p:nvPicPr>
-          <p:cNvPr id="1048" name="그림 33" descr="C:/Users/Admin1/AppData/Roaming/PolarisOffice/ETemp/16684_11126392/fImage1904563056500.png"/>
-          <p:cNvPicPr>
-            <a:picLocks noChangeAspect="1"/>
-          </p:cNvPicPr>
-          <p:nvPr/>
-        </p:nvPicPr>
-        <p:blipFill rotWithShape="1">
-          <a:blip r:embed="rId17" cstate="hqprint">
-            <a:extLst>
-              <a:ext uri="{28A0092B-C50C-407E-A947-70E740481C1C}">
-                <a14:useLocalDpi xmlns:a14="http://schemas.microsoft.com/office/drawing/2010/main"/>
-              </a:ext>
-            </a:extLst>
-          </a:blip>
-          <a:stretch>
-            <a:fillRect/>
-          </a:stretch>
-        </p:blipFill>
-        <p:spPr>
-          <a:xfrm rot="0">
-            <a:off x="9254490" y="4150995"/>
-            <a:ext cx="1157605" cy="574675"/>
-          </a:xfrm>
-          <a:prstGeom prst="rect"/>
-          <a:noFill/>
-        </p:spPr>
-      </p:pic>
-      <p:pic>
-        <p:nvPicPr>
-          <p:cNvPr id="1049" name="그림 10" descr="C:/Users/Admin1/AppData/Roaming/PolarisOffice/ETemp/16684_11126392/fImage19045630041.png"/>
-          <p:cNvPicPr>
-            <a:picLocks noChangeAspect="1"/>
-          </p:cNvPicPr>
-          <p:nvPr/>
-        </p:nvPicPr>
-        <p:blipFill rotWithShape="1">
-          <a:blip r:embed="rId14" cstate="hqprint">
-            <a:extLst>
-              <a:ext uri="{28A0092B-C50C-407E-A947-70E740481C1C}">
-                <a14:useLocalDpi xmlns:a14="http://schemas.microsoft.com/office/drawing/2010/main"/>
-              </a:ext>
-            </a:extLst>
-          </a:blip>
-          <a:stretch>
-            <a:fillRect/>
-          </a:stretch>
-        </p:blipFill>
-        <p:spPr>
-          <a:xfrm rot="0">
-            <a:off x="9251315" y="1771015"/>
-            <a:ext cx="1157605" cy="574675"/>
           </a:xfrm>
           <a:prstGeom prst="rect"/>
           <a:noFill/>
@@ -9791,7 +9415,7 @@
       </p:sp>
       <p:sp>
         <p:nvSpPr>
-          <p:cNvPr id="1051" name="Rect 0"/>
+          <p:cNvPr id="1032" name="텍스트 상자 20"/>
           <p:cNvSpPr txBox="1">
             <a:spLocks/>
           </p:cNvSpPr>
@@ -9799,8 +9423,8 @@
         </p:nvSpPr>
         <p:spPr>
           <a:xfrm rot="0">
-            <a:off x="1346200" y="4954270"/>
-            <a:ext cx="4024630" cy="954405"/>
+            <a:off x="1395730" y="5086985"/>
+            <a:ext cx="3959225" cy="954405"/>
           </a:xfrm>
           <a:prstGeom prst="rect"/>
           <a:noFill/>
@@ -9827,7 +9451,7 @@
                 <a:latin typeface="맑은 고딕" charset="0"/>
                 <a:ea typeface="맑은 고딕" charset="0"/>
               </a:rPr>
-              <a:t>10</a:t>
+              <a:t>7</a:t>
             </a:r>
             <a:r>
               <a:rPr sz="2000" b="1">
@@ -9844,7 +9468,14 @@
                 <a:latin typeface="맑은 고딕" charset="0"/>
                 <a:ea typeface="맑은 고딕" charset="0"/>
               </a:rPr>
-              <a:t>Model 폴더에서 Stone_3 게임 오브젝트를 선택하고 게임 월드 공간으로 배치합니다.</a:t>
+              <a:t>이제</a:t>
+            </a:r>
+            <a:r>
+              <a:rPr lang="ko-KR" sz="1800">
+                <a:latin typeface="맑은 고딕" charset="0"/>
+                <a:ea typeface="맑은 고딕" charset="0"/>
+              </a:rPr>
+              <a:t> On Click 함수의 Event에 Create Object 오브젝트를 넣어줍니다.</a:t>
             </a:r>
             <a:endParaRPr lang="ko-KR" altLang="en-US" sz="1800">
               <a:latin typeface="맑은 고딕" charset="0"/>
@@ -9855,7 +9486,7 @@
       </p:sp>
       <p:sp>
         <p:nvSpPr>
-          <p:cNvPr id="1054" name="Rect 0"/>
+          <p:cNvPr id="1033" name="텍스트 상자 21"/>
           <p:cNvSpPr txBox="1">
             <a:spLocks/>
           </p:cNvSpPr>
@@ -9863,8 +9494,8 @@
         </p:nvSpPr>
         <p:spPr>
           <a:xfrm rot="0">
-            <a:off x="6812915" y="2748915"/>
-            <a:ext cx="4144645" cy="954405"/>
+            <a:off x="6801485" y="5082540"/>
+            <a:ext cx="4152900" cy="954405"/>
           </a:xfrm>
           <a:prstGeom prst="rect"/>
           <a:noFill/>
@@ -9891,7 +9522,7 @@
                 <a:latin typeface="맑은 고딕" charset="0"/>
                 <a:ea typeface="맑은 고딕" charset="0"/>
               </a:rPr>
-              <a:t>11</a:t>
+              <a:t>8</a:t>
             </a:r>
             <a:r>
               <a:rPr sz="2000" b="1">
@@ -9908,7 +9539,7 @@
                 <a:latin typeface="맑은 고딕" charset="0"/>
                 <a:ea typeface="맑은 고딕" charset="0"/>
               </a:rPr>
-              <a:t>그다음으로 Prefab 폴더를 생성하고 Stone_3 게임 오브젝트를 넣어줍니다.</a:t>
+              <a:t>그리고 Button Event로 사용할 Create.GenericCreate( )함수를 설정합니다.</a:t>
             </a:r>
             <a:endParaRPr lang="ko-KR" altLang="en-US" sz="1800">
               <a:latin typeface="맑은 고딕" charset="0"/>
@@ -9919,14 +9550,72 @@
       </p:sp>
       <p:pic>
         <p:nvPicPr>
-          <p:cNvPr id="1062" name="그림 96"/>
+          <p:cNvPr id="1034" name="그림 22" descr="C:/Users/Admin1/AppData/Roaming/PolarisOffice/ETemp/20572_22936136/fImage412512959358.png"/>
           <p:cNvPicPr>
             <a:picLocks noChangeAspect="1"/>
           </p:cNvPicPr>
           <p:nvPr/>
         </p:nvPicPr>
         <p:blipFill rotWithShape="1">
-          <a:blip r:embed="rId2" cstate="print">
+          <a:blip r:embed="rId8" cstate="hqprint">
+            <a:extLst>
+              <a:ext uri="{28A0092B-C50C-407E-A947-70E740481C1C}">
+                <a14:useLocalDpi xmlns:a14="http://schemas.microsoft.com/office/drawing/2010/main"/>
+              </a:ext>
+            </a:extLst>
+          </a:blip>
+          <a:stretch>
+            <a:fillRect/>
+          </a:stretch>
+        </p:blipFill>
+        <p:spPr>
+          <a:xfrm rot="0">
+            <a:off x="2876550" y="1373505"/>
+            <a:ext cx="2478405" cy="3515995"/>
+          </a:xfrm>
+          <a:prstGeom prst="rect"/>
+          <a:noFill/>
+        </p:spPr>
+      </p:pic>
+      <p:pic>
+        <p:nvPicPr>
+          <p:cNvPr id="1037" name="그림 25" descr="C:/Users/Admin1/AppData/Roaming/PolarisOffice/ETemp/20572_22936136/fImage410242994464.png"/>
+          <p:cNvPicPr>
+            <a:picLocks noChangeAspect="1"/>
+          </p:cNvPicPr>
+          <p:nvPr/>
+        </p:nvPicPr>
+        <p:blipFill rotWithShape="1">
+          <a:blip r:embed="rId9" cstate="hqprint">
+            <a:extLst>
+              <a:ext uri="{28A0092B-C50C-407E-A947-70E740481C1C}">
+                <a14:useLocalDpi xmlns:a14="http://schemas.microsoft.com/office/drawing/2010/main"/>
+              </a:ext>
+            </a:extLst>
+          </a:blip>
+          <a:stretch>
+            <a:fillRect/>
+          </a:stretch>
+        </p:blipFill>
+        <p:spPr>
+          <a:xfrm rot="0">
+            <a:off x="6814820" y="1390015"/>
+            <a:ext cx="4139565" cy="3572510"/>
+          </a:xfrm>
+          <a:prstGeom prst="rect"/>
+          <a:noFill/>
+        </p:spPr>
+      </p:pic>
+      <p:pic>
+        <p:nvPicPr>
+          <p:cNvPr id="1038" name="그림 26" descr="C:/Users/Admin1/AppData/Roaming/PolarisOffice/ETemp/20572_22936136/fImage61361866500.png"/>
+          <p:cNvPicPr>
+            <a:picLocks noChangeAspect="1"/>
+          </p:cNvPicPr>
+          <p:nvPr/>
+        </p:nvPicPr>
+        <p:blipFill rotWithShape="1">
+          <a:blip r:embed="rId10" cstate="print">
             <a:extLst>
               <a:ext uri="{28A0092B-C50C-407E-A947-70E740481C1C}">
                 <a14:useLocalDpi xmlns:a14="http://schemas.microsoft.com/office/drawing/2010/main" val="0"/>
@@ -9939,69 +9628,8 @@
         </p:blipFill>
         <p:spPr>
           <a:xfrm rot="0">
-            <a:off x="1346835" y="1297305"/>
-            <a:ext cx="4023995" cy="3566160"/>
-          </a:xfrm>
-          <a:prstGeom prst="rect"/>
-          <a:noFill/>
-        </p:spPr>
-      </p:pic>
-      <p:cxnSp>
-        <p:nvCxnSpPr>
-          <p:cNvPr id="1063" name="도형 98"/>
-          <p:cNvCxnSpPr/>
-          <p:nvPr/>
-        </p:nvCxnSpPr>
-        <p:spPr>
-          <a:xfrm rot="0" flipV="1">
-            <a:off x="2360930" y="2618740"/>
-            <a:ext cx="948690" cy="1130935"/>
-          </a:xfrm>
-          <a:prstGeom prst="straightConnector1"/>
-          <a:ln w="6350" cap="flat" cmpd="sng">
-            <a:prstDash/>
-            <a:tailEnd type="triangle" w="med" len="med"/>
-          </a:ln>
-        </p:spPr>
-        <p:style>
-          <a:lnRef idx="1">
-            <a:schemeClr val="accent1"/>
-          </a:lnRef>
-          <a:fillRef idx="0">
-            <a:schemeClr val="accent1"/>
-          </a:fillRef>
-          <a:effectRef idx="0">
-            <a:schemeClr val="accent1"/>
-          </a:effectRef>
-          <a:fontRef idx="minor">
-            <a:schemeClr val="tx1"/>
-          </a:fontRef>
-        </p:style>
-      </p:cxnSp>
-      <p:pic>
-        <p:nvPicPr>
-          <p:cNvPr id="1064" name="그림 100"/>
-          <p:cNvPicPr>
-            <a:picLocks noChangeAspect="1"/>
-          </p:cNvPicPr>
-          <p:nvPr/>
-        </p:nvPicPr>
-        <p:blipFill rotWithShape="1">
-          <a:blip r:embed="rId3" cstate="print">
-            <a:extLst>
-              <a:ext uri="{28A0092B-C50C-407E-A947-70E740481C1C}">
-                <a14:useLocalDpi xmlns:a14="http://schemas.microsoft.com/office/drawing/2010/main" val="0"/>
-              </a:ext>
-            </a:extLst>
-          </a:blip>
-          <a:stretch>
-            <a:fillRect/>
-          </a:stretch>
-        </p:blipFill>
-        <p:spPr>
-          <a:xfrm rot="0">
-            <a:off x="6816725" y="1430020"/>
-            <a:ext cx="1205865" cy="1047750"/>
+            <a:off x="1397000" y="1984375"/>
+            <a:ext cx="1318260" cy="1937385"/>
           </a:xfrm>
           <a:prstGeom prst="roundRect"/>
           <a:solidFill>
@@ -10009,265 +9637,16 @@
           </a:solidFill>
         </p:spPr>
       </p:pic>
-      <p:pic>
-        <p:nvPicPr>
-          <p:cNvPr id="1065" name="그림 103"/>
-          <p:cNvPicPr>
-            <a:picLocks noChangeAspect="1"/>
-          </p:cNvPicPr>
-          <p:nvPr/>
-        </p:nvPicPr>
-        <p:blipFill rotWithShape="1">
-          <a:blip r:embed="rId4" cstate="print">
-            <a:extLst>
-              <a:ext uri="{28A0092B-C50C-407E-A947-70E740481C1C}">
-                <a14:useLocalDpi xmlns:a14="http://schemas.microsoft.com/office/drawing/2010/main" val="0"/>
-              </a:ext>
-            </a:extLst>
-          </a:blip>
-          <a:stretch>
-            <a:fillRect/>
-          </a:stretch>
-        </p:blipFill>
-        <p:spPr>
-          <a:xfrm rot="0">
-            <a:off x="8578850" y="1292860"/>
-            <a:ext cx="2378710" cy="1334770"/>
-          </a:xfrm>
-          <a:prstGeom prst="rect"/>
-          <a:noFill/>
-        </p:spPr>
-      </p:pic>
-      <p:pic>
-        <p:nvPicPr>
-          <p:cNvPr id="1067" name="그림 107" descr="C:/Users/Admin1/AppData/Roaming/PolarisOffice/ETemp/16684_11126392/fImage5291344153.png"/>
-          <p:cNvPicPr>
-            <a:picLocks noChangeAspect="1"/>
-          </p:cNvPicPr>
-          <p:nvPr/>
-        </p:nvPicPr>
-        <p:blipFill rotWithShape="1">
-          <a:blip r:embed="rId5" cstate="hqprint">
-            <a:extLst>
-              <a:ext uri="{28A0092B-C50C-407E-A947-70E740481C1C}">
-                <a14:useLocalDpi xmlns:a14="http://schemas.microsoft.com/office/drawing/2010/main"/>
-              </a:ext>
-            </a:extLst>
-          </a:blip>
-          <a:stretch>
-            <a:fillRect/>
-          </a:stretch>
-        </p:blipFill>
-        <p:spPr>
-          <a:xfrm rot="0">
-            <a:off x="8288020" y="3791585"/>
-            <a:ext cx="2670175" cy="1355725"/>
-          </a:xfrm>
-          <a:prstGeom prst="roundRect"/>
-          <a:solidFill>
-            <a:srgbClr val="EDEDED"/>
-          </a:solidFill>
-        </p:spPr>
-      </p:pic>
-      <p:pic>
-        <p:nvPicPr>
-          <p:cNvPr id="1068" name="그림 108"/>
-          <p:cNvPicPr>
-            <a:picLocks noChangeAspect="1"/>
-          </p:cNvPicPr>
-          <p:nvPr/>
-        </p:nvPicPr>
-        <p:blipFill rotWithShape="1">
-          <a:blip r:embed="rId6" cstate="print">
-            <a:extLst>
-              <a:ext uri="{28A0092B-C50C-407E-A947-70E740481C1C}">
-                <a14:useLocalDpi xmlns:a14="http://schemas.microsoft.com/office/drawing/2010/main" val="0"/>
-              </a:ext>
-            </a:extLst>
-          </a:blip>
-          <a:stretch>
-            <a:fillRect/>
-          </a:stretch>
-        </p:blipFill>
-        <p:spPr>
-          <a:xfrm rot="0">
-            <a:off x="6813550" y="3970655"/>
-            <a:ext cx="1205865" cy="1047750"/>
-          </a:xfrm>
-          <a:prstGeom prst="roundRect"/>
-          <a:solidFill>
-            <a:srgbClr val="EDEDED"/>
-          </a:solidFill>
-        </p:spPr>
-      </p:pic>
       <p:cxnSp>
         <p:nvCxnSpPr>
-          <p:cNvPr id="1069" name="도형 109"/>
+          <p:cNvPr id="1036" name="도형 24"/>
           <p:cNvCxnSpPr/>
           <p:nvPr/>
         </p:nvCxnSpPr>
         <p:spPr>
-          <a:xfrm rot="0" flipV="1">
-            <a:off x="7523480" y="4580255"/>
-            <a:ext cx="1139190" cy="274955"/>
-          </a:xfrm>
-          <a:prstGeom prst="straightConnector1"/>
-          <a:ln w="6350" cap="flat" cmpd="sng">
-            <a:prstDash/>
-            <a:tailEnd type="triangle" w="med" len="med"/>
-          </a:ln>
-        </p:spPr>
-        <p:style>
-          <a:lnRef idx="1">
-            <a:schemeClr val="accent1"/>
-          </a:lnRef>
-          <a:fillRef idx="0">
-            <a:schemeClr val="accent1"/>
-          </a:fillRef>
-          <a:effectRef idx="0">
-            <a:schemeClr val="accent1"/>
-          </a:effectRef>
-          <a:fontRef idx="minor">
-            <a:schemeClr val="tx1"/>
-          </a:fontRef>
-        </p:style>
-      </p:cxnSp>
-      <p:sp>
-        <p:nvSpPr>
-          <p:cNvPr id="1070" name="텍스트 상자 110"/>
-          <p:cNvSpPr txBox="1">
-            <a:spLocks/>
-          </p:cNvSpPr>
-          <p:nvPr/>
-        </p:nvSpPr>
-        <p:spPr>
-          <a:xfrm rot="0">
-            <a:off x="6817995" y="5222875"/>
-            <a:ext cx="4139565" cy="677545"/>
-          </a:xfrm>
-          <a:prstGeom prst="rect"/>
-          <a:noFill/>
-          <a:ln w="0">
-            <a:noFill/>
-            <a:prstDash/>
-          </a:ln>
-        </p:spPr>
-        <p:txBody>
-          <a:bodyPr wrap="square" lIns="89535" tIns="46355" rIns="89535" bIns="46355" numCol="1" vert="horz" anchor="t">
-            <a:spAutoFit/>
-          </a:bodyPr>
-          <a:lstStyle/>
-          <a:p>
-            <a:pPr marL="0" indent="0" algn="l" latinLnBrk="0" hangingPunct="1">
-              <a:buFontTx/>
-              <a:buNone/>
-            </a:pPr>
-            <a:r>
-              <a:rPr lang="ko-KR" sz="2000" b="1">
-                <a:solidFill>
-                  <a:srgbClr val="0611F2"/>
-                </a:solidFill>
-                <a:latin typeface="맑은 고딕" charset="0"/>
-                <a:ea typeface="맑은 고딕" charset="0"/>
-              </a:rPr>
-              <a:t>12</a:t>
-            </a:r>
-            <a:r>
-              <a:rPr sz="2000" b="1">
-                <a:solidFill>
-                  <a:srgbClr val="0611F2"/>
-                </a:solidFill>
-                <a:latin typeface="맑은 고딕" charset="0"/>
-                <a:ea typeface="맑은 고딕" charset="0"/>
-              </a:rPr>
-              <a:t>. </a:t>
-            </a:r>
-            <a:r>
-              <a:rPr lang="ko-KR" sz="1800">
-                <a:latin typeface="맑은 고딕" charset="0"/>
-                <a:ea typeface="맑은 고딕" charset="0"/>
-              </a:rPr>
-              <a:t>그리고 게임 월드 공간에 있는 Stone_3 Prefab은 삭제합니다.</a:t>
-            </a:r>
-            <a:endParaRPr lang="ko-KR" altLang="en-US" sz="1800">
-              <a:latin typeface="맑은 고딕" charset="0"/>
-              <a:ea typeface="맑은 고딕" charset="0"/>
-            </a:endParaRPr>
-          </a:p>
-        </p:txBody>
-      </p:sp>
-      <p:pic>
-        <p:nvPicPr>
-          <p:cNvPr id="1072" name="그림 39"/>
-          <p:cNvPicPr>
-            <a:picLocks noChangeAspect="1"/>
-          </p:cNvPicPr>
-          <p:nvPr/>
-        </p:nvPicPr>
-        <p:blipFill rotWithShape="1">
-          <a:blip r:embed="rId3" cstate="hqprint">
-            <a:extLst>
-              <a:ext uri="{28A0092B-C50C-407E-A947-70E740481C1C}">
-                <a14:useLocalDpi xmlns:a14="http://schemas.microsoft.com/office/drawing/2010/main"/>
-              </a:ext>
-            </a:extLst>
-          </a:blip>
-          <a:stretch>
-            <a:fillRect/>
-          </a:stretch>
-        </p:blipFill>
-        <p:spPr>
-          <a:xfrm rot="0">
-            <a:off x="6805930" y="1430020"/>
-            <a:ext cx="1206500" cy="1048385"/>
-          </a:xfrm>
-          <a:prstGeom prst="roundRect"/>
-          <a:solidFill>
-            <a:srgbClr val="EDEDED"/>
-          </a:solidFill>
-        </p:spPr>
-      </p:pic>
-      <p:pic>
-        <p:nvPicPr>
-          <p:cNvPr id="1073" name="그림 40" descr="C:/Users/Admin1/AppData/Roaming/PolarisOffice/ETemp/16684_11126392/fImage58793403902.png"/>
-          <p:cNvPicPr>
-            <a:picLocks noChangeAspect="1"/>
-          </p:cNvPicPr>
-          <p:nvPr/>
-        </p:nvPicPr>
-        <p:blipFill rotWithShape="1">
-          <a:blip r:embed="rId4" cstate="hqprint">
-            <a:extLst>
-              <a:ext uri="{28A0092B-C50C-407E-A947-70E740481C1C}">
-                <a14:useLocalDpi xmlns:a14="http://schemas.microsoft.com/office/drawing/2010/main"/>
-              </a:ext>
-            </a:extLst>
-          </a:blip>
-          <a:stretch>
-            <a:fillRect/>
-          </a:stretch>
-        </p:blipFill>
-        <p:spPr>
-          <a:xfrm rot="0">
-            <a:off x="8296275" y="1292860"/>
-            <a:ext cx="2651760" cy="1336040"/>
-          </a:xfrm>
-          <a:prstGeom prst="roundRect"/>
-          <a:solidFill>
-            <a:srgbClr val="EDEDED"/>
-          </a:solidFill>
-        </p:spPr>
-      </p:pic>
-      <p:cxnSp>
-        <p:nvCxnSpPr>
-          <p:cNvPr id="1066" name="도형 104"/>
-          <p:cNvCxnSpPr/>
-          <p:nvPr/>
-        </p:nvCxnSpPr>
-        <p:spPr>
-          <a:xfrm rot="0" flipV="1">
-            <a:off x="7506970" y="2070100"/>
-            <a:ext cx="1322070" cy="250190"/>
+          <a:xfrm rot="0">
+            <a:off x="2404745" y="3063875"/>
+            <a:ext cx="1250315" cy="1491615"/>
           </a:xfrm>
           <a:prstGeom prst="straightConnector1"/>
           <a:ln w="6350" cap="flat" cmpd="sng">
@@ -10390,8 +9769,8 @@
         </p:nvSpPr>
         <p:spPr>
           <a:xfrm rot="0">
-            <a:off x="1222375" y="1413510"/>
-            <a:ext cx="4148455" cy="923925"/>
+            <a:off x="1222375" y="1491615"/>
+            <a:ext cx="4149090" cy="924560"/>
           </a:xfrm>
           <a:prstGeom prst="rect"/>
           <a:noFill/>
@@ -10415,49 +9794,7 @@
                 <a:latin typeface="맑은 고딕" charset="0"/>
                 <a:ea typeface="맑은 고딕" charset="0"/>
               </a:rPr>
-              <a:t>프리팹은 이미 </a:t>
-            </a:r>
-            <a:r>
-              <a:rPr lang="ko-KR" sz="1800">
-                <a:latin typeface="맑은 고딕" charset="0"/>
-                <a:ea typeface="맑은 고딕" charset="0"/>
-              </a:rPr>
-              <a:t>생성된</a:t>
-            </a:r>
-            <a:r>
-              <a:rPr lang="ko-KR" sz="1800">
-                <a:latin typeface="맑은 고딕" charset="0"/>
-                <a:ea typeface="맑은 고딕" charset="0"/>
-              </a:rPr>
-              <a:t> 게임 오브젝트를 재활용</a:t>
-            </a:r>
-            <a:r>
-              <a:rPr lang="ko-KR" sz="1800">
-                <a:latin typeface="맑은 고딕" charset="0"/>
-                <a:ea typeface="맑은 고딕" charset="0"/>
-              </a:rPr>
-              <a:t>할 수 있는 </a:t>
-            </a:r>
-            <a:r>
-              <a:rPr lang="ko-KR" sz="1800">
-                <a:latin typeface="맑은 고딕" charset="0"/>
-                <a:ea typeface="맑은 고딕" charset="0"/>
-              </a:rPr>
-              <a:t>형태로</a:t>
-            </a:r>
-            <a:r>
-              <a:rPr lang="ko-KR" sz="1800">
-                <a:latin typeface="맑은 고딕" charset="0"/>
-                <a:ea typeface="맑은 고딕" charset="0"/>
-              </a:rPr>
-              <a:t> 설정해놓은</a:t>
-            </a:r>
-            <a:r>
-              <a:rPr lang="ko-KR" sz="1800">
-                <a:latin typeface="맑은 고딕" charset="0"/>
-                <a:ea typeface="맑은 고딕" charset="0"/>
-              </a:rPr>
-              <a:t> 게임 오브젝트입니다.</a:t>
+              <a:t>프리팹은 이미 생성된 게임 오브젝트를 재활용할 수 있는 형태로 설정해놓은 게임 오브젝트입니다.</a:t>
             </a:r>
             <a:endParaRPr lang="ko-KR" altLang="en-US" sz="1800">
               <a:latin typeface="맑은 고딕" charset="0"/>
@@ -10476,8 +9813,8 @@
         </p:nvSpPr>
         <p:spPr>
           <a:xfrm rot="0">
-            <a:off x="7041515" y="4152265"/>
-            <a:ext cx="3916045" cy="2031365"/>
+            <a:off x="6823710" y="4152265"/>
+            <a:ext cx="4130675" cy="2031365"/>
           </a:xfrm>
           <a:prstGeom prst="rect"/>
           <a:noFill/>
@@ -10528,49 +9865,7 @@
                 <a:latin typeface="맑은 고딕" charset="0"/>
                 <a:ea typeface="맑은 고딕" charset="0"/>
               </a:rPr>
-              <a:t>그</a:t>
-            </a:r>
-            <a:r>
-              <a:rPr lang="ko-KR" sz="1800">
-                <a:latin typeface="맑은 고딕" charset="0"/>
-                <a:ea typeface="맑은 고딕" charset="0"/>
-              </a:rPr>
-              <a:t>러므로</a:t>
-            </a:r>
-            <a:r>
-              <a:rPr lang="ko-KR" sz="1800">
-                <a:latin typeface="맑은 고딕" charset="0"/>
-                <a:ea typeface="맑은 고딕" charset="0"/>
-              </a:rPr>
-              <a:t> 하나의 게임 오브젝트를 변경하</a:t>
-            </a:r>
-            <a:r>
-              <a:rPr lang="ko-KR" sz="1800">
-                <a:latin typeface="맑은 고딕" charset="0"/>
-                <a:ea typeface="맑은 고딕" charset="0"/>
-              </a:rPr>
-              <a:t>게 되면</a:t>
-            </a:r>
-            <a:r>
-              <a:rPr lang="ko-KR" sz="1800">
-                <a:latin typeface="맑은 고딕" charset="0"/>
-                <a:ea typeface="맑은 고딕" charset="0"/>
-              </a:rPr>
-              <a:t> 참조</a:t>
-            </a:r>
-            <a:r>
-              <a:rPr lang="ko-KR" sz="1800">
-                <a:latin typeface="맑은 고딕" charset="0"/>
-                <a:ea typeface="맑은 고딕" charset="0"/>
-              </a:rPr>
-              <a:t>되어 있는</a:t>
-            </a:r>
-            <a:r>
-              <a:rPr lang="ko-KR" sz="1800">
-                <a:latin typeface="맑은 고딕" charset="0"/>
-                <a:ea typeface="맑은 고딕" charset="0"/>
-              </a:rPr>
-              <a:t> 게임 오브젝트가 전체적으로 영향을 받게 됩니다.</a:t>
+              <a:t>그러므로 하나의 게임 오브젝트를 변경하게 되면 참조되어 있는 게임 오브젝트가 전체적으로 영향을 받게 됩니다.</a:t>
             </a:r>
             <a:endParaRPr lang="ko-KR" altLang="en-US" sz="1800">
               <a:latin typeface="맑은 고딕" charset="0"/>
@@ -10589,8 +9884,8 @@
         </p:nvSpPr>
         <p:spPr>
           <a:xfrm rot="0">
-            <a:off x="1224280" y="4984750"/>
-            <a:ext cx="4146550" cy="923925"/>
+            <a:off x="1221105" y="5259070"/>
+            <a:ext cx="4139565" cy="923925"/>
           </a:xfrm>
           <a:prstGeom prst="rect"/>
           <a:noFill/>
@@ -10625,17 +9920,17 @@
       </p:sp>
       <p:pic>
         <p:nvPicPr>
-          <p:cNvPr id="1051" name="그림 18" descr="C:/Users/Admin1/AppData/Roaming/PolarisOffice/ETemp/16684_11126392/fImage504092968467.png"/>
+          <p:cNvPr id="1051" name="그림 18" descr="C:/Users/Admin1/AppData/Roaming/PolarisOffice/ETemp/20572_22936136/fImage504092968467.png"/>
           <p:cNvPicPr>
             <a:picLocks noChangeAspect="1"/>
           </p:cNvPicPr>
           <p:nvPr/>
         </p:nvPicPr>
         <p:blipFill rotWithShape="1">
-          <a:blip r:embed="rId10" cstate="print">
+          <a:blip r:embed="rId10" cstate="hqprint">
             <a:extLst>
               <a:ext uri="{28A0092B-C50C-407E-A947-70E740481C1C}">
-                <a14:useLocalDpi xmlns:a14="http://schemas.microsoft.com/office/drawing/2010/main" val="0"/>
+                <a14:useLocalDpi xmlns:a14="http://schemas.microsoft.com/office/drawing/2010/main"/>
               </a:ext>
             </a:extLst>
           </a:blip>
@@ -10645,8 +9940,8 @@
         </p:blipFill>
         <p:spPr>
           <a:xfrm rot="0">
-            <a:off x="7041515" y="1421765"/>
-            <a:ext cx="3916045" cy="2544445"/>
+            <a:off x="6823710" y="1497965"/>
+            <a:ext cx="4134485" cy="2468880"/>
           </a:xfrm>
           <a:prstGeom prst="roundRect"/>
           <a:solidFill>
@@ -10656,17 +9951,17 @@
       </p:pic>
       <p:pic>
         <p:nvPicPr>
-          <p:cNvPr id="1052" name="그림 21" descr="C:/Users/Admin1/AppData/Roaming/PolarisOffice/ETemp/16684_11126392/fImage1040312976334.png"/>
+          <p:cNvPr id="1052" name="그림 21" descr="C:/Users/Admin1/AppData/Roaming/PolarisOffice/ETemp/20572_22936136/fImage1040312976334.png"/>
           <p:cNvPicPr>
             <a:picLocks noChangeAspect="1"/>
           </p:cNvPicPr>
           <p:nvPr/>
         </p:nvPicPr>
         <p:blipFill rotWithShape="1">
-          <a:blip r:embed="rId11" cstate="print">
+          <a:blip r:embed="rId11" cstate="hqprint">
             <a:extLst>
               <a:ext uri="{28A0092B-C50C-407E-A947-70E740481C1C}">
-                <a14:useLocalDpi xmlns:a14="http://schemas.microsoft.com/office/drawing/2010/main" val="0"/>
+                <a14:useLocalDpi xmlns:a14="http://schemas.microsoft.com/office/drawing/2010/main"/>
               </a:ext>
             </a:extLst>
           </a:blip>
@@ -10676,8 +9971,8 @@
         </p:blipFill>
         <p:spPr>
           <a:xfrm rot="0">
-            <a:off x="1230630" y="2485390"/>
-            <a:ext cx="4140200" cy="2336800"/>
+            <a:off x="1230630" y="2552700"/>
+            <a:ext cx="4141470" cy="2578100"/>
           </a:xfrm>
           <a:prstGeom prst="roundRect"/>
           <a:solidFill>
@@ -10795,8 +10090,8 @@
         </p:nvSpPr>
         <p:spPr>
           <a:xfrm rot="0">
-            <a:off x="1354455" y="4131310"/>
-            <a:ext cx="4024630" cy="1784985"/>
+            <a:off x="1432560" y="2866390"/>
+            <a:ext cx="3954145" cy="954405"/>
           </a:xfrm>
           <a:prstGeom prst="rect"/>
           <a:noFill/>
@@ -10823,7 +10118,7 @@
                 <a:latin typeface="맑은 고딕" charset="0"/>
                 <a:ea typeface="맑은 고딕" charset="0"/>
               </a:rPr>
-              <a:t>13</a:t>
+              <a:t>9</a:t>
             </a:r>
             <a:r>
               <a:rPr sz="2000" b="1">
@@ -10840,143 +10135,25 @@
                 <a:latin typeface="맑은 고딕" charset="0"/>
                 <a:ea typeface="맑은 고딕" charset="0"/>
               </a:rPr>
-              <a:t>그런 다음 Create Object 오브젝트를 선택합니다.</a:t>
+              <a:t>그런 다음 Generic Create Button의 앵커를 지정하고 위치와 크기를 설정합니다.</a:t>
             </a:r>
             <a:endParaRPr lang="ko-KR" altLang="en-US" sz="1800">
               <a:latin typeface="맑은 고딕" charset="0"/>
               <a:ea typeface="맑은 고딕" charset="0"/>
             </a:endParaRPr>
           </a:p>
-          <a:p>
-            <a:pPr marL="0" indent="0" algn="l" latinLnBrk="0" hangingPunct="1">
-              <a:buFontTx/>
-              <a:buNone/>
-            </a:pPr>
-            <a:endParaRPr lang="ko-KR" altLang="en-US" sz="1800">
-              <a:latin typeface="맑은 고딕" charset="0"/>
-              <a:ea typeface="맑은 고딕" charset="0"/>
-            </a:endParaRPr>
-          </a:p>
-          <a:p>
-            <a:pPr marL="0" indent="0" algn="l" latinLnBrk="0" hangingPunct="1">
-              <a:buFontTx/>
-              <a:buNone/>
-            </a:pPr>
-            <a:r>
-              <a:rPr lang="ko-KR" sz="1800">
-                <a:latin typeface="맑은 고딕" charset="0"/>
-                <a:ea typeface="맑은 고딕" charset="0"/>
-              </a:rPr>
-              <a:t>그리고 Create 스크립트에 있는 Prefab 게임 오브젝트 변수에 Stone_3 오브젝트를 넣어줍니다.</a:t>
-            </a:r>
-            <a:endParaRPr lang="ko-KR" altLang="en-US" sz="1800">
-              <a:latin typeface="맑은 고딕" charset="0"/>
-              <a:ea typeface="맑은 고딕" charset="0"/>
-            </a:endParaRPr>
-          </a:p>
-        </p:txBody>
-      </p:sp>
-      <p:sp>
-        <p:nvSpPr>
-          <p:cNvPr id="1070" name="Rect 0"/>
-          <p:cNvSpPr txBox="1">
-            <a:spLocks/>
-          </p:cNvSpPr>
-          <p:nvPr/>
-        </p:nvSpPr>
-        <p:spPr>
-          <a:xfrm rot="0">
-            <a:off x="6809740" y="4322445"/>
-            <a:ext cx="4140200" cy="1784985"/>
-          </a:xfrm>
-          <a:prstGeom prst="rect"/>
-          <a:noFill/>
-          <a:ln w="0">
-            <a:noFill/>
-            <a:prstDash/>
-          </a:ln>
-        </p:spPr>
-        <p:txBody>
-          <a:bodyPr wrap="square" lIns="89535" tIns="46355" rIns="89535" bIns="46355" numCol="1" vert="horz" anchor="t">
-            <a:spAutoFit/>
-          </a:bodyPr>
-          <a:lstStyle/>
-          <a:p>
-            <a:pPr marL="0" indent="0" algn="l" latinLnBrk="0" hangingPunct="1">
-              <a:buFontTx/>
-              <a:buNone/>
-            </a:pPr>
-            <a:r>
-              <a:rPr lang="ko-KR" sz="2000" b="1">
-                <a:solidFill>
-                  <a:srgbClr val="0611F2"/>
-                </a:solidFill>
-                <a:latin typeface="맑은 고딕" charset="0"/>
-                <a:ea typeface="맑은 고딕" charset="0"/>
-              </a:rPr>
-              <a:t>14</a:t>
-            </a:r>
-            <a:r>
-              <a:rPr sz="2000" b="1">
-                <a:solidFill>
-                  <a:srgbClr val="0611F2"/>
-                </a:solidFill>
-                <a:latin typeface="맑은 고딕" charset="0"/>
-                <a:ea typeface="맑은 고딕" charset="0"/>
-              </a:rPr>
-              <a:t>. </a:t>
-            </a:r>
-            <a:r>
-              <a:rPr lang="ko-KR" sz="1800">
-                <a:latin typeface="맑은 고딕" charset="0"/>
-                <a:ea typeface="맑은 고딕" charset="0"/>
-              </a:rPr>
-              <a:t>그다음 버튼을 생성하고 버튼 이름을 Generic Create Button으로 변경합니다.</a:t>
-            </a:r>
-            <a:endParaRPr lang="ko-KR" altLang="en-US" sz="1800">
-              <a:latin typeface="맑은 고딕" charset="0"/>
-              <a:ea typeface="맑은 고딕" charset="0"/>
-            </a:endParaRPr>
-          </a:p>
-          <a:p>
-            <a:pPr marL="0" indent="0" algn="l" latinLnBrk="0" hangingPunct="1">
-              <a:buFontTx/>
-              <a:buNone/>
-            </a:pPr>
-            <a:endParaRPr lang="ko-KR" altLang="en-US" sz="1800">
-              <a:latin typeface="맑은 고딕" charset="0"/>
-              <a:ea typeface="맑은 고딕" charset="0"/>
-            </a:endParaRPr>
-          </a:p>
-          <a:p>
-            <a:pPr marL="0" indent="0" algn="l" latinLnBrk="0" hangingPunct="1">
-              <a:buFontTx/>
-              <a:buNone/>
-            </a:pPr>
-            <a:r>
-              <a:rPr lang="ko-KR" sz="1800">
-                <a:latin typeface="맑은 고딕" charset="0"/>
-                <a:ea typeface="맑은 고딕" charset="0"/>
-              </a:rPr>
-              <a:t>그리고 Generic Create Button의 하위 오브젝트 Text를 선택합니다.</a:t>
-            </a:r>
-            <a:endParaRPr lang="ko-KR" altLang="en-US" sz="1800">
-              <a:latin typeface="맑은 고딕" charset="0"/>
-              <a:ea typeface="맑은 고딕" charset="0"/>
-            </a:endParaRPr>
-          </a:p>
         </p:txBody>
       </p:sp>
       <p:pic>
         <p:nvPicPr>
-          <p:cNvPr id="1071" name="그림 127"/>
+          <p:cNvPr id="1052" name="그림 34" descr="C:/Users/Admin1/AppData/Roaming/PolarisOffice/ETemp/20572_22936136/fImage120161889169.png"/>
           <p:cNvPicPr>
             <a:picLocks noChangeAspect="1"/>
           </p:cNvPicPr>
           <p:nvPr/>
         </p:nvPicPr>
         <p:blipFill rotWithShape="1">
-          <a:blip r:embed="rId2" cstate="print">
+          <a:blip r:embed="rId8" cstate="print">
             <a:extLst>
               <a:ext uri="{28A0092B-C50C-407E-A947-70E740481C1C}">
                 <a14:useLocalDpi xmlns:a14="http://schemas.microsoft.com/office/drawing/2010/main" val="0"/>
@@ -10989,8 +10166,8 @@
         </p:blipFill>
         <p:spPr>
           <a:xfrm rot="0">
-            <a:off x="1344295" y="1288415"/>
-            <a:ext cx="4026535" cy="1430655"/>
+            <a:off x="1428750" y="1402715"/>
+            <a:ext cx="3957955" cy="1351915"/>
           </a:xfrm>
           <a:prstGeom prst="roundRect"/>
           <a:solidFill>
@@ -11000,14 +10177,14 @@
       </p:pic>
       <p:pic>
         <p:nvPicPr>
-          <p:cNvPr id="1072" name="그림 128"/>
+          <p:cNvPr id="1053" name="그림 37" descr="C:/Users/Admin1/AppData/Roaming/PolarisOffice/ETemp/20572_22936136/fImage122321895724.png"/>
           <p:cNvPicPr>
             <a:picLocks noChangeAspect="1"/>
           </p:cNvPicPr>
           <p:nvPr/>
         </p:nvPicPr>
         <p:blipFill rotWithShape="1">
-          <a:blip r:embed="rId3" cstate="print">
+          <a:blip r:embed="rId9" cstate="print">
             <a:extLst>
               <a:ext uri="{28A0092B-C50C-407E-A947-70E740481C1C}">
                 <a14:useLocalDpi xmlns:a14="http://schemas.microsoft.com/office/drawing/2010/main" val="0"/>
@@ -11020,8 +10197,8 @@
         </p:blipFill>
         <p:spPr>
           <a:xfrm rot="0">
-            <a:off x="1343025" y="2852420"/>
-            <a:ext cx="4027805" cy="1155065"/>
+            <a:off x="1433195" y="3938905"/>
+            <a:ext cx="3945255" cy="1273810"/>
           </a:xfrm>
           <a:prstGeom prst="roundRect"/>
           <a:solidFill>
@@ -11029,49 +10206,332 @@
           </a:solidFill>
         </p:spPr>
       </p:pic>
-      <p:cxnSp>
-        <p:nvCxnSpPr>
-          <p:cNvPr id="1073" name="도형 133"/>
-          <p:cNvCxnSpPr/>
+      <p:sp>
+        <p:nvSpPr>
+          <p:cNvPr id="1054" name="텍스트 상자 40"/>
+          <p:cNvSpPr txBox="1">
+            <a:spLocks/>
+          </p:cNvSpPr>
           <p:nvPr/>
-        </p:nvCxnSpPr>
-        <p:spPr>
-          <a:xfrm rot="0" flipV="1">
-            <a:off x="2826385" y="2618740"/>
-            <a:ext cx="2444750" cy="615950"/>
-          </a:xfrm>
-          <a:prstGeom prst="straightConnector1"/>
-          <a:ln w="6350" cap="flat" cmpd="sng">
+        </p:nvSpPr>
+        <p:spPr>
+          <a:xfrm rot="0">
+            <a:off x="1426210" y="5293995"/>
+            <a:ext cx="3954145" cy="954405"/>
+          </a:xfrm>
+          <a:prstGeom prst="rect"/>
+          <a:noFill/>
+          <a:ln w="0">
+            <a:noFill/>
             <a:prstDash/>
-            <a:headEnd type="none" w="med" len="med"/>
-            <a:tailEnd type="triangle" w="med" len="med"/>
           </a:ln>
         </p:spPr>
-        <p:style>
-          <a:lnRef idx="1">
-            <a:schemeClr val="accent1"/>
-          </a:lnRef>
-          <a:fillRef idx="0">
-            <a:schemeClr val="accent1"/>
-          </a:fillRef>
-          <a:effectRef idx="0">
-            <a:schemeClr val="accent1"/>
-          </a:effectRef>
-          <a:fontRef idx="minor">
-            <a:schemeClr val="tx1"/>
-          </a:fontRef>
-        </p:style>
-      </p:cxnSp>
+        <p:txBody>
+          <a:bodyPr wrap="square" lIns="89535" tIns="46355" rIns="89535" bIns="46355" numCol="1" vert="horz" anchor="t">
+            <a:spAutoFit/>
+          </a:bodyPr>
+          <a:lstStyle/>
+          <a:p>
+            <a:pPr marL="0" indent="0" algn="l" latinLnBrk="0" hangingPunct="1">
+              <a:buFontTx/>
+              <a:buNone/>
+            </a:pPr>
+            <a:r>
+              <a:rPr lang="ko-KR" sz="2000" b="1">
+                <a:solidFill>
+                  <a:srgbClr val="0611F2"/>
+                </a:solidFill>
+                <a:latin typeface="맑은 고딕" charset="0"/>
+                <a:ea typeface="맑은 고딕" charset="0"/>
+              </a:rPr>
+              <a:t>10</a:t>
+            </a:r>
+            <a:r>
+              <a:rPr sz="2000" b="1">
+                <a:solidFill>
+                  <a:srgbClr val="0611F2"/>
+                </a:solidFill>
+                <a:latin typeface="맑은 고딕" charset="0"/>
+                <a:ea typeface="맑은 고딕" charset="0"/>
+              </a:rPr>
+              <a:t>. </a:t>
+            </a:r>
+            <a:r>
+              <a:rPr lang="ko-KR" sz="1800">
+                <a:latin typeface="맑은 고딕" charset="0"/>
+                <a:ea typeface="맑은 고딕" charset="0"/>
+              </a:rPr>
+              <a:t>그다음 Main Camera 오브젝트의 위치와 회전 값을 설정합니다.</a:t>
+            </a:r>
+            <a:endParaRPr lang="ko-KR" altLang="en-US" sz="1800">
+              <a:latin typeface="맑은 고딕" charset="0"/>
+              <a:ea typeface="맑은 고딕" charset="0"/>
+            </a:endParaRPr>
+          </a:p>
+        </p:txBody>
+      </p:sp>
       <p:pic>
         <p:nvPicPr>
-          <p:cNvPr id="1074" name="그림 146"/>
+          <p:cNvPr id="1055" name="그림 41" descr="C:/Users/Admin1/AppData/Roaming/PolarisOffice/ETemp/20572_22936136/fImage59261911478.png"/>
           <p:cNvPicPr>
             <a:picLocks noChangeAspect="1"/>
           </p:cNvPicPr>
           <p:nvPr/>
         </p:nvPicPr>
         <p:blipFill rotWithShape="1">
-          <a:blip r:embed="rId4" cstate="hqprint">
+          <a:blip r:embed="rId10" cstate="print">
+            <a:extLst>
+              <a:ext uri="{28A0092B-C50C-407E-A947-70E740481C1C}">
+                <a14:useLocalDpi xmlns:a14="http://schemas.microsoft.com/office/drawing/2010/main" val="0"/>
+              </a:ext>
+            </a:extLst>
+          </a:blip>
+          <a:stretch>
+            <a:fillRect/>
+          </a:stretch>
+        </p:blipFill>
+        <p:spPr>
+          <a:xfrm rot="0">
+            <a:off x="8355965" y="1400810"/>
+            <a:ext cx="2598420" cy="1353820"/>
+          </a:xfrm>
+          <a:prstGeom prst="roundRect"/>
+          <a:solidFill>
+            <a:srgbClr val="EDEDED"/>
+          </a:solidFill>
+        </p:spPr>
+      </p:pic>
+      <p:sp>
+        <p:nvSpPr>
+          <p:cNvPr id="1056" name="텍스트 상자 44"/>
+          <p:cNvSpPr txBox="1">
+            <a:spLocks/>
+          </p:cNvSpPr>
+          <p:nvPr/>
+        </p:nvSpPr>
+        <p:spPr>
+          <a:xfrm rot="0">
+            <a:off x="6812280" y="2938145"/>
+            <a:ext cx="4142105" cy="677545"/>
+          </a:xfrm>
+          <a:prstGeom prst="rect"/>
+          <a:noFill/>
+          <a:ln w="0">
+            <a:noFill/>
+            <a:prstDash/>
+          </a:ln>
+        </p:spPr>
+        <p:txBody>
+          <a:bodyPr wrap="square" lIns="89535" tIns="46355" rIns="89535" bIns="46355" numCol="1" vert="horz" anchor="t">
+            <a:spAutoFit/>
+          </a:bodyPr>
+          <a:lstStyle/>
+          <a:p>
+            <a:pPr marL="0" indent="0" algn="l" latinLnBrk="0" hangingPunct="1">
+              <a:buFontTx/>
+              <a:buNone/>
+            </a:pPr>
+            <a:r>
+              <a:rPr lang="ko-KR" sz="2000" b="1">
+                <a:solidFill>
+                  <a:srgbClr val="0611F2"/>
+                </a:solidFill>
+                <a:latin typeface="맑은 고딕" charset="0"/>
+                <a:ea typeface="맑은 고딕" charset="0"/>
+              </a:rPr>
+              <a:t>11</a:t>
+            </a:r>
+            <a:r>
+              <a:rPr sz="2000" b="1">
+                <a:solidFill>
+                  <a:srgbClr val="0611F2"/>
+                </a:solidFill>
+                <a:latin typeface="맑은 고딕" charset="0"/>
+                <a:ea typeface="맑은 고딕" charset="0"/>
+              </a:rPr>
+              <a:t>. </a:t>
+            </a:r>
+            <a:r>
+              <a:rPr lang="ko-KR" sz="1800">
+                <a:latin typeface="맑은 고딕" charset="0"/>
+                <a:ea typeface="맑은 고딕" charset="0"/>
+              </a:rPr>
+              <a:t>이제 Model 폴더에 있는 Orc 오브젝트를 월드 공간에 배치합니다.</a:t>
+            </a:r>
+            <a:endParaRPr lang="ko-KR" altLang="en-US" sz="1800">
+              <a:latin typeface="맑은 고딕" charset="0"/>
+              <a:ea typeface="맑은 고딕" charset="0"/>
+            </a:endParaRPr>
+          </a:p>
+        </p:txBody>
+      </p:sp>
+      <p:pic>
+        <p:nvPicPr>
+          <p:cNvPr id="1057" name="그림 45" descr="C:/Users/Admin1/AppData/Roaming/PolarisOffice/ETemp/20572_22936136/fImage71351939358.png"/>
+          <p:cNvPicPr>
+            <a:picLocks noChangeAspect="1"/>
+          </p:cNvPicPr>
+          <p:nvPr/>
+        </p:nvPicPr>
+        <p:blipFill rotWithShape="1">
+          <a:blip r:embed="rId11" cstate="print">
+            <a:extLst>
+              <a:ext uri="{28A0092B-C50C-407E-A947-70E740481C1C}">
+                <a14:useLocalDpi xmlns:a14="http://schemas.microsoft.com/office/drawing/2010/main" val="0"/>
+              </a:ext>
+            </a:extLst>
+          </a:blip>
+          <a:stretch>
+            <a:fillRect/>
+          </a:stretch>
+        </p:blipFill>
+        <p:spPr>
+          <a:xfrm rot="0">
+            <a:off x="6814820" y="1406525"/>
+            <a:ext cx="1386205" cy="1365250"/>
+          </a:xfrm>
+          <a:prstGeom prst="roundRect"/>
+          <a:solidFill>
+            <a:srgbClr val="EDEDED"/>
+          </a:solidFill>
+        </p:spPr>
+      </p:pic>
+      <p:pic>
+        <p:nvPicPr>
+          <p:cNvPr id="1058" name="그림 48" descr="C:/Users/Admin1/AppData/Roaming/PolarisOffice/ETemp/20572_22936136/fImage53011946962.png"/>
+          <p:cNvPicPr>
+            <a:picLocks noChangeAspect="1"/>
+          </p:cNvPicPr>
+          <p:nvPr/>
+        </p:nvPicPr>
+        <p:blipFill rotWithShape="1">
+          <a:blip r:embed="rId12" cstate="print">
+            <a:extLst>
+              <a:ext uri="{28A0092B-C50C-407E-A947-70E740481C1C}">
+                <a14:useLocalDpi xmlns:a14="http://schemas.microsoft.com/office/drawing/2010/main" val="0"/>
+              </a:ext>
+            </a:extLst>
+          </a:blip>
+          <a:stretch>
+            <a:fillRect/>
+          </a:stretch>
+        </p:blipFill>
+        <p:spPr>
+          <a:xfrm rot="0">
+            <a:off x="8347710" y="3818890"/>
+            <a:ext cx="2604135" cy="1359535"/>
+          </a:xfrm>
+          <a:prstGeom prst="roundRect"/>
+          <a:solidFill>
+            <a:srgbClr val="EDEDED"/>
+          </a:solidFill>
+        </p:spPr>
+      </p:pic>
+      <p:pic>
+        <p:nvPicPr>
+          <p:cNvPr id="1059" name="그림 49" descr="C:/Users/Admin1/AppData/Roaming/PolarisOffice/ETemp/20572_22936136/fImage71351954464.png"/>
+          <p:cNvPicPr>
+            <a:picLocks noChangeAspect="1"/>
+          </p:cNvPicPr>
+          <p:nvPr/>
+        </p:nvPicPr>
+        <p:blipFill rotWithShape="1">
+          <a:blip r:embed="rId13" cstate="print">
+            <a:extLst>
+              <a:ext uri="{28A0092B-C50C-407E-A947-70E740481C1C}">
+                <a14:useLocalDpi xmlns:a14="http://schemas.microsoft.com/office/drawing/2010/main" val="0"/>
+              </a:ext>
+            </a:extLst>
+          </a:blip>
+          <a:stretch>
+            <a:fillRect/>
+          </a:stretch>
+        </p:blipFill>
+        <p:spPr>
+          <a:xfrm rot="0">
+            <a:off x="6826250" y="3816350"/>
+            <a:ext cx="1383665" cy="1365250"/>
+          </a:xfrm>
+          <a:prstGeom prst="roundRect"/>
+          <a:solidFill>
+            <a:srgbClr val="EDEDED"/>
+          </a:solidFill>
+        </p:spPr>
+      </p:pic>
+      <p:sp>
+        <p:nvSpPr>
+          <p:cNvPr id="1060" name="텍스트 상자 52"/>
+          <p:cNvSpPr txBox="1">
+            <a:spLocks/>
+          </p:cNvSpPr>
+          <p:nvPr/>
+        </p:nvSpPr>
+        <p:spPr>
+          <a:xfrm rot="0">
+            <a:off x="6814820" y="5295265"/>
+            <a:ext cx="4142105" cy="954405"/>
+          </a:xfrm>
+          <a:prstGeom prst="rect"/>
+          <a:noFill/>
+          <a:ln w="0">
+            <a:noFill/>
+            <a:prstDash/>
+          </a:ln>
+        </p:spPr>
+        <p:txBody>
+          <a:bodyPr wrap="square" lIns="89535" tIns="46355" rIns="89535" bIns="46355" numCol="1" vert="horz" anchor="t">
+            <a:spAutoFit/>
+          </a:bodyPr>
+          <a:lstStyle/>
+          <a:p>
+            <a:pPr marL="0" indent="0" algn="l" latinLnBrk="0" hangingPunct="1">
+              <a:buFontTx/>
+              <a:buNone/>
+            </a:pPr>
+            <a:r>
+              <a:rPr lang="ko-KR" sz="2000" b="1">
+                <a:solidFill>
+                  <a:srgbClr val="0611F2"/>
+                </a:solidFill>
+                <a:latin typeface="맑은 고딕" charset="0"/>
+                <a:ea typeface="맑은 고딕" charset="0"/>
+              </a:rPr>
+              <a:t>12</a:t>
+            </a:r>
+            <a:r>
+              <a:rPr sz="2000" b="1">
+                <a:solidFill>
+                  <a:srgbClr val="0611F2"/>
+                </a:solidFill>
+                <a:latin typeface="맑은 고딕" charset="0"/>
+                <a:ea typeface="맑은 고딕" charset="0"/>
+              </a:rPr>
+              <a:t>. </a:t>
+            </a:r>
+            <a:r>
+              <a:rPr lang="ko-KR" sz="1800">
+                <a:latin typeface="맑은 고딕" charset="0"/>
+                <a:ea typeface="맑은 고딕" charset="0"/>
+              </a:rPr>
+              <a:t>그리고 월드 공간에 있는 Orc 오브젝트를 Project 폴더에 있는 Prefab 폴더에 넣어줍니다.</a:t>
+            </a:r>
+            <a:endParaRPr lang="ko-KR" altLang="en-US" sz="1800">
+              <a:latin typeface="맑은 고딕" charset="0"/>
+              <a:ea typeface="맑은 고딕" charset="0"/>
+            </a:endParaRPr>
+          </a:p>
+        </p:txBody>
+      </p:sp>
+      <p:pic>
+        <p:nvPicPr>
+          <p:cNvPr id="1061" name="그림 54" descr="C:/Users/Admin1/AppData/Roaming/PolarisOffice/ETemp/20572_22936136/fImage2242171995705.png"/>
+          <p:cNvPicPr>
+            <a:picLocks noChangeAspect="1"/>
+          </p:cNvPicPr>
+          <p:nvPr/>
+        </p:nvPicPr>
+        <p:blipFill rotWithShape="1">
+          <a:blip r:embed="rId14" cstate="hqprint">
             <a:extLst>
               <a:ext uri="{28A0092B-C50C-407E-A947-70E740481C1C}">
                 <a14:useLocalDpi xmlns:a14="http://schemas.microsoft.com/office/drawing/2010/main"/>
@@ -11084,8 +10544,8 @@
         </p:blipFill>
         <p:spPr>
           <a:xfrm rot="0">
-            <a:off x="6814820" y="1277620"/>
-            <a:ext cx="2264410" cy="2894330"/>
+            <a:off x="8013700" y="4366895"/>
+            <a:ext cx="530860" cy="426085"/>
           </a:xfrm>
           <a:prstGeom prst="rect"/>
           <a:noFill/>
@@ -11093,17 +10553,17 @@
       </p:pic>
       <p:pic>
         <p:nvPicPr>
-          <p:cNvPr id="1076" name="그림 7"/>
+          <p:cNvPr id="1062" name="그림 55" descr="C:/Users/Admin1/AppData/Roaming/PolarisOffice/ETemp/20572_22936136/fImage2242172008145.png"/>
           <p:cNvPicPr>
             <a:picLocks noChangeAspect="1"/>
           </p:cNvPicPr>
           <p:nvPr/>
         </p:nvPicPr>
         <p:blipFill rotWithShape="1">
-          <a:blip r:embed="rId7" cstate="print">
+          <a:blip r:embed="rId15" cstate="hqprint">
             <a:extLst>
               <a:ext uri="{28A0092B-C50C-407E-A947-70E740481C1C}">
-                <a14:useLocalDpi xmlns:a14="http://schemas.microsoft.com/office/drawing/2010/main" val="0"/>
+                <a14:useLocalDpi xmlns:a14="http://schemas.microsoft.com/office/drawing/2010/main"/>
               </a:ext>
             </a:extLst>
           </a:blip>
@@ -11112,14 +10572,12 @@
           </a:stretch>
         </p:blipFill>
         <p:spPr>
-          <a:xfrm rot="0">
-            <a:off x="9326880" y="1770380"/>
-            <a:ext cx="1630680" cy="1921510"/>
-          </a:xfrm>
-          <a:prstGeom prst="roundRect"/>
-          <a:solidFill>
-            <a:srgbClr val="EDEDED"/>
-          </a:solidFill>
+          <a:xfrm rot="10800000">
+            <a:off x="8007350" y="1866900"/>
+            <a:ext cx="530860" cy="426085"/>
+          </a:xfrm>
+          <a:prstGeom prst="rect"/>
+          <a:noFill/>
         </p:spPr>
       </p:pic>
     </p:spTree>
@@ -11224,7 +10682,7 @@
       </p:sp>
       <p:sp>
         <p:nvSpPr>
-          <p:cNvPr id="1051" name="Rect 0"/>
+          <p:cNvPr id="1032" name="텍스트 상자 56"/>
           <p:cNvSpPr txBox="1">
             <a:spLocks/>
           </p:cNvSpPr>
@@ -11232,8 +10690,8 @@
         </p:nvSpPr>
         <p:spPr>
           <a:xfrm rot="0">
-            <a:off x="1395730" y="5154295"/>
-            <a:ext cx="3958590" cy="954405"/>
+            <a:off x="1432560" y="5100320"/>
+            <a:ext cx="3945890" cy="954405"/>
           </a:xfrm>
           <a:prstGeom prst="rect"/>
           <a:noFill/>
@@ -11260,17 +10718,7 @@
                 <a:latin typeface="맑은 고딕" charset="0"/>
                 <a:ea typeface="맑은 고딕" charset="0"/>
               </a:rPr>
-              <a:t>1</a:t>
-            </a:r>
-            <a:r>
-              <a:rPr lang="ko-KR" sz="2000" b="1">
-                <a:solidFill>
-                  <a:srgbClr val="0611F2"/>
-                </a:solidFill>
-                <a:latin typeface="맑은 고딕" charset="0"/>
-                <a:ea typeface="맑은 고딕" charset="0"/>
-              </a:rPr>
-              <a:t>5</a:t>
+              <a:t>13</a:t>
             </a:r>
             <a:r>
               <a:rPr sz="2000" b="1">
@@ -11287,28 +10735,7 @@
                 <a:latin typeface="맑은 고딕" charset="0"/>
                 <a:ea typeface="맑은 고딕" charset="0"/>
               </a:rPr>
-              <a:t>그</a:t>
-            </a:r>
-            <a:r>
-              <a:rPr lang="ko-KR" sz="1800">
-                <a:latin typeface="맑은 고딕" charset="0"/>
-                <a:ea typeface="맑은 고딕" charset="0"/>
-              </a:rPr>
-              <a:t>리고</a:t>
-            </a:r>
-            <a:r>
-              <a:rPr lang="ko-KR" sz="1800">
-                <a:latin typeface="맑은 고딕" charset="0"/>
-                <a:ea typeface="맑은 고딕" charset="0"/>
-              </a:rPr>
-              <a:t> Generic Create Button</a:t>
-            </a:r>
-            <a:r>
-              <a:rPr lang="ko-KR" sz="1800">
-                <a:latin typeface="맑은 고딕" charset="0"/>
-                <a:ea typeface="맑은 고딕" charset="0"/>
-              </a:rPr>
-              <a:t>의 Text에 Genenric Stone Create로 정의합니다.</a:t>
+              <a:t>그런 다음 월드 공간에 있는 Orc 오브젝트를 선택하고 Delete로 삭제시켜 줍니다.</a:t>
             </a:r>
             <a:endParaRPr lang="ko-KR" altLang="en-US" sz="1800">
               <a:latin typeface="맑은 고딕" charset="0"/>
@@ -11317,97 +10744,16 @@
           </a:p>
         </p:txBody>
       </p:sp>
-      <p:sp>
-        <p:nvSpPr>
-          <p:cNvPr id="1070" name="Rect 0"/>
-          <p:cNvSpPr txBox="1">
-            <a:spLocks/>
-          </p:cNvSpPr>
-          <p:nvPr/>
-        </p:nvSpPr>
-        <p:spPr>
-          <a:xfrm rot="0">
-            <a:off x="6801485" y="5149850"/>
-            <a:ext cx="4217670" cy="954405"/>
-          </a:xfrm>
-          <a:prstGeom prst="rect"/>
-          <a:noFill/>
-          <a:ln w="0">
-            <a:noFill/>
-            <a:prstDash/>
-          </a:ln>
-        </p:spPr>
-        <p:txBody>
-          <a:bodyPr wrap="square" lIns="89535" tIns="46355" rIns="89535" bIns="46355" numCol="1" vert="horz" anchor="t">
-            <a:spAutoFit/>
-          </a:bodyPr>
-          <a:lstStyle/>
-          <a:p>
-            <a:pPr marL="0" indent="0" algn="l" latinLnBrk="0" hangingPunct="1">
-              <a:buFontTx/>
-              <a:buNone/>
-            </a:pPr>
-            <a:r>
-              <a:rPr lang="ko-KR" sz="2000" b="1">
-                <a:solidFill>
-                  <a:srgbClr val="0611F2"/>
-                </a:solidFill>
-                <a:latin typeface="맑은 고딕" charset="0"/>
-                <a:ea typeface="맑은 고딕" charset="0"/>
-              </a:rPr>
-              <a:t>1</a:t>
-            </a:r>
-            <a:r>
-              <a:rPr lang="ko-KR" sz="2000" b="1">
-                <a:solidFill>
-                  <a:srgbClr val="0611F2"/>
-                </a:solidFill>
-                <a:latin typeface="맑은 고딕" charset="0"/>
-                <a:ea typeface="맑은 고딕" charset="0"/>
-              </a:rPr>
-              <a:t>6</a:t>
-            </a:r>
-            <a:r>
-              <a:rPr sz="2000" b="1">
-                <a:solidFill>
-                  <a:srgbClr val="0611F2"/>
-                </a:solidFill>
-                <a:latin typeface="맑은 고딕" charset="0"/>
-                <a:ea typeface="맑은 고딕" charset="0"/>
-              </a:rPr>
-              <a:t>. </a:t>
-            </a:r>
-            <a:r>
-              <a:rPr lang="ko-KR" sz="1800">
-                <a:latin typeface="맑은 고딕" charset="0"/>
-                <a:ea typeface="맑은 고딕" charset="0"/>
-              </a:rPr>
-              <a:t>그</a:t>
-            </a:r>
-            <a:r>
-              <a:rPr lang="ko-KR" sz="1800">
-                <a:latin typeface="맑은 고딕" charset="0"/>
-                <a:ea typeface="맑은 고딕" charset="0"/>
-              </a:rPr>
-              <a:t>다음으로 Generic Create Button을 선택하고 On Click 함수에 Event를 추가합니다.</a:t>
-            </a:r>
-            <a:endParaRPr lang="ko-KR" altLang="en-US" sz="1800">
-              <a:latin typeface="맑은 고딕" charset="0"/>
-              <a:ea typeface="맑은 고딕" charset="0"/>
-            </a:endParaRPr>
-          </a:p>
-        </p:txBody>
-      </p:sp>
       <p:pic>
         <p:nvPicPr>
-          <p:cNvPr id="1077" name="그림 14"/>
+          <p:cNvPr id="1034" name="그림 58" descr="C:/Users/Admin1/AppData/Roaming/PolarisOffice/ETemp/20572_22936136/fImage115662033281.png"/>
           <p:cNvPicPr>
             <a:picLocks noChangeAspect="1"/>
           </p:cNvPicPr>
           <p:nvPr/>
         </p:nvPicPr>
         <p:blipFill rotWithShape="1">
-          <a:blip r:embed="rId2" cstate="print">
+          <a:blip r:embed="rId5" cstate="print">
             <a:extLst>
               <a:ext uri="{28A0092B-C50C-407E-A947-70E740481C1C}">
                 <a14:useLocalDpi xmlns:a14="http://schemas.microsoft.com/office/drawing/2010/main" val="0"/>
@@ -11420,23 +10766,25 @@
         </p:blipFill>
         <p:spPr>
           <a:xfrm rot="0">
-            <a:off x="1393190" y="1274445"/>
-            <a:ext cx="3960495" cy="3767455"/>
-          </a:xfrm>
-          <a:prstGeom prst="rect"/>
-          <a:noFill/>
+            <a:off x="3187065" y="1402715"/>
+            <a:ext cx="2182495" cy="3481705"/>
+          </a:xfrm>
+          <a:prstGeom prst="roundRect"/>
+          <a:solidFill>
+            <a:srgbClr val="EDEDED"/>
+          </a:solidFill>
         </p:spPr>
       </p:pic>
       <p:pic>
         <p:nvPicPr>
-          <p:cNvPr id="1078" name="그림 15"/>
+          <p:cNvPr id="1035" name="그림 61" descr="C:/Users/Admin1/AppData/Roaming/PolarisOffice/ETemp/20572_22936136/fImage71352046827.png"/>
           <p:cNvPicPr>
             <a:picLocks noChangeAspect="1"/>
           </p:cNvPicPr>
           <p:nvPr/>
         </p:nvPicPr>
         <p:blipFill rotWithShape="1">
-          <a:blip r:embed="rId3" cstate="print">
+          <a:blip r:embed="rId6" cstate="print">
             <a:extLst>
               <a:ext uri="{28A0092B-C50C-407E-A947-70E740481C1C}">
                 <a14:useLocalDpi xmlns:a14="http://schemas.microsoft.com/office/drawing/2010/main" val="0"/>
@@ -11449,11 +10797,13 @@
         </p:blipFill>
         <p:spPr>
           <a:xfrm rot="0">
-            <a:off x="6797040" y="1312545"/>
-            <a:ext cx="4225290" cy="3695065"/>
-          </a:xfrm>
-          <a:prstGeom prst="rect"/>
-          <a:noFill/>
+            <a:off x="1428750" y="1922145"/>
+            <a:ext cx="1602740" cy="2451735"/>
+          </a:xfrm>
+          <a:prstGeom prst="roundRect"/>
+          <a:solidFill>
+            <a:srgbClr val="EDEDED"/>
+          </a:solidFill>
         </p:spPr>
       </p:pic>
     </p:spTree>
@@ -11556,289 +10906,6 @@
           </a:p>
         </p:txBody>
       </p:sp>
-      <p:sp>
-        <p:nvSpPr>
-          <p:cNvPr id="1051" name="Rect 0"/>
-          <p:cNvSpPr txBox="1">
-            <a:spLocks/>
-          </p:cNvSpPr>
-          <p:nvPr/>
-        </p:nvSpPr>
-        <p:spPr>
-          <a:xfrm rot="0">
-            <a:off x="1395730" y="5154295"/>
-            <a:ext cx="3958590" cy="954405"/>
-          </a:xfrm>
-          <a:prstGeom prst="rect"/>
-          <a:noFill/>
-          <a:ln w="0">
-            <a:noFill/>
-            <a:prstDash/>
-          </a:ln>
-        </p:spPr>
-        <p:txBody>
-          <a:bodyPr wrap="square" lIns="89535" tIns="46355" rIns="89535" bIns="46355" numCol="1" vert="horz" anchor="t">
-            <a:spAutoFit/>
-          </a:bodyPr>
-          <a:lstStyle/>
-          <a:p>
-            <a:pPr marL="0" indent="0" algn="l" latinLnBrk="0" hangingPunct="1">
-              <a:buFontTx/>
-              <a:buNone/>
-            </a:pPr>
-            <a:r>
-              <a:rPr lang="ko-KR" sz="2000" b="1">
-                <a:solidFill>
-                  <a:srgbClr val="0611F2"/>
-                </a:solidFill>
-                <a:latin typeface="맑은 고딕" charset="0"/>
-                <a:ea typeface="맑은 고딕" charset="0"/>
-              </a:rPr>
-              <a:t>1</a:t>
-            </a:r>
-            <a:r>
-              <a:rPr lang="ko-KR" sz="2000" b="1">
-                <a:solidFill>
-                  <a:srgbClr val="0611F2"/>
-                </a:solidFill>
-                <a:latin typeface="맑은 고딕" charset="0"/>
-                <a:ea typeface="맑은 고딕" charset="0"/>
-              </a:rPr>
-              <a:t>7</a:t>
-            </a:r>
-            <a:r>
-              <a:rPr sz="2000" b="1">
-                <a:solidFill>
-                  <a:srgbClr val="0611F2"/>
-                </a:solidFill>
-                <a:latin typeface="맑은 고딕" charset="0"/>
-                <a:ea typeface="맑은 고딕" charset="0"/>
-              </a:rPr>
-              <a:t>. </a:t>
-            </a:r>
-            <a:r>
-              <a:rPr lang="ko-KR" sz="1800">
-                <a:latin typeface="맑은 고딕" charset="0"/>
-                <a:ea typeface="맑은 고딕" charset="0"/>
-              </a:rPr>
-              <a:t>그</a:t>
-            </a:r>
-            <a:r>
-              <a:rPr lang="ko-KR" sz="1800">
-                <a:latin typeface="맑은 고딕" charset="0"/>
-                <a:ea typeface="맑은 고딕" charset="0"/>
-              </a:rPr>
-              <a:t>런 다음 On Click 함수의 Event에 Create Object 오브젝트를 넣어줍니다.</a:t>
-            </a:r>
-            <a:endParaRPr lang="ko-KR" altLang="en-US" sz="1800">
-              <a:latin typeface="맑은 고딕" charset="0"/>
-              <a:ea typeface="맑은 고딕" charset="0"/>
-            </a:endParaRPr>
-          </a:p>
-        </p:txBody>
-      </p:sp>
-      <p:sp>
-        <p:nvSpPr>
-          <p:cNvPr id="1070" name="Rect 0"/>
-          <p:cNvSpPr txBox="1">
-            <a:spLocks/>
-          </p:cNvSpPr>
-          <p:nvPr/>
-        </p:nvSpPr>
-        <p:spPr>
-          <a:xfrm rot="0">
-            <a:off x="6801485" y="5149850"/>
-            <a:ext cx="4217670" cy="954405"/>
-          </a:xfrm>
-          <a:prstGeom prst="rect"/>
-          <a:noFill/>
-          <a:ln w="0">
-            <a:noFill/>
-            <a:prstDash/>
-          </a:ln>
-        </p:spPr>
-        <p:txBody>
-          <a:bodyPr wrap="square" lIns="89535" tIns="46355" rIns="89535" bIns="46355" numCol="1" vert="horz" anchor="t">
-            <a:spAutoFit/>
-          </a:bodyPr>
-          <a:lstStyle/>
-          <a:p>
-            <a:pPr marL="0" indent="0" algn="l" latinLnBrk="0" hangingPunct="1">
-              <a:buFontTx/>
-              <a:buNone/>
-            </a:pPr>
-            <a:r>
-              <a:rPr lang="ko-KR" sz="2000" b="1">
-                <a:solidFill>
-                  <a:srgbClr val="0611F2"/>
-                </a:solidFill>
-                <a:latin typeface="맑은 고딕" charset="0"/>
-                <a:ea typeface="맑은 고딕" charset="0"/>
-              </a:rPr>
-              <a:t>1</a:t>
-            </a:r>
-            <a:r>
-              <a:rPr lang="ko-KR" sz="2000" b="1">
-                <a:solidFill>
-                  <a:srgbClr val="0611F2"/>
-                </a:solidFill>
-                <a:latin typeface="맑은 고딕" charset="0"/>
-                <a:ea typeface="맑은 고딕" charset="0"/>
-              </a:rPr>
-              <a:t>8</a:t>
-            </a:r>
-            <a:r>
-              <a:rPr sz="2000" b="1">
-                <a:solidFill>
-                  <a:srgbClr val="0611F2"/>
-                </a:solidFill>
-                <a:latin typeface="맑은 고딕" charset="0"/>
-                <a:ea typeface="맑은 고딕" charset="0"/>
-              </a:rPr>
-              <a:t>. </a:t>
-            </a:r>
-            <a:r>
-              <a:rPr lang="ko-KR" sz="1800">
-                <a:latin typeface="맑은 고딕" charset="0"/>
-                <a:ea typeface="맑은 고딕" charset="0"/>
-              </a:rPr>
-              <a:t>그</a:t>
-            </a:r>
-            <a:r>
-              <a:rPr lang="ko-KR" sz="1800">
-                <a:latin typeface="맑은 고딕" charset="0"/>
-                <a:ea typeface="맑은 고딕" charset="0"/>
-              </a:rPr>
-              <a:t>리고 Button Event로 사용할 Create.GenericCreate( )함수를 설정합니다.</a:t>
-            </a:r>
-            <a:endParaRPr lang="ko-KR" altLang="en-US" sz="1800">
-              <a:latin typeface="맑은 고딕" charset="0"/>
-              <a:ea typeface="맑은 고딕" charset="0"/>
-            </a:endParaRPr>
-          </a:p>
-        </p:txBody>
-      </p:sp>
-      <p:pic>
-        <p:nvPicPr>
-          <p:cNvPr id="1079" name="그림 21"/>
-          <p:cNvPicPr>
-            <a:picLocks noChangeAspect="1"/>
-          </p:cNvPicPr>
-          <p:nvPr/>
-        </p:nvPicPr>
-        <p:blipFill rotWithShape="1">
-          <a:blip r:embed="rId2" cstate="print">
-            <a:extLst>
-              <a:ext uri="{28A0092B-C50C-407E-A947-70E740481C1C}">
-                <a14:useLocalDpi xmlns:a14="http://schemas.microsoft.com/office/drawing/2010/main" val="0"/>
-              </a:ext>
-            </a:extLst>
-          </a:blip>
-          <a:stretch>
-            <a:fillRect/>
-          </a:stretch>
-        </p:blipFill>
-        <p:spPr>
-          <a:xfrm rot="0">
-            <a:off x="2876550" y="1311910"/>
-            <a:ext cx="2477770" cy="3576955"/>
-          </a:xfrm>
-          <a:prstGeom prst="rect"/>
-          <a:noFill/>
-        </p:spPr>
-      </p:pic>
-      <p:pic>
-        <p:nvPicPr>
-          <p:cNvPr id="1080" name="그림 22"/>
-          <p:cNvPicPr>
-            <a:picLocks noChangeAspect="1"/>
-          </p:cNvPicPr>
-          <p:nvPr/>
-        </p:nvPicPr>
-        <p:blipFill rotWithShape="1">
-          <a:blip r:embed="rId3" cstate="print">
-            <a:extLst>
-              <a:ext uri="{28A0092B-C50C-407E-A947-70E740481C1C}">
-                <a14:useLocalDpi xmlns:a14="http://schemas.microsoft.com/office/drawing/2010/main" val="0"/>
-              </a:ext>
-            </a:extLst>
-          </a:blip>
-          <a:stretch>
-            <a:fillRect/>
-          </a:stretch>
-        </p:blipFill>
-        <p:spPr>
-          <a:xfrm rot="0">
-            <a:off x="1400175" y="2344420"/>
-            <a:ext cx="1202690" cy="1496695"/>
-          </a:xfrm>
-          <a:prstGeom prst="roundRect"/>
-          <a:solidFill>
-            <a:srgbClr val="EDEDED"/>
-          </a:solidFill>
-        </p:spPr>
-      </p:pic>
-      <p:cxnSp>
-        <p:nvCxnSpPr>
-          <p:cNvPr id="1081" name="도형 25"/>
-          <p:cNvCxnSpPr/>
-          <p:nvPr/>
-        </p:nvCxnSpPr>
-        <p:spPr>
-          <a:xfrm rot="0">
-            <a:off x="2419350" y="3092450"/>
-            <a:ext cx="1230630" cy="1455420"/>
-          </a:xfrm>
-          <a:prstGeom prst="straightConnector1"/>
-          <a:ln w="6350" cap="flat" cmpd="sng">
-            <a:prstDash/>
-            <a:tailEnd type="triangle" w="med" len="med"/>
-          </a:ln>
-        </p:spPr>
-        <p:style>
-          <a:lnRef idx="1">
-            <a:schemeClr val="accent1"/>
-          </a:lnRef>
-          <a:fillRef idx="0">
-            <a:schemeClr val="accent1"/>
-          </a:fillRef>
-          <a:effectRef idx="0">
-            <a:schemeClr val="accent1"/>
-          </a:effectRef>
-          <a:fontRef idx="minor">
-            <a:schemeClr val="tx1"/>
-          </a:fontRef>
-        </p:style>
-      </p:cxnSp>
-      <p:pic>
-        <p:nvPicPr>
-          <p:cNvPr id="1082" name="그림 27"/>
-          <p:cNvPicPr>
-            <a:picLocks noChangeAspect="1"/>
-          </p:cNvPicPr>
-          <p:nvPr/>
-        </p:nvPicPr>
-        <p:blipFill rotWithShape="1">
-          <a:blip r:embed="rId4" cstate="print">
-            <a:extLst>
-              <a:ext uri="{28A0092B-C50C-407E-A947-70E740481C1C}">
-                <a14:useLocalDpi xmlns:a14="http://schemas.microsoft.com/office/drawing/2010/main" val="0"/>
-              </a:ext>
-            </a:extLst>
-          </a:blip>
-          <a:stretch>
-            <a:fillRect/>
-          </a:stretch>
-        </p:blipFill>
-        <p:spPr>
-          <a:xfrm rot="0">
-            <a:off x="6813550" y="1188720"/>
-            <a:ext cx="4213860" cy="3903345"/>
-          </a:xfrm>
-          <a:prstGeom prst="rect"/>
-          <a:noFill/>
-        </p:spPr>
-      </p:pic>
     </p:spTree>
   </p:cSld>
   <p:clrMapOvr>

</xml_diff>

<commit_message>
Utilize The Destroy Function
- Implemented so that a game
  object is created and then
  destroyed according to a specific
  time

- Implementation of a system that is
  randomly generated at a specific
  location

- Update PPT data
</commit_message>
<xml_diff>
--- a/Assets/Class/Instantiate & Destroy/PPT Data/Instatiate and Destroy Example.pptx
+++ b/Assets/Class/Instantiate & Destroy/PPT Data/Instatiate and Destroy Example.pptx
@@ -2,7 +2,7 @@
 <file path=ppt/presentation.xml><?xml version="1.0" encoding="utf-8"?>
 <p:presentation xmlns:a="http://schemas.openxmlformats.org/drawingml/2006/main" xmlns:r="http://schemas.openxmlformats.org/officeDocument/2006/relationships" xmlns:p="http://schemas.openxmlformats.org/presentationml/2006/main" xmlns:p14="http://schemas.microsoft.com/office/powerpoint/2010/main" saveSubsetFonts="1" firstSlideNum="0">
   <p:sldMasterIdLst>
-    <p:sldMasterId id="2147485770" r:id="rId12"/>
+    <p:sldMasterId id="2147485787" r:id="rId12"/>
   </p:sldMasterIdLst>
   <p:notesMasterIdLst>
     <p:notesMasterId r:id="rId14"/>
@@ -18,7 +18,9 @@
     <p:sldId id="298" r:id="rId23"/>
     <p:sldId id="299" r:id="rId24"/>
     <p:sldId id="300" r:id="rId25"/>
-    <p:sldId id="287" r:id="rId27"/>
+    <p:sldId id="301" r:id="rId26"/>
+    <p:sldId id="302" r:id="rId27"/>
+    <p:sldId id="287" r:id="rId28"/>
   </p:sldIdLst>
   <p:sldSz cx="12192000" cy="6858000"/>
   <p:notesSz cx="6858000" cy="9144000"/>
@@ -791,6 +793,290 @@
         <p:spPr>
           <a:xfrm rot="0">
             <a:off x="685800" y="1143000"/>
+            <a:ext cx="5490845" cy="3090545"/>
+          </a:xfrm>
+          <a:prstGeom prst="rect"/>
+          <a:noFill/>
+          <a:ln w="12700" cap="flat" cmpd="sng">
+            <a:solidFill>
+              <a:srgbClr val="000000">
+                <a:alpha val="100000"/>
+              </a:srgbClr>
+            </a:solidFill>
+            <a:prstDash val="solid"/>
+          </a:ln>
+        </p:spPr>
+        <p:txBody>
+          <a:bodyPr wrap="square" lIns="91440" tIns="45720" rIns="91440" bIns="45720" numCol="1" vert="horz" anchor="ctr">
+            <a:noAutofit/>
+          </a:bodyPr>
+          <a:lstStyle/>
+          <a:p>
+            <a:pPr marL="0" indent="0" latinLnBrk="0">
+              <a:buFontTx/>
+              <a:buNone/>
+            </a:pPr>
+          </a:p>
+        </p:txBody>
+      </p:sp>
+      <p:sp>
+        <p:nvSpPr>
+          <p:cNvPr id="3" name="슬라이드 노트 개체 틀 4"/>
+          <p:cNvSpPr txBox="1">
+            <a:spLocks/>
+          </p:cNvSpPr>
+          <p:nvPr>
+            <p:ph type="body" idx="3"/>
+          </p:nvPr>
+        </p:nvSpPr>
+        <p:spPr>
+          <a:xfrm rot="0">
+            <a:off x="685800" y="4400550"/>
+            <a:ext cx="5490845" cy="3604895"/>
+          </a:xfrm>
+          <a:prstGeom prst="rect"/>
+        </p:spPr>
+        <p:txBody>
+          <a:bodyPr wrap="square" lIns="91440" tIns="45720" rIns="91440" bIns="45720" numCol="1" vert="horz" anchor="t">
+            <a:noAutofit/>
+          </a:bodyPr>
+          <a:lstStyle/>
+          <a:p>
+            <a:pPr marL="0" indent="0" latinLnBrk="0">
+              <a:buFontTx/>
+              <a:buNone/>
+            </a:pPr>
+          </a:p>
+        </p:txBody>
+      </p:sp>
+      <p:sp>
+        <p:nvSpPr>
+          <p:cNvPr id="4" name="슬라이드 번호 개체 틀 6"/>
+          <p:cNvSpPr txBox="1">
+            <a:spLocks/>
+          </p:cNvSpPr>
+          <p:nvPr>
+            <p:ph type="sldNum" idx="5"/>
+          </p:nvPr>
+        </p:nvSpPr>
+        <p:spPr>
+          <a:xfrm rot="0">
+            <a:off x="3884930" y="8685530"/>
+            <a:ext cx="2976245" cy="462915"/>
+          </a:xfrm>
+          <a:prstGeom prst="rect"/>
+        </p:spPr>
+        <p:txBody>
+          <a:bodyPr wrap="square" lIns="91440" tIns="45720" rIns="91440" bIns="45720" numCol="1" vert="horz" anchor="b">
+            <a:noAutofit/>
+          </a:bodyPr>
+          <a:lstStyle>
+            <a:lvl1pPr marL="0" indent="0" algn="r" latinLnBrk="0">
+              <a:buFontTx/>
+              <a:buNone/>
+              <a:defRPr lang="en-GB" altLang="en-US" sz="1200"/>
+            </a:lvl1pPr>
+          </a:lstStyle>
+          <a:p>
+            <a:pPr marL="0" indent="0" latinLnBrk="0">
+              <a:buFontTx/>
+              <a:buNone/>
+            </a:pPr>
+            <a:fld id="{B9320F77-B9A0-41C5-862A-B4B631284C64}" type="slidenum">
+              <a:rPr lang="ko-KR" altLang="en-US"/>
+              <a:t>‹#›</a:t>
+            </a:fld>
+          </a:p>
+        </p:txBody>
+      </p:sp>
+    </p:spTree>
+  </p:cSld>
+  <p:clrMapOvr>
+    <a:masterClrMapping/>
+  </p:clrMapOvr>
+  <mc:AlternateContent xmlns:mc="http://schemas.openxmlformats.org/markup-compatibility/2006">
+    <mc:Choice xmlns:p14="http://schemas.microsoft.com/office/powerpoint/2010/main" Requires="p14">
+      <p:transition spd="slow" p14:dur="0"/>
+    </mc:Choice>
+    <mc:Fallback>
+      <p:transition spd="slow"/>
+    </mc:Fallback>
+  </mc:AlternateContent>
+</p:notes>
+</file>
+
+<file path=ppt/notesSlides/notesSlide12.xml><?xml version="1.0" encoding="utf-8"?>
+<p:notes xmlns:a="http://schemas.openxmlformats.org/drawingml/2006/main" xmlns:r="http://schemas.openxmlformats.org/officeDocument/2006/relationships" xmlns:p="http://schemas.openxmlformats.org/presentationml/2006/main">
+  <p:cSld>
+    <p:spTree>
+      <p:nvGrpSpPr>
+        <p:cNvPr id="1" name=""/>
+        <p:cNvGrpSpPr/>
+        <p:nvPr/>
+      </p:nvGrpSpPr>
+      <p:grpSpPr>
+        <a:xfrm>
+          <a:off x="0" y="0"/>
+          <a:ext cx="0" cy="0"/>
+          <a:chOff x="0" y="0"/>
+          <a:chExt cx="0" cy="0"/>
+        </a:xfrm>
+      </p:grpSpPr>
+      <p:sp>
+        <p:nvSpPr>
+          <p:cNvPr id="2" name="슬라이드 이미지 개체 틀 3"/>
+          <p:cNvSpPr>
+            <a:spLocks noChangeAspect="1"/>
+          </p:cNvSpPr>
+          <p:nvPr>
+            <p:ph type="sldImg" idx="2"/>
+          </p:nvPr>
+        </p:nvSpPr>
+        <p:spPr>
+          <a:xfrm rot="0">
+            <a:off x="685800" y="1143000"/>
+            <a:ext cx="5490845" cy="3090545"/>
+          </a:xfrm>
+          <a:prstGeom prst="rect"/>
+          <a:noFill/>
+          <a:ln w="12700" cap="flat" cmpd="sng">
+            <a:solidFill>
+              <a:srgbClr val="000000">
+                <a:alpha val="100000"/>
+              </a:srgbClr>
+            </a:solidFill>
+            <a:prstDash val="solid"/>
+          </a:ln>
+        </p:spPr>
+        <p:txBody>
+          <a:bodyPr wrap="square" lIns="91440" tIns="45720" rIns="91440" bIns="45720" numCol="1" vert="horz" anchor="ctr">
+            <a:noAutofit/>
+          </a:bodyPr>
+          <a:lstStyle/>
+          <a:p>
+            <a:pPr marL="0" indent="0" latinLnBrk="0">
+              <a:buFontTx/>
+              <a:buNone/>
+            </a:pPr>
+          </a:p>
+        </p:txBody>
+      </p:sp>
+      <p:sp>
+        <p:nvSpPr>
+          <p:cNvPr id="3" name="슬라이드 노트 개체 틀 4"/>
+          <p:cNvSpPr txBox="1">
+            <a:spLocks/>
+          </p:cNvSpPr>
+          <p:nvPr>
+            <p:ph type="body" idx="3"/>
+          </p:nvPr>
+        </p:nvSpPr>
+        <p:spPr>
+          <a:xfrm rot="0">
+            <a:off x="685800" y="4400550"/>
+            <a:ext cx="5490845" cy="3604895"/>
+          </a:xfrm>
+          <a:prstGeom prst="rect"/>
+        </p:spPr>
+        <p:txBody>
+          <a:bodyPr wrap="square" lIns="91440" tIns="45720" rIns="91440" bIns="45720" numCol="1" vert="horz" anchor="t">
+            <a:noAutofit/>
+          </a:bodyPr>
+          <a:lstStyle/>
+          <a:p>
+            <a:pPr marL="0" indent="0" latinLnBrk="0">
+              <a:buFontTx/>
+              <a:buNone/>
+            </a:pPr>
+          </a:p>
+        </p:txBody>
+      </p:sp>
+      <p:sp>
+        <p:nvSpPr>
+          <p:cNvPr id="4" name="슬라이드 번호 개체 틀 6"/>
+          <p:cNvSpPr txBox="1">
+            <a:spLocks/>
+          </p:cNvSpPr>
+          <p:nvPr>
+            <p:ph type="sldNum" idx="5"/>
+          </p:nvPr>
+        </p:nvSpPr>
+        <p:spPr>
+          <a:xfrm rot="0">
+            <a:off x="3884930" y="8685530"/>
+            <a:ext cx="2976245" cy="462915"/>
+          </a:xfrm>
+          <a:prstGeom prst="rect"/>
+        </p:spPr>
+        <p:txBody>
+          <a:bodyPr wrap="square" lIns="91440" tIns="45720" rIns="91440" bIns="45720" numCol="1" vert="horz" anchor="b">
+            <a:noAutofit/>
+          </a:bodyPr>
+          <a:lstStyle>
+            <a:lvl1pPr marL="0" indent="0" algn="r" latinLnBrk="0">
+              <a:buFontTx/>
+              <a:buNone/>
+              <a:defRPr lang="en-GB" altLang="en-US" sz="1200"/>
+            </a:lvl1pPr>
+          </a:lstStyle>
+          <a:p>
+            <a:pPr marL="0" indent="0" latinLnBrk="0">
+              <a:buFontTx/>
+              <a:buNone/>
+            </a:pPr>
+            <a:fld id="{B9320F77-B9A0-41C5-862A-B4B631284C64}" type="slidenum">
+              <a:rPr lang="ko-KR" altLang="en-US"/>
+              <a:t>‹#›</a:t>
+            </a:fld>
+          </a:p>
+        </p:txBody>
+      </p:sp>
+    </p:spTree>
+  </p:cSld>
+  <p:clrMapOvr>
+    <a:masterClrMapping/>
+  </p:clrMapOvr>
+  <mc:AlternateContent xmlns:mc="http://schemas.openxmlformats.org/markup-compatibility/2006">
+    <mc:Choice xmlns:p14="http://schemas.microsoft.com/office/powerpoint/2010/main" Requires="p14">
+      <p:transition spd="slow" p14:dur="0"/>
+    </mc:Choice>
+    <mc:Fallback>
+      <p:transition spd="slow"/>
+    </mc:Fallback>
+  </mc:AlternateContent>
+</p:notes>
+</file>
+
+<file path=ppt/notesSlides/notesSlide13.xml><?xml version="1.0" encoding="utf-8"?>
+<p:notes xmlns:a="http://schemas.openxmlformats.org/drawingml/2006/main" xmlns:r="http://schemas.openxmlformats.org/officeDocument/2006/relationships" xmlns:p="http://schemas.openxmlformats.org/presentationml/2006/main">
+  <p:cSld>
+    <p:spTree>
+      <p:nvGrpSpPr>
+        <p:cNvPr id="1" name=""/>
+        <p:cNvGrpSpPr/>
+        <p:nvPr/>
+      </p:nvGrpSpPr>
+      <p:grpSpPr>
+        <a:xfrm>
+          <a:off x="0" y="0"/>
+          <a:ext cx="0" cy="0"/>
+          <a:chOff x="0" y="0"/>
+          <a:chExt cx="0" cy="0"/>
+        </a:xfrm>
+      </p:grpSpPr>
+      <p:sp>
+        <p:nvSpPr>
+          <p:cNvPr id="2" name="슬라이드 이미지 개체 틀 3"/>
+          <p:cNvSpPr>
+            <a:spLocks noChangeAspect="1"/>
+          </p:cNvSpPr>
+          <p:nvPr>
+            <p:ph type="sldImg" idx="2"/>
+          </p:nvPr>
+        </p:nvSpPr>
+        <p:spPr>
+          <a:xfrm rot="0">
+            <a:off x="685800" y="1143000"/>
             <a:ext cx="5488940" cy="3088640"/>
           </a:xfrm>
           <a:prstGeom prst="rect"/>
@@ -7361,7 +7647,7 @@
       </p:sp>
       <p:pic>
         <p:nvPicPr>
-          <p:cNvPr id="1051" name="그림 2" descr="C:/Users/Admin1/AppData/Roaming/PolarisOffice/ETemp/20572_22936136/fImage191383915447.png"/>
+          <p:cNvPr id="1051" name="그림 2"/>
           <p:cNvPicPr>
             <a:picLocks noChangeAspect="1"/>
           </p:cNvPicPr>
@@ -7392,7 +7678,7 @@
       </p:pic>
       <p:pic>
         <p:nvPicPr>
-          <p:cNvPr id="1052" name="그림 3" descr="C:/Users/Admin1/AppData/Roaming/PolarisOffice/ETemp/20572_22936136/fImage51191929169.png"/>
+          <p:cNvPr id="1052" name="그림 3"/>
           <p:cNvPicPr>
             <a:picLocks noChangeAspect="1"/>
           </p:cNvPicPr>
@@ -7523,7 +7809,7 @@
       </p:sp>
       <p:sp>
         <p:nvSpPr>
-          <p:cNvPr id="1051" name="Rect 0"/>
+          <p:cNvPr id="1070" name="Rect 0"/>
           <p:cNvSpPr txBox="1">
             <a:spLocks/>
           </p:cNvSpPr>
@@ -7531,8 +7817,8 @@
         </p:nvSpPr>
         <p:spPr>
           <a:xfrm rot="0">
-            <a:off x="1395730" y="2402840"/>
-            <a:ext cx="3958590" cy="1508125"/>
+            <a:off x="6791960" y="5241925"/>
+            <a:ext cx="4156710" cy="954405"/>
           </a:xfrm>
           <a:prstGeom prst="rect"/>
           <a:noFill/>
@@ -7559,17 +7845,7 @@
                 <a:latin typeface="맑은 고딕" charset="0"/>
                 <a:ea typeface="맑은 고딕" charset="0"/>
               </a:rPr>
-              <a:t>1</a:t>
-            </a:r>
-            <a:r>
-              <a:rPr lang="ko-KR" sz="2000" b="1">
-                <a:solidFill>
-                  <a:srgbClr val="0611F2"/>
-                </a:solidFill>
-                <a:latin typeface="맑은 고딕" charset="0"/>
-                <a:ea typeface="맑은 고딕" charset="0"/>
-              </a:rPr>
-              <a:t>9</a:t>
+              <a:t>18</a:t>
             </a:r>
             <a:r>
               <a:rPr sz="2000" b="1">
@@ -7586,52 +7862,46 @@
                 <a:latin typeface="맑은 고딕" charset="0"/>
                 <a:ea typeface="맑은 고딕" charset="0"/>
               </a:rPr>
-              <a:t>그</a:t>
+              <a:t>그리고 </a:t>
+            </a:r>
+            <a:r>
+              <a:rPr sz="1800">
+                <a:latin typeface="맑은 고딕" charset="0"/>
+                <a:ea typeface="맑은 고딕" charset="0"/>
+              </a:rPr>
+              <a:t>Create</a:t>
+            </a:r>
+            <a:r>
+              <a:rPr sz="1800">
+                <a:latin typeface="맑은 고딕" charset="0"/>
+                <a:ea typeface="맑은 고딕" charset="0"/>
+              </a:rPr>
+              <a:t> </a:t>
+            </a:r>
+            <a:r>
+              <a:rPr sz="1800">
+                <a:latin typeface="맑은 고딕" charset="0"/>
+                <a:ea typeface="맑은 고딕" charset="0"/>
+              </a:rPr>
+              <a:t>스크립트</a:t>
             </a:r>
             <a:r>
               <a:rPr lang="ko-KR" sz="1800">
                 <a:latin typeface="맑은 고딕" charset="0"/>
                 <a:ea typeface="맑은 고딕" charset="0"/>
               </a:rPr>
-              <a:t>런 다음 GeneriecStoneDelete 스크립트 생성합니다.</a:t>
+              <a:t>에 있는 Prefab에 Prefab 폴더에 있는 Orc 오브젝트를 넣어줍니다.</a:t>
             </a:r>
             <a:endParaRPr lang="ko-KR" altLang="en-US" sz="1800">
               <a:latin typeface="맑은 고딕" charset="0"/>
               <a:ea typeface="맑은 고딕" charset="0"/>
             </a:endParaRPr>
           </a:p>
-          <a:p>
-            <a:pPr marL="0" indent="0" algn="l" latinLnBrk="0" hangingPunct="1">
-              <a:buFontTx/>
-              <a:buNone/>
-            </a:pPr>
-            <a:endParaRPr lang="ko-KR" altLang="en-US" sz="1800">
-              <a:latin typeface="맑은 고딕" charset="0"/>
-              <a:ea typeface="맑은 고딕" charset="0"/>
-            </a:endParaRPr>
-          </a:p>
-          <a:p>
-            <a:pPr marL="0" indent="0" algn="l" latinLnBrk="0" hangingPunct="1">
-              <a:buFontTx/>
-              <a:buNone/>
-            </a:pPr>
-            <a:r>
-              <a:rPr lang="ko-KR" sz="1800">
-                <a:latin typeface="맑은 고딕" charset="0"/>
-                <a:ea typeface="맑은 고딕" charset="0"/>
-              </a:rPr>
-              <a:t>그리고 Prefab 폴더에 있는 Stone_3 오브젝트에 넣어줍니다.</a:t>
-            </a:r>
-            <a:endParaRPr lang="ko-KR" altLang="en-US" sz="1800">
-              <a:latin typeface="맑은 고딕" charset="0"/>
-              <a:ea typeface="맑은 고딕" charset="0"/>
-            </a:endParaRPr>
-          </a:p>
-        </p:txBody>
-      </p:sp>
-      <p:sp>
-        <p:nvSpPr>
-          <p:cNvPr id="1070" name="Rect 0"/>
+        </p:txBody>
+      </p:sp>
+      <p:sp>
+        <p:nvSpPr>
+          <p:cNvPr id="1090" name="텍스트 상자 20"/>
           <p:cNvSpPr txBox="1">
             <a:spLocks/>
           </p:cNvSpPr>
@@ -7639,8 +7909,8 @@
         </p:nvSpPr>
         <p:spPr>
           <a:xfrm rot="0">
-            <a:off x="6800215" y="3778885"/>
-            <a:ext cx="4218940" cy="2338705"/>
+            <a:off x="1222375" y="4441825"/>
+            <a:ext cx="4173220" cy="1754505"/>
           </a:xfrm>
           <a:prstGeom prst="rect"/>
           <a:noFill/>
@@ -7650,41 +7920,62 @@
           </a:ln>
         </p:spPr>
         <p:txBody>
-          <a:bodyPr wrap="square" lIns="89535" tIns="46355" rIns="89535" bIns="46355" numCol="1" vert="horz" anchor="t">
+          <a:bodyPr wrap="square" lIns="89535" tIns="46355" rIns="89535" bIns="46355" vert="horz" anchor="t">
             <a:spAutoFit/>
           </a:bodyPr>
           <a:lstStyle/>
           <a:p>
-            <a:pPr marL="0" indent="0" algn="l" latinLnBrk="0" hangingPunct="1">
-              <a:buFontTx/>
-              <a:buNone/>
-            </a:pPr>
-            <a:r>
-              <a:rPr lang="ko-KR" sz="2000" b="1">
+            <a:pPr marL="0" indent="0" rtl="0" algn="l" defTabSz="914400" eaLnBrk="1" latinLnBrk="0" hangingPunct="1">
+              <a:buFontTx/>
+              <a:buNone/>
+            </a:pPr>
+            <a:r>
+              <a:rPr sz="1800" b="1">
                 <a:solidFill>
                   <a:srgbClr val="0611F2"/>
                 </a:solidFill>
                 <a:latin typeface="맑은 고딕" charset="0"/>
                 <a:ea typeface="맑은 고딕" charset="0"/>
               </a:rPr>
-              <a:t>21</a:t>
-            </a:r>
-            <a:r>
-              <a:rPr sz="2000" b="1">
+              <a:t>17</a:t>
+            </a:r>
+            <a:r>
+              <a:rPr sz="1800" b="1">
                 <a:solidFill>
                   <a:srgbClr val="0611F2"/>
                 </a:solidFill>
                 <a:latin typeface="맑은 고딕" charset="0"/>
                 <a:ea typeface="맑은 고딕" charset="0"/>
               </a:rPr>
-              <a:t>. </a:t>
+              <a:t>.</a:t>
+            </a:r>
+            <a:r>
+              <a:rPr sz="1800">
+                <a:latin typeface="맑은 고딕" charset="0"/>
+                <a:ea typeface="맑은 고딕" charset="0"/>
+              </a:rPr>
+              <a:t> </a:t>
+            </a:r>
+            <a:r>
+              <a:rPr sz="1800">
+                <a:latin typeface="맑은 고딕" charset="0"/>
+                <a:ea typeface="맑은 고딕" charset="0"/>
+              </a:rPr>
+              <a:t>이</a:t>
             </a:r>
             <a:r>
               <a:rPr lang="ko-KR" sz="1800">
                 <a:latin typeface="맑은 고딕" charset="0"/>
                 <a:ea typeface="맑은 고딕" charset="0"/>
               </a:rPr>
-              <a:t>그리고 GeneriecStoneDelete 스크립트에서 게임 오브젝트가 화면 밖으로 나갔을 때 호출되는 함수를 선언합니다.</a:t>
+              <a:t>제</a:t>
+            </a:r>
+            <a:r>
+              <a:rPr sz="1800">
+                <a:latin typeface="맑은 고딕" charset="0"/>
+                <a:ea typeface="맑은 고딕" charset="0"/>
+              </a:rPr>
+              <a:t> First Point 오브젝트와 Second Point 오브젝트의 위치를 설정합니다.</a:t>
             </a:r>
             <a:endParaRPr lang="ko-KR" altLang="en-US" sz="1800">
               <a:latin typeface="맑은 고딕" charset="0"/>
@@ -7692,7 +7983,7 @@
             </a:endParaRPr>
           </a:p>
           <a:p>
-            <a:pPr marL="0" indent="0" algn="l" latinLnBrk="0" hangingPunct="1">
+            <a:pPr marL="0" indent="0" rtl="0" algn="l" defTabSz="914400" eaLnBrk="1" latinLnBrk="0" hangingPunct="1">
               <a:buFontTx/>
               <a:buNone/>
             </a:pPr>
@@ -7702,16 +7993,30 @@
             </a:endParaRPr>
           </a:p>
           <a:p>
-            <a:pPr marL="0" indent="0" algn="l" latinLnBrk="0" hangingPunct="1">
-              <a:buFontTx/>
-              <a:buNone/>
-            </a:pPr>
+            <a:pPr marL="0" indent="0" rtl="0" algn="l" defTabSz="914400" eaLnBrk="1" latinLnBrk="0" hangingPunct="1">
+              <a:buFontTx/>
+              <a:buNone/>
+            </a:pPr>
+            <a:r>
+              <a:rPr sz="1800">
+                <a:latin typeface="맑은 고딕" charset="0"/>
+                <a:ea typeface="맑은 고딕" charset="0"/>
+              </a:rPr>
+              <a:t>그</a:t>
+            </a:r>
             <a:r>
               <a:rPr lang="ko-KR" sz="1800">
                 <a:latin typeface="맑은 고딕" charset="0"/>
                 <a:ea typeface="맑은 고딕" charset="0"/>
               </a:rPr>
-              <a:t>마지막으로 게임 오브젝트의 이름이 Stone_3(Clone)이라면 게임 오브젝트를 파괴하도록 설정합니다.</a:t>
+              <a:t>런 다음</a:t>
+            </a:r>
+            <a:r>
+              <a:rPr sz="1800">
+                <a:latin typeface="맑은 고딕" charset="0"/>
+                <a:ea typeface="맑은 고딕" charset="0"/>
+              </a:rPr>
+              <a:t> Third Point 오브젝트와 Four Point 오브젝트의 위치를 설정합니다.</a:t>
             </a:r>
             <a:endParaRPr lang="ko-KR" altLang="en-US" sz="1800">
               <a:latin typeface="맑은 고딕" charset="0"/>
@@ -7722,14 +8027,169 @@
       </p:sp>
       <p:pic>
         <p:nvPicPr>
-          <p:cNvPr id="1084" name="그림 40"/>
+          <p:cNvPr id="1091" name="그림 21" descr="C:/Users/Admin1/AppData/Roaming/PolarisOffice/ETemp/15256_19321368/fImage115561661478.png"/>
           <p:cNvPicPr>
             <a:picLocks noChangeAspect="1"/>
           </p:cNvPicPr>
           <p:nvPr/>
         </p:nvPicPr>
         <p:blipFill rotWithShape="1">
-          <a:blip r:embed="rId2" cstate="hqprint">
+          <a:blip r:embed="rId7" cstate="print">
+            <a:extLst>
+              <a:ext uri="{28A0092B-C50C-407E-A947-70E740481C1C}">
+                <a14:useLocalDpi xmlns:a14="http://schemas.microsoft.com/office/drawing/2010/main" val="0"/>
+              </a:ext>
+            </a:extLst>
+          </a:blip>
+          <a:stretch>
+            <a:fillRect/>
+          </a:stretch>
+        </p:blipFill>
+        <p:spPr>
+          <a:xfrm rot="0">
+            <a:off x="1215390" y="1343025"/>
+            <a:ext cx="2019300" cy="1410970"/>
+          </a:xfrm>
+          <a:prstGeom prst="roundRect"/>
+          <a:solidFill>
+            <a:srgbClr val="EDEDED"/>
+          </a:solidFill>
+        </p:spPr>
+      </p:pic>
+      <p:pic>
+        <p:nvPicPr>
+          <p:cNvPr id="1092" name="그림 22" descr="C:/Users/Admin1/AppData/Roaming/PolarisOffice/ETemp/15256_19321368/fImage117931679358.png"/>
+          <p:cNvPicPr>
+            <a:picLocks noChangeAspect="1"/>
+          </p:cNvPicPr>
+          <p:nvPr/>
+        </p:nvPicPr>
+        <p:blipFill rotWithShape="1">
+          <a:blip r:embed="rId8" cstate="print">
+            <a:extLst>
+              <a:ext uri="{28A0092B-C50C-407E-A947-70E740481C1C}">
+                <a14:useLocalDpi xmlns:a14="http://schemas.microsoft.com/office/drawing/2010/main" val="0"/>
+              </a:ext>
+            </a:extLst>
+          </a:blip>
+          <a:stretch>
+            <a:fillRect/>
+          </a:stretch>
+        </p:blipFill>
+        <p:spPr>
+          <a:xfrm rot="0">
+            <a:off x="3333750" y="1347470"/>
+            <a:ext cx="2053590" cy="1396365"/>
+          </a:xfrm>
+          <a:prstGeom prst="roundRect"/>
+          <a:solidFill>
+            <a:srgbClr val="EDEDED"/>
+          </a:solidFill>
+        </p:spPr>
+      </p:pic>
+      <p:pic>
+        <p:nvPicPr>
+          <p:cNvPr id="1093" name="그림 27" descr="C:/Users/Admin1/AppData/Roaming/PolarisOffice/ETemp/15256_19321368/fImage115291686962.png"/>
+          <p:cNvPicPr>
+            <a:picLocks noChangeAspect="1"/>
+          </p:cNvPicPr>
+          <p:nvPr/>
+        </p:nvPicPr>
+        <p:blipFill rotWithShape="1">
+          <a:blip r:embed="rId9" cstate="print">
+            <a:extLst>
+              <a:ext uri="{28A0092B-C50C-407E-A947-70E740481C1C}">
+                <a14:useLocalDpi xmlns:a14="http://schemas.microsoft.com/office/drawing/2010/main" val="0"/>
+              </a:ext>
+            </a:extLst>
+          </a:blip>
+          <a:stretch>
+            <a:fillRect/>
+          </a:stretch>
+        </p:blipFill>
+        <p:spPr>
+          <a:xfrm rot="0">
+            <a:off x="1219200" y="2926080"/>
+            <a:ext cx="2015490" cy="1405255"/>
+          </a:xfrm>
+          <a:prstGeom prst="roundRect"/>
+          <a:solidFill>
+            <a:srgbClr val="EDEDED"/>
+          </a:solidFill>
+        </p:spPr>
+      </p:pic>
+      <p:pic>
+        <p:nvPicPr>
+          <p:cNvPr id="1094" name="그림 30" descr="C:/Users/Admin1/AppData/Roaming/PolarisOffice/ETemp/15256_19321368/fImage114661694464.png"/>
+          <p:cNvPicPr>
+            <a:picLocks noChangeAspect="1"/>
+          </p:cNvPicPr>
+          <p:nvPr/>
+        </p:nvPicPr>
+        <p:blipFill rotWithShape="1">
+          <a:blip r:embed="rId10" cstate="print">
+            <a:extLst>
+              <a:ext uri="{28A0092B-C50C-407E-A947-70E740481C1C}">
+                <a14:useLocalDpi xmlns:a14="http://schemas.microsoft.com/office/drawing/2010/main" val="0"/>
+              </a:ext>
+            </a:extLst>
+          </a:blip>
+          <a:stretch>
+            <a:fillRect/>
+          </a:stretch>
+        </p:blipFill>
+        <p:spPr>
+          <a:xfrm rot="0">
+            <a:off x="3335020" y="2931795"/>
+            <a:ext cx="2044065" cy="1410335"/>
+          </a:xfrm>
+          <a:prstGeom prst="roundRect"/>
+          <a:solidFill>
+            <a:srgbClr val="EDEDED"/>
+          </a:solidFill>
+        </p:spPr>
+      </p:pic>
+      <p:pic>
+        <p:nvPicPr>
+          <p:cNvPr id="1095" name="그림 33" descr="C:/Users/Admin1/AppData/Roaming/PolarisOffice/ETemp/15256_19321368/fImage191281705705.png"/>
+          <p:cNvPicPr>
+            <a:picLocks noChangeAspect="1"/>
+          </p:cNvPicPr>
+          <p:nvPr/>
+        </p:nvPicPr>
+        <p:blipFill rotWithShape="1">
+          <a:blip r:embed="rId11" cstate="print">
+            <a:extLst>
+              <a:ext uri="{28A0092B-C50C-407E-A947-70E740481C1C}">
+                <a14:useLocalDpi xmlns:a14="http://schemas.microsoft.com/office/drawing/2010/main" val="0"/>
+              </a:ext>
+            </a:extLst>
+          </a:blip>
+          <a:stretch>
+            <a:fillRect/>
+          </a:stretch>
+        </p:blipFill>
+        <p:spPr>
+          <a:xfrm rot="0">
+            <a:off x="6791960" y="1346835"/>
+            <a:ext cx="4165600" cy="2004060"/>
+          </a:xfrm>
+          <a:prstGeom prst="roundRect"/>
+          <a:solidFill>
+            <a:srgbClr val="EDEDED"/>
+          </a:solidFill>
+        </p:spPr>
+      </p:pic>
+      <p:pic>
+        <p:nvPicPr>
+          <p:cNvPr id="1096" name="그림 36" descr="C:/Users/Admin1/AppData/Roaming/PolarisOffice/ETemp/15256_19321368/fImage53011946962.png"/>
+          <p:cNvPicPr>
+            <a:picLocks noChangeAspect="1"/>
+          </p:cNvPicPr>
+          <p:nvPr/>
+        </p:nvPicPr>
+        <p:blipFill rotWithShape="1">
+          <a:blip r:embed="rId12" cstate="hqprint">
             <a:extLst>
               <a:ext uri="{28A0092B-C50C-407E-A947-70E740481C1C}">
                 <a14:useLocalDpi xmlns:a14="http://schemas.microsoft.com/office/drawing/2010/main"/>
@@ -7742,8 +8202,8 @@
         </p:blipFill>
         <p:spPr>
           <a:xfrm rot="0">
-            <a:off x="2435860" y="1339850"/>
-            <a:ext cx="2919095" cy="946785"/>
+            <a:off x="6800215" y="3586480"/>
+            <a:ext cx="4148455" cy="1560195"/>
           </a:xfrm>
           <a:prstGeom prst="roundRect"/>
           <a:solidFill>
@@ -7753,20 +8213,19 @@
       </p:pic>
       <p:cxnSp>
         <p:nvCxnSpPr>
-          <p:cNvPr id="1085" name="도형 41"/>
-          <p:cNvCxnSpPr>
-            <a:stCxn id="1086" idx="3"/>
-          </p:cNvCxnSpPr>
+          <p:cNvPr id="1097" name="도형 37"/>
+          <p:cNvCxnSpPr/>
           <p:nvPr/>
         </p:nvCxnSpPr>
         <p:spPr>
-          <a:xfrm rot="0">
-            <a:off x="2136140" y="1791970"/>
-            <a:ext cx="442595" cy="5080"/>
+          <a:xfrm rot="0" flipV="1">
+            <a:off x="7955915" y="1887220"/>
+            <a:ext cx="2860040" cy="2103755"/>
           </a:xfrm>
           <a:prstGeom prst="straightConnector1"/>
           <a:ln w="6350" cap="flat" cmpd="sng">
             <a:prstDash/>
+            <a:headEnd type="none" w="med" len="med"/>
             <a:tailEnd type="triangle" w="med" len="med"/>
           </a:ln>
         </p:spPr>
@@ -7785,168 +8244,6 @@
           </a:fontRef>
         </p:style>
       </p:cxnSp>
-      <p:pic>
-        <p:nvPicPr>
-          <p:cNvPr id="1086" name="그림 42"/>
-          <p:cNvPicPr>
-            <a:picLocks noChangeAspect="1"/>
-          </p:cNvPicPr>
-          <p:nvPr/>
-        </p:nvPicPr>
-        <p:blipFill rotWithShape="1">
-          <a:blip r:embed="rId3" cstate="print">
-            <a:extLst>
-              <a:ext uri="{28A0092B-C50C-407E-A947-70E740481C1C}">
-                <a14:useLocalDpi xmlns:a14="http://schemas.microsoft.com/office/drawing/2010/main" val="0"/>
-              </a:ext>
-            </a:extLst>
-          </a:blip>
-          <a:stretch>
-            <a:fillRect/>
-          </a:stretch>
-        </p:blipFill>
-        <p:spPr>
-          <a:xfrm rot="0">
-            <a:off x="1459865" y="1398270"/>
-            <a:ext cx="676910" cy="788670"/>
-          </a:xfrm>
-          <a:prstGeom prst="roundRect"/>
-          <a:solidFill>
-            <a:srgbClr val="EDEDED"/>
-          </a:solidFill>
-        </p:spPr>
-      </p:pic>
-      <p:pic>
-        <p:nvPicPr>
-          <p:cNvPr id="1087" name="그림 45"/>
-          <p:cNvPicPr>
-            <a:picLocks noChangeAspect="1"/>
-          </p:cNvPicPr>
-          <p:nvPr/>
-        </p:nvPicPr>
-        <p:blipFill rotWithShape="1">
-          <a:blip r:embed="rId4" cstate="print">
-            <a:extLst>
-              <a:ext uri="{28A0092B-C50C-407E-A947-70E740481C1C}">
-                <a14:useLocalDpi xmlns:a14="http://schemas.microsoft.com/office/drawing/2010/main" val="0"/>
-              </a:ext>
-            </a:extLst>
-          </a:blip>
-          <a:stretch>
-            <a:fillRect/>
-          </a:stretch>
-        </p:blipFill>
-        <p:spPr>
-          <a:xfrm rot="0">
-            <a:off x="1395730" y="4047490"/>
-            <a:ext cx="3958590" cy="1207135"/>
-          </a:xfrm>
-          <a:prstGeom prst="roundRect"/>
-          <a:solidFill>
-            <a:srgbClr val="EDEDED"/>
-          </a:solidFill>
-        </p:spPr>
-      </p:pic>
-      <p:sp>
-        <p:nvSpPr>
-          <p:cNvPr id="1088" name="텍스트 상자 49"/>
-          <p:cNvSpPr txBox="1">
-            <a:spLocks/>
-          </p:cNvSpPr>
-          <p:nvPr/>
-        </p:nvSpPr>
-        <p:spPr>
-          <a:xfrm rot="0">
-            <a:off x="1400810" y="5433695"/>
-            <a:ext cx="3958590" cy="677545"/>
-          </a:xfrm>
-          <a:prstGeom prst="rect"/>
-          <a:noFill/>
-          <a:ln w="0">
-            <a:noFill/>
-            <a:prstDash/>
-          </a:ln>
-        </p:spPr>
-        <p:txBody>
-          <a:bodyPr wrap="square" lIns="89535" tIns="46355" rIns="89535" bIns="46355" numCol="1" vert="horz" anchor="t">
-            <a:spAutoFit/>
-          </a:bodyPr>
-          <a:lstStyle/>
-          <a:p>
-            <a:pPr marL="0" indent="0" algn="l" latinLnBrk="0" hangingPunct="1">
-              <a:buFontTx/>
-              <a:buNone/>
-            </a:pPr>
-            <a:r>
-              <a:rPr lang="ko-KR" sz="2000" b="1">
-                <a:solidFill>
-                  <a:srgbClr val="0611F2"/>
-                </a:solidFill>
-                <a:latin typeface="맑은 고딕" charset="0"/>
-                <a:ea typeface="맑은 고딕" charset="0"/>
-              </a:rPr>
-              <a:t>20.</a:t>
-            </a:r>
-            <a:r>
-              <a:rPr sz="2000" b="1">
-                <a:solidFill>
-                  <a:srgbClr val="0611F2"/>
-                </a:solidFill>
-                <a:latin typeface="맑은 고딕" charset="0"/>
-                <a:ea typeface="맑은 고딕" charset="0"/>
-              </a:rPr>
-              <a:t> </a:t>
-            </a:r>
-            <a:r>
-              <a:rPr lang="ko-KR" sz="1800">
-                <a:latin typeface="맑은 고딕" charset="0"/>
-                <a:ea typeface="맑은 고딕" charset="0"/>
-              </a:rPr>
-              <a:t>그</a:t>
-            </a:r>
-            <a:r>
-              <a:rPr lang="ko-KR" sz="1800">
-                <a:latin typeface="맑은 고딕" charset="0"/>
-                <a:ea typeface="맑은 고딕" charset="0"/>
-              </a:rPr>
-              <a:t>다음으로 Stone_3 오브젝트에 Rigidbody컴포넌트도 추가합니다.</a:t>
-            </a:r>
-            <a:endParaRPr lang="ko-KR" altLang="en-US" sz="1800">
-              <a:latin typeface="맑은 고딕" charset="0"/>
-              <a:ea typeface="맑은 고딕" charset="0"/>
-            </a:endParaRPr>
-          </a:p>
-        </p:txBody>
-      </p:sp>
-      <p:pic>
-        <p:nvPicPr>
-          <p:cNvPr id="1089" name="그림 52"/>
-          <p:cNvPicPr>
-            <a:picLocks noChangeAspect="1"/>
-          </p:cNvPicPr>
-          <p:nvPr/>
-        </p:nvPicPr>
-        <p:blipFill rotWithShape="1">
-          <a:blip r:embed="rId5" cstate="print">
-            <a:extLst>
-              <a:ext uri="{28A0092B-C50C-407E-A947-70E740481C1C}">
-                <a14:useLocalDpi xmlns:a14="http://schemas.microsoft.com/office/drawing/2010/main" val="0"/>
-              </a:ext>
-            </a:extLst>
-          </a:blip>
-          <a:stretch>
-            <a:fillRect/>
-          </a:stretch>
-        </p:blipFill>
-        <p:spPr>
-          <a:xfrm rot="0">
-            <a:off x="6797040" y="1343025"/>
-            <a:ext cx="4222115" cy="2271395"/>
-          </a:xfrm>
-          <a:prstGeom prst="rect"/>
-          <a:noFill/>
-        </p:spPr>
-      </p:pic>
     </p:spTree>
   </p:cSld>
   <p:clrMapOvr>
@@ -7971,6 +8268,936 @@
 </file>
 
 <file path=ppt/slides/slide11.xml><?xml version="1.0" encoding="utf-8"?>
+<p:sld xmlns:a="http://schemas.openxmlformats.org/drawingml/2006/main" xmlns:r="http://schemas.openxmlformats.org/officeDocument/2006/relationships" xmlns:p="http://schemas.openxmlformats.org/presentationml/2006/main">
+  <p:cSld>
+    <p:spTree>
+      <p:nvGrpSpPr>
+        <p:cNvPr id="1" name=""/>
+        <p:cNvGrpSpPr/>
+        <p:nvPr/>
+      </p:nvGrpSpPr>
+      <p:grpSpPr>
+        <a:xfrm>
+          <a:off x="0" y="0"/>
+          <a:ext cx="0" cy="0"/>
+          <a:chOff x="0" y="0"/>
+          <a:chExt cx="0" cy="0"/>
+        </a:xfrm>
+      </p:grpSpPr>
+      <p:sp>
+        <p:nvSpPr>
+          <p:cNvPr id="1031" name="Rect 0"/>
+          <p:cNvSpPr txBox="1">
+            <a:spLocks/>
+          </p:cNvSpPr>
+          <p:nvPr/>
+        </p:nvSpPr>
+        <p:spPr>
+          <a:xfrm rot="0">
+            <a:off x="4353560" y="393065"/>
+            <a:ext cx="3500120" cy="554990"/>
+          </a:xfrm>
+          <a:prstGeom prst="rect"/>
+          <a:noFill/>
+          <a:ln w="0">
+            <a:noFill/>
+            <a:prstDash/>
+          </a:ln>
+        </p:spPr>
+        <p:txBody>
+          <a:bodyPr wrap="square" lIns="89535" tIns="46355" rIns="89535" bIns="46355" numCol="1" vert="horz" anchor="t">
+            <a:spAutoFit/>
+          </a:bodyPr>
+          <a:lstStyle/>
+          <a:p>
+            <a:pPr marL="0" indent="0" algn="l" latinLnBrk="0">
+              <a:buFontTx/>
+              <a:buNone/>
+            </a:pPr>
+            <a:r>
+              <a:rPr lang="ko-KR" altLang="en-US" sz="3000" b="1">
+                <a:solidFill>
+                  <a:schemeClr val="tx1"/>
+                </a:solidFill>
+                <a:latin typeface="맑은 고딕" charset="0"/>
+                <a:ea typeface="맑은 고딕" charset="0"/>
+              </a:rPr>
+              <a:t>아홉</a:t>
+            </a:r>
+            <a:r>
+              <a:rPr lang="ko-KR" altLang="en-US" sz="3000" b="1">
+                <a:solidFill>
+                  <a:schemeClr val="tx1"/>
+                </a:solidFill>
+                <a:latin typeface="맑은 고딕" charset="0"/>
+                <a:ea typeface="맑은 고딕" charset="0"/>
+              </a:rPr>
+              <a:t> 번째 튜토리얼</a:t>
+            </a:r>
+            <a:endParaRPr lang="ko-KR" altLang="en-US" sz="3000" b="1">
+              <a:solidFill>
+                <a:schemeClr val="tx1"/>
+              </a:solidFill>
+              <a:latin typeface="맑은 고딕" charset="0"/>
+              <a:ea typeface="맑은 고딕" charset="0"/>
+            </a:endParaRPr>
+          </a:p>
+        </p:txBody>
+      </p:sp>
+      <p:sp>
+        <p:nvSpPr>
+          <p:cNvPr id="1070" name="Rect 0"/>
+          <p:cNvSpPr txBox="1">
+            <a:spLocks/>
+          </p:cNvSpPr>
+          <p:nvPr/>
+        </p:nvSpPr>
+        <p:spPr>
+          <a:xfrm rot="0">
+            <a:off x="1222375" y="5276850"/>
+            <a:ext cx="4164330" cy="954405"/>
+          </a:xfrm>
+          <a:prstGeom prst="rect"/>
+          <a:noFill/>
+          <a:ln w="0">
+            <a:noFill/>
+            <a:prstDash/>
+          </a:ln>
+        </p:spPr>
+        <p:txBody>
+          <a:bodyPr wrap="square" lIns="89535" tIns="46355" rIns="89535" bIns="46355" numCol="1" vert="horz" anchor="t">
+            <a:spAutoFit/>
+          </a:bodyPr>
+          <a:lstStyle/>
+          <a:p>
+            <a:pPr marL="0" indent="0" algn="l" latinLnBrk="0" hangingPunct="1">
+              <a:buFontTx/>
+              <a:buNone/>
+            </a:pPr>
+            <a:r>
+              <a:rPr lang="ko-KR" sz="2000" b="1">
+                <a:solidFill>
+                  <a:srgbClr val="0611F2"/>
+                </a:solidFill>
+                <a:latin typeface="맑은 고딕" charset="0"/>
+                <a:ea typeface="맑은 고딕" charset="0"/>
+              </a:rPr>
+              <a:t>20</a:t>
+            </a:r>
+            <a:r>
+              <a:rPr sz="2000" b="1">
+                <a:solidFill>
+                  <a:srgbClr val="0611F2"/>
+                </a:solidFill>
+                <a:latin typeface="맑은 고딕" charset="0"/>
+                <a:ea typeface="맑은 고딕" charset="0"/>
+              </a:rPr>
+              <a:t>. </a:t>
+            </a:r>
+            <a:r>
+              <a:rPr lang="ko-KR" sz="1800">
+                <a:latin typeface="맑은 고딕" charset="0"/>
+                <a:ea typeface="맑은 고딕" charset="0"/>
+              </a:rPr>
+              <a:t>마지막으로</a:t>
+            </a:r>
+            <a:r>
+              <a:rPr lang="ko-KR" sz="1800">
+                <a:latin typeface="맑은 고딕" charset="0"/>
+                <a:ea typeface="맑은 고딕" charset="0"/>
+              </a:rPr>
+              <a:t> </a:t>
+            </a:r>
+            <a:r>
+              <a:rPr lang="ko-KR" sz="1800">
+                <a:latin typeface="맑은 고딕" charset="0"/>
+                <a:ea typeface="맑은 고딕" charset="0"/>
+              </a:rPr>
+              <a:t>Prefab 폴더에 있는 Orc 오브젝트를 선택하고 Delete 스크립트라는 컴포넌트를 추가합니다.</a:t>
+            </a:r>
+            <a:endParaRPr lang="ko-KR" altLang="en-US" sz="1800">
+              <a:latin typeface="맑은 고딕" charset="0"/>
+              <a:ea typeface="맑은 고딕" charset="0"/>
+            </a:endParaRPr>
+          </a:p>
+        </p:txBody>
+      </p:sp>
+      <p:sp>
+        <p:nvSpPr>
+          <p:cNvPr id="1090" name="Rect 0"/>
+          <p:cNvSpPr txBox="1">
+            <a:spLocks/>
+          </p:cNvSpPr>
+          <p:nvPr/>
+        </p:nvSpPr>
+        <p:spPr>
+          <a:xfrm rot="0">
+            <a:off x="1222375" y="3195320"/>
+            <a:ext cx="4173220" cy="647065"/>
+          </a:xfrm>
+          <a:prstGeom prst="rect"/>
+          <a:noFill/>
+          <a:ln w="0">
+            <a:noFill/>
+            <a:prstDash/>
+          </a:ln>
+        </p:spPr>
+        <p:txBody>
+          <a:bodyPr wrap="square" lIns="89535" tIns="46355" rIns="89535" bIns="46355" vert="horz" anchor="t">
+            <a:spAutoFit/>
+          </a:bodyPr>
+          <a:lstStyle/>
+          <a:p>
+            <a:pPr marL="0" indent="0" rtl="0" algn="l" defTabSz="914400" eaLnBrk="1" latinLnBrk="0" hangingPunct="1">
+              <a:buFontTx/>
+              <a:buNone/>
+            </a:pPr>
+            <a:r>
+              <a:rPr sz="1800" b="1">
+                <a:solidFill>
+                  <a:srgbClr val="0611F2"/>
+                </a:solidFill>
+                <a:latin typeface="맑은 고딕" charset="0"/>
+                <a:ea typeface="맑은 고딕" charset="0"/>
+              </a:rPr>
+              <a:t>1</a:t>
+            </a:r>
+            <a:r>
+              <a:rPr lang="ko-KR" sz="1800" b="1">
+                <a:solidFill>
+                  <a:srgbClr val="0611F2"/>
+                </a:solidFill>
+                <a:latin typeface="맑은 고딕" charset="0"/>
+                <a:ea typeface="맑은 고딕" charset="0"/>
+              </a:rPr>
+              <a:t>9</a:t>
+            </a:r>
+            <a:r>
+              <a:rPr sz="1800" b="1">
+                <a:solidFill>
+                  <a:srgbClr val="0611F2"/>
+                </a:solidFill>
+                <a:latin typeface="맑은 고딕" charset="0"/>
+                <a:ea typeface="맑은 고딕" charset="0"/>
+              </a:rPr>
+              <a:t>.</a:t>
+            </a:r>
+            <a:r>
+              <a:rPr sz="1800">
+                <a:latin typeface="맑은 고딕" charset="0"/>
+                <a:ea typeface="맑은 고딕" charset="0"/>
+              </a:rPr>
+              <a:t> </a:t>
+            </a:r>
+            <a:r>
+              <a:rPr sz="1800">
+                <a:latin typeface="맑은 고딕" charset="0"/>
+                <a:ea typeface="맑은 고딕" charset="0"/>
+              </a:rPr>
+              <a:t>그다음으</a:t>
+            </a:r>
+            <a:r>
+              <a:rPr lang="ko-KR" sz="1800">
+                <a:latin typeface="맑은 고딕" charset="0"/>
+                <a:ea typeface="맑은 고딕" charset="0"/>
+              </a:rPr>
+              <a:t>로 C# Script를 생성하고 Delete라는 이름으로 정의합니다.</a:t>
+            </a:r>
+            <a:endParaRPr lang="ko-KR" altLang="en-US" sz="1800">
+              <a:latin typeface="맑은 고딕" charset="0"/>
+              <a:ea typeface="맑은 고딕" charset="0"/>
+            </a:endParaRPr>
+          </a:p>
+        </p:txBody>
+      </p:sp>
+      <p:pic>
+        <p:nvPicPr>
+          <p:cNvPr id="1096" name="Picture " descr="C:/Users/Admin1/AppData/Roaming/PolarisOffice/ETemp/15256_19321368/fImage53011946962.png"/>
+          <p:cNvPicPr>
+            <a:picLocks noChangeAspect="1"/>
+          </p:cNvPicPr>
+          <p:nvPr/>
+        </p:nvPicPr>
+        <p:blipFill rotWithShape="1">
+          <a:blip r:embed="rId2" cstate="hqprint">
+            <a:extLst>
+              <a:ext uri="{28A0092B-C50C-407E-A947-70E740481C1C}">
+                <a14:useLocalDpi xmlns:a14="http://schemas.microsoft.com/office/drawing/2010/main"/>
+              </a:ext>
+            </a:extLst>
+          </a:blip>
+          <a:stretch>
+            <a:fillRect/>
+          </a:stretch>
+        </p:blipFill>
+        <p:spPr>
+          <a:xfrm rot="0">
+            <a:off x="2976245" y="3988435"/>
+            <a:ext cx="2428240" cy="1194435"/>
+          </a:xfrm>
+          <a:prstGeom prst="roundRect"/>
+          <a:solidFill>
+            <a:srgbClr val="EDEDED"/>
+          </a:solidFill>
+        </p:spPr>
+      </p:pic>
+      <p:pic>
+        <p:nvPicPr>
+          <p:cNvPr id="1098" name="그림 38" descr="C:/Users/Admin1/AppData/Roaming/PolarisOffice/ETemp/15256_19321368/fImage52902588145.png"/>
+          <p:cNvPicPr>
+            <a:picLocks noChangeAspect="1"/>
+          </p:cNvPicPr>
+          <p:nvPr/>
+        </p:nvPicPr>
+        <p:blipFill rotWithShape="1">
+          <a:blip r:embed="rId3" cstate="print">
+            <a:extLst>
+              <a:ext uri="{28A0092B-C50C-407E-A947-70E740481C1C}">
+                <a14:useLocalDpi xmlns:a14="http://schemas.microsoft.com/office/drawing/2010/main" val="0"/>
+              </a:ext>
+            </a:extLst>
+          </a:blip>
+          <a:stretch>
+            <a:fillRect/>
+          </a:stretch>
+        </p:blipFill>
+        <p:spPr>
+          <a:xfrm rot="0">
+            <a:off x="1219200" y="3977640"/>
+            <a:ext cx="1649730" cy="1213485"/>
+          </a:xfrm>
+          <a:prstGeom prst="roundRect"/>
+          <a:solidFill>
+            <a:srgbClr val="EDEDED"/>
+          </a:solidFill>
+        </p:spPr>
+      </p:pic>
+      <p:pic>
+        <p:nvPicPr>
+          <p:cNvPr id="1099" name="그림 41" descr="C:/Users/Admin1/AppData/Roaming/PolarisOffice/ETemp/15256_19321368/fImage18932593281.png"/>
+          <p:cNvPicPr>
+            <a:picLocks noChangeAspect="1"/>
+          </p:cNvPicPr>
+          <p:nvPr/>
+        </p:nvPicPr>
+        <p:blipFill rotWithShape="1">
+          <a:blip r:embed="rId4" cstate="print">
+            <a:extLst>
+              <a:ext uri="{28A0092B-C50C-407E-A947-70E740481C1C}">
+                <a14:useLocalDpi xmlns:a14="http://schemas.microsoft.com/office/drawing/2010/main" val="0"/>
+              </a:ext>
+            </a:extLst>
+          </a:blip>
+          <a:stretch>
+            <a:fillRect/>
+          </a:stretch>
+        </p:blipFill>
+        <p:spPr>
+          <a:xfrm rot="0">
+            <a:off x="4355465" y="1746250"/>
+            <a:ext cx="849630" cy="939165"/>
+          </a:xfrm>
+          <a:prstGeom prst="roundRect"/>
+          <a:solidFill>
+            <a:srgbClr val="EDEDED"/>
+          </a:solidFill>
+        </p:spPr>
+      </p:pic>
+      <p:pic>
+        <p:nvPicPr>
+          <p:cNvPr id="1100" name="그림 44" descr="C:/Users/Admin1/AppData/Roaming/PolarisOffice/ETemp/15256_19321368/fImage82892606827.png"/>
+          <p:cNvPicPr>
+            <a:picLocks noChangeAspect="1"/>
+          </p:cNvPicPr>
+          <p:nvPr/>
+        </p:nvPicPr>
+        <p:blipFill rotWithShape="1">
+          <a:blip r:embed="rId5" cstate="print">
+            <a:extLst>
+              <a:ext uri="{28A0092B-C50C-407E-A947-70E740481C1C}">
+                <a14:useLocalDpi xmlns:a14="http://schemas.microsoft.com/office/drawing/2010/main" val="0"/>
+              </a:ext>
+            </a:extLst>
+          </a:blip>
+          <a:stretch>
+            <a:fillRect/>
+          </a:stretch>
+        </p:blipFill>
+        <p:spPr>
+          <a:xfrm rot="0">
+            <a:off x="1221740" y="1337945"/>
+            <a:ext cx="1783715" cy="1762760"/>
+          </a:xfrm>
+          <a:prstGeom prst="roundRect"/>
+          <a:solidFill>
+            <a:srgbClr val="EDEDED"/>
+          </a:solidFill>
+        </p:spPr>
+      </p:pic>
+      <p:pic>
+        <p:nvPicPr>
+          <p:cNvPr id="1101" name="그림 51" descr="C:/Users/Admin1/AppData/Roaming/PolarisOffice/ETemp/15256_19321368/fImage2242171995705.png"/>
+          <p:cNvPicPr>
+            <a:picLocks noChangeAspect="1"/>
+          </p:cNvPicPr>
+          <p:nvPr/>
+        </p:nvPicPr>
+        <p:blipFill rotWithShape="1">
+          <a:blip r:embed="rId6" cstate="hqprint">
+            <a:extLst>
+              <a:ext uri="{28A0092B-C50C-407E-A947-70E740481C1C}">
+                <a14:useLocalDpi xmlns:a14="http://schemas.microsoft.com/office/drawing/2010/main"/>
+              </a:ext>
+            </a:extLst>
+          </a:blip>
+          <a:stretch>
+            <a:fillRect/>
+          </a:stretch>
+        </p:blipFill>
+        <p:spPr>
+          <a:xfrm rot="0">
+            <a:off x="3152140" y="2019300"/>
+            <a:ext cx="1022350" cy="426720"/>
+          </a:xfrm>
+          <a:prstGeom prst="rect"/>
+          <a:noFill/>
+        </p:spPr>
+      </p:pic>
+      <p:pic>
+        <p:nvPicPr>
+          <p:cNvPr id="1102" name="그림 54" descr="C:/Users/Admin1/AppData/Roaming/PolarisOffice/ETemp/15256_19321368/fImage258202649961.png"/>
+          <p:cNvPicPr>
+            <a:picLocks noChangeAspect="1"/>
+          </p:cNvPicPr>
+          <p:nvPr/>
+        </p:nvPicPr>
+        <p:blipFill rotWithShape="1">
+          <a:blip r:embed="rId7" cstate="print">
+            <a:extLst>
+              <a:ext uri="{28A0092B-C50C-407E-A947-70E740481C1C}">
+                <a14:useLocalDpi xmlns:a14="http://schemas.microsoft.com/office/drawing/2010/main" val="0"/>
+              </a:ext>
+            </a:extLst>
+          </a:blip>
+          <a:stretch>
+            <a:fillRect/>
+          </a:stretch>
+        </p:blipFill>
+        <p:spPr>
+          <a:xfrm rot="0">
+            <a:off x="6814820" y="1345565"/>
+            <a:ext cx="4139565" cy="2447925"/>
+          </a:xfrm>
+          <a:prstGeom prst="roundRect"/>
+          <a:solidFill>
+            <a:srgbClr val="EDEDED"/>
+          </a:solidFill>
+        </p:spPr>
+      </p:pic>
+      <p:sp>
+        <p:nvSpPr>
+          <p:cNvPr id="1103" name="텍스트 상자 57"/>
+          <p:cNvSpPr txBox="1">
+            <a:spLocks/>
+          </p:cNvSpPr>
+          <p:nvPr/>
+        </p:nvSpPr>
+        <p:spPr>
+          <a:xfrm rot="0">
+            <a:off x="6827520" y="3893820"/>
+            <a:ext cx="4135755" cy="2338705"/>
+          </a:xfrm>
+          <a:prstGeom prst="rect"/>
+          <a:noFill/>
+          <a:ln w="0">
+            <a:noFill/>
+            <a:prstDash/>
+          </a:ln>
+        </p:spPr>
+        <p:txBody>
+          <a:bodyPr wrap="square" lIns="89535" tIns="46355" rIns="89535" bIns="46355" numCol="1" vert="horz" anchor="t">
+            <a:spAutoFit/>
+          </a:bodyPr>
+          <a:lstStyle/>
+          <a:p>
+            <a:pPr marL="0" indent="0" algn="l" latinLnBrk="0" hangingPunct="1">
+              <a:buFontTx/>
+              <a:buNone/>
+            </a:pPr>
+            <a:r>
+              <a:rPr lang="ko-KR" sz="2000" b="1">
+                <a:solidFill>
+                  <a:srgbClr val="0611F2"/>
+                </a:solidFill>
+                <a:latin typeface="맑은 고딕" charset="0"/>
+                <a:ea typeface="맑은 고딕" charset="0"/>
+              </a:rPr>
+              <a:t>21</a:t>
+            </a:r>
+            <a:r>
+              <a:rPr sz="2000" b="1">
+                <a:solidFill>
+                  <a:srgbClr val="0611F2"/>
+                </a:solidFill>
+                <a:latin typeface="맑은 고딕" charset="0"/>
+                <a:ea typeface="맑은 고딕" charset="0"/>
+              </a:rPr>
+              <a:t>. </a:t>
+            </a:r>
+            <a:r>
+              <a:rPr lang="ko-KR" sz="1800">
+                <a:latin typeface="맑은 고딕" charset="0"/>
+                <a:ea typeface="맑은 고딕" charset="0"/>
+              </a:rPr>
+              <a:t>이제</a:t>
+            </a:r>
+            <a:r>
+              <a:rPr lang="ko-KR" sz="1800">
+                <a:latin typeface="맑은 고딕" charset="0"/>
+                <a:ea typeface="맑은 고딕" charset="0"/>
+              </a:rPr>
+              <a:t> </a:t>
+            </a:r>
+            <a:r>
+              <a:rPr lang="ko-KR" sz="1800">
+                <a:latin typeface="맑은 고딕" charset="0"/>
+                <a:ea typeface="맑은 고딕" charset="0"/>
+              </a:rPr>
+              <a:t>Delete 스크립트를 선택한 다음 Start( ) 함수 안에 게임 오브젝트를 파괴하는 함수를 선언합니다.</a:t>
+            </a:r>
+            <a:endParaRPr lang="ko-KR" altLang="en-US" sz="1800">
+              <a:latin typeface="맑은 고딕" charset="0"/>
+              <a:ea typeface="맑은 고딕" charset="0"/>
+            </a:endParaRPr>
+          </a:p>
+          <a:p>
+            <a:pPr marL="0" indent="0" algn="l" latinLnBrk="0" hangingPunct="1">
+              <a:buFontTx/>
+              <a:buNone/>
+            </a:pPr>
+            <a:endParaRPr lang="ko-KR" altLang="en-US" sz="1800">
+              <a:latin typeface="맑은 고딕" charset="0"/>
+              <a:ea typeface="맑은 고딕" charset="0"/>
+            </a:endParaRPr>
+          </a:p>
+          <a:p>
+            <a:pPr marL="0" indent="0" algn="l" latinLnBrk="0" hangingPunct="1">
+              <a:buFontTx/>
+              <a:buNone/>
+            </a:pPr>
+            <a:r>
+              <a:rPr lang="ko-KR" sz="1800">
+                <a:latin typeface="맑은 고딕" charset="0"/>
+                <a:ea typeface="맑은 고딕" charset="0"/>
+              </a:rPr>
+              <a:t>그리고 Random.Range( )를 사용하여 게임 오브젝트가 1 ~ 5초 사이의 특정 시간에 파괴될 수 있도록 설정합니다.</a:t>
+            </a:r>
+            <a:endParaRPr lang="ko-KR" altLang="en-US" sz="1800">
+              <a:latin typeface="맑은 고딕" charset="0"/>
+              <a:ea typeface="맑은 고딕" charset="0"/>
+            </a:endParaRPr>
+          </a:p>
+        </p:txBody>
+      </p:sp>
+    </p:spTree>
+  </p:cSld>
+  <p:clrMapOvr>
+    <a:masterClrMapping/>
+  </p:clrMapOvr>
+  <mc:AlternateContent xmlns:mc="http://schemas.openxmlformats.org/markup-compatibility/2006">
+    <mc:Choice xmlns:p14="http://schemas.microsoft.com/office/powerpoint/2010/main" Requires="p14">
+      <p:transition spd="slow" p14:dur="2000"/>
+    </mc:Choice>
+    <mc:Fallback>
+      <p:transition spd="slow"/>
+    </mc:Fallback>
+  </mc:AlternateContent>
+  <p:timing>
+    <p:tnLst>
+      <p:par>
+        <p:cTn id="1" dur="indefinite" restart="never" nodeType="tmRoot"/>
+      </p:par>
+    </p:tnLst>
+  </p:timing>
+</p:sld>
+</file>
+
+<file path=ppt/slides/slide12.xml><?xml version="1.0" encoding="utf-8"?>
+<p:sld xmlns:a="http://schemas.openxmlformats.org/drawingml/2006/main" xmlns:r="http://schemas.openxmlformats.org/officeDocument/2006/relationships" xmlns:p="http://schemas.openxmlformats.org/presentationml/2006/main">
+  <p:cSld>
+    <p:spTree>
+      <p:nvGrpSpPr>
+        <p:cNvPr id="1" name=""/>
+        <p:cNvGrpSpPr/>
+        <p:nvPr/>
+      </p:nvGrpSpPr>
+      <p:grpSpPr>
+        <a:xfrm>
+          <a:off x="0" y="0"/>
+          <a:ext cx="0" cy="0"/>
+          <a:chOff x="0" y="0"/>
+          <a:chExt cx="0" cy="0"/>
+        </a:xfrm>
+      </p:grpSpPr>
+      <p:sp>
+        <p:nvSpPr>
+          <p:cNvPr id="1031" name="Rect 0"/>
+          <p:cNvSpPr txBox="1">
+            <a:spLocks/>
+          </p:cNvSpPr>
+          <p:nvPr/>
+        </p:nvSpPr>
+        <p:spPr>
+          <a:xfrm rot="0">
+            <a:off x="4500880" y="384175"/>
+            <a:ext cx="3189605" cy="554990"/>
+          </a:xfrm>
+          <a:prstGeom prst="rect"/>
+          <a:noFill/>
+          <a:ln w="0">
+            <a:noFill/>
+            <a:prstDash/>
+          </a:ln>
+        </p:spPr>
+        <p:txBody>
+          <a:bodyPr wrap="square" lIns="89535" tIns="46355" rIns="89535" bIns="46355" numCol="1" vert="horz" anchor="t">
+            <a:spAutoFit/>
+          </a:bodyPr>
+          <a:lstStyle/>
+          <a:p>
+            <a:pPr marL="0" indent="0" algn="l" latinLnBrk="0">
+              <a:buFontTx/>
+              <a:buNone/>
+            </a:pPr>
+            <a:r>
+              <a:rPr lang="ko-KR" altLang="en-US" sz="3000" b="1">
+                <a:solidFill>
+                  <a:schemeClr val="tx1"/>
+                </a:solidFill>
+                <a:latin typeface="맑은 고딕" charset="0"/>
+                <a:ea typeface="맑은 고딕" charset="0"/>
+              </a:rPr>
+              <a:t>열</a:t>
+            </a:r>
+            <a:r>
+              <a:rPr lang="ko-KR" altLang="en-US" sz="3000" b="1">
+                <a:solidFill>
+                  <a:schemeClr val="tx1"/>
+                </a:solidFill>
+                <a:latin typeface="맑은 고딕" charset="0"/>
+                <a:ea typeface="맑은 고딕" charset="0"/>
+              </a:rPr>
+              <a:t> 번째 튜토리얼</a:t>
+            </a:r>
+            <a:endParaRPr lang="ko-KR" altLang="en-US" sz="3000" b="1">
+              <a:solidFill>
+                <a:schemeClr val="tx1"/>
+              </a:solidFill>
+              <a:latin typeface="맑은 고딕" charset="0"/>
+              <a:ea typeface="맑은 고딕" charset="0"/>
+            </a:endParaRPr>
+          </a:p>
+        </p:txBody>
+      </p:sp>
+      <p:sp>
+        <p:nvSpPr>
+          <p:cNvPr id="1070" name="Rect 0"/>
+          <p:cNvSpPr txBox="1">
+            <a:spLocks/>
+          </p:cNvSpPr>
+          <p:nvPr/>
+        </p:nvSpPr>
+        <p:spPr>
+          <a:xfrm rot="0">
+            <a:off x="1222375" y="5276850"/>
+            <a:ext cx="4164330" cy="954405"/>
+          </a:xfrm>
+          <a:prstGeom prst="rect"/>
+          <a:noFill/>
+          <a:ln w="0">
+            <a:noFill/>
+            <a:prstDash/>
+          </a:ln>
+        </p:spPr>
+        <p:txBody>
+          <a:bodyPr wrap="square" lIns="89535" tIns="46355" rIns="89535" bIns="46355" numCol="1" vert="horz" anchor="t">
+            <a:spAutoFit/>
+          </a:bodyPr>
+          <a:lstStyle/>
+          <a:p>
+            <a:pPr marL="0" indent="0" algn="l" latinLnBrk="0" hangingPunct="1">
+              <a:buFontTx/>
+              <a:buNone/>
+            </a:pPr>
+            <a:r>
+              <a:rPr lang="ko-KR" sz="2000" b="1">
+                <a:solidFill>
+                  <a:srgbClr val="0611F2"/>
+                </a:solidFill>
+                <a:latin typeface="맑은 고딕" charset="0"/>
+                <a:ea typeface="맑은 고딕" charset="0"/>
+              </a:rPr>
+              <a:t>23</a:t>
+            </a:r>
+            <a:r>
+              <a:rPr sz="2000" b="1">
+                <a:solidFill>
+                  <a:srgbClr val="0611F2"/>
+                </a:solidFill>
+                <a:latin typeface="맑은 고딕" charset="0"/>
+                <a:ea typeface="맑은 고딕" charset="0"/>
+              </a:rPr>
+              <a:t>. </a:t>
+            </a:r>
+            <a:r>
+              <a:rPr lang="ko-KR" sz="1800">
+                <a:latin typeface="맑은 고딕" charset="0"/>
+                <a:ea typeface="맑은 고딕" charset="0"/>
+              </a:rPr>
+              <a:t>그런 다음</a:t>
+            </a:r>
+            <a:r>
+              <a:rPr lang="ko-KR" sz="1800">
+                <a:latin typeface="맑은 고딕" charset="0"/>
+                <a:ea typeface="맑은 고딕" charset="0"/>
+              </a:rPr>
+              <a:t> </a:t>
+            </a:r>
+            <a:r>
+              <a:rPr lang="ko-KR" sz="1800">
+                <a:latin typeface="맑은 고딕" charset="0"/>
+                <a:ea typeface="맑은 고딕" charset="0"/>
+              </a:rPr>
+              <a:t>Projcet 폴더에 있는 Materials 폴더에 Tile Material을 Plane 게임 오브젝트에 넣어줍니다.</a:t>
+            </a:r>
+            <a:endParaRPr lang="ko-KR" altLang="en-US" sz="1800">
+              <a:latin typeface="맑은 고딕" charset="0"/>
+              <a:ea typeface="맑은 고딕" charset="0"/>
+            </a:endParaRPr>
+          </a:p>
+        </p:txBody>
+      </p:sp>
+      <p:sp>
+        <p:nvSpPr>
+          <p:cNvPr id="1090" name="Rect 0"/>
+          <p:cNvSpPr txBox="1">
+            <a:spLocks/>
+          </p:cNvSpPr>
+          <p:nvPr/>
+        </p:nvSpPr>
+        <p:spPr>
+          <a:xfrm rot="0">
+            <a:off x="1220470" y="3073400"/>
+            <a:ext cx="4166235" cy="647065"/>
+          </a:xfrm>
+          <a:prstGeom prst="rect"/>
+          <a:noFill/>
+          <a:ln w="0">
+            <a:noFill/>
+            <a:prstDash/>
+          </a:ln>
+        </p:spPr>
+        <p:txBody>
+          <a:bodyPr wrap="square" lIns="89535" tIns="46355" rIns="89535" bIns="46355" vert="horz" anchor="t">
+            <a:spAutoFit/>
+          </a:bodyPr>
+          <a:lstStyle/>
+          <a:p>
+            <a:pPr marL="0" indent="0" rtl="0" algn="l" defTabSz="914400" eaLnBrk="1" latinLnBrk="0" hangingPunct="1">
+              <a:buFontTx/>
+              <a:buNone/>
+            </a:pPr>
+            <a:r>
+              <a:rPr lang="ko-KR" sz="1800" b="1">
+                <a:solidFill>
+                  <a:srgbClr val="0611F2"/>
+                </a:solidFill>
+                <a:latin typeface="맑은 고딕" charset="0"/>
+                <a:ea typeface="맑은 고딕" charset="0"/>
+              </a:rPr>
+              <a:t>22</a:t>
+            </a:r>
+            <a:r>
+              <a:rPr sz="1800" b="1">
+                <a:solidFill>
+                  <a:srgbClr val="0611F2"/>
+                </a:solidFill>
+                <a:latin typeface="맑은 고딕" charset="0"/>
+                <a:ea typeface="맑은 고딕" charset="0"/>
+              </a:rPr>
+              <a:t>.</a:t>
+            </a:r>
+            <a:r>
+              <a:rPr sz="1800">
+                <a:latin typeface="맑은 고딕" charset="0"/>
+                <a:ea typeface="맑은 고딕" charset="0"/>
+              </a:rPr>
+              <a:t> </a:t>
+            </a:r>
+            <a:r>
+              <a:rPr lang="ko-KR" sz="1800">
+                <a:latin typeface="맑은 고딕" charset="0"/>
+                <a:ea typeface="맑은 고딕" charset="0"/>
+              </a:rPr>
+              <a:t>그다음 Main Camera 오브젝트의 위치와 회전 값을 설정합니다.</a:t>
+            </a:r>
+            <a:endParaRPr lang="ko-KR" altLang="en-US" sz="1800">
+              <a:latin typeface="맑은 고딕" charset="0"/>
+              <a:ea typeface="맑은 고딕" charset="0"/>
+            </a:endParaRPr>
+          </a:p>
+        </p:txBody>
+      </p:sp>
+      <p:pic>
+        <p:nvPicPr>
+          <p:cNvPr id="1104" name="그림 58" descr="C:/Users/Admin1/AppData/Roaming/PolarisOffice/ETemp/15256_19321368/fImage12239279491.png"/>
+          <p:cNvPicPr>
+            <a:picLocks noChangeAspect="1"/>
+          </p:cNvPicPr>
+          <p:nvPr/>
+        </p:nvPicPr>
+        <p:blipFill rotWithShape="1">
+          <a:blip r:embed="rId2" cstate="print">
+            <a:extLst>
+              <a:ext uri="{28A0092B-C50C-407E-A947-70E740481C1C}">
+                <a14:useLocalDpi xmlns:a14="http://schemas.microsoft.com/office/drawing/2010/main" val="0"/>
+              </a:ext>
+            </a:extLst>
+          </a:blip>
+          <a:stretch>
+            <a:fillRect/>
+          </a:stretch>
+        </p:blipFill>
+        <p:spPr>
+          <a:xfrm rot="0">
+            <a:off x="1238250" y="1445895"/>
+            <a:ext cx="4157345" cy="1507490"/>
+          </a:xfrm>
+          <a:prstGeom prst="roundRect"/>
+          <a:solidFill>
+            <a:srgbClr val="EDEDED"/>
+          </a:solidFill>
+        </p:spPr>
+      </p:pic>
+      <p:pic>
+        <p:nvPicPr>
+          <p:cNvPr id="1105" name="그림 61" descr="C:/Users/Admin1/AppData/Roaming/PolarisOffice/ETemp/15256_19321368/fImage90722802995.png"/>
+          <p:cNvPicPr>
+            <a:picLocks noChangeAspect="1"/>
+          </p:cNvPicPr>
+          <p:nvPr/>
+        </p:nvPicPr>
+        <p:blipFill rotWithShape="1">
+          <a:blip r:embed="rId3" cstate="print">
+            <a:extLst>
+              <a:ext uri="{28A0092B-C50C-407E-A947-70E740481C1C}">
+                <a14:useLocalDpi xmlns:a14="http://schemas.microsoft.com/office/drawing/2010/main" val="0"/>
+              </a:ext>
+            </a:extLst>
+          </a:blip>
+          <a:stretch>
+            <a:fillRect/>
+          </a:stretch>
+        </p:blipFill>
+        <p:spPr>
+          <a:xfrm rot="0">
+            <a:off x="1214120" y="3851910"/>
+            <a:ext cx="1488440" cy="1335405"/>
+          </a:xfrm>
+          <a:prstGeom prst="roundRect"/>
+          <a:solidFill>
+            <a:srgbClr val="EDEDED"/>
+          </a:solidFill>
+        </p:spPr>
+      </p:pic>
+      <p:pic>
+        <p:nvPicPr>
+          <p:cNvPr id="1106" name="그림 64" descr="C:/Users/Admin1/AppData/Roaming/PolarisOffice/ETemp/15256_19321368/fImage145102811942.png"/>
+          <p:cNvPicPr>
+            <a:picLocks noChangeAspect="1"/>
+          </p:cNvPicPr>
+          <p:nvPr/>
+        </p:nvPicPr>
+        <p:blipFill rotWithShape="1">
+          <a:blip r:embed="rId4" cstate="print">
+            <a:extLst>
+              <a:ext uri="{28A0092B-C50C-407E-A947-70E740481C1C}">
+                <a14:useLocalDpi xmlns:a14="http://schemas.microsoft.com/office/drawing/2010/main" val="0"/>
+              </a:ext>
+            </a:extLst>
+          </a:blip>
+          <a:stretch>
+            <a:fillRect/>
+          </a:stretch>
+        </p:blipFill>
+        <p:spPr>
+          <a:xfrm rot="0">
+            <a:off x="2823210" y="3844925"/>
+            <a:ext cx="2563495" cy="1334135"/>
+          </a:xfrm>
+          <a:prstGeom prst="roundRect"/>
+          <a:solidFill>
+            <a:srgbClr val="EDEDED"/>
+          </a:solidFill>
+        </p:spPr>
+      </p:pic>
+      <p:cxnSp>
+        <p:nvCxnSpPr>
+          <p:cNvPr id="1107" name="도형 67"/>
+          <p:cNvCxnSpPr/>
+          <p:nvPr/>
+        </p:nvCxnSpPr>
+        <p:spPr>
+          <a:xfrm rot="0" flipH="1">
+            <a:off x="1835785" y="4572000"/>
+            <a:ext cx="1715135" cy="113030"/>
+          </a:xfrm>
+          <a:prstGeom prst="straightConnector1"/>
+          <a:ln w="6350" cap="flat" cmpd="sng">
+            <a:prstDash/>
+            <a:headEnd type="none" w="med" len="med"/>
+            <a:tailEnd type="triangle" w="med" len="med"/>
+          </a:ln>
+        </p:spPr>
+        <p:style>
+          <a:lnRef idx="1">
+            <a:schemeClr val="accent1"/>
+          </a:lnRef>
+          <a:fillRef idx="0">
+            <a:schemeClr val="accent1"/>
+          </a:fillRef>
+          <a:effectRef idx="0">
+            <a:schemeClr val="accent1"/>
+          </a:effectRef>
+          <a:fontRef idx="minor">
+            <a:schemeClr val="tx1"/>
+          </a:fontRef>
+        </p:style>
+      </p:cxnSp>
+    </p:spTree>
+  </p:cSld>
+  <p:clrMapOvr>
+    <a:masterClrMapping/>
+  </p:clrMapOvr>
+  <mc:AlternateContent xmlns:mc="http://schemas.openxmlformats.org/markup-compatibility/2006">
+    <mc:Choice xmlns:p14="http://schemas.microsoft.com/office/powerpoint/2010/main" Requires="p14">
+      <p:transition spd="slow" p14:dur="2000"/>
+    </mc:Choice>
+    <mc:Fallback>
+      <p:transition spd="slow"/>
+    </mc:Fallback>
+  </mc:AlternateContent>
+  <p:timing>
+    <p:tnLst>
+      <p:par>
+        <p:cTn id="1" dur="indefinite" restart="never" nodeType="tmRoot"/>
+      </p:par>
+    </p:tnLst>
+  </p:timing>
+</p:sld>
+</file>
+
+<file path=ppt/slides/slide13.xml><?xml version="1.0" encoding="utf-8"?>
 <p:sld xmlns:a="http://schemas.openxmlformats.org/drawingml/2006/main" xmlns:r="http://schemas.openxmlformats.org/officeDocument/2006/relationships" xmlns:p="http://schemas.openxmlformats.org/presentationml/2006/main" xmlns:p14="http://schemas.microsoft.com/office/powerpoint/2010/main">
   <p:cSld>
     <p:spTree>
@@ -8232,7 +9459,7 @@
       </p:sp>
       <p:pic>
         <p:nvPicPr>
-          <p:cNvPr id="1110" name="그림 24" descr="C:/Users/Admin1/AppData/Roaming/PolarisOffice/ETemp/20572_22936136/fImage187452986500.png"/>
+          <p:cNvPr id="1110" name="그림 24"/>
           <p:cNvPicPr>
             <a:picLocks noChangeAspect="1"/>
           </p:cNvPicPr>
@@ -8434,7 +9661,7 @@
       </p:sp>
       <p:pic>
         <p:nvPicPr>
-          <p:cNvPr id="1033" name="그림 7" descr="C:/Users/Admin1/AppData/Roaming/PolarisOffice/ETemp/20572_22936136/fImage396362805724.png"/>
+          <p:cNvPr id="1033" name="그림 7"/>
           <p:cNvPicPr>
             <a:picLocks noChangeAspect="1"/>
           </p:cNvPicPr>
@@ -8527,7 +9754,7 @@
       </p:sp>
       <p:pic>
         <p:nvPicPr>
-          <p:cNvPr id="1035" name="그림 9" descr="C:/Users/Admin1/AppData/Roaming/PolarisOffice/ETemp/20572_22936136/fImage384292811478.png"/>
+          <p:cNvPr id="1035" name="그림 9"/>
           <p:cNvPicPr>
             <a:picLocks noChangeAspect="1"/>
           </p:cNvPicPr>
@@ -8768,7 +9995,7 @@
       </p:sp>
       <p:pic>
         <p:nvPicPr>
-          <p:cNvPr id="1062" name="그림 10" descr="C:/Users/Admin1/AppData/Roaming/PolarisOffice/ETemp/20572_22936136/fImage1877317641.png"/>
+          <p:cNvPr id="1062" name="그림 10"/>
           <p:cNvPicPr>
             <a:picLocks noChangeAspect="1"/>
           </p:cNvPicPr>
@@ -8863,7 +10090,7 @@
       </p:sp>
       <p:pic>
         <p:nvPicPr>
-          <p:cNvPr id="1064" name="그림 14" descr="C:/Users/Admin1/AppData/Roaming/PolarisOffice/ETemp/20572_22936136/fImage60931788467.png"/>
+          <p:cNvPr id="1064" name="그림 14"/>
           <p:cNvPicPr>
             <a:picLocks noChangeAspect="1"/>
           </p:cNvPicPr>
@@ -8894,7 +10121,7 @@
       </p:pic>
       <p:pic>
         <p:nvPicPr>
-          <p:cNvPr id="1065" name="그림 17" descr="C:/Users/Admin1/AppData/Roaming/PolarisOffice/ETemp/20572_22936136/fImage468631796334.png"/>
+          <p:cNvPr id="1065" name="그림 17"/>
           <p:cNvPicPr>
             <a:picLocks noChangeAspect="1"/>
           </p:cNvPicPr>
@@ -9211,7 +10438,7 @@
       </p:sp>
       <p:pic>
         <p:nvPicPr>
-          <p:cNvPr id="1036" name="그림 1" descr="C:/Users/Admin1/AppData/Roaming/PolarisOffice/ETemp/20572_22936136/fImage29139941.png"/>
+          <p:cNvPr id="1036" name="그림 1"/>
           <p:cNvPicPr>
             <a:picLocks noChangeAspect="1"/>
           </p:cNvPicPr>
@@ -9550,7 +10777,7 @@
       </p:sp>
       <p:pic>
         <p:nvPicPr>
-          <p:cNvPr id="1034" name="그림 22" descr="C:/Users/Admin1/AppData/Roaming/PolarisOffice/ETemp/20572_22936136/fImage412512959358.png"/>
+          <p:cNvPr id="1034" name="그림 22"/>
           <p:cNvPicPr>
             <a:picLocks noChangeAspect="1"/>
           </p:cNvPicPr>
@@ -9579,7 +10806,7 @@
       </p:pic>
       <p:pic>
         <p:nvPicPr>
-          <p:cNvPr id="1037" name="그림 25" descr="C:/Users/Admin1/AppData/Roaming/PolarisOffice/ETemp/20572_22936136/fImage410242994464.png"/>
+          <p:cNvPr id="1037" name="그림 25"/>
           <p:cNvPicPr>
             <a:picLocks noChangeAspect="1"/>
           </p:cNvPicPr>
@@ -9608,7 +10835,7 @@
       </p:pic>
       <p:pic>
         <p:nvPicPr>
-          <p:cNvPr id="1038" name="그림 26" descr="C:/Users/Admin1/AppData/Roaming/PolarisOffice/ETemp/20572_22936136/fImage61361866500.png"/>
+          <p:cNvPr id="1038" name="그림 26"/>
           <p:cNvPicPr>
             <a:picLocks noChangeAspect="1"/>
           </p:cNvPicPr>
@@ -9920,7 +11147,7 @@
       </p:sp>
       <p:pic>
         <p:nvPicPr>
-          <p:cNvPr id="1051" name="그림 18" descr="C:/Users/Admin1/AppData/Roaming/PolarisOffice/ETemp/20572_22936136/fImage504092968467.png"/>
+          <p:cNvPr id="1051" name="그림 18"/>
           <p:cNvPicPr>
             <a:picLocks noChangeAspect="1"/>
           </p:cNvPicPr>
@@ -9951,7 +11178,7 @@
       </p:pic>
       <p:pic>
         <p:nvPicPr>
-          <p:cNvPr id="1052" name="그림 21" descr="C:/Users/Admin1/AppData/Roaming/PolarisOffice/ETemp/20572_22936136/fImage1040312976334.png"/>
+          <p:cNvPr id="1052" name="그림 21"/>
           <p:cNvPicPr>
             <a:picLocks noChangeAspect="1"/>
           </p:cNvPicPr>
@@ -10146,7 +11373,7 @@
       </p:sp>
       <p:pic>
         <p:nvPicPr>
-          <p:cNvPr id="1052" name="그림 34" descr="C:/Users/Admin1/AppData/Roaming/PolarisOffice/ETemp/20572_22936136/fImage120161889169.png"/>
+          <p:cNvPr id="1052" name="그림 34"/>
           <p:cNvPicPr>
             <a:picLocks noChangeAspect="1"/>
           </p:cNvPicPr>
@@ -10177,7 +11404,7 @@
       </p:pic>
       <p:pic>
         <p:nvPicPr>
-          <p:cNvPr id="1053" name="그림 37" descr="C:/Users/Admin1/AppData/Roaming/PolarisOffice/ETemp/20572_22936136/fImage122321895724.png"/>
+          <p:cNvPr id="1053" name="그림 37"/>
           <p:cNvPicPr>
             <a:picLocks noChangeAspect="1"/>
           </p:cNvPicPr>
@@ -10272,7 +11499,7 @@
       </p:sp>
       <p:pic>
         <p:nvPicPr>
-          <p:cNvPr id="1055" name="그림 41" descr="C:/Users/Admin1/AppData/Roaming/PolarisOffice/ETemp/20572_22936136/fImage59261911478.png"/>
+          <p:cNvPr id="1055" name="그림 41"/>
           <p:cNvPicPr>
             <a:picLocks noChangeAspect="1"/>
           </p:cNvPicPr>
@@ -10367,7 +11594,7 @@
       </p:sp>
       <p:pic>
         <p:nvPicPr>
-          <p:cNvPr id="1057" name="그림 45" descr="C:/Users/Admin1/AppData/Roaming/PolarisOffice/ETemp/20572_22936136/fImage71351939358.png"/>
+          <p:cNvPr id="1057" name="그림 45"/>
           <p:cNvPicPr>
             <a:picLocks noChangeAspect="1"/>
           </p:cNvPicPr>
@@ -10398,7 +11625,7 @@
       </p:pic>
       <p:pic>
         <p:nvPicPr>
-          <p:cNvPr id="1058" name="그림 48" descr="C:/Users/Admin1/AppData/Roaming/PolarisOffice/ETemp/20572_22936136/fImage53011946962.png"/>
+          <p:cNvPr id="1058" name="그림 48"/>
           <p:cNvPicPr>
             <a:picLocks noChangeAspect="1"/>
           </p:cNvPicPr>
@@ -10429,7 +11656,7 @@
       </p:pic>
       <p:pic>
         <p:nvPicPr>
-          <p:cNvPr id="1059" name="그림 49" descr="C:/Users/Admin1/AppData/Roaming/PolarisOffice/ETemp/20572_22936136/fImage71351954464.png"/>
+          <p:cNvPr id="1059" name="그림 49"/>
           <p:cNvPicPr>
             <a:picLocks noChangeAspect="1"/>
           </p:cNvPicPr>
@@ -10524,7 +11751,7 @@
       </p:sp>
       <p:pic>
         <p:nvPicPr>
-          <p:cNvPr id="1061" name="그림 54" descr="C:/Users/Admin1/AppData/Roaming/PolarisOffice/ETemp/20572_22936136/fImage2242171995705.png"/>
+          <p:cNvPr id="1061" name="그림 54"/>
           <p:cNvPicPr>
             <a:picLocks noChangeAspect="1"/>
           </p:cNvPicPr>
@@ -10553,7 +11780,7 @@
       </p:pic>
       <p:pic>
         <p:nvPicPr>
-          <p:cNvPr id="1062" name="그림 55" descr="C:/Users/Admin1/AppData/Roaming/PolarisOffice/ETemp/20572_22936136/fImage2242172008145.png"/>
+          <p:cNvPr id="1062" name="그림 55"/>
           <p:cNvPicPr>
             <a:picLocks noChangeAspect="1"/>
           </p:cNvPicPr>
@@ -10690,8 +11917,8 @@
         </p:nvSpPr>
         <p:spPr>
           <a:xfrm rot="0">
-            <a:off x="1432560" y="5100320"/>
-            <a:ext cx="3945890" cy="954405"/>
+            <a:off x="1424305" y="5233035"/>
+            <a:ext cx="3946525" cy="955040"/>
           </a:xfrm>
           <a:prstGeom prst="rect"/>
           <a:noFill/>
@@ -10746,14 +11973,226 @@
       </p:sp>
       <p:pic>
         <p:nvPicPr>
-          <p:cNvPr id="1034" name="그림 58" descr="C:/Users/Admin1/AppData/Roaming/PolarisOffice/ETemp/20572_22936136/fImage115662033281.png"/>
+          <p:cNvPr id="1034" name="그림 58" descr="C:/Users/Admin1/AppData/Roaming/PolarisOffice/ETemp/15256_19321368/fImage115662033281.png"/>
           <p:cNvPicPr>
             <a:picLocks noChangeAspect="1"/>
           </p:cNvPicPr>
           <p:nvPr/>
         </p:nvPicPr>
         <p:blipFill rotWithShape="1">
-          <a:blip r:embed="rId5" cstate="print">
+          <a:blip r:embed="rId5" cstate="hqprint">
+            <a:extLst>
+              <a:ext uri="{28A0092B-C50C-407E-A947-70E740481C1C}">
+                <a14:useLocalDpi xmlns:a14="http://schemas.microsoft.com/office/drawing/2010/main"/>
+              </a:ext>
+            </a:extLst>
+          </a:blip>
+          <a:stretch>
+            <a:fillRect/>
+          </a:stretch>
+        </p:blipFill>
+        <p:spPr>
+          <a:xfrm rot="0">
+            <a:off x="3187065" y="1402715"/>
+            <a:ext cx="2183130" cy="3677285"/>
+          </a:xfrm>
+          <a:prstGeom prst="roundRect"/>
+          <a:solidFill>
+            <a:srgbClr val="EDEDED"/>
+          </a:solidFill>
+        </p:spPr>
+      </p:pic>
+      <p:pic>
+        <p:nvPicPr>
+          <p:cNvPr id="1035" name="그림 61" descr="C:/Users/Admin1/AppData/Roaming/PolarisOffice/ETemp/15256_19321368/fImage71352046827.png"/>
+          <p:cNvPicPr>
+            <a:picLocks noChangeAspect="1"/>
+          </p:cNvPicPr>
+          <p:nvPr/>
+        </p:nvPicPr>
+        <p:blipFill rotWithShape="1">
+          <a:blip r:embed="rId6" cstate="hqprint">
+            <a:extLst>
+              <a:ext uri="{28A0092B-C50C-407E-A947-70E740481C1C}">
+                <a14:useLocalDpi xmlns:a14="http://schemas.microsoft.com/office/drawing/2010/main"/>
+              </a:ext>
+            </a:extLst>
+          </a:blip>
+          <a:stretch>
+            <a:fillRect/>
+          </a:stretch>
+        </p:blipFill>
+        <p:spPr>
+          <a:xfrm rot="0">
+            <a:off x="1428750" y="2111375"/>
+            <a:ext cx="1603375" cy="2263140"/>
+          </a:xfrm>
+          <a:prstGeom prst="roundRect"/>
+          <a:solidFill>
+            <a:srgbClr val="EDEDED"/>
+          </a:solidFill>
+        </p:spPr>
+      </p:pic>
+      <p:sp>
+        <p:nvSpPr>
+          <p:cNvPr id="1036" name="텍스트 상자 5"/>
+          <p:cNvSpPr txBox="1">
+            <a:spLocks/>
+          </p:cNvSpPr>
+          <p:nvPr/>
+        </p:nvSpPr>
+        <p:spPr>
+          <a:xfrm rot="0">
+            <a:off x="6800215" y="4151630"/>
+            <a:ext cx="4173855" cy="2031365"/>
+          </a:xfrm>
+          <a:prstGeom prst="rect"/>
+          <a:noFill/>
+          <a:ln w="0">
+            <a:noFill/>
+            <a:prstDash/>
+          </a:ln>
+        </p:spPr>
+        <p:txBody>
+          <a:bodyPr wrap="square" lIns="89535" tIns="46355" rIns="89535" bIns="46355" vert="horz" anchor="t">
+            <a:spAutoFit/>
+          </a:bodyPr>
+          <a:lstStyle/>
+          <a:p>
+            <a:pPr marL="0" indent="0" rtl="0" algn="l" defTabSz="914400" eaLnBrk="1" latinLnBrk="0" hangingPunct="1">
+              <a:buFontTx/>
+              <a:buNone/>
+            </a:pPr>
+            <a:r>
+              <a:rPr sz="1800" b="1">
+                <a:solidFill>
+                  <a:srgbClr val="0611F2"/>
+                </a:solidFill>
+                <a:latin typeface="맑은 고딕" charset="0"/>
+                <a:ea typeface="맑은 고딕" charset="0"/>
+              </a:rPr>
+              <a:t>14</a:t>
+            </a:r>
+            <a:r>
+              <a:rPr sz="1800" b="1">
+                <a:solidFill>
+                  <a:srgbClr val="0611F2"/>
+                </a:solidFill>
+                <a:latin typeface="맑은 고딕" charset="0"/>
+                <a:ea typeface="맑은 고딕" charset="0"/>
+              </a:rPr>
+              <a:t>.</a:t>
+            </a:r>
+            <a:r>
+              <a:rPr sz="1800">
+                <a:latin typeface="맑은 고딕" charset="0"/>
+                <a:ea typeface="맑은 고딕" charset="0"/>
+              </a:rPr>
+              <a:t> 그</a:t>
+            </a:r>
+            <a:r>
+              <a:rPr lang="ko-KR" sz="1800">
+                <a:latin typeface="맑은 고딕" charset="0"/>
+                <a:ea typeface="맑은 고딕" charset="0"/>
+              </a:rPr>
+              <a:t>다음으로</a:t>
+            </a:r>
+            <a:r>
+              <a:rPr sz="1800">
+                <a:latin typeface="맑은 고딕" charset="0"/>
+                <a:ea typeface="맑은 고딕" charset="0"/>
+              </a:rPr>
+              <a:t> 빈 게임 오브젝트를 4개 생성합니다.</a:t>
+            </a:r>
+            <a:endParaRPr lang="ko-KR" altLang="en-US" sz="1800">
+              <a:latin typeface="맑은 고딕" charset="0"/>
+              <a:ea typeface="맑은 고딕" charset="0"/>
+            </a:endParaRPr>
+          </a:p>
+          <a:p>
+            <a:pPr marL="0" indent="0" rtl="0" algn="l" defTabSz="914400" eaLnBrk="1" latinLnBrk="0" hangingPunct="1">
+              <a:buFontTx/>
+              <a:buNone/>
+            </a:pPr>
+            <a:endParaRPr lang="ko-KR" altLang="en-US" sz="1800">
+              <a:latin typeface="맑은 고딕" charset="0"/>
+              <a:ea typeface="맑은 고딕" charset="0"/>
+            </a:endParaRPr>
+          </a:p>
+          <a:p>
+            <a:pPr marL="0" indent="0" rtl="0" algn="l" defTabSz="914400" eaLnBrk="1" latinLnBrk="0" hangingPunct="1">
+              <a:buFontTx/>
+              <a:buNone/>
+            </a:pPr>
+            <a:r>
+              <a:rPr sz="1800">
+                <a:latin typeface="맑은 고딕" charset="0"/>
+                <a:ea typeface="맑은 고딕" charset="0"/>
+              </a:rPr>
+              <a:t>그러</a:t>
+            </a:r>
+            <a:r>
+              <a:rPr lang="ko-KR" sz="1800">
+                <a:latin typeface="맑은 고딕" charset="0"/>
+                <a:ea typeface="맑은 고딕" charset="0"/>
+              </a:rPr>
+              <a:t>고 나서</a:t>
+            </a:r>
+            <a:r>
+              <a:rPr sz="1800">
+                <a:latin typeface="맑은 고딕" charset="0"/>
+                <a:ea typeface="맑은 고딕" charset="0"/>
+              </a:rPr>
+              <a:t> 각각의 이름을 First Point와 Second Point 그리고 Third Point 마지막으로 Four Point라는 이름으로 정의합니다.</a:t>
+            </a:r>
+            <a:endParaRPr lang="ko-KR" altLang="en-US" sz="1800">
+              <a:latin typeface="맑은 고딕" charset="0"/>
+              <a:ea typeface="맑은 고딕" charset="0"/>
+            </a:endParaRPr>
+          </a:p>
+        </p:txBody>
+      </p:sp>
+      <p:pic>
+        <p:nvPicPr>
+          <p:cNvPr id="1037" name="그림 6" descr="C:/Users/Admin1/AppData/Roaming/PolarisOffice/ETemp/15256_19321368/fImage3302515541.png"/>
+          <p:cNvPicPr>
+            <a:picLocks noChangeAspect="1"/>
+          </p:cNvPicPr>
+          <p:nvPr/>
+        </p:nvPicPr>
+        <p:blipFill rotWithShape="1">
+          <a:blip r:embed="rId7" cstate="hqprint">
+            <a:extLst>
+              <a:ext uri="{28A0092B-C50C-407E-A947-70E740481C1C}">
+                <a14:useLocalDpi xmlns:a14="http://schemas.microsoft.com/office/drawing/2010/main"/>
+              </a:ext>
+            </a:extLst>
+          </a:blip>
+          <a:stretch>
+            <a:fillRect/>
+          </a:stretch>
+        </p:blipFill>
+        <p:spPr>
+          <a:xfrm rot="0">
+            <a:off x="6800215" y="1404620"/>
+            <a:ext cx="2411730" cy="2586990"/>
+          </a:xfrm>
+          <a:prstGeom prst="roundRect"/>
+          <a:solidFill>
+            <a:srgbClr val="EDEDED"/>
+          </a:solidFill>
+        </p:spPr>
+      </p:pic>
+      <p:pic>
+        <p:nvPicPr>
+          <p:cNvPr id="1038" name="그림 7" descr="C:/Users/Admin1/AppData/Roaming/PolarisOffice/ETemp/15256_19321368/fImage77711568467.png"/>
+          <p:cNvPicPr>
+            <a:picLocks noChangeAspect="1"/>
+          </p:cNvPicPr>
+          <p:nvPr/>
+        </p:nvPicPr>
+        <p:blipFill rotWithShape="1">
+          <a:blip r:embed="rId8" cstate="print">
             <a:extLst>
               <a:ext uri="{28A0092B-C50C-407E-A947-70E740481C1C}">
                 <a14:useLocalDpi xmlns:a14="http://schemas.microsoft.com/office/drawing/2010/main" val="0"/>
@@ -10766,39 +12205,8 @@
         </p:blipFill>
         <p:spPr>
           <a:xfrm rot="0">
-            <a:off x="3187065" y="1402715"/>
-            <a:ext cx="2182495" cy="3481705"/>
-          </a:xfrm>
-          <a:prstGeom prst="roundRect"/>
-          <a:solidFill>
-            <a:srgbClr val="EDEDED"/>
-          </a:solidFill>
-        </p:spPr>
-      </p:pic>
-      <p:pic>
-        <p:nvPicPr>
-          <p:cNvPr id="1035" name="그림 61" descr="C:/Users/Admin1/AppData/Roaming/PolarisOffice/ETemp/20572_22936136/fImage71352046827.png"/>
-          <p:cNvPicPr>
-            <a:picLocks noChangeAspect="1"/>
-          </p:cNvPicPr>
-          <p:nvPr/>
-        </p:nvPicPr>
-        <p:blipFill rotWithShape="1">
-          <a:blip r:embed="rId6" cstate="print">
-            <a:extLst>
-              <a:ext uri="{28A0092B-C50C-407E-A947-70E740481C1C}">
-                <a14:useLocalDpi xmlns:a14="http://schemas.microsoft.com/office/drawing/2010/main" val="0"/>
-              </a:ext>
-            </a:extLst>
-          </a:blip>
-          <a:stretch>
-            <a:fillRect/>
-          </a:stretch>
-        </p:blipFill>
-        <p:spPr>
-          <a:xfrm rot="0">
-            <a:off x="1428750" y="1922145"/>
-            <a:ext cx="1602740" cy="2451735"/>
+            <a:off x="9393555" y="1837055"/>
+            <a:ext cx="1588770" cy="1739265"/>
           </a:xfrm>
           <a:prstGeom prst="roundRect"/>
           <a:solidFill>
@@ -10906,6 +12314,587 @@
           </a:p>
         </p:txBody>
       </p:sp>
+      <p:sp>
+        <p:nvSpPr>
+          <p:cNvPr id="1032" name="텍스트 상자 3"/>
+          <p:cNvSpPr txBox="1">
+            <a:spLocks/>
+          </p:cNvSpPr>
+          <p:nvPr/>
+        </p:nvSpPr>
+        <p:spPr>
+          <a:xfrm rot="0">
+            <a:off x="1363345" y="5032375"/>
+            <a:ext cx="4007485" cy="1200785"/>
+          </a:xfrm>
+          <a:prstGeom prst="rect"/>
+          <a:noFill/>
+          <a:ln w="0">
+            <a:noFill/>
+            <a:prstDash/>
+          </a:ln>
+        </p:spPr>
+        <p:txBody>
+          <a:bodyPr wrap="square" lIns="89535" tIns="46355" rIns="89535" bIns="46355" vert="horz" anchor="t">
+            <a:spAutoFit/>
+          </a:bodyPr>
+          <a:lstStyle/>
+          <a:p>
+            <a:pPr marL="0" indent="0" rtl="0" algn="l" defTabSz="914400" eaLnBrk="1" latinLnBrk="0" hangingPunct="1">
+              <a:buFontTx/>
+              <a:buNone/>
+            </a:pPr>
+            <a:r>
+              <a:rPr sz="1800" b="1">
+                <a:solidFill>
+                  <a:srgbClr val="0611F2"/>
+                </a:solidFill>
+                <a:latin typeface="맑은 고딕" charset="0"/>
+                <a:ea typeface="맑은 고딕" charset="0"/>
+              </a:rPr>
+              <a:t>1</a:t>
+            </a:r>
+            <a:r>
+              <a:rPr lang="ko-KR" sz="1800" b="1">
+                <a:solidFill>
+                  <a:srgbClr val="0611F2"/>
+                </a:solidFill>
+                <a:latin typeface="맑은 고딕" charset="0"/>
+                <a:ea typeface="맑은 고딕" charset="0"/>
+              </a:rPr>
+              <a:t>5</a:t>
+            </a:r>
+            <a:r>
+              <a:rPr sz="1800" b="1">
+                <a:solidFill>
+                  <a:srgbClr val="0611F2"/>
+                </a:solidFill>
+                <a:latin typeface="맑은 고딕" charset="0"/>
+                <a:ea typeface="맑은 고딕" charset="0"/>
+              </a:rPr>
+              <a:t>.</a:t>
+            </a:r>
+            <a:r>
+              <a:rPr sz="1800">
+                <a:latin typeface="맑은 고딕" charset="0"/>
+                <a:ea typeface="맑은 고딕" charset="0"/>
+              </a:rPr>
+              <a:t> </a:t>
+            </a:r>
+            <a:r>
+              <a:rPr sz="1800">
+                <a:latin typeface="맑은 고딕" charset="0"/>
+                <a:ea typeface="맑은 고딕" charset="0"/>
+              </a:rPr>
+              <a:t>이제</a:t>
+            </a:r>
+            <a:r>
+              <a:rPr lang="ko-KR" sz="1800">
+                <a:latin typeface="맑은 고딕" charset="0"/>
+                <a:ea typeface="맑은 고딕" charset="0"/>
+              </a:rPr>
+              <a:t> First Point</a:t>
+            </a:r>
+            <a:r>
+              <a:rPr sz="1800">
+                <a:latin typeface="맑은 고딕" charset="0"/>
+                <a:ea typeface="맑은 고딕" charset="0"/>
+              </a:rPr>
+              <a:t> 오브젝트</a:t>
+            </a:r>
+            <a:r>
+              <a:rPr lang="ko-KR" sz="1800">
+                <a:latin typeface="맑은 고딕" charset="0"/>
+                <a:ea typeface="맑은 고딕" charset="0"/>
+              </a:rPr>
+              <a:t>와 Second Point 오브젝트 그리고 Third Point 오브젝트와 Four Point 오브젝트에</a:t>
+            </a:r>
+            <a:r>
+              <a:rPr sz="1800">
+                <a:latin typeface="맑은 고딕" charset="0"/>
+                <a:ea typeface="맑은 고딕" charset="0"/>
+              </a:rPr>
+              <a:t> Select Icon을 설정합니다.</a:t>
+            </a:r>
+            <a:endParaRPr lang="ko-KR" altLang="en-US" sz="1800">
+              <a:latin typeface="맑은 고딕" charset="0"/>
+              <a:ea typeface="맑은 고딕" charset="0"/>
+            </a:endParaRPr>
+          </a:p>
+        </p:txBody>
+      </p:sp>
+      <p:pic>
+        <p:nvPicPr>
+          <p:cNvPr id="1033" name="그림 4" descr="C:/Users/Admin1/AppData/Roaming/PolarisOffice/ETemp/15256_19321368/fImage70121536334.png"/>
+          <p:cNvPicPr>
+            <a:picLocks noChangeAspect="1"/>
+          </p:cNvPicPr>
+          <p:nvPr/>
+        </p:nvPicPr>
+        <p:blipFill rotWithShape="1">
+          <a:blip r:embed="rId6" cstate="hqprint">
+            <a:extLst>
+              <a:ext uri="{28A0092B-C50C-407E-A947-70E740481C1C}">
+                <a14:useLocalDpi xmlns:a14="http://schemas.microsoft.com/office/drawing/2010/main"/>
+              </a:ext>
+            </a:extLst>
+          </a:blip>
+          <a:stretch>
+            <a:fillRect/>
+          </a:stretch>
+        </p:blipFill>
+        <p:spPr>
+          <a:xfrm rot="0">
+            <a:off x="3749040" y="1878330"/>
+            <a:ext cx="1621790" cy="2479675"/>
+          </a:xfrm>
+          <a:prstGeom prst="roundRect"/>
+          <a:solidFill>
+            <a:srgbClr val="EDEDED"/>
+          </a:solidFill>
+        </p:spPr>
+      </p:pic>
+      <p:pic>
+        <p:nvPicPr>
+          <p:cNvPr id="1034" name="그림 10" descr="C:/Users/Admin1/AppData/Roaming/PolarisOffice/ETemp/15256_19321368/fImage77711576500.png"/>
+          <p:cNvPicPr>
+            <a:picLocks noChangeAspect="1"/>
+          </p:cNvPicPr>
+          <p:nvPr/>
+        </p:nvPicPr>
+        <p:blipFill rotWithShape="1">
+          <a:blip r:embed="rId7" cstate="print">
+            <a:extLst>
+              <a:ext uri="{28A0092B-C50C-407E-A947-70E740481C1C}">
+                <a14:useLocalDpi xmlns:a14="http://schemas.microsoft.com/office/drawing/2010/main" val="0"/>
+              </a:ext>
+            </a:extLst>
+          </a:blip>
+          <a:stretch>
+            <a:fillRect/>
+          </a:stretch>
+        </p:blipFill>
+        <p:spPr>
+          <a:xfrm rot="0">
+            <a:off x="1363345" y="1430020"/>
+            <a:ext cx="2162175" cy="3367405"/>
+          </a:xfrm>
+          <a:prstGeom prst="roundRect"/>
+          <a:solidFill>
+            <a:srgbClr val="EDEDED"/>
+          </a:solidFill>
+        </p:spPr>
+      </p:pic>
+      <p:pic>
+        <p:nvPicPr>
+          <p:cNvPr id="1035" name="그림 11" descr="C:/Users/Admin1/AppData/Roaming/PolarisOffice/ETemp/15256_19321368/fImage190431589169.png"/>
+          <p:cNvPicPr>
+            <a:picLocks noChangeAspect="1"/>
+          </p:cNvPicPr>
+          <p:nvPr/>
+        </p:nvPicPr>
+        <p:blipFill rotWithShape="1">
+          <a:blip r:embed="rId8" cstate="print">
+            <a:extLst>
+              <a:ext uri="{28A0092B-C50C-407E-A947-70E740481C1C}">
+                <a14:useLocalDpi xmlns:a14="http://schemas.microsoft.com/office/drawing/2010/main" val="0"/>
+              </a:ext>
+            </a:extLst>
+          </a:blip>
+          <a:stretch>
+            <a:fillRect/>
+          </a:stretch>
+        </p:blipFill>
+        <p:spPr>
+          <a:xfrm rot="0">
+            <a:off x="8271510" y="1428115"/>
+            <a:ext cx="2686050" cy="1548765"/>
+          </a:xfrm>
+          <a:prstGeom prst="roundRect"/>
+          <a:solidFill>
+            <a:srgbClr val="EDEDED"/>
+          </a:solidFill>
+        </p:spPr>
+      </p:pic>
+      <p:pic>
+        <p:nvPicPr>
+          <p:cNvPr id="1036" name="그림 14" descr="C:/Users/Admin1/AppData/Roaming/PolarisOffice/ETemp/15256_19321368/fImage77711595724.png"/>
+          <p:cNvPicPr>
+            <a:picLocks noChangeAspect="1"/>
+          </p:cNvPicPr>
+          <p:nvPr/>
+        </p:nvPicPr>
+        <p:blipFill rotWithShape="1">
+          <a:blip r:embed="rId9" cstate="print">
+            <a:extLst>
+              <a:ext uri="{28A0092B-C50C-407E-A947-70E740481C1C}">
+                <a14:useLocalDpi xmlns:a14="http://schemas.microsoft.com/office/drawing/2010/main" val="0"/>
+              </a:ext>
+            </a:extLst>
+          </a:blip>
+          <a:stretch>
+            <a:fillRect/>
+          </a:stretch>
+        </p:blipFill>
+        <p:spPr>
+          <a:xfrm rot="0">
+            <a:off x="6824980" y="1435100"/>
+            <a:ext cx="1314450" cy="1541780"/>
+          </a:xfrm>
+          <a:prstGeom prst="roundRect"/>
+          <a:solidFill>
+            <a:srgbClr val="EDEDED"/>
+          </a:solidFill>
+        </p:spPr>
+      </p:pic>
+      <p:sp>
+        <p:nvSpPr>
+          <p:cNvPr id="1037" name="텍스트 상자 15"/>
+          <p:cNvSpPr txBox="1">
+            <a:spLocks/>
+          </p:cNvSpPr>
+          <p:nvPr/>
+        </p:nvSpPr>
+        <p:spPr>
+          <a:xfrm rot="0">
+            <a:off x="6791960" y="3095625"/>
+            <a:ext cx="4157345" cy="3138805"/>
+          </a:xfrm>
+          <a:prstGeom prst="rect"/>
+          <a:noFill/>
+          <a:ln w="0">
+            <a:noFill/>
+            <a:prstDash/>
+          </a:ln>
+        </p:spPr>
+        <p:txBody>
+          <a:bodyPr wrap="square" lIns="89535" tIns="46355" rIns="89535" bIns="46355" vert="horz" anchor="t">
+            <a:spAutoFit/>
+          </a:bodyPr>
+          <a:lstStyle/>
+          <a:p>
+            <a:pPr marL="0" indent="0" rtl="0" algn="l" defTabSz="914400" eaLnBrk="1" latinLnBrk="0" hangingPunct="1">
+              <a:buFontTx/>
+              <a:buNone/>
+            </a:pPr>
+            <a:r>
+              <a:rPr sz="1800" b="1">
+                <a:solidFill>
+                  <a:srgbClr val="0611F2"/>
+                </a:solidFill>
+                <a:latin typeface="맑은 고딕" charset="0"/>
+                <a:ea typeface="맑은 고딕" charset="0"/>
+              </a:rPr>
+              <a:t>16</a:t>
+            </a:r>
+            <a:r>
+              <a:rPr sz="1800" b="1">
+                <a:solidFill>
+                  <a:srgbClr val="0611F2"/>
+                </a:solidFill>
+                <a:latin typeface="맑은 고딕" charset="0"/>
+                <a:ea typeface="맑은 고딕" charset="0"/>
+              </a:rPr>
+              <a:t>.</a:t>
+            </a:r>
+            <a:r>
+              <a:rPr sz="1800">
+                <a:latin typeface="맑은 고딕" charset="0"/>
+                <a:ea typeface="맑은 고딕" charset="0"/>
+              </a:rPr>
+              <a:t> 그다음 Create </a:t>
+            </a:r>
+            <a:r>
+              <a:rPr lang="ko-KR" sz="1800">
+                <a:latin typeface="맑은 고딕" charset="0"/>
+                <a:ea typeface="맑은 고딕" charset="0"/>
+              </a:rPr>
+              <a:t>Object </a:t>
+            </a:r>
+            <a:r>
+              <a:rPr sz="1800">
+                <a:latin typeface="맑은 고딕" charset="0"/>
+                <a:ea typeface="맑은 고딕" charset="0"/>
+              </a:rPr>
+              <a:t>오브젝트에 있는 Create</a:t>
+            </a:r>
+            <a:r>
+              <a:rPr sz="1800">
+                <a:latin typeface="맑은 고딕" charset="0"/>
+                <a:ea typeface="맑은 고딕" charset="0"/>
+              </a:rPr>
+              <a:t> </a:t>
+            </a:r>
+            <a:r>
+              <a:rPr sz="1800">
+                <a:latin typeface="맑은 고딕" charset="0"/>
+                <a:ea typeface="맑은 고딕" charset="0"/>
+              </a:rPr>
+              <a:t>스크립트의 </a:t>
+            </a:r>
+            <a:r>
+              <a:rPr lang="ko-KR" sz="1800">
+                <a:latin typeface="맑은 고딕" charset="0"/>
+                <a:ea typeface="맑은 고딕" charset="0"/>
+              </a:rPr>
+              <a:t>Random Position을</a:t>
+            </a:r>
+            <a:r>
+              <a:rPr sz="1800">
+                <a:latin typeface="맑은 고딕" charset="0"/>
+                <a:ea typeface="맑은 고딕" charset="0"/>
+              </a:rPr>
+              <a:t> 4개</a:t>
+            </a:r>
+            <a:r>
+              <a:rPr lang="ko-KR" sz="1800">
+                <a:latin typeface="맑은 고딕" charset="0"/>
+                <a:ea typeface="맑은 고딕" charset="0"/>
+              </a:rPr>
+              <a:t>로</a:t>
+            </a:r>
+            <a:r>
+              <a:rPr sz="1800">
+                <a:latin typeface="맑은 고딕" charset="0"/>
+                <a:ea typeface="맑은 고딕" charset="0"/>
+              </a:rPr>
+              <a:t> 설정합니다. </a:t>
+            </a:r>
+            <a:endParaRPr lang="ko-KR" altLang="en-US" sz="1800">
+              <a:latin typeface="맑은 고딕" charset="0"/>
+              <a:ea typeface="맑은 고딕" charset="0"/>
+            </a:endParaRPr>
+          </a:p>
+          <a:p>
+            <a:pPr marL="0" indent="0" rtl="0" algn="l" defTabSz="914400" eaLnBrk="1" latinLnBrk="0" hangingPunct="1">
+              <a:buFontTx/>
+              <a:buNone/>
+            </a:pPr>
+            <a:endParaRPr lang="ko-KR" altLang="en-US" sz="1800">
+              <a:latin typeface="맑은 고딕" charset="0"/>
+              <a:ea typeface="맑은 고딕" charset="0"/>
+            </a:endParaRPr>
+          </a:p>
+          <a:p>
+            <a:pPr marL="0" indent="0" rtl="0" algn="l" defTabSz="914400" eaLnBrk="1" latinLnBrk="0" hangingPunct="1">
+              <a:buFontTx/>
+              <a:buNone/>
+            </a:pPr>
+            <a:r>
+              <a:rPr sz="1800">
+                <a:latin typeface="맑은 고딕" charset="0"/>
+                <a:ea typeface="맑은 고딕" charset="0"/>
+              </a:rPr>
+              <a:t>그</a:t>
+            </a:r>
+            <a:r>
+              <a:rPr lang="ko-KR" sz="1800">
+                <a:latin typeface="맑은 고딕" charset="0"/>
+                <a:ea typeface="맑은 고딕" charset="0"/>
+              </a:rPr>
+              <a:t>런 다음</a:t>
+            </a:r>
+            <a:r>
+              <a:rPr sz="1800">
+                <a:latin typeface="맑은 고딕" charset="0"/>
+                <a:ea typeface="맑은 고딕" charset="0"/>
+              </a:rPr>
+              <a:t> Element 0에는 First Point를 넣어주고 Element 1에는 Second Point를 넣어줍니다.</a:t>
+            </a:r>
+            <a:endParaRPr lang="ko-KR" altLang="en-US" sz="1800">
+              <a:latin typeface="맑은 고딕" charset="0"/>
+              <a:ea typeface="맑은 고딕" charset="0"/>
+            </a:endParaRPr>
+          </a:p>
+          <a:p>
+            <a:pPr marL="0" indent="0" rtl="0" algn="l" defTabSz="914400" eaLnBrk="1" latinLnBrk="0" hangingPunct="1">
+              <a:buFontTx/>
+              <a:buNone/>
+            </a:pPr>
+            <a:endParaRPr lang="ko-KR" altLang="en-US" sz="1800">
+              <a:latin typeface="맑은 고딕" charset="0"/>
+              <a:ea typeface="맑은 고딕" charset="0"/>
+            </a:endParaRPr>
+          </a:p>
+          <a:p>
+            <a:pPr marL="0" indent="0" rtl="0" algn="l" defTabSz="914400" eaLnBrk="1" latinLnBrk="0" hangingPunct="1">
+              <a:buFontTx/>
+              <a:buNone/>
+            </a:pPr>
+            <a:r>
+              <a:rPr sz="1800">
+                <a:latin typeface="맑은 고딕" charset="0"/>
+                <a:ea typeface="맑은 고딕" charset="0"/>
+              </a:rPr>
+              <a:t>마지막으</a:t>
+            </a:r>
+            <a:r>
+              <a:rPr lang="ko-KR" sz="1800">
+                <a:latin typeface="맑은 고딕" charset="0"/>
+                <a:ea typeface="맑은 고딕" charset="0"/>
+              </a:rPr>
+              <a:t>로</a:t>
+            </a:r>
+            <a:r>
+              <a:rPr sz="1800">
+                <a:latin typeface="맑은 고딕" charset="0"/>
+                <a:ea typeface="맑은 고딕" charset="0"/>
+              </a:rPr>
+              <a:t> Element 2에는 Third Point를 넣어</a:t>
+            </a:r>
+            <a:r>
+              <a:rPr lang="ko-KR" sz="1800">
+                <a:latin typeface="맑은 고딕" charset="0"/>
+                <a:ea typeface="맑은 고딕" charset="0"/>
+              </a:rPr>
+              <a:t>주고</a:t>
+            </a:r>
+            <a:r>
+              <a:rPr sz="1800">
+                <a:latin typeface="맑은 고딕" charset="0"/>
+                <a:ea typeface="맑은 고딕" charset="0"/>
+              </a:rPr>
+              <a:t> Element 3에는 Four Point를 넣어줍니다.</a:t>
+            </a:r>
+            <a:endParaRPr lang="ko-KR" altLang="en-US" sz="1800">
+              <a:latin typeface="맑은 고딕" charset="0"/>
+              <a:ea typeface="맑은 고딕" charset="0"/>
+            </a:endParaRPr>
+          </a:p>
+        </p:txBody>
+      </p:sp>
+      <p:cxnSp>
+        <p:nvCxnSpPr>
+          <p:cNvPr id="1038" name="도형 16"/>
+          <p:cNvCxnSpPr/>
+          <p:nvPr/>
+        </p:nvCxnSpPr>
+        <p:spPr>
+          <a:xfrm rot="0" flipV="1">
+            <a:off x="7714615" y="2218690"/>
+            <a:ext cx="3101340" cy="241935"/>
+          </a:xfrm>
+          <a:prstGeom prst="straightConnector1"/>
+          <a:ln w="6350" cap="flat" cmpd="sng">
+            <a:prstDash/>
+            <a:headEnd type="none" w="med" len="med"/>
+            <a:tailEnd type="triangle" w="med" len="med"/>
+          </a:ln>
+        </p:spPr>
+        <p:style>
+          <a:lnRef idx="1">
+            <a:schemeClr val="accent1"/>
+          </a:lnRef>
+          <a:fillRef idx="0">
+            <a:schemeClr val="accent1"/>
+          </a:fillRef>
+          <a:effectRef idx="0">
+            <a:schemeClr val="accent1"/>
+          </a:effectRef>
+          <a:fontRef idx="minor">
+            <a:schemeClr val="tx1"/>
+          </a:fontRef>
+        </p:style>
+      </p:cxnSp>
+      <p:cxnSp>
+        <p:nvCxnSpPr>
+          <p:cNvPr id="1039" name="도형 17"/>
+          <p:cNvCxnSpPr/>
+          <p:nvPr/>
+        </p:nvCxnSpPr>
+        <p:spPr>
+          <a:xfrm rot="0" flipV="1">
+            <a:off x="7872730" y="2368550"/>
+            <a:ext cx="2959735" cy="225425"/>
+          </a:xfrm>
+          <a:prstGeom prst="straightConnector1"/>
+          <a:ln w="6350" cap="flat" cmpd="sng">
+            <a:prstDash/>
+            <a:headEnd type="none" w="med" len="med"/>
+            <a:tailEnd type="triangle" w="med" len="med"/>
+          </a:ln>
+        </p:spPr>
+        <p:style>
+          <a:lnRef idx="1">
+            <a:schemeClr val="accent1"/>
+          </a:lnRef>
+          <a:fillRef idx="0">
+            <a:schemeClr val="accent1"/>
+          </a:fillRef>
+          <a:effectRef idx="0">
+            <a:schemeClr val="accent1"/>
+          </a:effectRef>
+          <a:fontRef idx="minor">
+            <a:schemeClr val="tx1"/>
+          </a:fontRef>
+        </p:style>
+      </p:cxnSp>
+      <p:cxnSp>
+        <p:nvCxnSpPr>
+          <p:cNvPr id="1040" name="도형 18"/>
+          <p:cNvCxnSpPr/>
+          <p:nvPr/>
+        </p:nvCxnSpPr>
+        <p:spPr>
+          <a:xfrm rot="0" flipV="1">
+            <a:off x="7755890" y="2510155"/>
+            <a:ext cx="3068320" cy="216535"/>
+          </a:xfrm>
+          <a:prstGeom prst="straightConnector1"/>
+          <a:ln w="6350" cap="flat" cmpd="sng">
+            <a:prstDash/>
+            <a:headEnd type="none" w="med" len="med"/>
+            <a:tailEnd type="triangle" w="med" len="med"/>
+          </a:ln>
+        </p:spPr>
+        <p:style>
+          <a:lnRef idx="1">
+            <a:schemeClr val="accent1"/>
+          </a:lnRef>
+          <a:fillRef idx="0">
+            <a:schemeClr val="accent1"/>
+          </a:fillRef>
+          <a:effectRef idx="0">
+            <a:schemeClr val="accent1"/>
+          </a:effectRef>
+          <a:fontRef idx="minor">
+            <a:schemeClr val="tx1"/>
+          </a:fontRef>
+        </p:style>
+      </p:cxnSp>
+      <p:cxnSp>
+        <p:nvCxnSpPr>
+          <p:cNvPr id="1041" name="도형 19"/>
+          <p:cNvCxnSpPr/>
+          <p:nvPr/>
+        </p:nvCxnSpPr>
+        <p:spPr>
+          <a:xfrm rot="0" flipV="1">
+            <a:off x="7764145" y="2651125"/>
+            <a:ext cx="3068320" cy="200025"/>
+          </a:xfrm>
+          <a:prstGeom prst="straightConnector1"/>
+          <a:ln w="6350" cap="flat" cmpd="sng">
+            <a:prstDash/>
+            <a:headEnd type="none" w="med" len="med"/>
+            <a:tailEnd type="triangle" w="med" len="med"/>
+          </a:ln>
+        </p:spPr>
+        <p:style>
+          <a:lnRef idx="1">
+            <a:schemeClr val="accent1"/>
+          </a:lnRef>
+          <a:fillRef idx="0">
+            <a:schemeClr val="accent1"/>
+          </a:fillRef>
+          <a:effectRef idx="0">
+            <a:schemeClr val="accent1"/>
+          </a:effectRef>
+          <a:fontRef idx="minor">
+            <a:schemeClr val="tx1"/>
+          </a:fontRef>
+        </p:style>
+      </p:cxnSp>
     </p:spTree>
   </p:cSld>
   <p:clrMapOvr>

</xml_diff>

<commit_message>
Add Button Delay System
- Implement a function to be used
  by other scripts by using the global
  Action variable

- Set the button object to be
  inactive and then active according
  to a specific time
</commit_message>
<xml_diff>
--- a/Assets/Class/Instantiate & Destroy/PPT Data/Instatiate and Destroy Example.pptx
+++ b/Assets/Class/Instantiate & Destroy/PPT Data/Instatiate and Destroy Example.pptx
@@ -2,7 +2,7 @@
 <file path=ppt/presentation.xml><?xml version="1.0" encoding="utf-8"?>
 <p:presentation xmlns:a="http://schemas.openxmlformats.org/drawingml/2006/main" xmlns:r="http://schemas.openxmlformats.org/officeDocument/2006/relationships" xmlns:p="http://schemas.openxmlformats.org/presentationml/2006/main" xmlns:p14="http://schemas.microsoft.com/office/powerpoint/2010/main" saveSubsetFonts="1" firstSlideNum="0">
   <p:sldMasterIdLst>
-    <p:sldMasterId id="2147485787" r:id="rId12"/>
+    <p:sldMasterId id="2147485804" r:id="rId12"/>
   </p:sldMasterIdLst>
   <p:notesMasterIdLst>
     <p:notesMasterId r:id="rId14"/>
@@ -19,8 +19,9 @@
     <p:sldId id="299" r:id="rId24"/>
     <p:sldId id="300" r:id="rId25"/>
     <p:sldId id="301" r:id="rId26"/>
-    <p:sldId id="302" r:id="rId27"/>
-    <p:sldId id="287" r:id="rId28"/>
+    <p:sldId id="287" r:id="rId27"/>
+    <p:sldId id="302" r:id="rId28"/>
+    <p:sldId id="303" r:id="rId29"/>
   </p:sldIdLst>
   <p:sldSz cx="12192000" cy="6858000"/>
   <p:notesSz cx="6858000" cy="9144000"/>
@@ -935,7 +936,7 @@
         <p:spPr>
           <a:xfrm rot="0">
             <a:off x="685800" y="1143000"/>
-            <a:ext cx="5490845" cy="3090545"/>
+            <a:ext cx="5488940" cy="3088640"/>
           </a:xfrm>
           <a:prstGeom prst="rect"/>
           <a:noFill/>
@@ -974,7 +975,7 @@
         <p:spPr>
           <a:xfrm rot="0">
             <a:off x="685800" y="4400550"/>
-            <a:ext cx="5490845" cy="3604895"/>
+            <a:ext cx="5488940" cy="3602990"/>
           </a:xfrm>
           <a:prstGeom prst="rect"/>
         </p:spPr>
@@ -1004,7 +1005,7 @@
         <p:spPr>
           <a:xfrm rot="0">
             <a:off x="3884930" y="8685530"/>
-            <a:ext cx="2976245" cy="462915"/>
+            <a:ext cx="2974340" cy="461010"/>
           </a:xfrm>
           <a:prstGeom prst="rect"/>
         </p:spPr>
@@ -1077,7 +1078,7 @@
         <p:spPr>
           <a:xfrm rot="0">
             <a:off x="685800" y="1143000"/>
-            <a:ext cx="5488940" cy="3088640"/>
+            <a:ext cx="5490845" cy="3090545"/>
           </a:xfrm>
           <a:prstGeom prst="rect"/>
           <a:noFill/>
@@ -1116,7 +1117,7 @@
         <p:spPr>
           <a:xfrm rot="0">
             <a:off x="685800" y="4400550"/>
-            <a:ext cx="5488940" cy="3602990"/>
+            <a:ext cx="5490845" cy="3604895"/>
           </a:xfrm>
           <a:prstGeom prst="rect"/>
         </p:spPr>
@@ -1146,7 +1147,149 @@
         <p:spPr>
           <a:xfrm rot="0">
             <a:off x="3884930" y="8685530"/>
-            <a:ext cx="2974340" cy="461010"/>
+            <a:ext cx="2976245" cy="462915"/>
+          </a:xfrm>
+          <a:prstGeom prst="rect"/>
+        </p:spPr>
+        <p:txBody>
+          <a:bodyPr wrap="square" lIns="91440" tIns="45720" rIns="91440" bIns="45720" numCol="1" vert="horz" anchor="b">
+            <a:noAutofit/>
+          </a:bodyPr>
+          <a:lstStyle>
+            <a:lvl1pPr marL="0" indent="0" algn="r" latinLnBrk="0">
+              <a:buFontTx/>
+              <a:buNone/>
+              <a:defRPr lang="en-GB" altLang="en-US" sz="1200"/>
+            </a:lvl1pPr>
+          </a:lstStyle>
+          <a:p>
+            <a:pPr marL="0" indent="0" latinLnBrk="0">
+              <a:buFontTx/>
+              <a:buNone/>
+            </a:pPr>
+            <a:fld id="{B9320F77-B9A0-41C5-862A-B4B631284C64}" type="slidenum">
+              <a:rPr lang="ko-KR" altLang="en-US"/>
+              <a:t>‹#›</a:t>
+            </a:fld>
+          </a:p>
+        </p:txBody>
+      </p:sp>
+    </p:spTree>
+  </p:cSld>
+  <p:clrMapOvr>
+    <a:masterClrMapping/>
+  </p:clrMapOvr>
+  <mc:AlternateContent xmlns:mc="http://schemas.openxmlformats.org/markup-compatibility/2006">
+    <mc:Choice xmlns:p14="http://schemas.microsoft.com/office/powerpoint/2010/main" Requires="p14">
+      <p:transition spd="slow" p14:dur="0"/>
+    </mc:Choice>
+    <mc:Fallback>
+      <p:transition spd="slow"/>
+    </mc:Fallback>
+  </mc:AlternateContent>
+</p:notes>
+</file>
+
+<file path=ppt/notesSlides/notesSlide14.xml><?xml version="1.0" encoding="utf-8"?>
+<p:notes xmlns:a="http://schemas.openxmlformats.org/drawingml/2006/main" xmlns:r="http://schemas.openxmlformats.org/officeDocument/2006/relationships" xmlns:p="http://schemas.openxmlformats.org/presentationml/2006/main">
+  <p:cSld>
+    <p:spTree>
+      <p:nvGrpSpPr>
+        <p:cNvPr id="1" name=""/>
+        <p:cNvGrpSpPr/>
+        <p:nvPr/>
+      </p:nvGrpSpPr>
+      <p:grpSpPr>
+        <a:xfrm>
+          <a:off x="0" y="0"/>
+          <a:ext cx="0" cy="0"/>
+          <a:chOff x="0" y="0"/>
+          <a:chExt cx="0" cy="0"/>
+        </a:xfrm>
+      </p:grpSpPr>
+      <p:sp>
+        <p:nvSpPr>
+          <p:cNvPr id="2" name="슬라이드 이미지 개체 틀 3"/>
+          <p:cNvSpPr>
+            <a:spLocks noChangeAspect="1"/>
+          </p:cNvSpPr>
+          <p:nvPr>
+            <p:ph type="sldImg" idx="2"/>
+          </p:nvPr>
+        </p:nvSpPr>
+        <p:spPr>
+          <a:xfrm rot="0">
+            <a:off x="685800" y="1143000"/>
+            <a:ext cx="5491480" cy="3091180"/>
+          </a:xfrm>
+          <a:prstGeom prst="rect"/>
+          <a:noFill/>
+          <a:ln w="12700" cap="flat" cmpd="sng">
+            <a:solidFill>
+              <a:srgbClr val="000000">
+                <a:alpha val="100000"/>
+              </a:srgbClr>
+            </a:solidFill>
+            <a:prstDash val="solid"/>
+          </a:ln>
+        </p:spPr>
+        <p:txBody>
+          <a:bodyPr wrap="square" lIns="91440" tIns="45720" rIns="91440" bIns="45720" numCol="1" vert="horz" anchor="ctr">
+            <a:noAutofit/>
+          </a:bodyPr>
+          <a:lstStyle/>
+          <a:p>
+            <a:pPr marL="0" indent="0" latinLnBrk="0">
+              <a:buFontTx/>
+              <a:buNone/>
+            </a:pPr>
+          </a:p>
+        </p:txBody>
+      </p:sp>
+      <p:sp>
+        <p:nvSpPr>
+          <p:cNvPr id="3" name="슬라이드 노트 개체 틀 4"/>
+          <p:cNvSpPr txBox="1">
+            <a:spLocks/>
+          </p:cNvSpPr>
+          <p:nvPr>
+            <p:ph type="body" idx="3"/>
+          </p:nvPr>
+        </p:nvSpPr>
+        <p:spPr>
+          <a:xfrm rot="0">
+            <a:off x="685800" y="4400550"/>
+            <a:ext cx="5491480" cy="3605530"/>
+          </a:xfrm>
+          <a:prstGeom prst="rect"/>
+        </p:spPr>
+        <p:txBody>
+          <a:bodyPr wrap="square" lIns="91440" tIns="45720" rIns="91440" bIns="45720" numCol="1" vert="horz" anchor="t">
+            <a:noAutofit/>
+          </a:bodyPr>
+          <a:lstStyle/>
+          <a:p>
+            <a:pPr marL="0" indent="0" latinLnBrk="0">
+              <a:buFontTx/>
+              <a:buNone/>
+            </a:pPr>
+          </a:p>
+        </p:txBody>
+      </p:sp>
+      <p:sp>
+        <p:nvSpPr>
+          <p:cNvPr id="4" name="슬라이드 번호 개체 틀 6"/>
+          <p:cNvSpPr txBox="1">
+            <a:spLocks/>
+          </p:cNvSpPr>
+          <p:nvPr>
+            <p:ph type="sldNum" idx="5"/>
+          </p:nvPr>
+        </p:nvSpPr>
+        <p:spPr>
+          <a:xfrm rot="0">
+            <a:off x="3884930" y="8685530"/>
+            <a:ext cx="2976880" cy="463550"/>
           </a:xfrm>
           <a:prstGeom prst="rect"/>
         </p:spPr>
@@ -7319,7 +7462,7 @@
       </p:sp>
       <p:pic>
         <p:nvPicPr>
-          <p:cNvPr id="1042" name="그림 58"/>
+          <p:cNvPr id="1042" name="그림 58" descr="C:/Users/Admin1/AppData/Roaming/PolarisOffice/ETemp/16484_18744056/fImage850627641.png"/>
           <p:cNvPicPr>
             <a:picLocks noChangeAspect="1"/>
           </p:cNvPicPr>
@@ -7339,8 +7482,8 @@
         </p:blipFill>
         <p:spPr>
           <a:xfrm rot="0">
-            <a:off x="1472565" y="1279525"/>
-            <a:ext cx="2036445" cy="2835910"/>
+            <a:off x="1238885" y="1271270"/>
+            <a:ext cx="2469515" cy="2969260"/>
           </a:xfrm>
           <a:prstGeom prst="roundRect"/>
           <a:solidFill>
@@ -7358,8 +7501,8 @@
         </p:nvSpPr>
         <p:spPr>
           <a:xfrm rot="0">
-            <a:off x="1465580" y="4300220"/>
-            <a:ext cx="3888740" cy="1784985"/>
+            <a:off x="1230630" y="4383405"/>
+            <a:ext cx="4082415" cy="1784985"/>
           </a:xfrm>
           <a:prstGeom prst="rect"/>
           <a:noFill/>
@@ -7393,7 +7536,112 @@
                 <a:latin typeface="맑은 고딕" charset="0"/>
                 <a:ea typeface="맑은 고딕" charset="0"/>
               </a:rPr>
-              <a:t>빈 게임 오브젝트를 생성하고 이름을 Create Object로 정의합니다. </a:t>
+              <a:t>빈</a:t>
+            </a:r>
+            <a:r>
+              <a:rPr lang="ko-KR" sz="1800">
+                <a:latin typeface="맑은 고딕" charset="0"/>
+                <a:ea typeface="맑은 고딕" charset="0"/>
+              </a:rPr>
+              <a:t> </a:t>
+            </a:r>
+            <a:r>
+              <a:rPr lang="ko-KR" sz="1800">
+                <a:latin typeface="맑은 고딕" charset="0"/>
+                <a:ea typeface="맑은 고딕" charset="0"/>
+              </a:rPr>
+              <a:t>게임</a:t>
+            </a:r>
+            <a:r>
+              <a:rPr lang="ko-KR" sz="1800">
+                <a:latin typeface="맑은 고딕" charset="0"/>
+                <a:ea typeface="맑은 고딕" charset="0"/>
+              </a:rPr>
+              <a:t> </a:t>
+            </a:r>
+            <a:r>
+              <a:rPr lang="ko-KR" sz="1800">
+                <a:latin typeface="맑은 고딕" charset="0"/>
+                <a:ea typeface="맑은 고딕" charset="0"/>
+              </a:rPr>
+              <a:t>오브젝트를</a:t>
+            </a:r>
+            <a:r>
+              <a:rPr lang="ko-KR" sz="1800">
+                <a:latin typeface="맑은 고딕" charset="0"/>
+                <a:ea typeface="맑은 고딕" charset="0"/>
+              </a:rPr>
+              <a:t> </a:t>
+            </a:r>
+            <a:r>
+              <a:rPr lang="ko-KR" sz="1800">
+                <a:latin typeface="맑은 고딕" charset="0"/>
+                <a:ea typeface="맑은 고딕" charset="0"/>
+              </a:rPr>
+              <a:t>생성하고</a:t>
+            </a:r>
+            <a:r>
+              <a:rPr lang="ko-KR" sz="1800">
+                <a:latin typeface="맑은 고딕" charset="0"/>
+                <a:ea typeface="맑은 고딕" charset="0"/>
+              </a:rPr>
+              <a:t> </a:t>
+            </a:r>
+            <a:r>
+              <a:rPr lang="ko-KR" sz="1800">
+                <a:latin typeface="맑은 고딕" charset="0"/>
+                <a:ea typeface="맑은 고딕" charset="0"/>
+              </a:rPr>
+              <a:t>이름을</a:t>
+            </a:r>
+            <a:r>
+              <a:rPr lang="ko-KR" sz="1800">
+                <a:latin typeface="맑은 고딕" charset="0"/>
+                <a:ea typeface="맑은 고딕" charset="0"/>
+              </a:rPr>
+              <a:t> </a:t>
+            </a:r>
+            <a:r>
+              <a:rPr lang="ko-KR" sz="1800">
+                <a:latin typeface="맑은 고딕" charset="0"/>
+                <a:ea typeface="맑은 고딕" charset="0"/>
+              </a:rPr>
+              <a:t>Create</a:t>
+            </a:r>
+            <a:r>
+              <a:rPr lang="ko-KR" sz="1800">
+                <a:latin typeface="맑은 고딕" charset="0"/>
+                <a:ea typeface="맑은 고딕" charset="0"/>
+              </a:rPr>
+              <a:t> </a:t>
+            </a:r>
+            <a:r>
+              <a:rPr lang="ko-KR" sz="1800">
+                <a:latin typeface="맑은 고딕" charset="0"/>
+                <a:ea typeface="맑은 고딕" charset="0"/>
+              </a:rPr>
+              <a:t>Object로</a:t>
+            </a:r>
+            <a:r>
+              <a:rPr lang="ko-KR" sz="1800">
+                <a:latin typeface="맑은 고딕" charset="0"/>
+                <a:ea typeface="맑은 고딕" charset="0"/>
+              </a:rPr>
+              <a:t> </a:t>
+            </a:r>
+            <a:r>
+              <a:rPr lang="ko-KR" sz="1800">
+                <a:latin typeface="맑은 고딕" charset="0"/>
+                <a:ea typeface="맑은 고딕" charset="0"/>
+              </a:rPr>
+              <a:t>정의합니다.</a:t>
+            </a:r>
+            <a:r>
+              <a:rPr lang="ko-KR" sz="1800">
+                <a:latin typeface="맑은 고딕" charset="0"/>
+                <a:ea typeface="맑은 고딕" charset="0"/>
+              </a:rPr>
+              <a:t> </a:t>
             </a:r>
             <a:endParaRPr lang="ko-KR" altLang="en-US" sz="1800">
               <a:latin typeface="맑은 고딕" charset="0"/>
@@ -7431,7 +7679,7 @@
       </p:sp>
       <p:pic>
         <p:nvPicPr>
-          <p:cNvPr id="1045" name="그림 65"/>
+          <p:cNvPr id="1045" name="그림 65" descr="C:/Users/Admin1/AppData/Roaming/PolarisOffice/ETemp/16484_18744056/fImage28282796334.png"/>
           <p:cNvPicPr>
             <a:picLocks noChangeAspect="1"/>
           </p:cNvPicPr>
@@ -7451,8 +7699,8 @@
         </p:blipFill>
         <p:spPr>
           <a:xfrm rot="0">
-            <a:off x="4198620" y="3383280"/>
-            <a:ext cx="682625" cy="740410"/>
+            <a:off x="4273550" y="3508375"/>
+            <a:ext cx="683260" cy="741045"/>
           </a:xfrm>
           <a:prstGeom prst="roundRect"/>
           <a:solidFill>
@@ -7470,9 +7718,9 @@
           <p:nvPr/>
         </p:nvCxnSpPr>
         <p:spPr>
-          <a:xfrm rot="0" flipV="1">
-            <a:off x="4539615" y="2950845"/>
-            <a:ext cx="2540" cy="433070"/>
+          <a:xfrm rot="0" flipH="1" flipV="1">
+            <a:off x="4610100" y="3117215"/>
+            <a:ext cx="5080" cy="391795"/>
           </a:xfrm>
           <a:prstGeom prst="straightConnector1"/>
           <a:ln w="6350" cap="flat" cmpd="sng">
@@ -7497,17 +7745,17 @@
       </p:cxnSp>
       <p:pic>
         <p:nvPicPr>
-          <p:cNvPr id="1049" name="그림 1"/>
+          <p:cNvPr id="1049" name="그림 1" descr="C:/Users/Admin1/AppData/Roaming/PolarisOffice/ETemp/16484_18744056/fImage453129141.png"/>
           <p:cNvPicPr>
             <a:picLocks noChangeAspect="1"/>
           </p:cNvPicPr>
           <p:nvPr/>
         </p:nvPicPr>
         <p:blipFill rotWithShape="1">
-          <a:blip r:embed="rId8" cstate="print">
+          <a:blip r:embed="rId8" cstate="hqprint">
             <a:extLst>
               <a:ext uri="{28A0092B-C50C-407E-A947-70E740481C1C}">
-                <a14:useLocalDpi xmlns:a14="http://schemas.microsoft.com/office/drawing/2010/main" val="0"/>
+                <a14:useLocalDpi xmlns:a14="http://schemas.microsoft.com/office/drawing/2010/main"/>
               </a:ext>
             </a:extLst>
           </a:blip>
@@ -7517,8 +7765,8 @@
         </p:blipFill>
         <p:spPr>
           <a:xfrm rot="0">
-            <a:off x="3769995" y="1278890"/>
-            <a:ext cx="1543685" cy="1672590"/>
+            <a:off x="3907155" y="1278890"/>
+            <a:ext cx="1407160" cy="1838960"/>
           </a:xfrm>
           <a:prstGeom prst="roundRect"/>
           <a:solidFill>
@@ -7536,8 +7784,8 @@
         </p:nvSpPr>
         <p:spPr>
           <a:xfrm rot="0">
-            <a:off x="6817995" y="4297680"/>
-            <a:ext cx="4140835" cy="1784985"/>
+            <a:off x="6817995" y="4114800"/>
+            <a:ext cx="4141470" cy="2061845"/>
           </a:xfrm>
           <a:prstGeom prst="rect"/>
           <a:noFill/>
@@ -7581,21 +7829,7 @@
                 <a:latin typeface="맑은 고딕" charset="0"/>
                 <a:ea typeface="맑은 고딕" charset="0"/>
               </a:rPr>
-              <a:t>그다음 버튼을 생성하고 버튼</a:t>
-            </a:r>
-            <a:r>
-              <a:rPr lang="ko-KR" sz="1800">
-                <a:latin typeface="맑은 고딕" charset="0"/>
-                <a:ea typeface="맑은 고딕" charset="0"/>
-              </a:rPr>
-              <a:t>의 </a:t>
-            </a:r>
-            <a:r>
-              <a:rPr lang="ko-KR" sz="1800">
-                <a:latin typeface="맑은 고딕" charset="0"/>
-                <a:ea typeface="맑은 고딕" charset="0"/>
-              </a:rPr>
-              <a:t> 이름을 Generic Create Button으로 변경합니다.</a:t>
+              <a:t>그다음 버튼을 생성하고 버튼의  이름을 Generic Create Button으로 변경합니다.</a:t>
             </a:r>
             <a:endParaRPr lang="ko-KR" altLang="en-US" sz="1800">
               <a:latin typeface="맑은 고딕" charset="0"/>
@@ -7622,21 +7856,35 @@
                 <a:latin typeface="맑은 고딕" charset="0"/>
                 <a:ea typeface="맑은 고딕" charset="0"/>
               </a:rPr>
-              <a:t>그</a:t>
+              <a:t>그러고 나서 </a:t>
             </a:r>
             <a:r>
               <a:rPr lang="ko-KR" sz="1800">
                 <a:latin typeface="맑은 고딕" charset="0"/>
                 <a:ea typeface="맑은 고딕" charset="0"/>
               </a:rPr>
-              <a:t>런 다음</a:t>
+              <a:t>스크립트를 생성하고 </a:t>
             </a:r>
             <a:r>
               <a:rPr lang="ko-KR" sz="1800">
                 <a:latin typeface="맑은 고딕" charset="0"/>
                 <a:ea typeface="맑은 고딕" charset="0"/>
               </a:rPr>
-              <a:t> Generic Create Button의 하위 오브젝트 Text를 선택합니다.</a:t>
+              <a:t>Delete라는 이름으로 설정한 다음 </a:t>
+            </a:r>
+            <a:r>
+              <a:rPr lang="ko-KR" sz="1800">
+                <a:latin typeface="맑은 고딕" charset="0"/>
+                <a:ea typeface="맑은 고딕" charset="0"/>
+              </a:rPr>
+              <a:t>Generic Create Button</a:t>
+            </a:r>
+            <a:r>
+              <a:rPr lang="ko-KR" sz="1800">
+                <a:latin typeface="맑은 고딕" charset="0"/>
+                <a:ea typeface="맑은 고딕" charset="0"/>
+              </a:rPr>
+              <a:t>에 넣어줍니다.</a:t>
             </a:r>
             <a:endParaRPr lang="ko-KR" altLang="en-US" sz="1800">
               <a:latin typeface="맑은 고딕" charset="0"/>
@@ -7647,7 +7895,7 @@
       </p:sp>
       <p:pic>
         <p:nvPicPr>
-          <p:cNvPr id="1051" name="그림 2"/>
+          <p:cNvPr id="1051" name="그림 2" descr="C:/Users/Admin1/AppData/Roaming/PolarisOffice/ETemp/16484_18744056/fImage191383915447.png"/>
           <p:cNvPicPr>
             <a:picLocks noChangeAspect="1"/>
           </p:cNvPicPr>
@@ -7668,7 +7916,7 @@
         <p:spPr>
           <a:xfrm rot="0">
             <a:off x="6814820" y="1277620"/>
-            <a:ext cx="2265045" cy="2894965"/>
+            <a:ext cx="2554605" cy="2630170"/>
           </a:xfrm>
           <a:prstGeom prst="roundRect"/>
           <a:solidFill>
@@ -7678,17 +7926,17 @@
       </p:pic>
       <p:pic>
         <p:nvPicPr>
-          <p:cNvPr id="1052" name="그림 3"/>
+          <p:cNvPr id="1052" name="그림 1" descr="C:/Users/Admin1/AppData/Roaming/PolarisOffice/ETemp/16484_18744056/fImage729619141.png"/>
           <p:cNvPicPr>
             <a:picLocks noChangeAspect="1"/>
           </p:cNvPicPr>
           <p:nvPr/>
         </p:nvPicPr>
         <p:blipFill rotWithShape="1">
-          <a:blip r:embed="rId10" cstate="hqprint">
+          <a:blip r:embed="rId11" cstate="print">
             <a:extLst>
               <a:ext uri="{28A0092B-C50C-407E-A947-70E740481C1C}">
-                <a14:useLocalDpi xmlns:a14="http://schemas.microsoft.com/office/drawing/2010/main"/>
+                <a14:useLocalDpi xmlns:a14="http://schemas.microsoft.com/office/drawing/2010/main" val="0"/>
               </a:ext>
             </a:extLst>
           </a:blip>
@@ -7698,8 +7946,8 @@
         </p:blipFill>
         <p:spPr>
           <a:xfrm rot="0">
-            <a:off x="9326880" y="1770380"/>
-            <a:ext cx="1631315" cy="1922145"/>
+            <a:off x="9601835" y="1388110"/>
+            <a:ext cx="1351915" cy="1513840"/>
           </a:xfrm>
           <a:prstGeom prst="roundRect"/>
           <a:solidFill>
@@ -7707,6 +7955,72 @@
           </a:solidFill>
         </p:spPr>
       </p:pic>
+      <p:pic>
+        <p:nvPicPr>
+          <p:cNvPr id="1053" name="그림 4" descr="C:/Users/Admin1/AppData/Roaming/PolarisOffice/ETemp/16484_18744056/fImage19561928467.png"/>
+          <p:cNvPicPr>
+            <a:picLocks noChangeAspect="1"/>
+          </p:cNvPicPr>
+          <p:nvPr/>
+        </p:nvPicPr>
+        <p:blipFill rotWithShape="1">
+          <a:blip r:embed="rId12" cstate="print">
+            <a:extLst>
+              <a:ext uri="{28A0092B-C50C-407E-A947-70E740481C1C}">
+                <a14:useLocalDpi xmlns:a14="http://schemas.microsoft.com/office/drawing/2010/main" val="0"/>
+              </a:ext>
+            </a:extLst>
+          </a:blip>
+          <a:stretch>
+            <a:fillRect/>
+          </a:stretch>
+        </p:blipFill>
+        <p:spPr>
+          <a:xfrm rot="0">
+            <a:off x="9933940" y="3200400"/>
+            <a:ext cx="672465" cy="702945"/>
+          </a:xfrm>
+          <a:prstGeom prst="roundRect"/>
+          <a:solidFill>
+            <a:srgbClr val="EDEDED"/>
+          </a:solidFill>
+        </p:spPr>
+      </p:pic>
+      <p:cxnSp>
+        <p:nvCxnSpPr>
+          <p:cNvPr id="1054" name="도형 7"/>
+          <p:cNvCxnSpPr>
+            <a:stCxn id="1053" idx="0"/>
+          </p:cNvCxnSpPr>
+          <p:nvPr/>
+        </p:nvCxnSpPr>
+        <p:spPr>
+          <a:xfrm rot="0" flipH="1" flipV="1">
+            <a:off x="10266680" y="2543810"/>
+            <a:ext cx="3810" cy="657225"/>
+          </a:xfrm>
+          <a:prstGeom prst="straightConnector1"/>
+          <a:ln w="6350" cap="flat" cmpd="sng">
+            <a:prstDash/>
+            <a:headEnd type="none" w="med" len="med"/>
+            <a:tailEnd type="triangle" w="med" len="med"/>
+          </a:ln>
+        </p:spPr>
+        <p:style>
+          <a:lnRef idx="1">
+            <a:schemeClr val="accent1"/>
+          </a:lnRef>
+          <a:fillRef idx="0">
+            <a:schemeClr val="accent1"/>
+          </a:fillRef>
+          <a:effectRef idx="0">
+            <a:schemeClr val="accent1"/>
+          </a:effectRef>
+          <a:fontRef idx="minor">
+            <a:schemeClr val="tx1"/>
+          </a:fontRef>
+        </p:style>
+      </p:cxnSp>
     </p:spTree>
   </p:cSld>
   <p:clrMapOvr>
@@ -8027,7 +8341,7 @@
       </p:sp>
       <p:pic>
         <p:nvPicPr>
-          <p:cNvPr id="1091" name="그림 21" descr="C:/Users/Admin1/AppData/Roaming/PolarisOffice/ETemp/15256_19321368/fImage115561661478.png"/>
+          <p:cNvPr id="1091" name="그림 21"/>
           <p:cNvPicPr>
             <a:picLocks noChangeAspect="1"/>
           </p:cNvPicPr>
@@ -8058,7 +8372,7 @@
       </p:pic>
       <p:pic>
         <p:nvPicPr>
-          <p:cNvPr id="1092" name="그림 22" descr="C:/Users/Admin1/AppData/Roaming/PolarisOffice/ETemp/15256_19321368/fImage117931679358.png"/>
+          <p:cNvPr id="1092" name="그림 22"/>
           <p:cNvPicPr>
             <a:picLocks noChangeAspect="1"/>
           </p:cNvPicPr>
@@ -8089,7 +8403,7 @@
       </p:pic>
       <p:pic>
         <p:nvPicPr>
-          <p:cNvPr id="1093" name="그림 27" descr="C:/Users/Admin1/AppData/Roaming/PolarisOffice/ETemp/15256_19321368/fImage115291686962.png"/>
+          <p:cNvPr id="1093" name="그림 27"/>
           <p:cNvPicPr>
             <a:picLocks noChangeAspect="1"/>
           </p:cNvPicPr>
@@ -8120,7 +8434,7 @@
       </p:pic>
       <p:pic>
         <p:nvPicPr>
-          <p:cNvPr id="1094" name="그림 30" descr="C:/Users/Admin1/AppData/Roaming/PolarisOffice/ETemp/15256_19321368/fImage114661694464.png"/>
+          <p:cNvPr id="1094" name="그림 30"/>
           <p:cNvPicPr>
             <a:picLocks noChangeAspect="1"/>
           </p:cNvPicPr>
@@ -8151,7 +8465,7 @@
       </p:pic>
       <p:pic>
         <p:nvPicPr>
-          <p:cNvPr id="1095" name="그림 33" descr="C:/Users/Admin1/AppData/Roaming/PolarisOffice/ETemp/15256_19321368/fImage191281705705.png"/>
+          <p:cNvPr id="1095" name="그림 33"/>
           <p:cNvPicPr>
             <a:picLocks noChangeAspect="1"/>
           </p:cNvPicPr>
@@ -8182,7 +8496,7 @@
       </p:pic>
       <p:pic>
         <p:nvPicPr>
-          <p:cNvPr id="1096" name="그림 36" descr="C:/Users/Admin1/AppData/Roaming/PolarisOffice/ETemp/15256_19321368/fImage53011946962.png"/>
+          <p:cNvPr id="1096" name="그림 36"/>
           <p:cNvPicPr>
             <a:picLocks noChangeAspect="1"/>
           </p:cNvPicPr>
@@ -8268,7 +8582,7 @@
 </file>
 
 <file path=ppt/slides/slide11.xml><?xml version="1.0" encoding="utf-8"?>
-<p:sld xmlns:a="http://schemas.openxmlformats.org/drawingml/2006/main" xmlns:r="http://schemas.openxmlformats.org/officeDocument/2006/relationships" xmlns:p="http://schemas.openxmlformats.org/presentationml/2006/main">
+<p:sld xmlns:a="http://schemas.openxmlformats.org/drawingml/2006/main" xmlns:r="http://schemas.openxmlformats.org/officeDocument/2006/relationships" xmlns:p="http://schemas.openxmlformats.org/presentationml/2006/main" xmlns:p14="http://schemas.microsoft.com/office/powerpoint/2010/main">
   <p:cSld>
     <p:spTree>
       <p:nvGrpSpPr>
@@ -8512,7 +8826,7 @@
       </p:sp>
       <p:pic>
         <p:nvPicPr>
-          <p:cNvPr id="1096" name="Picture " descr="C:/Users/Admin1/AppData/Roaming/PolarisOffice/ETemp/15256_19321368/fImage53011946962.png"/>
+          <p:cNvPr id="1096" name="Picture "/>
           <p:cNvPicPr>
             <a:picLocks noChangeAspect="1"/>
           </p:cNvPicPr>
@@ -8543,7 +8857,7 @@
       </p:pic>
       <p:pic>
         <p:nvPicPr>
-          <p:cNvPr id="1098" name="그림 38" descr="C:/Users/Admin1/AppData/Roaming/PolarisOffice/ETemp/15256_19321368/fImage52902588145.png"/>
+          <p:cNvPr id="1098" name="그림 38"/>
           <p:cNvPicPr>
             <a:picLocks noChangeAspect="1"/>
           </p:cNvPicPr>
@@ -8574,7 +8888,7 @@
       </p:pic>
       <p:pic>
         <p:nvPicPr>
-          <p:cNvPr id="1099" name="그림 41" descr="C:/Users/Admin1/AppData/Roaming/PolarisOffice/ETemp/15256_19321368/fImage18932593281.png"/>
+          <p:cNvPr id="1099" name="그림 41"/>
           <p:cNvPicPr>
             <a:picLocks noChangeAspect="1"/>
           </p:cNvPicPr>
@@ -8605,7 +8919,7 @@
       </p:pic>
       <p:pic>
         <p:nvPicPr>
-          <p:cNvPr id="1100" name="그림 44" descr="C:/Users/Admin1/AppData/Roaming/PolarisOffice/ETemp/15256_19321368/fImage82892606827.png"/>
+          <p:cNvPr id="1100" name="그림 44"/>
           <p:cNvPicPr>
             <a:picLocks noChangeAspect="1"/>
           </p:cNvPicPr>
@@ -8636,7 +8950,7 @@
       </p:pic>
       <p:pic>
         <p:nvPicPr>
-          <p:cNvPr id="1101" name="그림 51" descr="C:/Users/Admin1/AppData/Roaming/PolarisOffice/ETemp/15256_19321368/fImage2242171995705.png"/>
+          <p:cNvPr id="1101" name="그림 51"/>
           <p:cNvPicPr>
             <a:picLocks noChangeAspect="1"/>
           </p:cNvPicPr>
@@ -8665,7 +8979,7 @@
       </p:pic>
       <p:pic>
         <p:nvPicPr>
-          <p:cNvPr id="1102" name="그림 54" descr="C:/Users/Admin1/AppData/Roaming/PolarisOffice/ETemp/15256_19321368/fImage258202649961.png"/>
+          <p:cNvPr id="1102" name="그림 54"/>
           <p:cNvPicPr>
             <a:picLocks noChangeAspect="1"/>
           </p:cNvPicPr>
@@ -8705,7 +9019,7 @@
         <p:spPr>
           <a:xfrm rot="0">
             <a:off x="6827520" y="3893820"/>
-            <a:ext cx="4135755" cy="2338705"/>
+            <a:ext cx="4136390" cy="2339340"/>
           </a:xfrm>
           <a:prstGeom prst="rect"/>
           <a:noFill/>
@@ -8749,21 +9063,7 @@
                 <a:latin typeface="맑은 고딕" charset="0"/>
                 <a:ea typeface="맑은 고딕" charset="0"/>
               </a:rPr>
-              <a:t>이제</a:t>
-            </a:r>
-            <a:r>
-              <a:rPr lang="ko-KR" sz="1800">
-                <a:latin typeface="맑은 고딕" charset="0"/>
-                <a:ea typeface="맑은 고딕" charset="0"/>
-              </a:rPr>
-              <a:t> </a:t>
-            </a:r>
-            <a:r>
-              <a:rPr lang="ko-KR" sz="1800">
-                <a:latin typeface="맑은 고딕" charset="0"/>
-                <a:ea typeface="맑은 고딕" charset="0"/>
-              </a:rPr>
-              <a:t>Delete 스크립트를 선택한 다음 Start( ) 함수 안에 게임 오브젝트를 파괴하는 함수를 선언합니다.</a:t>
+              <a:t>이제 Delete 스크립트를 선택한 다음 Start( ) 함수 안에 게임 오브젝트를 파괴하는 함수를 선언합니다.</a:t>
             </a:r>
             <a:endParaRPr lang="ko-KR" altLang="en-US" sz="1800">
               <a:latin typeface="맑은 고딕" charset="0"/>
@@ -8823,7 +9123,7 @@
 </file>
 
 <file path=ppt/slides/slide12.xml><?xml version="1.0" encoding="utf-8"?>
-<p:sld xmlns:a="http://schemas.openxmlformats.org/drawingml/2006/main" xmlns:r="http://schemas.openxmlformats.org/officeDocument/2006/relationships" xmlns:p="http://schemas.openxmlformats.org/presentationml/2006/main">
+<p:sld xmlns:a="http://schemas.openxmlformats.org/drawingml/2006/main" xmlns:r="http://schemas.openxmlformats.org/officeDocument/2006/relationships" xmlns:p="http://schemas.openxmlformats.org/presentationml/2006/main" xmlns:p14="http://schemas.microsoft.com/office/powerpoint/2010/main">
   <p:cSld>
     <p:spTree>
       <p:nvGrpSpPr>
@@ -8849,8 +9149,8 @@
         </p:nvSpPr>
         <p:spPr>
           <a:xfrm rot="0">
-            <a:off x="4500880" y="384175"/>
-            <a:ext cx="3189605" cy="554990"/>
+            <a:off x="5285740" y="509905"/>
+            <a:ext cx="1621790" cy="554990"/>
           </a:xfrm>
           <a:prstGeom prst="rect"/>
           <a:noFill/>
@@ -8877,17 +9177,7 @@
                 <a:latin typeface="맑은 고딕" charset="0"/>
                 <a:ea typeface="맑은 고딕" charset="0"/>
               </a:rPr>
-              <a:t>열</a:t>
-            </a:r>
-            <a:r>
-              <a:rPr lang="ko-KR" altLang="en-US" sz="3000" b="1">
-                <a:solidFill>
-                  <a:schemeClr val="tx1"/>
-                </a:solidFill>
-                <a:latin typeface="맑은 고딕" charset="0"/>
-                <a:ea typeface="맑은 고딕" charset="0"/>
-              </a:rPr>
-              <a:t> 번째 튜토리얼</a:t>
+              <a:t>Destory</a:t>
             </a:r>
             <a:endParaRPr lang="ko-KR" altLang="en-US" sz="3000" b="1">
               <a:solidFill>
@@ -8901,7 +9191,7 @@
       </p:sp>
       <p:sp>
         <p:nvSpPr>
-          <p:cNvPr id="1070" name="Rect 0"/>
+          <p:cNvPr id="1101" name="Rect 0"/>
           <p:cNvSpPr txBox="1">
             <a:spLocks/>
           </p:cNvSpPr>
@@ -8909,8 +9199,8 @@
         </p:nvSpPr>
         <p:spPr>
           <a:xfrm rot="0">
-            <a:off x="1222375" y="5276850"/>
-            <a:ext cx="4164330" cy="954405"/>
+            <a:off x="1047750" y="1619885"/>
+            <a:ext cx="4307840" cy="4246245"/>
           </a:xfrm>
           <a:prstGeom prst="rect"/>
           <a:noFill/>
@@ -8930,56 +9220,120 @@
               <a:buNone/>
             </a:pPr>
             <a:r>
-              <a:rPr lang="ko-KR" sz="2000" b="1">
-                <a:solidFill>
-                  <a:srgbClr val="0611F2"/>
-                </a:solidFill>
-                <a:latin typeface="맑은 고딕" charset="0"/>
-                <a:ea typeface="맑은 고딕" charset="0"/>
-              </a:rPr>
-              <a:t>23</a:t>
-            </a:r>
-            <a:r>
-              <a:rPr sz="2000" b="1">
-                <a:solidFill>
-                  <a:srgbClr val="0611F2"/>
-                </a:solidFill>
-                <a:latin typeface="맑은 고딕" charset="0"/>
-                <a:ea typeface="맑은 고딕" charset="0"/>
-              </a:rPr>
-              <a:t>. </a:t>
-            </a:r>
-            <a:r>
               <a:rPr lang="ko-KR" sz="1800">
                 <a:latin typeface="맑은 고딕" charset="0"/>
                 <a:ea typeface="맑은 고딕" charset="0"/>
               </a:rPr>
-              <a:t>그런 다음</a:t>
-            </a:r>
-            <a:r>
-              <a:rPr lang="ko-KR" sz="1800">
-                <a:latin typeface="맑은 고딕" charset="0"/>
-                <a:ea typeface="맑은 고딕" charset="0"/>
-              </a:rPr>
-              <a:t> </a:t>
-            </a:r>
-            <a:r>
-              <a:rPr lang="ko-KR" sz="1800">
-                <a:latin typeface="맑은 고딕" charset="0"/>
-                <a:ea typeface="맑은 고딕" charset="0"/>
-              </a:rPr>
-              <a:t>Projcet 폴더에 있는 Materials 폴더에 Tile Material을 Plane 게임 오브젝트에 넣어줍니다.</a:t>
+              <a:t>Destroy( ) 함수는 게임 오브젝트를 파괴하는 함수입니다.</a:t>
             </a:r>
             <a:endParaRPr lang="ko-KR" altLang="en-US" sz="1800">
               <a:latin typeface="맑은 고딕" charset="0"/>
               <a:ea typeface="맑은 고딕" charset="0"/>
             </a:endParaRPr>
           </a:p>
-        </p:txBody>
-      </p:sp>
-      <p:sp>
-        <p:nvSpPr>
-          <p:cNvPr id="1090" name="Rect 0"/>
+          <a:p>
+            <a:pPr marL="0" indent="0" algn="l" latinLnBrk="0" hangingPunct="1">
+              <a:buFontTx/>
+              <a:buNone/>
+            </a:pPr>
+            <a:endParaRPr lang="ko-KR" altLang="en-US" sz="1800">
+              <a:latin typeface="맑은 고딕" charset="0"/>
+              <a:ea typeface="맑은 고딕" charset="0"/>
+            </a:endParaRPr>
+          </a:p>
+          <a:p>
+            <a:pPr marL="0" indent="0" algn="l" latinLnBrk="0" hangingPunct="1">
+              <a:buFontTx/>
+              <a:buNone/>
+            </a:pPr>
+            <a:r>
+              <a:rPr lang="ko-KR" sz="1800">
+                <a:latin typeface="맑은 고딕" charset="0"/>
+                <a:ea typeface="맑은 고딕" charset="0"/>
+              </a:rPr>
+              <a:t>일정 시간을 설정하고 일정 시간 후에 파괴할 수 있도록 설정할 수도 있습니다.</a:t>
+            </a:r>
+            <a:endParaRPr lang="ko-KR" altLang="en-US" sz="1800">
+              <a:latin typeface="맑은 고딕" charset="0"/>
+              <a:ea typeface="맑은 고딕" charset="0"/>
+            </a:endParaRPr>
+          </a:p>
+          <a:p>
+            <a:pPr marL="0" indent="0" algn="l" latinLnBrk="0" hangingPunct="1">
+              <a:buFontTx/>
+              <a:buNone/>
+            </a:pPr>
+            <a:endParaRPr lang="ko-KR" altLang="en-US" sz="1800">
+              <a:latin typeface="맑은 고딕" charset="0"/>
+              <a:ea typeface="맑은 고딕" charset="0"/>
+            </a:endParaRPr>
+          </a:p>
+          <a:p>
+            <a:pPr marL="0" indent="0" algn="l" latinLnBrk="0" hangingPunct="1">
+              <a:buFontTx/>
+              <a:buNone/>
+            </a:pPr>
+            <a:r>
+              <a:rPr lang="ko-KR" sz="1800">
+                <a:latin typeface="맑은 고딕" charset="0"/>
+                <a:ea typeface="맑은 고딕" charset="0"/>
+              </a:rPr>
+              <a:t>게임 오브젝트가 메모리에서 해제되면 Object의 == 연산자 오버로딩으로 인하여 해제된 객체를 확인할 수 있습니다.</a:t>
+            </a:r>
+            <a:endParaRPr lang="ko-KR" altLang="en-US" sz="1800">
+              <a:latin typeface="맑은 고딕" charset="0"/>
+              <a:ea typeface="맑은 고딕" charset="0"/>
+            </a:endParaRPr>
+          </a:p>
+          <a:p>
+            <a:pPr marL="0" indent="0" algn="l" latinLnBrk="0" hangingPunct="1">
+              <a:buFontTx/>
+              <a:buNone/>
+            </a:pPr>
+            <a:endParaRPr lang="ko-KR" altLang="en-US" sz="1800">
+              <a:latin typeface="맑은 고딕" charset="0"/>
+              <a:ea typeface="맑은 고딕" charset="0"/>
+            </a:endParaRPr>
+          </a:p>
+          <a:p>
+            <a:pPr marL="0" indent="0" algn="l" latinLnBrk="0" hangingPunct="1">
+              <a:buFontTx/>
+              <a:buNone/>
+            </a:pPr>
+            <a:r>
+              <a:rPr lang="ko-KR" sz="1800">
+                <a:latin typeface="맑은 고딕" charset="0"/>
+                <a:ea typeface="맑은 고딕" charset="0"/>
+              </a:rPr>
+              <a:t>객체가 메모리에서 해제되었을 때</a:t>
+            </a:r>
+            <a:endParaRPr lang="ko-KR" altLang="en-US" sz="1800">
+              <a:latin typeface="맑은 고딕" charset="0"/>
+              <a:ea typeface="맑은 고딕" charset="0"/>
+            </a:endParaRPr>
+          </a:p>
+          <a:p>
+            <a:pPr marL="0" indent="0" algn="l" latinLnBrk="0" hangingPunct="1">
+              <a:buFontTx/>
+              <a:buNone/>
+            </a:pPr>
+            <a:r>
+              <a:rPr lang="ko-KR" sz="1800">
+                <a:latin typeface="맑은 고딕" charset="0"/>
+                <a:ea typeface="맑은 고딕" charset="0"/>
+              </a:rPr>
+              <a:t>객체를 참조하는 참조 변수들은 허상 포인터가 되지 않도록 null을 가리키도록 설정합니다.</a:t>
+            </a:r>
+            <a:endParaRPr lang="ko-KR" altLang="en-US" sz="1800">
+              <a:latin typeface="맑은 고딕" charset="0"/>
+              <a:ea typeface="맑은 고딕" charset="0"/>
+            </a:endParaRPr>
+          </a:p>
+        </p:txBody>
+      </p:sp>
+      <p:sp>
+        <p:nvSpPr>
+          <p:cNvPr id="1109" name="텍스트 상자 11"/>
           <p:cNvSpPr txBox="1">
             <a:spLocks/>
           </p:cNvSpPr>
@@ -8987,8 +9341,8 @@
         </p:nvSpPr>
         <p:spPr>
           <a:xfrm rot="0">
-            <a:off x="1220470" y="3073400"/>
-            <a:ext cx="4166235" cy="647065"/>
+            <a:off x="6817360" y="4394200"/>
+            <a:ext cx="4145915" cy="1478280"/>
           </a:xfrm>
           <a:prstGeom prst="rect"/>
           <a:noFill/>
@@ -8998,48 +9352,21 @@
           </a:ln>
         </p:spPr>
         <p:txBody>
-          <a:bodyPr wrap="square" lIns="89535" tIns="46355" rIns="89535" bIns="46355" vert="horz" anchor="t">
+          <a:bodyPr wrap="square" lIns="89535" tIns="46355" rIns="89535" bIns="46355" numCol="1" vert="horz" anchor="t">
             <a:spAutoFit/>
           </a:bodyPr>
           <a:lstStyle/>
           <a:p>
-            <a:pPr marL="0" indent="0" rtl="0" algn="l" defTabSz="914400" eaLnBrk="1" latinLnBrk="0" hangingPunct="1">
-              <a:buFontTx/>
-              <a:buNone/>
-            </a:pPr>
-            <a:r>
-              <a:rPr lang="ko-KR" sz="1800" b="1">
-                <a:solidFill>
-                  <a:srgbClr val="0611F2"/>
-                </a:solidFill>
-                <a:latin typeface="맑은 고딕" charset="0"/>
-                <a:ea typeface="맑은 고딕" charset="0"/>
-              </a:rPr>
-              <a:t>22</a:t>
-            </a:r>
-            <a:r>
-              <a:rPr sz="1800" b="1">
-                <a:solidFill>
-                  <a:srgbClr val="0611F2"/>
-                </a:solidFill>
-                <a:latin typeface="맑은 고딕" charset="0"/>
-                <a:ea typeface="맑은 고딕" charset="0"/>
-              </a:rPr>
-              <a:t>.</a:t>
-            </a:r>
-            <a:r>
-              <a:rPr sz="1800">
-                <a:latin typeface="맑은 고딕" charset="0"/>
-                <a:ea typeface="맑은 고딕" charset="0"/>
-              </a:rPr>
-              <a:t> </a:t>
-            </a:r>
+            <a:pPr marL="0" indent="0" algn="l" latinLnBrk="0" hangingPunct="1">
+              <a:buFontTx/>
+              <a:buNone/>
+            </a:pPr>
             <a:r>
               <a:rPr lang="ko-KR" sz="1800">
                 <a:latin typeface="맑은 고딕" charset="0"/>
                 <a:ea typeface="맑은 고딕" charset="0"/>
               </a:rPr>
-              <a:t>그다음 Main Camera 오브젝트의 위치와 회전 값을 설정합니다.</a:t>
+              <a:t>Destroy( ) 함수로 게임 오브젝트를 파괴했을 때 C++ nativeObject는 메모리에서 해제되며, C# UnityEngine.Object는 객체이기 때문에 해제되지 않습니다.</a:t>
             </a:r>
             <a:endParaRPr lang="ko-KR" altLang="en-US" sz="1800">
               <a:latin typeface="맑은 고딕" charset="0"/>
@@ -9050,17 +9377,17 @@
       </p:sp>
       <p:pic>
         <p:nvPicPr>
-          <p:cNvPr id="1104" name="그림 58" descr="C:/Users/Admin1/AppData/Roaming/PolarisOffice/ETemp/15256_19321368/fImage12239279491.png"/>
+          <p:cNvPr id="1110" name="그림 24"/>
           <p:cNvPicPr>
             <a:picLocks noChangeAspect="1"/>
           </p:cNvPicPr>
           <p:nvPr/>
         </p:nvPicPr>
         <p:blipFill rotWithShape="1">
-          <a:blip r:embed="rId2" cstate="print">
+          <a:blip r:embed="rId12" cstate="hqprint">
             <a:extLst>
               <a:ext uri="{28A0092B-C50C-407E-A947-70E740481C1C}">
-                <a14:useLocalDpi xmlns:a14="http://schemas.microsoft.com/office/drawing/2010/main" val="0"/>
+                <a14:useLocalDpi xmlns:a14="http://schemas.microsoft.com/office/drawing/2010/main"/>
               </a:ext>
             </a:extLst>
           </a:blip>
@@ -9070,8 +9397,8 @@
         </p:blipFill>
         <p:spPr>
           <a:xfrm rot="0">
-            <a:off x="1238250" y="1445895"/>
-            <a:ext cx="4157345" cy="1507490"/>
+            <a:off x="6816725" y="1612265"/>
+            <a:ext cx="4141470" cy="2635250"/>
           </a:xfrm>
           <a:prstGeom prst="roundRect"/>
           <a:solidFill>
@@ -9079,101 +9406,6 @@
           </a:solidFill>
         </p:spPr>
       </p:pic>
-      <p:pic>
-        <p:nvPicPr>
-          <p:cNvPr id="1105" name="그림 61" descr="C:/Users/Admin1/AppData/Roaming/PolarisOffice/ETemp/15256_19321368/fImage90722802995.png"/>
-          <p:cNvPicPr>
-            <a:picLocks noChangeAspect="1"/>
-          </p:cNvPicPr>
-          <p:nvPr/>
-        </p:nvPicPr>
-        <p:blipFill rotWithShape="1">
-          <a:blip r:embed="rId3" cstate="print">
-            <a:extLst>
-              <a:ext uri="{28A0092B-C50C-407E-A947-70E740481C1C}">
-                <a14:useLocalDpi xmlns:a14="http://schemas.microsoft.com/office/drawing/2010/main" val="0"/>
-              </a:ext>
-            </a:extLst>
-          </a:blip>
-          <a:stretch>
-            <a:fillRect/>
-          </a:stretch>
-        </p:blipFill>
-        <p:spPr>
-          <a:xfrm rot="0">
-            <a:off x="1214120" y="3851910"/>
-            <a:ext cx="1488440" cy="1335405"/>
-          </a:xfrm>
-          <a:prstGeom prst="roundRect"/>
-          <a:solidFill>
-            <a:srgbClr val="EDEDED"/>
-          </a:solidFill>
-        </p:spPr>
-      </p:pic>
-      <p:pic>
-        <p:nvPicPr>
-          <p:cNvPr id="1106" name="그림 64" descr="C:/Users/Admin1/AppData/Roaming/PolarisOffice/ETemp/15256_19321368/fImage145102811942.png"/>
-          <p:cNvPicPr>
-            <a:picLocks noChangeAspect="1"/>
-          </p:cNvPicPr>
-          <p:nvPr/>
-        </p:nvPicPr>
-        <p:blipFill rotWithShape="1">
-          <a:blip r:embed="rId4" cstate="print">
-            <a:extLst>
-              <a:ext uri="{28A0092B-C50C-407E-A947-70E740481C1C}">
-                <a14:useLocalDpi xmlns:a14="http://schemas.microsoft.com/office/drawing/2010/main" val="0"/>
-              </a:ext>
-            </a:extLst>
-          </a:blip>
-          <a:stretch>
-            <a:fillRect/>
-          </a:stretch>
-        </p:blipFill>
-        <p:spPr>
-          <a:xfrm rot="0">
-            <a:off x="2823210" y="3844925"/>
-            <a:ext cx="2563495" cy="1334135"/>
-          </a:xfrm>
-          <a:prstGeom prst="roundRect"/>
-          <a:solidFill>
-            <a:srgbClr val="EDEDED"/>
-          </a:solidFill>
-        </p:spPr>
-      </p:pic>
-      <p:cxnSp>
-        <p:nvCxnSpPr>
-          <p:cNvPr id="1107" name="도형 67"/>
-          <p:cNvCxnSpPr/>
-          <p:nvPr/>
-        </p:nvCxnSpPr>
-        <p:spPr>
-          <a:xfrm rot="0" flipH="1">
-            <a:off x="1835785" y="4572000"/>
-            <a:ext cx="1715135" cy="113030"/>
-          </a:xfrm>
-          <a:prstGeom prst="straightConnector1"/>
-          <a:ln w="6350" cap="flat" cmpd="sng">
-            <a:prstDash/>
-            <a:headEnd type="none" w="med" len="med"/>
-            <a:tailEnd type="triangle" w="med" len="med"/>
-          </a:ln>
-        </p:spPr>
-        <p:style>
-          <a:lnRef idx="1">
-            <a:schemeClr val="accent1"/>
-          </a:lnRef>
-          <a:fillRef idx="0">
-            <a:schemeClr val="accent1"/>
-          </a:fillRef>
-          <a:effectRef idx="0">
-            <a:schemeClr val="accent1"/>
-          </a:effectRef>
-          <a:fontRef idx="minor">
-            <a:schemeClr val="tx1"/>
-          </a:fontRef>
-        </p:style>
-      </p:cxnSp>
     </p:spTree>
   </p:cSld>
   <p:clrMapOvr>
@@ -9224,8 +9456,8 @@
         </p:nvSpPr>
         <p:spPr>
           <a:xfrm rot="0">
-            <a:off x="5285740" y="509905"/>
-            <a:ext cx="1621790" cy="554990"/>
+            <a:off x="4500880" y="384175"/>
+            <a:ext cx="3189605" cy="554990"/>
           </a:xfrm>
           <a:prstGeom prst="rect"/>
           <a:noFill/>
@@ -9252,7 +9484,17 @@
                 <a:latin typeface="맑은 고딕" charset="0"/>
                 <a:ea typeface="맑은 고딕" charset="0"/>
               </a:rPr>
-              <a:t>Destory</a:t>
+              <a:t>열</a:t>
+            </a:r>
+            <a:r>
+              <a:rPr lang="ko-KR" altLang="en-US" sz="3000" b="1">
+                <a:solidFill>
+                  <a:schemeClr val="tx1"/>
+                </a:solidFill>
+                <a:latin typeface="맑은 고딕" charset="0"/>
+                <a:ea typeface="맑은 고딕" charset="0"/>
+              </a:rPr>
+              <a:t> 번째 튜토리얼</a:t>
             </a:r>
             <a:endParaRPr lang="ko-KR" altLang="en-US" sz="3000" b="1">
               <a:solidFill>
@@ -9266,7 +9508,7 @@
       </p:sp>
       <p:sp>
         <p:nvSpPr>
-          <p:cNvPr id="1101" name="Rect 0"/>
+          <p:cNvPr id="1070" name="Rect 0"/>
           <p:cNvSpPr txBox="1">
             <a:spLocks/>
           </p:cNvSpPr>
@@ -9274,8 +9516,8 @@
         </p:nvSpPr>
         <p:spPr>
           <a:xfrm rot="0">
-            <a:off x="1047750" y="1619885"/>
-            <a:ext cx="4307840" cy="4246245"/>
+            <a:off x="1222375" y="5276850"/>
+            <a:ext cx="4164330" cy="954405"/>
           </a:xfrm>
           <a:prstGeom prst="rect"/>
           <a:noFill/>
@@ -9295,120 +9537,56 @@
               <a:buNone/>
             </a:pPr>
             <a:r>
+              <a:rPr lang="ko-KR" sz="2000" b="1">
+                <a:solidFill>
+                  <a:srgbClr val="0611F2"/>
+                </a:solidFill>
+                <a:latin typeface="맑은 고딕" charset="0"/>
+                <a:ea typeface="맑은 고딕" charset="0"/>
+              </a:rPr>
+              <a:t>23</a:t>
+            </a:r>
+            <a:r>
+              <a:rPr sz="2000" b="1">
+                <a:solidFill>
+                  <a:srgbClr val="0611F2"/>
+                </a:solidFill>
+                <a:latin typeface="맑은 고딕" charset="0"/>
+                <a:ea typeface="맑은 고딕" charset="0"/>
+              </a:rPr>
+              <a:t>. </a:t>
+            </a:r>
+            <a:r>
               <a:rPr lang="ko-KR" sz="1800">
                 <a:latin typeface="맑은 고딕" charset="0"/>
                 <a:ea typeface="맑은 고딕" charset="0"/>
               </a:rPr>
-              <a:t>Destroy( ) 함수는 게임 오브젝트를 파괴하는 함수입니다.</a:t>
+              <a:t>그런 다음</a:t>
+            </a:r>
+            <a:r>
+              <a:rPr lang="ko-KR" sz="1800">
+                <a:latin typeface="맑은 고딕" charset="0"/>
+                <a:ea typeface="맑은 고딕" charset="0"/>
+              </a:rPr>
+              <a:t> </a:t>
+            </a:r>
+            <a:r>
+              <a:rPr lang="ko-KR" sz="1800">
+                <a:latin typeface="맑은 고딕" charset="0"/>
+                <a:ea typeface="맑은 고딕" charset="0"/>
+              </a:rPr>
+              <a:t>Projcet 폴더에 있는 Materials 폴더에 Tile Material을 Plane 게임 오브젝트에 넣어줍니다.</a:t>
             </a:r>
             <a:endParaRPr lang="ko-KR" altLang="en-US" sz="1800">
               <a:latin typeface="맑은 고딕" charset="0"/>
               <a:ea typeface="맑은 고딕" charset="0"/>
             </a:endParaRPr>
           </a:p>
-          <a:p>
-            <a:pPr marL="0" indent="0" algn="l" latinLnBrk="0" hangingPunct="1">
-              <a:buFontTx/>
-              <a:buNone/>
-            </a:pPr>
-            <a:endParaRPr lang="ko-KR" altLang="en-US" sz="1800">
-              <a:latin typeface="맑은 고딕" charset="0"/>
-              <a:ea typeface="맑은 고딕" charset="0"/>
-            </a:endParaRPr>
-          </a:p>
-          <a:p>
-            <a:pPr marL="0" indent="0" algn="l" latinLnBrk="0" hangingPunct="1">
-              <a:buFontTx/>
-              <a:buNone/>
-            </a:pPr>
-            <a:r>
-              <a:rPr lang="ko-KR" sz="1800">
-                <a:latin typeface="맑은 고딕" charset="0"/>
-                <a:ea typeface="맑은 고딕" charset="0"/>
-              </a:rPr>
-              <a:t>일정 시간을 설정하고 일정 시간 후에 파괴할 수 있도록 설정할 수도 있습니다.</a:t>
-            </a:r>
-            <a:endParaRPr lang="ko-KR" altLang="en-US" sz="1800">
-              <a:latin typeface="맑은 고딕" charset="0"/>
-              <a:ea typeface="맑은 고딕" charset="0"/>
-            </a:endParaRPr>
-          </a:p>
-          <a:p>
-            <a:pPr marL="0" indent="0" algn="l" latinLnBrk="0" hangingPunct="1">
-              <a:buFontTx/>
-              <a:buNone/>
-            </a:pPr>
-            <a:endParaRPr lang="ko-KR" altLang="en-US" sz="1800">
-              <a:latin typeface="맑은 고딕" charset="0"/>
-              <a:ea typeface="맑은 고딕" charset="0"/>
-            </a:endParaRPr>
-          </a:p>
-          <a:p>
-            <a:pPr marL="0" indent="0" algn="l" latinLnBrk="0" hangingPunct="1">
-              <a:buFontTx/>
-              <a:buNone/>
-            </a:pPr>
-            <a:r>
-              <a:rPr lang="ko-KR" sz="1800">
-                <a:latin typeface="맑은 고딕" charset="0"/>
-                <a:ea typeface="맑은 고딕" charset="0"/>
-              </a:rPr>
-              <a:t>게임 오브젝트가 메모리에서 해제되면 Object의 == 연산자 오버로딩으로 인하여 해제된 객체를 확인할 수 있습니다.</a:t>
-            </a:r>
-            <a:endParaRPr lang="ko-KR" altLang="en-US" sz="1800">
-              <a:latin typeface="맑은 고딕" charset="0"/>
-              <a:ea typeface="맑은 고딕" charset="0"/>
-            </a:endParaRPr>
-          </a:p>
-          <a:p>
-            <a:pPr marL="0" indent="0" algn="l" latinLnBrk="0" hangingPunct="1">
-              <a:buFontTx/>
-              <a:buNone/>
-            </a:pPr>
-            <a:endParaRPr lang="ko-KR" altLang="en-US" sz="1800">
-              <a:latin typeface="맑은 고딕" charset="0"/>
-              <a:ea typeface="맑은 고딕" charset="0"/>
-            </a:endParaRPr>
-          </a:p>
-          <a:p>
-            <a:pPr marL="0" indent="0" algn="l" latinLnBrk="0" hangingPunct="1">
-              <a:buFontTx/>
-              <a:buNone/>
-            </a:pPr>
-            <a:r>
-              <a:rPr lang="ko-KR" sz="1800">
-                <a:latin typeface="맑은 고딕" charset="0"/>
-                <a:ea typeface="맑은 고딕" charset="0"/>
-              </a:rPr>
-              <a:t>객체가 메모리에서 해제되었을 때</a:t>
-            </a:r>
-            <a:endParaRPr lang="ko-KR" altLang="en-US" sz="1800">
-              <a:latin typeface="맑은 고딕" charset="0"/>
-              <a:ea typeface="맑은 고딕" charset="0"/>
-            </a:endParaRPr>
-          </a:p>
-          <a:p>
-            <a:pPr marL="0" indent="0" algn="l" latinLnBrk="0" hangingPunct="1">
-              <a:buFontTx/>
-              <a:buNone/>
-            </a:pPr>
-            <a:r>
-              <a:rPr lang="ko-KR" sz="1800">
-                <a:latin typeface="맑은 고딕" charset="0"/>
-                <a:ea typeface="맑은 고딕" charset="0"/>
-              </a:rPr>
-              <a:t>객체를 참조하는 참조 변수들은 허상 포인터가 되지 않도록 null을 가리키도록 설정합니다.</a:t>
-            </a:r>
-            <a:endParaRPr lang="ko-KR" altLang="en-US" sz="1800">
-              <a:latin typeface="맑은 고딕" charset="0"/>
-              <a:ea typeface="맑은 고딕" charset="0"/>
-            </a:endParaRPr>
-          </a:p>
-        </p:txBody>
-      </p:sp>
-      <p:sp>
-        <p:nvSpPr>
-          <p:cNvPr id="1109" name="텍스트 상자 11"/>
+        </p:txBody>
+      </p:sp>
+      <p:sp>
+        <p:nvSpPr>
+          <p:cNvPr id="1090" name="Rect 0"/>
           <p:cNvSpPr txBox="1">
             <a:spLocks/>
           </p:cNvSpPr>
@@ -9416,8 +9594,8 @@
         </p:nvSpPr>
         <p:spPr>
           <a:xfrm rot="0">
-            <a:off x="6817360" y="4385945"/>
-            <a:ext cx="4145280" cy="1477645"/>
+            <a:off x="1220470" y="3073400"/>
+            <a:ext cx="4166235" cy="647065"/>
           </a:xfrm>
           <a:prstGeom prst="rect"/>
           <a:noFill/>
@@ -9427,28 +9605,48 @@
           </a:ln>
         </p:spPr>
         <p:txBody>
-          <a:bodyPr wrap="square" lIns="89535" tIns="46355" rIns="89535" bIns="46355" numCol="1" vert="horz" anchor="t">
+          <a:bodyPr wrap="square" lIns="89535" tIns="46355" rIns="89535" bIns="46355" vert="horz" anchor="t">
             <a:spAutoFit/>
           </a:bodyPr>
           <a:lstStyle/>
           <a:p>
-            <a:pPr marL="0" indent="0" algn="l" latinLnBrk="0" hangingPunct="1">
-              <a:buFontTx/>
-              <a:buNone/>
-            </a:pPr>
+            <a:pPr marL="0" indent="0" rtl="0" algn="l" defTabSz="914400" eaLnBrk="1" latinLnBrk="0" hangingPunct="1">
+              <a:buFontTx/>
+              <a:buNone/>
+            </a:pPr>
+            <a:r>
+              <a:rPr lang="ko-KR" sz="1800" b="1">
+                <a:solidFill>
+                  <a:srgbClr val="0611F2"/>
+                </a:solidFill>
+                <a:latin typeface="맑은 고딕" charset="0"/>
+                <a:ea typeface="맑은 고딕" charset="0"/>
+              </a:rPr>
+              <a:t>22</a:t>
+            </a:r>
+            <a:r>
+              <a:rPr sz="1800" b="1">
+                <a:solidFill>
+                  <a:srgbClr val="0611F2"/>
+                </a:solidFill>
+                <a:latin typeface="맑은 고딕" charset="0"/>
+                <a:ea typeface="맑은 고딕" charset="0"/>
+              </a:rPr>
+              <a:t>.</a:t>
+            </a:r>
+            <a:r>
+              <a:rPr sz="1800">
+                <a:latin typeface="맑은 고딕" charset="0"/>
+                <a:ea typeface="맑은 고딕" charset="0"/>
+              </a:rPr>
+              <a:t> </a:t>
+            </a:r>
             <a:r>
               <a:rPr lang="ko-KR" sz="1800">
                 <a:latin typeface="맑은 고딕" charset="0"/>
                 <a:ea typeface="맑은 고딕" charset="0"/>
               </a:rPr>
-              <a:t>Destroy( ) 함수로 게임 오브젝트를 </a:t>
-            </a:r>
-            <a:r>
-              <a:rPr lang="ko-KR" sz="1800">
-                <a:latin typeface="맑은 고딕" charset="0"/>
-                <a:ea typeface="맑은 고딕" charset="0"/>
-              </a:rPr>
-              <a:t>파괴했을 때 C++ nativeObject는 메모리에서 해제되며, C# UnityEngine.Object는 객체이기 때문에 해제되지 않습니다.</a:t>
+              <a:t>그다음 Main Camera 오브젝트의 위치와 회전 값을 설정합니다.</a:t>
             </a:r>
             <a:endParaRPr lang="ko-KR" altLang="en-US" sz="1800">
               <a:latin typeface="맑은 고딕" charset="0"/>
@@ -9459,14 +9657,14 @@
       </p:sp>
       <p:pic>
         <p:nvPicPr>
-          <p:cNvPr id="1110" name="그림 24"/>
+          <p:cNvPr id="1104" name="그림 58" descr="C:/Users/Admin1/AppData/Roaming/PolarisOffice/ETemp/16484_18744056/fImage12239279491.png"/>
           <p:cNvPicPr>
             <a:picLocks noChangeAspect="1"/>
           </p:cNvPicPr>
           <p:nvPr/>
         </p:nvPicPr>
         <p:blipFill rotWithShape="1">
-          <a:blip r:embed="rId12" cstate="hqprint">
+          <a:blip r:embed="rId2" cstate="hqprint">
             <a:extLst>
               <a:ext uri="{28A0092B-C50C-407E-A947-70E740481C1C}">
                 <a14:useLocalDpi xmlns:a14="http://schemas.microsoft.com/office/drawing/2010/main"/>
@@ -9479,8 +9677,571 @@
         </p:blipFill>
         <p:spPr>
           <a:xfrm rot="0">
-            <a:off x="6816725" y="1612265"/>
-            <a:ext cx="4141470" cy="2635250"/>
+            <a:off x="1230630" y="1445895"/>
+            <a:ext cx="4165600" cy="1508125"/>
+          </a:xfrm>
+          <a:prstGeom prst="roundRect"/>
+          <a:solidFill>
+            <a:srgbClr val="EDEDED"/>
+          </a:solidFill>
+        </p:spPr>
+      </p:pic>
+      <p:pic>
+        <p:nvPicPr>
+          <p:cNvPr id="1105" name="그림 61"/>
+          <p:cNvPicPr>
+            <a:picLocks noChangeAspect="1"/>
+          </p:cNvPicPr>
+          <p:nvPr/>
+        </p:nvPicPr>
+        <p:blipFill rotWithShape="1">
+          <a:blip r:embed="rId3" cstate="print">
+            <a:extLst>
+              <a:ext uri="{28A0092B-C50C-407E-A947-70E740481C1C}">
+                <a14:useLocalDpi xmlns:a14="http://schemas.microsoft.com/office/drawing/2010/main" val="0"/>
+              </a:ext>
+            </a:extLst>
+          </a:blip>
+          <a:stretch>
+            <a:fillRect/>
+          </a:stretch>
+        </p:blipFill>
+        <p:spPr>
+          <a:xfrm rot="0">
+            <a:off x="1214120" y="3851910"/>
+            <a:ext cx="1488440" cy="1335405"/>
+          </a:xfrm>
+          <a:prstGeom prst="roundRect"/>
+          <a:solidFill>
+            <a:srgbClr val="EDEDED"/>
+          </a:solidFill>
+        </p:spPr>
+      </p:pic>
+      <p:pic>
+        <p:nvPicPr>
+          <p:cNvPr id="1106" name="그림 64"/>
+          <p:cNvPicPr>
+            <a:picLocks noChangeAspect="1"/>
+          </p:cNvPicPr>
+          <p:nvPr/>
+        </p:nvPicPr>
+        <p:blipFill rotWithShape="1">
+          <a:blip r:embed="rId4" cstate="print">
+            <a:extLst>
+              <a:ext uri="{28A0092B-C50C-407E-A947-70E740481C1C}">
+                <a14:useLocalDpi xmlns:a14="http://schemas.microsoft.com/office/drawing/2010/main" val="0"/>
+              </a:ext>
+            </a:extLst>
+          </a:blip>
+          <a:stretch>
+            <a:fillRect/>
+          </a:stretch>
+        </p:blipFill>
+        <p:spPr>
+          <a:xfrm rot="0">
+            <a:off x="2823210" y="3844925"/>
+            <a:ext cx="2563495" cy="1334135"/>
+          </a:xfrm>
+          <a:prstGeom prst="roundRect"/>
+          <a:solidFill>
+            <a:srgbClr val="EDEDED"/>
+          </a:solidFill>
+        </p:spPr>
+      </p:pic>
+      <p:cxnSp>
+        <p:nvCxnSpPr>
+          <p:cNvPr id="1107" name="도형 67"/>
+          <p:cNvCxnSpPr/>
+          <p:nvPr/>
+        </p:nvCxnSpPr>
+        <p:spPr>
+          <a:xfrm rot="0" flipH="1">
+            <a:off x="1835785" y="4572000"/>
+            <a:ext cx="1715135" cy="113030"/>
+          </a:xfrm>
+          <a:prstGeom prst="straightConnector1"/>
+          <a:ln w="6350" cap="flat" cmpd="sng">
+            <a:prstDash/>
+            <a:headEnd type="none" w="med" len="med"/>
+            <a:tailEnd type="triangle" w="med" len="med"/>
+          </a:ln>
+        </p:spPr>
+        <p:style>
+          <a:lnRef idx="1">
+            <a:schemeClr val="accent1"/>
+          </a:lnRef>
+          <a:fillRef idx="0">
+            <a:schemeClr val="accent1"/>
+          </a:fillRef>
+          <a:effectRef idx="0">
+            <a:schemeClr val="accent1"/>
+          </a:effectRef>
+          <a:fontRef idx="minor">
+            <a:schemeClr val="tx1"/>
+          </a:fontRef>
+        </p:style>
+      </p:cxnSp>
+      <p:sp>
+        <p:nvSpPr>
+          <p:cNvPr id="1108" name="텍스트 상자 8"/>
+          <p:cNvSpPr txBox="1">
+            <a:spLocks/>
+          </p:cNvSpPr>
+          <p:nvPr/>
+        </p:nvSpPr>
+        <p:spPr>
+          <a:xfrm rot="0">
+            <a:off x="6806565" y="5279390"/>
+            <a:ext cx="3969385" cy="954405"/>
+          </a:xfrm>
+          <a:prstGeom prst="rect"/>
+          <a:noFill/>
+          <a:ln w="0">
+            <a:noFill/>
+            <a:prstDash/>
+          </a:ln>
+        </p:spPr>
+        <p:txBody>
+          <a:bodyPr wrap="square" lIns="89535" tIns="46355" rIns="89535" bIns="46355" numCol="1" vert="horz" anchor="t">
+            <a:spAutoFit/>
+          </a:bodyPr>
+          <a:lstStyle/>
+          <a:p>
+            <a:pPr marL="0" indent="0" algn="l" latinLnBrk="0" hangingPunct="1">
+              <a:buFontTx/>
+              <a:buNone/>
+            </a:pPr>
+            <a:r>
+              <a:rPr lang="ko-KR" sz="2000" b="1">
+                <a:solidFill>
+                  <a:srgbClr val="0611F2"/>
+                </a:solidFill>
+                <a:latin typeface="맑은 고딕" charset="0"/>
+                <a:ea typeface="맑은 고딕" charset="0"/>
+              </a:rPr>
+              <a:t>24</a:t>
+            </a:r>
+            <a:r>
+              <a:rPr sz="2000" b="1">
+                <a:solidFill>
+                  <a:srgbClr val="0611F2"/>
+                </a:solidFill>
+                <a:latin typeface="맑은 고딕" charset="0"/>
+                <a:ea typeface="맑은 고딕" charset="0"/>
+              </a:rPr>
+              <a:t>. </a:t>
+            </a:r>
+            <a:r>
+              <a:rPr lang="ko-KR" sz="1800">
+                <a:latin typeface="맑은 고딕" charset="0"/>
+                <a:ea typeface="맑은 고딕" charset="0"/>
+              </a:rPr>
+              <a:t>마지막으로</a:t>
+            </a:r>
+            <a:r>
+              <a:rPr lang="ko-KR" sz="1800">
+                <a:latin typeface="맑은 고딕" charset="0"/>
+                <a:ea typeface="맑은 고딕" charset="0"/>
+              </a:rPr>
+              <a:t> Generic Create Button의 Text에 Genenric Stone Create로 정의합니다.</a:t>
+            </a:r>
+            <a:endParaRPr lang="ko-KR" altLang="en-US" sz="1800">
+              <a:latin typeface="맑은 고딕" charset="0"/>
+              <a:ea typeface="맑은 고딕" charset="0"/>
+            </a:endParaRPr>
+          </a:p>
+        </p:txBody>
+      </p:sp>
+      <p:pic>
+        <p:nvPicPr>
+          <p:cNvPr id="1109" name="그림 9" descr="C:/Users/Admin1/AppData/Roaming/PolarisOffice/ETemp/16484_18744056/fImage396362805724.png"/>
+          <p:cNvPicPr>
+            <a:picLocks noChangeAspect="1"/>
+          </p:cNvPicPr>
+          <p:nvPr/>
+        </p:nvPicPr>
+        <p:blipFill rotWithShape="1">
+          <a:blip r:embed="rId6" cstate="hqprint">
+            <a:extLst>
+              <a:ext uri="{28A0092B-C50C-407E-A947-70E740481C1C}">
+                <a14:useLocalDpi xmlns:a14="http://schemas.microsoft.com/office/drawing/2010/main"/>
+              </a:ext>
+            </a:extLst>
+          </a:blip>
+          <a:stretch>
+            <a:fillRect/>
+          </a:stretch>
+        </p:blipFill>
+        <p:spPr>
+          <a:xfrm rot="0">
+            <a:off x="6808470" y="1448435"/>
+            <a:ext cx="3966845" cy="3669665"/>
+          </a:xfrm>
+          <a:prstGeom prst="rect"/>
+          <a:noFill/>
+        </p:spPr>
+      </p:pic>
+    </p:spTree>
+  </p:cSld>
+  <p:clrMapOvr>
+    <a:masterClrMapping/>
+  </p:clrMapOvr>
+  <mc:AlternateContent xmlns:mc="http://schemas.openxmlformats.org/markup-compatibility/2006">
+    <mc:Choice xmlns:p14="http://schemas.microsoft.com/office/powerpoint/2010/main" Requires="p14">
+      <p:transition spd="slow" p14:dur="2000"/>
+    </mc:Choice>
+    <mc:Fallback>
+      <p:transition spd="slow"/>
+    </mc:Fallback>
+  </mc:AlternateContent>
+  <p:timing>
+    <p:tnLst>
+      <p:par>
+        <p:cTn id="1" dur="indefinite" restart="never" nodeType="tmRoot"/>
+      </p:par>
+    </p:tnLst>
+  </p:timing>
+</p:sld>
+</file>
+
+<file path=ppt/slides/slide14.xml><?xml version="1.0" encoding="utf-8"?>
+<p:sld xmlns:a="http://schemas.openxmlformats.org/drawingml/2006/main" xmlns:r="http://schemas.openxmlformats.org/officeDocument/2006/relationships" xmlns:p="http://schemas.openxmlformats.org/presentationml/2006/main">
+  <p:cSld>
+    <p:spTree>
+      <p:nvGrpSpPr>
+        <p:cNvPr id="1" name=""/>
+        <p:cNvGrpSpPr/>
+        <p:nvPr/>
+      </p:nvGrpSpPr>
+      <p:grpSpPr>
+        <a:xfrm>
+          <a:off x="0" y="0"/>
+          <a:ext cx="0" cy="0"/>
+          <a:chOff x="0" y="0"/>
+          <a:chExt cx="0" cy="0"/>
+        </a:xfrm>
+      </p:grpSpPr>
+      <p:sp>
+        <p:nvSpPr>
+          <p:cNvPr id="1031" name="Rect 0"/>
+          <p:cNvSpPr txBox="1">
+            <a:spLocks/>
+          </p:cNvSpPr>
+          <p:nvPr/>
+        </p:nvSpPr>
+        <p:spPr>
+          <a:xfrm rot="0">
+            <a:off x="4318000" y="392430"/>
+            <a:ext cx="3563620" cy="554990"/>
+          </a:xfrm>
+          <a:prstGeom prst="rect"/>
+          <a:noFill/>
+          <a:ln w="0">
+            <a:noFill/>
+            <a:prstDash/>
+          </a:ln>
+        </p:spPr>
+        <p:txBody>
+          <a:bodyPr wrap="square" lIns="89535" tIns="46355" rIns="89535" bIns="46355" numCol="1" vert="horz" anchor="t">
+            <a:spAutoFit/>
+          </a:bodyPr>
+          <a:lstStyle/>
+          <a:p>
+            <a:pPr marL="0" indent="0" algn="l" latinLnBrk="0">
+              <a:buFontTx/>
+              <a:buNone/>
+            </a:pPr>
+            <a:r>
+              <a:rPr lang="ko-KR" altLang="en-US" sz="3000" b="1">
+                <a:solidFill>
+                  <a:schemeClr val="tx1"/>
+                </a:solidFill>
+                <a:latin typeface="맑은 고딕" charset="0"/>
+                <a:ea typeface="맑은 고딕" charset="0"/>
+              </a:rPr>
+              <a:t>열</a:t>
+            </a:r>
+            <a:r>
+              <a:rPr lang="ko-KR" altLang="en-US" sz="3000" b="1">
+                <a:solidFill>
+                  <a:schemeClr val="tx1"/>
+                </a:solidFill>
+                <a:latin typeface="맑은 고딕" charset="0"/>
+                <a:ea typeface="맑은 고딕" charset="0"/>
+              </a:rPr>
+              <a:t>한</a:t>
+            </a:r>
+            <a:r>
+              <a:rPr lang="ko-KR" altLang="en-US" sz="3000" b="1">
+                <a:solidFill>
+                  <a:schemeClr val="tx1"/>
+                </a:solidFill>
+                <a:latin typeface="맑은 고딕" charset="0"/>
+                <a:ea typeface="맑은 고딕" charset="0"/>
+              </a:rPr>
+              <a:t> 번째 튜토리얼</a:t>
+            </a:r>
+            <a:endParaRPr lang="ko-KR" altLang="en-US" sz="3000" b="1">
+              <a:solidFill>
+                <a:schemeClr val="tx1"/>
+              </a:solidFill>
+              <a:latin typeface="맑은 고딕" charset="0"/>
+              <a:ea typeface="맑은 고딕" charset="0"/>
+            </a:endParaRPr>
+          </a:p>
+        </p:txBody>
+      </p:sp>
+      <p:sp>
+        <p:nvSpPr>
+          <p:cNvPr id="1070" name="Rect 0"/>
+          <p:cNvSpPr txBox="1">
+            <a:spLocks/>
+          </p:cNvSpPr>
+          <p:nvPr/>
+        </p:nvSpPr>
+        <p:spPr>
+          <a:xfrm rot="0">
+            <a:off x="1238885" y="5152390"/>
+            <a:ext cx="4140200" cy="1231265"/>
+          </a:xfrm>
+          <a:prstGeom prst="rect"/>
+          <a:noFill/>
+          <a:ln w="0">
+            <a:noFill/>
+            <a:prstDash/>
+          </a:ln>
+        </p:spPr>
+        <p:txBody>
+          <a:bodyPr wrap="square" lIns="89535" tIns="46355" rIns="89535" bIns="46355" numCol="1" vert="horz" anchor="t">
+            <a:spAutoFit/>
+          </a:bodyPr>
+          <a:lstStyle/>
+          <a:p>
+            <a:pPr marL="0" indent="0" algn="l" latinLnBrk="0" hangingPunct="1">
+              <a:buFontTx/>
+              <a:buNone/>
+            </a:pPr>
+            <a:r>
+              <a:rPr lang="ko-KR" sz="2000" b="1">
+                <a:solidFill>
+                  <a:srgbClr val="0611F2"/>
+                </a:solidFill>
+                <a:latin typeface="맑은 고딕" charset="0"/>
+                <a:ea typeface="맑은 고딕" charset="0"/>
+              </a:rPr>
+              <a:t>2</a:t>
+            </a:r>
+            <a:r>
+              <a:rPr lang="ko-KR" sz="2000" b="1">
+                <a:solidFill>
+                  <a:srgbClr val="0611F2"/>
+                </a:solidFill>
+                <a:latin typeface="맑은 고딕" charset="0"/>
+                <a:ea typeface="맑은 고딕" charset="0"/>
+              </a:rPr>
+              <a:t>5</a:t>
+            </a:r>
+            <a:r>
+              <a:rPr sz="2000" b="1">
+                <a:solidFill>
+                  <a:srgbClr val="0611F2"/>
+                </a:solidFill>
+                <a:latin typeface="맑은 고딕" charset="0"/>
+                <a:ea typeface="맑은 고딕" charset="0"/>
+              </a:rPr>
+              <a:t>. </a:t>
+            </a:r>
+            <a:r>
+              <a:rPr lang="ko-KR" sz="1800">
+                <a:latin typeface="맑은 고딕" charset="0"/>
+                <a:ea typeface="맑은 고딕" charset="0"/>
+              </a:rPr>
+              <a:t>이제 </a:t>
+            </a:r>
+            <a:r>
+              <a:rPr lang="ko-KR" sz="1800">
+                <a:latin typeface="맑은 고딕" charset="0"/>
+                <a:ea typeface="맑은 고딕" charset="0"/>
+              </a:rPr>
+              <a:t>Generic Create Button</a:t>
+            </a:r>
+            <a:r>
+              <a:rPr lang="ko-KR" sz="1800">
+                <a:latin typeface="맑은 고딕" charset="0"/>
+                <a:ea typeface="맑은 고딕" charset="0"/>
+              </a:rPr>
+              <a:t> 오브젝트에 있는 Image 컴포넌트의 Image Type과 Fill Method 그리고 Fill Origin을 설정합니다.</a:t>
+            </a:r>
+            <a:endParaRPr lang="ko-KR" altLang="en-US" sz="1800">
+              <a:latin typeface="맑은 고딕" charset="0"/>
+              <a:ea typeface="맑은 고딕" charset="0"/>
+            </a:endParaRPr>
+          </a:p>
+        </p:txBody>
+      </p:sp>
+      <p:sp>
+        <p:nvSpPr>
+          <p:cNvPr id="1108" name="Rect 0"/>
+          <p:cNvSpPr txBox="1">
+            <a:spLocks/>
+          </p:cNvSpPr>
+          <p:nvPr/>
+        </p:nvSpPr>
+        <p:spPr>
+          <a:xfrm rot="0">
+            <a:off x="6790055" y="4323080"/>
+            <a:ext cx="4167505" cy="2061845"/>
+          </a:xfrm>
+          <a:prstGeom prst="rect"/>
+          <a:noFill/>
+          <a:ln w="0">
+            <a:noFill/>
+            <a:prstDash/>
+          </a:ln>
+        </p:spPr>
+        <p:txBody>
+          <a:bodyPr wrap="square" lIns="89535" tIns="46355" rIns="89535" bIns="46355" numCol="1" vert="horz" anchor="t">
+            <a:spAutoFit/>
+          </a:bodyPr>
+          <a:lstStyle/>
+          <a:p>
+            <a:pPr marL="0" indent="0" algn="l" latinLnBrk="0" hangingPunct="1">
+              <a:buFontTx/>
+              <a:buNone/>
+            </a:pPr>
+            <a:r>
+              <a:rPr lang="ko-KR" sz="2000" b="1">
+                <a:solidFill>
+                  <a:srgbClr val="0611F2"/>
+                </a:solidFill>
+                <a:latin typeface="맑은 고딕" charset="0"/>
+                <a:ea typeface="맑은 고딕" charset="0"/>
+              </a:rPr>
+              <a:t>26</a:t>
+            </a:r>
+            <a:r>
+              <a:rPr sz="2000" b="1">
+                <a:solidFill>
+                  <a:srgbClr val="0611F2"/>
+                </a:solidFill>
+                <a:latin typeface="맑은 고딕" charset="0"/>
+                <a:ea typeface="맑은 고딕" charset="0"/>
+              </a:rPr>
+              <a:t>. </a:t>
+            </a:r>
+            <a:r>
+              <a:rPr lang="ko-KR" sz="1800">
+                <a:latin typeface="맑은 고딕" charset="0"/>
+                <a:ea typeface="맑은 고딕" charset="0"/>
+              </a:rPr>
+              <a:t>그다음으로 Delay 스크립트에 있는 Update( ) 함수에서 조건에 따라</a:t>
+            </a:r>
+            <a:endParaRPr lang="ko-KR" altLang="en-US" sz="1800">
+              <a:latin typeface="맑은 고딕" charset="0"/>
+              <a:ea typeface="맑은 고딕" charset="0"/>
+            </a:endParaRPr>
+          </a:p>
+          <a:p>
+            <a:pPr marL="0" indent="0" algn="l" latinLnBrk="0" hangingPunct="1">
+              <a:buFontTx/>
+              <a:buNone/>
+            </a:pPr>
+            <a:r>
+              <a:rPr lang="ko-KR" sz="1800">
+                <a:latin typeface="맑은 고딕" charset="0"/>
+                <a:ea typeface="맑은 고딕" charset="0"/>
+              </a:rPr>
+              <a:t>버튼 오브젝트를 비활성화 및 활성화하도록 선언합니다.</a:t>
+            </a:r>
+            <a:endParaRPr lang="ko-KR" altLang="en-US" sz="1800">
+              <a:latin typeface="맑은 고딕" charset="0"/>
+              <a:ea typeface="맑은 고딕" charset="0"/>
+            </a:endParaRPr>
+          </a:p>
+          <a:p>
+            <a:pPr marL="0" indent="0" algn="l" latinLnBrk="0" hangingPunct="1">
+              <a:buFontTx/>
+              <a:buNone/>
+            </a:pPr>
+            <a:endParaRPr lang="ko-KR" altLang="en-US" sz="1800">
+              <a:latin typeface="맑은 고딕" charset="0"/>
+              <a:ea typeface="맑은 고딕" charset="0"/>
+            </a:endParaRPr>
+          </a:p>
+          <a:p>
+            <a:pPr marL="0" indent="0" algn="l" latinLnBrk="0" hangingPunct="1">
+              <a:buFontTx/>
+              <a:buNone/>
+            </a:pPr>
+            <a:r>
+              <a:rPr lang="ko-KR" sz="1800">
+                <a:latin typeface="맑은 고딕" charset="0"/>
+                <a:ea typeface="맑은 고딕" charset="0"/>
+              </a:rPr>
+              <a:t>마지막으로 이미지에 fillAmount 값을 시간에 따라 변화하도록 설정합니다.</a:t>
+            </a:r>
+            <a:endParaRPr lang="ko-KR" altLang="en-US" sz="1800">
+              <a:latin typeface="맑은 고딕" charset="0"/>
+              <a:ea typeface="맑은 고딕" charset="0"/>
+            </a:endParaRPr>
+          </a:p>
+        </p:txBody>
+      </p:sp>
+      <p:pic>
+        <p:nvPicPr>
+          <p:cNvPr id="1110" name="그림 19" descr="C:/Users/Admin1/AppData/Roaming/PolarisOffice/ETemp/16484_18744056/fImage192962919169.png"/>
+          <p:cNvPicPr>
+            <a:picLocks noChangeAspect="1"/>
+          </p:cNvPicPr>
+          <p:nvPr/>
+        </p:nvPicPr>
+        <p:blipFill rotWithShape="1">
+          <a:blip r:embed="rId2" cstate="print">
+            <a:extLst>
+              <a:ext uri="{28A0092B-C50C-407E-A947-70E740481C1C}">
+                <a14:useLocalDpi xmlns:a14="http://schemas.microsoft.com/office/drawing/2010/main" val="0"/>
+              </a:ext>
+            </a:extLst>
+          </a:blip>
+          <a:stretch>
+            <a:fillRect/>
+          </a:stretch>
+        </p:blipFill>
+        <p:spPr>
+          <a:xfrm rot="0">
+            <a:off x="1238250" y="1446530"/>
+            <a:ext cx="4149725" cy="3558540"/>
+          </a:xfrm>
+          <a:prstGeom prst="roundRect"/>
+          <a:solidFill>
+            <a:srgbClr val="EDEDED"/>
+          </a:solidFill>
+        </p:spPr>
+      </p:pic>
+      <p:pic>
+        <p:nvPicPr>
+          <p:cNvPr id="1111" name="그림 22" descr="C:/Users/Admin1/AppData/Roaming/PolarisOffice/ETemp/16484_18744056/fImage397562925724.png"/>
+          <p:cNvPicPr>
+            <a:picLocks noChangeAspect="1"/>
+          </p:cNvPicPr>
+          <p:nvPr/>
+        </p:nvPicPr>
+        <p:blipFill rotWithShape="1">
+          <a:blip r:embed="rId3" cstate="print">
+            <a:extLst>
+              <a:ext uri="{28A0092B-C50C-407E-A947-70E740481C1C}">
+                <a14:useLocalDpi xmlns:a14="http://schemas.microsoft.com/office/drawing/2010/main" val="0"/>
+              </a:ext>
+            </a:extLst>
+          </a:blip>
+          <a:stretch>
+            <a:fillRect/>
+          </a:stretch>
+        </p:blipFill>
+        <p:spPr>
+          <a:xfrm rot="0">
+            <a:off x="6791960" y="1438275"/>
+            <a:ext cx="4173855" cy="2735580"/>
           </a:xfrm>
           <a:prstGeom prst="roundRect"/>
           <a:solidFill>
@@ -9598,8 +10359,8 @@
         </p:nvSpPr>
         <p:spPr>
           <a:xfrm rot="0">
-            <a:off x="1395730" y="5154295"/>
-            <a:ext cx="3959225" cy="954405"/>
+            <a:off x="1230630" y="4314825"/>
+            <a:ext cx="4140200" cy="1784985"/>
           </a:xfrm>
           <a:prstGeom prst="rect"/>
           <a:noFill/>
@@ -9643,51 +10404,49 @@
                 <a:latin typeface="맑은 고딕" charset="0"/>
                 <a:ea typeface="맑은 고딕" charset="0"/>
               </a:rPr>
-              <a:t>이제</a:t>
+              <a:t>이제 </a:t>
             </a:r>
             <a:r>
               <a:rPr lang="ko-KR" sz="1800">
                 <a:latin typeface="맑은 고딕" charset="0"/>
                 <a:ea typeface="맑은 고딕" charset="0"/>
               </a:rPr>
-              <a:t> Generic Create Button의 Text에 Genenric Stone Create로 정의합니다.</a:t>
+              <a:t>Delay 스크립트에서 Action 변수와 Button 변수 그리고 각각의 float 변수와 bool 변수를 선언합니다.</a:t>
             </a:r>
             <a:endParaRPr lang="ko-KR" altLang="en-US" sz="1800">
               <a:latin typeface="맑은 고딕" charset="0"/>
               <a:ea typeface="맑은 고딕" charset="0"/>
             </a:endParaRPr>
           </a:p>
-        </p:txBody>
-      </p:sp>
-      <p:pic>
-        <p:nvPicPr>
-          <p:cNvPr id="1033" name="그림 7"/>
-          <p:cNvPicPr>
-            <a:picLocks noChangeAspect="1"/>
-          </p:cNvPicPr>
-          <p:nvPr/>
-        </p:nvPicPr>
-        <p:blipFill rotWithShape="1">
-          <a:blip r:embed="rId7" cstate="hqprint">
-            <a:extLst>
-              <a:ext uri="{28A0092B-C50C-407E-A947-70E740481C1C}">
-                <a14:useLocalDpi xmlns:a14="http://schemas.microsoft.com/office/drawing/2010/main"/>
-              </a:ext>
-            </a:extLst>
-          </a:blip>
-          <a:stretch>
-            <a:fillRect/>
-          </a:stretch>
-        </p:blipFill>
-        <p:spPr>
-          <a:xfrm rot="0">
-            <a:off x="1397000" y="1373505"/>
-            <a:ext cx="3957320" cy="3669030"/>
-          </a:xfrm>
-          <a:prstGeom prst="rect"/>
-          <a:noFill/>
-        </p:spPr>
-      </p:pic>
+          <a:p>
+            <a:pPr marL="0" indent="0" algn="l" latinLnBrk="0" hangingPunct="1">
+              <a:buFontTx/>
+              <a:buNone/>
+            </a:pPr>
+            <a:endParaRPr lang="ko-KR" altLang="en-US" sz="1800">
+              <a:latin typeface="맑은 고딕" charset="0"/>
+              <a:ea typeface="맑은 고딕" charset="0"/>
+            </a:endParaRPr>
+          </a:p>
+          <a:p>
+            <a:pPr marL="0" indent="0" algn="l" latinLnBrk="0" hangingPunct="1">
+              <a:buFontTx/>
+              <a:buNone/>
+            </a:pPr>
+            <a:r>
+              <a:rPr lang="ko-KR" sz="1800">
+                <a:latin typeface="맑은 고딕" charset="0"/>
+                <a:ea typeface="맑은 고딕" charset="0"/>
+              </a:rPr>
+              <a:t>그러고 나서 Start( ) 함수에서 button 컴포넌트를 가져옵니다.</a:t>
+            </a:r>
+            <a:endParaRPr lang="ko-KR" altLang="en-US" sz="1800">
+              <a:latin typeface="맑은 고딕" charset="0"/>
+              <a:ea typeface="맑은 고딕" charset="0"/>
+            </a:endParaRPr>
+          </a:p>
+        </p:txBody>
+      </p:sp>
       <p:sp>
         <p:nvSpPr>
           <p:cNvPr id="1034" name="텍스트 상자 8"/>
@@ -9779,6 +10538,37 @@
           </a:xfrm>
           <a:prstGeom prst="rect"/>
           <a:noFill/>
+        </p:spPr>
+      </p:pic>
+      <p:pic>
+        <p:nvPicPr>
+          <p:cNvPr id="1036" name="그림 13" descr="C:/Users/Admin1/AppData/Roaming/PolarisOffice/ETemp/16484_18744056/fImage463742776334.png"/>
+          <p:cNvPicPr>
+            <a:picLocks noChangeAspect="1"/>
+          </p:cNvPicPr>
+          <p:nvPr/>
+        </p:nvPicPr>
+        <p:blipFill rotWithShape="1">
+          <a:blip r:embed="rId9" cstate="print">
+            <a:extLst>
+              <a:ext uri="{28A0092B-C50C-407E-A947-70E740481C1C}">
+                <a14:useLocalDpi xmlns:a14="http://schemas.microsoft.com/office/drawing/2010/main" val="0"/>
+              </a:ext>
+            </a:extLst>
+          </a:blip>
+          <a:stretch>
+            <a:fillRect/>
+          </a:stretch>
+        </p:blipFill>
+        <p:spPr>
+          <a:xfrm rot="0">
+            <a:off x="1238885" y="1381125"/>
+            <a:ext cx="4131945" cy="2859405"/>
+          </a:xfrm>
+          <a:prstGeom prst="roundRect"/>
+          <a:solidFill>
+            <a:srgbClr val="EDEDED"/>
+          </a:solidFill>
         </p:spPr>
       </p:pic>
     </p:spTree>
@@ -9995,17 +10785,17 @@
       </p:sp>
       <p:pic>
         <p:nvPicPr>
-          <p:cNvPr id="1062" name="그림 10"/>
+          <p:cNvPr id="1062" name="그림 10" descr="C:/Users/Admin1/AppData/Roaming/PolarisOffice/ETemp/16484_18744056/fImage1877317641.png"/>
           <p:cNvPicPr>
             <a:picLocks noChangeAspect="1"/>
           </p:cNvPicPr>
           <p:nvPr/>
         </p:nvPicPr>
         <p:blipFill rotWithShape="1">
-          <a:blip r:embed="rId8" cstate="print">
+          <a:blip r:embed="rId8" cstate="hqprint">
             <a:extLst>
               <a:ext uri="{28A0092B-C50C-407E-A947-70E740481C1C}">
-                <a14:useLocalDpi xmlns:a14="http://schemas.microsoft.com/office/drawing/2010/main" val="0"/>
+                <a14:useLocalDpi xmlns:a14="http://schemas.microsoft.com/office/drawing/2010/main"/>
               </a:ext>
             </a:extLst>
           </a:blip>
@@ -10015,8 +10805,8 @@
         </p:blipFill>
         <p:spPr>
           <a:xfrm rot="0">
-            <a:off x="1404620" y="1421130"/>
-            <a:ext cx="2572385" cy="3914140"/>
+            <a:off x="1230630" y="1421130"/>
+            <a:ext cx="2747010" cy="3914775"/>
           </a:xfrm>
           <a:prstGeom prst="roundRect"/>
           <a:solidFill>
@@ -10034,8 +10824,8 @@
         </p:nvSpPr>
         <p:spPr>
           <a:xfrm rot="0">
-            <a:off x="1396365" y="5499100"/>
-            <a:ext cx="3985895" cy="677545"/>
+            <a:off x="1222375" y="5499100"/>
+            <a:ext cx="4160520" cy="677545"/>
           </a:xfrm>
           <a:prstGeom prst="rect"/>
           <a:noFill/>
@@ -10062,17 +10852,7 @@
                 <a:latin typeface="맑은 고딕" charset="0"/>
                 <a:ea typeface="맑은 고딕" charset="0"/>
               </a:rPr>
-              <a:t>5</a:t>
-            </a:r>
-            <a:r>
-              <a:rPr sz="2000" b="1">
-                <a:solidFill>
-                  <a:srgbClr val="0611F2"/>
-                </a:solidFill>
-                <a:latin typeface="맑은 고딕" charset="0"/>
-                <a:ea typeface="맑은 고딕" charset="0"/>
-              </a:rPr>
-              <a:t>. </a:t>
+              <a:t>5. </a:t>
             </a:r>
             <a:r>
               <a:rPr lang="ko-KR" sz="1800">
@@ -10121,14 +10901,14 @@
       </p:pic>
       <p:pic>
         <p:nvPicPr>
-          <p:cNvPr id="1065" name="그림 17"/>
+          <p:cNvPr id="1065" name="그림 16" descr="C:/Users/Admin1/AppData/Roaming/PolarisOffice/ETemp/16484_18744056/fImage445402786500.png"/>
           <p:cNvPicPr>
             <a:picLocks noChangeAspect="1"/>
           </p:cNvPicPr>
           <p:nvPr/>
         </p:nvPicPr>
         <p:blipFill rotWithShape="1">
-          <a:blip r:embed="rId10" cstate="print">
+          <a:blip r:embed="rId11" cstate="print">
             <a:extLst>
               <a:ext uri="{28A0092B-C50C-407E-A947-70E740481C1C}">
                 <a14:useLocalDpi xmlns:a14="http://schemas.microsoft.com/office/drawing/2010/main" val="0"/>
@@ -10141,8 +10921,8 @@
         </p:blipFill>
         <p:spPr>
           <a:xfrm rot="0">
-            <a:off x="6810375" y="1421130"/>
-            <a:ext cx="4152265" cy="2524760"/>
+            <a:off x="6816725" y="1421765"/>
+            <a:ext cx="4140835" cy="2577465"/>
           </a:xfrm>
           <a:prstGeom prst="roundRect"/>
           <a:solidFill>
@@ -10513,7 +11293,7 @@
       </p:sp>
       <p:pic>
         <p:nvPicPr>
-          <p:cNvPr id="1044" name="그림 145"/>
+          <p:cNvPr id="1044" name="그림 145" descr="C:/Users/Admin1/AppData/Roaming/PolarisOffice/ETemp/16484_18744056/fImage688723905436.png"/>
           <p:cNvPicPr>
             <a:picLocks noChangeAspect="1"/>
           </p:cNvPicPr>
@@ -10533,8 +11313,8 @@
         </p:blipFill>
         <p:spPr>
           <a:xfrm rot="0">
-            <a:off x="1174115" y="3100070"/>
-            <a:ext cx="4173220" cy="1805305"/>
+            <a:off x="1222375" y="3075305"/>
+            <a:ext cx="4133850" cy="1805940"/>
           </a:xfrm>
           <a:prstGeom prst="rect"/>
           <a:noFill/>
@@ -10650,8 +11430,8 @@
         </p:nvSpPr>
         <p:spPr>
           <a:xfrm rot="0">
-            <a:off x="1395730" y="5086985"/>
-            <a:ext cx="3959225" cy="954405"/>
+            <a:off x="1221740" y="5361305"/>
+            <a:ext cx="4125595" cy="677545"/>
           </a:xfrm>
           <a:prstGeom prst="rect"/>
           <a:noFill/>
@@ -10695,14 +11475,7 @@
                 <a:latin typeface="맑은 고딕" charset="0"/>
                 <a:ea typeface="맑은 고딕" charset="0"/>
               </a:rPr>
-              <a:t>이제</a:t>
-            </a:r>
-            <a:r>
-              <a:rPr lang="ko-KR" sz="1800">
-                <a:latin typeface="맑은 고딕" charset="0"/>
-                <a:ea typeface="맑은 고딕" charset="0"/>
-              </a:rPr>
-              <a:t> On Click 함수의 Event에 Create Object 오브젝트를 넣어줍니다.</a:t>
+              <a:t>이제 On Click 함수의 Event에 Create Object 오브젝트를 넣어줍니다.</a:t>
             </a:r>
             <a:endParaRPr lang="ko-KR" altLang="en-US" sz="1800">
               <a:latin typeface="맑은 고딕" charset="0"/>
@@ -10777,7 +11550,7 @@
       </p:sp>
       <p:pic>
         <p:nvPicPr>
-          <p:cNvPr id="1034" name="그림 22"/>
+          <p:cNvPr id="1034" name="그림 22" descr="C:/Users/Admin1/AppData/Roaming/PolarisOffice/ETemp/16484_18744056/fImage412512959358.png"/>
           <p:cNvPicPr>
             <a:picLocks noChangeAspect="1"/>
           </p:cNvPicPr>
@@ -10798,7 +11571,7 @@
         <p:spPr>
           <a:xfrm rot="0">
             <a:off x="2876550" y="1373505"/>
-            <a:ext cx="2478405" cy="3515995"/>
+            <a:ext cx="2479040" cy="3797935"/>
           </a:xfrm>
           <a:prstGeom prst="rect"/>
           <a:noFill/>
@@ -10835,17 +11608,17 @@
       </p:pic>
       <p:pic>
         <p:nvPicPr>
-          <p:cNvPr id="1038" name="그림 26"/>
+          <p:cNvPr id="1038" name="그림 26" descr="C:/Users/Admin1/AppData/Roaming/PolarisOffice/ETemp/16484_18744056/fImage61361866500.png"/>
           <p:cNvPicPr>
             <a:picLocks noChangeAspect="1"/>
           </p:cNvPicPr>
           <p:nvPr/>
         </p:nvPicPr>
         <p:blipFill rotWithShape="1">
-          <a:blip r:embed="rId10" cstate="print">
+          <a:blip r:embed="rId10" cstate="hqprint">
             <a:extLst>
               <a:ext uri="{28A0092B-C50C-407E-A947-70E740481C1C}">
-                <a14:useLocalDpi xmlns:a14="http://schemas.microsoft.com/office/drawing/2010/main" val="0"/>
+                <a14:useLocalDpi xmlns:a14="http://schemas.microsoft.com/office/drawing/2010/main"/>
               </a:ext>
             </a:extLst>
           </a:blip>
@@ -10855,8 +11628,8 @@
         </p:blipFill>
         <p:spPr>
           <a:xfrm rot="0">
-            <a:off x="1397000" y="1984375"/>
-            <a:ext cx="1318260" cy="1937385"/>
+            <a:off x="1230630" y="1984375"/>
+            <a:ext cx="1485265" cy="2205990"/>
           </a:xfrm>
           <a:prstGeom prst="roundRect"/>
           <a:solidFill>
@@ -10872,8 +11645,8 @@
         </p:nvCxnSpPr>
         <p:spPr>
           <a:xfrm rot="0">
-            <a:off x="2404745" y="3063875"/>
-            <a:ext cx="1250315" cy="1491615"/>
+            <a:off x="2377440" y="3075940"/>
+            <a:ext cx="1264285" cy="1729740"/>
           </a:xfrm>
           <a:prstGeom prst="straightConnector1"/>
           <a:ln w="6350" cap="flat" cmpd="sng">
@@ -11178,7 +11951,7 @@
       </p:pic>
       <p:pic>
         <p:nvPicPr>
-          <p:cNvPr id="1052" name="그림 21"/>
+          <p:cNvPr id="1052" name="그림 21" descr="C:/Users/Admin1/AppData/Roaming/PolarisOffice/ETemp/16484_18744056/fImage1040312976334.png"/>
           <p:cNvPicPr>
             <a:picLocks noChangeAspect="1"/>
           </p:cNvPicPr>
@@ -11199,7 +11972,7 @@
         <p:spPr>
           <a:xfrm rot="0">
             <a:off x="1230630" y="2552700"/>
-            <a:ext cx="4141470" cy="2578100"/>
+            <a:ext cx="4142105" cy="2578735"/>
           </a:xfrm>
           <a:prstGeom prst="roundRect"/>
           <a:solidFill>
@@ -11317,8 +12090,8 @@
         </p:nvSpPr>
         <p:spPr>
           <a:xfrm rot="0">
-            <a:off x="1432560" y="2866390"/>
-            <a:ext cx="3954145" cy="954405"/>
+            <a:off x="1221740" y="2866390"/>
+            <a:ext cx="4165600" cy="954405"/>
           </a:xfrm>
           <a:prstGeom prst="rect"/>
           <a:noFill/>
@@ -11373,17 +12146,17 @@
       </p:sp>
       <p:pic>
         <p:nvPicPr>
-          <p:cNvPr id="1052" name="그림 34"/>
+          <p:cNvPr id="1052" name="그림 34" descr="C:/Users/Admin1/AppData/Roaming/PolarisOffice/ETemp/16484_18744056/fImage120161889169.png"/>
           <p:cNvPicPr>
             <a:picLocks noChangeAspect="1"/>
           </p:cNvPicPr>
           <p:nvPr/>
         </p:nvPicPr>
         <p:blipFill rotWithShape="1">
-          <a:blip r:embed="rId8" cstate="print">
+          <a:blip r:embed="rId8" cstate="hqprint">
             <a:extLst>
               <a:ext uri="{28A0092B-C50C-407E-A947-70E740481C1C}">
-                <a14:useLocalDpi xmlns:a14="http://schemas.microsoft.com/office/drawing/2010/main" val="0"/>
+                <a14:useLocalDpi xmlns:a14="http://schemas.microsoft.com/office/drawing/2010/main"/>
               </a:ext>
             </a:extLst>
           </a:blip>
@@ -11393,8 +12166,8 @@
         </p:blipFill>
         <p:spPr>
           <a:xfrm rot="0">
-            <a:off x="1428750" y="1402715"/>
-            <a:ext cx="3957955" cy="1351915"/>
+            <a:off x="1230630" y="1402715"/>
+            <a:ext cx="4156710" cy="1352550"/>
           </a:xfrm>
           <a:prstGeom prst="roundRect"/>
           <a:solidFill>
@@ -11404,17 +12177,17 @@
       </p:pic>
       <p:pic>
         <p:nvPicPr>
-          <p:cNvPr id="1053" name="그림 37"/>
+          <p:cNvPr id="1053" name="그림 37" descr="C:/Users/Admin1/AppData/Roaming/PolarisOffice/ETemp/16484_18744056/fImage122321895724.png"/>
           <p:cNvPicPr>
             <a:picLocks noChangeAspect="1"/>
           </p:cNvPicPr>
           <p:nvPr/>
         </p:nvPicPr>
         <p:blipFill rotWithShape="1">
-          <a:blip r:embed="rId9" cstate="print">
+          <a:blip r:embed="rId9" cstate="hqprint">
             <a:extLst>
               <a:ext uri="{28A0092B-C50C-407E-A947-70E740481C1C}">
-                <a14:useLocalDpi xmlns:a14="http://schemas.microsoft.com/office/drawing/2010/main" val="0"/>
+                <a14:useLocalDpi xmlns:a14="http://schemas.microsoft.com/office/drawing/2010/main"/>
               </a:ext>
             </a:extLst>
           </a:blip>
@@ -11424,8 +12197,8 @@
         </p:blipFill>
         <p:spPr>
           <a:xfrm rot="0">
-            <a:off x="1433195" y="3938905"/>
-            <a:ext cx="3945255" cy="1273810"/>
+            <a:off x="1221740" y="3938905"/>
+            <a:ext cx="4157345" cy="1531620"/>
           </a:xfrm>
           <a:prstGeom prst="roundRect"/>
           <a:solidFill>
@@ -11443,8 +12216,8 @@
         </p:nvSpPr>
         <p:spPr>
           <a:xfrm rot="0">
-            <a:off x="1426210" y="5293995"/>
-            <a:ext cx="3954145" cy="954405"/>
+            <a:off x="1222375" y="5568315"/>
+            <a:ext cx="4158615" cy="677545"/>
           </a:xfrm>
           <a:prstGeom prst="rect"/>
           <a:noFill/>
@@ -11917,8 +12690,8 @@
         </p:nvSpPr>
         <p:spPr>
           <a:xfrm rot="0">
-            <a:off x="1424305" y="5233035"/>
-            <a:ext cx="3946525" cy="955040"/>
+            <a:off x="1230630" y="5233035"/>
+            <a:ext cx="4140835" cy="954405"/>
           </a:xfrm>
           <a:prstGeom prst="rect"/>
           <a:noFill/>
@@ -11973,7 +12746,7 @@
       </p:sp>
       <p:pic>
         <p:nvPicPr>
-          <p:cNvPr id="1034" name="그림 58" descr="C:/Users/Admin1/AppData/Roaming/PolarisOffice/ETemp/15256_19321368/fImage115662033281.png"/>
+          <p:cNvPr id="1034" name="그림 58" descr="C:/Users/Admin1/AppData/Roaming/PolarisOffice/ETemp/16484_18744056/fImage115662033281.png"/>
           <p:cNvPicPr>
             <a:picLocks noChangeAspect="1"/>
           </p:cNvPicPr>
@@ -11993,8 +12766,8 @@
         </p:blipFill>
         <p:spPr>
           <a:xfrm rot="0">
-            <a:off x="3187065" y="1402715"/>
-            <a:ext cx="2183130" cy="3677285"/>
+            <a:off x="3009265" y="1402715"/>
+            <a:ext cx="2361565" cy="3677920"/>
           </a:xfrm>
           <a:prstGeom prst="roundRect"/>
           <a:solidFill>
@@ -12004,7 +12777,7 @@
       </p:pic>
       <p:pic>
         <p:nvPicPr>
-          <p:cNvPr id="1035" name="그림 61" descr="C:/Users/Admin1/AppData/Roaming/PolarisOffice/ETemp/15256_19321368/fImage71352046827.png"/>
+          <p:cNvPr id="1035" name="그림 61" descr="C:/Users/Admin1/AppData/Roaming/PolarisOffice/ETemp/16484_18744056/fImage71352046827.png"/>
           <p:cNvPicPr>
             <a:picLocks noChangeAspect="1"/>
           </p:cNvPicPr>
@@ -12024,8 +12797,8 @@
         </p:blipFill>
         <p:spPr>
           <a:xfrm rot="0">
-            <a:off x="1428750" y="2111375"/>
-            <a:ext cx="1603375" cy="2263140"/>
+            <a:off x="1230630" y="2111375"/>
+            <a:ext cx="1630045" cy="2263775"/>
           </a:xfrm>
           <a:prstGeom prst="roundRect"/>
           <a:solidFill>
@@ -12154,7 +12927,7 @@
       </p:sp>
       <p:pic>
         <p:nvPicPr>
-          <p:cNvPr id="1037" name="그림 6" descr="C:/Users/Admin1/AppData/Roaming/PolarisOffice/ETemp/15256_19321368/fImage3302515541.png"/>
+          <p:cNvPr id="1037" name="그림 6"/>
           <p:cNvPicPr>
             <a:picLocks noChangeAspect="1"/>
           </p:cNvPicPr>
@@ -12185,7 +12958,7 @@
       </p:pic>
       <p:pic>
         <p:nvPicPr>
-          <p:cNvPr id="1038" name="그림 7" descr="C:/Users/Admin1/AppData/Roaming/PolarisOffice/ETemp/15256_19321368/fImage77711568467.png"/>
+          <p:cNvPr id="1038" name="그림 7"/>
           <p:cNvPicPr>
             <a:picLocks noChangeAspect="1"/>
           </p:cNvPicPr>
@@ -12324,8 +13097,8 @@
         </p:nvSpPr>
         <p:spPr>
           <a:xfrm rot="0">
-            <a:off x="1363345" y="5032375"/>
-            <a:ext cx="4007485" cy="1200785"/>
+            <a:off x="1255395" y="5032375"/>
+            <a:ext cx="4116070" cy="1200785"/>
           </a:xfrm>
           <a:prstGeom prst="rect"/>
           <a:noFill/>
@@ -12335,7 +13108,7 @@
           </a:ln>
         </p:spPr>
         <p:txBody>
-          <a:bodyPr wrap="square" lIns="89535" tIns="46355" rIns="89535" bIns="46355" vert="horz" anchor="t">
+          <a:bodyPr wrap="square" lIns="89535" tIns="46355" rIns="89535" bIns="46355" numCol="1" vert="horz" anchor="t">
             <a:spAutoFit/>
           </a:bodyPr>
           <a:lstStyle/>
@@ -12379,14 +13152,7 @@
                 <a:latin typeface="맑은 고딕" charset="0"/>
                 <a:ea typeface="맑은 고딕" charset="0"/>
               </a:rPr>
-              <a:t> </a:t>
-            </a:r>
-            <a:r>
-              <a:rPr sz="1800">
-                <a:latin typeface="맑은 고딕" charset="0"/>
-                <a:ea typeface="맑은 고딕" charset="0"/>
-              </a:rPr>
-              <a:t>이제</a:t>
+              <a:t> 이제</a:t>
             </a:r>
             <a:r>
               <a:rPr lang="ko-KR" sz="1800">
@@ -12425,7 +13191,7 @@
       </p:sp>
       <p:pic>
         <p:nvPicPr>
-          <p:cNvPr id="1033" name="그림 4" descr="C:/Users/Admin1/AppData/Roaming/PolarisOffice/ETemp/15256_19321368/fImage70121536334.png"/>
+          <p:cNvPr id="1033" name="그림 4"/>
           <p:cNvPicPr>
             <a:picLocks noChangeAspect="1"/>
           </p:cNvPicPr>
@@ -12456,17 +13222,17 @@
       </p:pic>
       <p:pic>
         <p:nvPicPr>
-          <p:cNvPr id="1034" name="그림 10" descr="C:/Users/Admin1/AppData/Roaming/PolarisOffice/ETemp/15256_19321368/fImage77711576500.png"/>
+          <p:cNvPr id="1034" name="그림 10" descr="C:/Users/Admin1/AppData/Roaming/PolarisOffice/ETemp/16484_18744056/fImage77711576500.png"/>
           <p:cNvPicPr>
             <a:picLocks noChangeAspect="1"/>
           </p:cNvPicPr>
           <p:nvPr/>
         </p:nvPicPr>
         <p:blipFill rotWithShape="1">
-          <a:blip r:embed="rId7" cstate="print">
+          <a:blip r:embed="rId7" cstate="hqprint">
             <a:extLst>
               <a:ext uri="{28A0092B-C50C-407E-A947-70E740481C1C}">
-                <a14:useLocalDpi xmlns:a14="http://schemas.microsoft.com/office/drawing/2010/main" val="0"/>
+                <a14:useLocalDpi xmlns:a14="http://schemas.microsoft.com/office/drawing/2010/main"/>
               </a:ext>
             </a:extLst>
           </a:blip>
@@ -12476,8 +13242,8 @@
         </p:blipFill>
         <p:spPr>
           <a:xfrm rot="0">
-            <a:off x="1363345" y="1430020"/>
-            <a:ext cx="2162175" cy="3367405"/>
+            <a:off x="1247140" y="1430020"/>
+            <a:ext cx="2279015" cy="3368040"/>
           </a:xfrm>
           <a:prstGeom prst="roundRect"/>
           <a:solidFill>
@@ -12487,7 +13253,7 @@
       </p:pic>
       <p:pic>
         <p:nvPicPr>
-          <p:cNvPr id="1035" name="그림 11" descr="C:/Users/Admin1/AppData/Roaming/PolarisOffice/ETemp/15256_19321368/fImage190431589169.png"/>
+          <p:cNvPr id="1035" name="그림 11"/>
           <p:cNvPicPr>
             <a:picLocks noChangeAspect="1"/>
           </p:cNvPicPr>
@@ -12518,7 +13284,7 @@
       </p:pic>
       <p:pic>
         <p:nvPicPr>
-          <p:cNvPr id="1036" name="그림 14" descr="C:/Users/Admin1/AppData/Roaming/PolarisOffice/ETemp/15256_19321368/fImage77711595724.png"/>
+          <p:cNvPr id="1036" name="그림 14"/>
           <p:cNvPicPr>
             <a:picLocks noChangeAspect="1"/>
           </p:cNvPicPr>

</xml_diff>

<commit_message>
Add Unity Garbage Collector Theory
- Add description of managed heap

- Change how objects are disabled
</commit_message>
<xml_diff>
--- a/Assets/Class/Instantiate & Destroy/PPT Data/Instatiate and Destroy Example.pptx
+++ b/Assets/Class/Instantiate & Destroy/PPT Data/Instatiate and Destroy Example.pptx
@@ -2,7 +2,7 @@
 <file path=ppt/presentation.xml><?xml version="1.0" encoding="utf-8"?>
 <p:presentation xmlns:a="http://schemas.openxmlformats.org/drawingml/2006/main" xmlns:r="http://schemas.openxmlformats.org/officeDocument/2006/relationships" xmlns:p="http://schemas.openxmlformats.org/presentationml/2006/main" xmlns:p14="http://schemas.microsoft.com/office/powerpoint/2010/main" saveSubsetFonts="1" firstSlideNum="0">
   <p:sldMasterIdLst>
-    <p:sldMasterId id="2147485804" r:id="rId12"/>
+    <p:sldMasterId id="2147485811" r:id="rId12"/>
   </p:sldMasterIdLst>
   <p:notesMasterIdLst>
     <p:notesMasterId r:id="rId14"/>
@@ -22,6 +22,7 @@
     <p:sldId id="287" r:id="rId27"/>
     <p:sldId id="302" r:id="rId28"/>
     <p:sldId id="303" r:id="rId29"/>
+    <p:sldId id="304" r:id="rId30"/>
   </p:sldIdLst>
   <p:sldSz cx="12192000" cy="6858000"/>
   <p:notesSz cx="6858000" cy="9144000"/>
@@ -1332,6 +1333,148 @@
 </p:notes>
 </file>
 
+<file path=ppt/notesSlides/notesSlide15.xml><?xml version="1.0" encoding="utf-8"?>
+<p:notes xmlns:a="http://schemas.openxmlformats.org/drawingml/2006/main" xmlns:r="http://schemas.openxmlformats.org/officeDocument/2006/relationships" xmlns:p="http://schemas.openxmlformats.org/presentationml/2006/main">
+  <p:cSld>
+    <p:spTree>
+      <p:nvGrpSpPr>
+        <p:cNvPr id="1" name=""/>
+        <p:cNvGrpSpPr/>
+        <p:nvPr/>
+      </p:nvGrpSpPr>
+      <p:grpSpPr>
+        <a:xfrm>
+          <a:off x="0" y="0"/>
+          <a:ext cx="0" cy="0"/>
+          <a:chOff x="0" y="0"/>
+          <a:chExt cx="0" cy="0"/>
+        </a:xfrm>
+      </p:grpSpPr>
+      <p:sp>
+        <p:nvSpPr>
+          <p:cNvPr id="2" name="슬라이드 이미지 개체 틀 3"/>
+          <p:cNvSpPr>
+            <a:spLocks noChangeAspect="1"/>
+          </p:cNvSpPr>
+          <p:nvPr>
+            <p:ph type="sldImg" idx="2"/>
+          </p:nvPr>
+        </p:nvSpPr>
+        <p:spPr>
+          <a:xfrm rot="0">
+            <a:off x="685800" y="1143000"/>
+            <a:ext cx="5489575" cy="3089275"/>
+          </a:xfrm>
+          <a:prstGeom prst="rect"/>
+          <a:noFill/>
+          <a:ln w="12700" cap="flat" cmpd="sng">
+            <a:solidFill>
+              <a:srgbClr val="000000">
+                <a:alpha val="100000"/>
+              </a:srgbClr>
+            </a:solidFill>
+            <a:prstDash val="solid"/>
+          </a:ln>
+        </p:spPr>
+        <p:txBody>
+          <a:bodyPr wrap="square" lIns="91440" tIns="45720" rIns="91440" bIns="45720" numCol="1" vert="horz" anchor="ctr">
+            <a:noAutofit/>
+          </a:bodyPr>
+          <a:lstStyle/>
+          <a:p>
+            <a:pPr marL="0" indent="0" latinLnBrk="0">
+              <a:buFontTx/>
+              <a:buNone/>
+            </a:pPr>
+          </a:p>
+        </p:txBody>
+      </p:sp>
+      <p:sp>
+        <p:nvSpPr>
+          <p:cNvPr id="3" name="슬라이드 노트 개체 틀 4"/>
+          <p:cNvSpPr txBox="1">
+            <a:spLocks/>
+          </p:cNvSpPr>
+          <p:nvPr>
+            <p:ph type="body" idx="3"/>
+          </p:nvPr>
+        </p:nvSpPr>
+        <p:spPr>
+          <a:xfrm rot="0">
+            <a:off x="685800" y="4400550"/>
+            <a:ext cx="5489575" cy="3603625"/>
+          </a:xfrm>
+          <a:prstGeom prst="rect"/>
+        </p:spPr>
+        <p:txBody>
+          <a:bodyPr wrap="square" lIns="91440" tIns="45720" rIns="91440" bIns="45720" numCol="1" vert="horz" anchor="t">
+            <a:noAutofit/>
+          </a:bodyPr>
+          <a:lstStyle/>
+          <a:p>
+            <a:pPr marL="0" indent="0" latinLnBrk="0">
+              <a:buFontTx/>
+              <a:buNone/>
+            </a:pPr>
+          </a:p>
+        </p:txBody>
+      </p:sp>
+      <p:sp>
+        <p:nvSpPr>
+          <p:cNvPr id="4" name="슬라이드 번호 개체 틀 6"/>
+          <p:cNvSpPr txBox="1">
+            <a:spLocks/>
+          </p:cNvSpPr>
+          <p:nvPr>
+            <p:ph type="sldNum" idx="5"/>
+          </p:nvPr>
+        </p:nvSpPr>
+        <p:spPr>
+          <a:xfrm rot="0">
+            <a:off x="3884930" y="8685530"/>
+            <a:ext cx="2974975" cy="461645"/>
+          </a:xfrm>
+          <a:prstGeom prst="rect"/>
+        </p:spPr>
+        <p:txBody>
+          <a:bodyPr wrap="square" lIns="91440" tIns="45720" rIns="91440" bIns="45720" numCol="1" vert="horz" anchor="b">
+            <a:noAutofit/>
+          </a:bodyPr>
+          <a:lstStyle>
+            <a:lvl1pPr marL="0" indent="0" algn="r" latinLnBrk="0">
+              <a:buFontTx/>
+              <a:buNone/>
+              <a:defRPr lang="en-GB" altLang="en-US" sz="1200"/>
+            </a:lvl1pPr>
+          </a:lstStyle>
+          <a:p>
+            <a:pPr marL="0" indent="0" latinLnBrk="0">
+              <a:buFontTx/>
+              <a:buNone/>
+            </a:pPr>
+            <a:fld id="{B9320F77-B9A0-41C5-862A-B4B631284C64}" type="slidenum">
+              <a:rPr lang="ko-KR" altLang="en-US"/>
+              <a:t>‹#›</a:t>
+            </a:fld>
+          </a:p>
+        </p:txBody>
+      </p:sp>
+    </p:spTree>
+  </p:cSld>
+  <p:clrMapOvr>
+    <a:masterClrMapping/>
+  </p:clrMapOvr>
+  <mc:AlternateContent xmlns:mc="http://schemas.openxmlformats.org/markup-compatibility/2006">
+    <mc:Choice xmlns:p14="http://schemas.microsoft.com/office/powerpoint/2010/main" Requires="p14">
+      <p:transition spd="slow" p14:dur="0"/>
+    </mc:Choice>
+    <mc:Fallback>
+      <p:transition spd="slow"/>
+    </mc:Fallback>
+  </mc:AlternateContent>
+</p:notes>
+</file>
+
 <file path=ppt/notesSlides/notesSlide2.xml><?xml version="1.0" encoding="utf-8"?>
 <p:notes xmlns:a="http://schemas.openxmlformats.org/drawingml/2006/main" xmlns:r="http://schemas.openxmlformats.org/officeDocument/2006/relationships" xmlns:p="http://schemas.openxmlformats.org/presentationml/2006/main">
   <p:cSld>
@@ -7462,7 +7605,7 @@
       </p:sp>
       <p:pic>
         <p:nvPicPr>
-          <p:cNvPr id="1042" name="그림 58" descr="C:/Users/Admin1/AppData/Roaming/PolarisOffice/ETemp/16484_18744056/fImage850627641.png"/>
+          <p:cNvPr id="1042" name="그림 58"/>
           <p:cNvPicPr>
             <a:picLocks noChangeAspect="1"/>
           </p:cNvPicPr>
@@ -7679,7 +7822,7 @@
       </p:sp>
       <p:pic>
         <p:nvPicPr>
-          <p:cNvPr id="1045" name="그림 65" descr="C:/Users/Admin1/AppData/Roaming/PolarisOffice/ETemp/16484_18744056/fImage28282796334.png"/>
+          <p:cNvPr id="1045" name="그림 65"/>
           <p:cNvPicPr>
             <a:picLocks noChangeAspect="1"/>
           </p:cNvPicPr>
@@ -7745,7 +7888,7 @@
       </p:cxnSp>
       <p:pic>
         <p:nvPicPr>
-          <p:cNvPr id="1049" name="그림 1" descr="C:/Users/Admin1/AppData/Roaming/PolarisOffice/ETemp/16484_18744056/fImage453129141.png"/>
+          <p:cNvPr id="1049" name="그림 1"/>
           <p:cNvPicPr>
             <a:picLocks noChangeAspect="1"/>
           </p:cNvPicPr>
@@ -7895,7 +8038,7 @@
       </p:sp>
       <p:pic>
         <p:nvPicPr>
-          <p:cNvPr id="1051" name="그림 2" descr="C:/Users/Admin1/AppData/Roaming/PolarisOffice/ETemp/16484_18744056/fImage191383915447.png"/>
+          <p:cNvPr id="1051" name="그림 2"/>
           <p:cNvPicPr>
             <a:picLocks noChangeAspect="1"/>
           </p:cNvPicPr>
@@ -7926,7 +8069,7 @@
       </p:pic>
       <p:pic>
         <p:nvPicPr>
-          <p:cNvPr id="1052" name="그림 1" descr="C:/Users/Admin1/AppData/Roaming/PolarisOffice/ETemp/16484_18744056/fImage729619141.png"/>
+          <p:cNvPr id="1052" name="그림 1"/>
           <p:cNvPicPr>
             <a:picLocks noChangeAspect="1"/>
           </p:cNvPicPr>
@@ -7957,7 +8100,7 @@
       </p:pic>
       <p:pic>
         <p:nvPicPr>
-          <p:cNvPr id="1053" name="그림 4" descr="C:/Users/Admin1/AppData/Roaming/PolarisOffice/ETemp/16484_18744056/fImage19561928467.png"/>
+          <p:cNvPr id="1053" name="그림 4"/>
           <p:cNvPicPr>
             <a:picLocks noChangeAspect="1"/>
           </p:cNvPicPr>
@@ -9657,7 +9800,7 @@
       </p:sp>
       <p:pic>
         <p:nvPicPr>
-          <p:cNvPr id="1104" name="그림 58" descr="C:/Users/Admin1/AppData/Roaming/PolarisOffice/ETemp/16484_18744056/fImage12239279491.png"/>
+          <p:cNvPr id="1104" name="그림 58"/>
           <p:cNvPicPr>
             <a:picLocks noChangeAspect="1"/>
           </p:cNvPicPr>
@@ -9854,7 +9997,7 @@
       </p:sp>
       <p:pic>
         <p:nvPicPr>
-          <p:cNvPr id="1109" name="그림 9" descr="C:/Users/Admin1/AppData/Roaming/PolarisOffice/ETemp/16484_18744056/fImage396362805724.png"/>
+          <p:cNvPr id="1109" name="그림 9"/>
           <p:cNvPicPr>
             <a:picLocks noChangeAspect="1"/>
           </p:cNvPicPr>
@@ -9905,7 +10048,7 @@
 </file>
 
 <file path=ppt/slides/slide14.xml><?xml version="1.0" encoding="utf-8"?>
-<p:sld xmlns:a="http://schemas.openxmlformats.org/drawingml/2006/main" xmlns:r="http://schemas.openxmlformats.org/officeDocument/2006/relationships" xmlns:p="http://schemas.openxmlformats.org/presentationml/2006/main">
+<p:sld xmlns:a="http://schemas.openxmlformats.org/drawingml/2006/main" xmlns:r="http://schemas.openxmlformats.org/officeDocument/2006/relationships" xmlns:p="http://schemas.openxmlformats.org/presentationml/2006/main" xmlns:p14="http://schemas.microsoft.com/office/powerpoint/2010/main">
   <p:cSld>
     <p:spTree>
       <p:nvGrpSpPr>
@@ -10189,7 +10332,7 @@
       </p:sp>
       <p:pic>
         <p:nvPicPr>
-          <p:cNvPr id="1110" name="그림 19" descr="C:/Users/Admin1/AppData/Roaming/PolarisOffice/ETemp/16484_18744056/fImage192962919169.png"/>
+          <p:cNvPr id="1110" name="그림 19"/>
           <p:cNvPicPr>
             <a:picLocks noChangeAspect="1"/>
           </p:cNvPicPr>
@@ -10220,7 +10363,7 @@
       </p:pic>
       <p:pic>
         <p:nvPicPr>
-          <p:cNvPr id="1111" name="그림 22" descr="C:/Users/Admin1/AppData/Roaming/PolarisOffice/ETemp/16484_18744056/fImage397562925724.png"/>
+          <p:cNvPr id="1111" name="그림 22"/>
           <p:cNvPicPr>
             <a:picLocks noChangeAspect="1"/>
           </p:cNvPicPr>
@@ -10242,6 +10385,307 @@
           <a:xfrm rot="0">
             <a:off x="6791960" y="1438275"/>
             <a:ext cx="4173855" cy="2735580"/>
+          </a:xfrm>
+          <a:prstGeom prst="roundRect"/>
+          <a:solidFill>
+            <a:srgbClr val="EDEDED"/>
+          </a:solidFill>
+        </p:spPr>
+      </p:pic>
+    </p:spTree>
+  </p:cSld>
+  <p:clrMapOvr>
+    <a:masterClrMapping/>
+  </p:clrMapOvr>
+  <mc:AlternateContent xmlns:mc="http://schemas.openxmlformats.org/markup-compatibility/2006">
+    <mc:Choice xmlns:p14="http://schemas.microsoft.com/office/powerpoint/2010/main" Requires="p14">
+      <p:transition spd="slow" p14:dur="2000"/>
+    </mc:Choice>
+    <mc:Fallback>
+      <p:transition spd="slow"/>
+    </mc:Fallback>
+  </mc:AlternateContent>
+  <p:timing>
+    <p:tnLst>
+      <p:par>
+        <p:cTn id="1" dur="indefinite" restart="never" nodeType="tmRoot"/>
+      </p:par>
+    </p:tnLst>
+  </p:timing>
+</p:sld>
+</file>
+
+<file path=ppt/slides/slide15.xml><?xml version="1.0" encoding="utf-8"?>
+<p:sld xmlns:a="http://schemas.openxmlformats.org/drawingml/2006/main" xmlns:r="http://schemas.openxmlformats.org/officeDocument/2006/relationships" xmlns:p="http://schemas.openxmlformats.org/presentationml/2006/main">
+  <p:cSld>
+    <p:spTree>
+      <p:nvGrpSpPr>
+        <p:cNvPr id="1" name=""/>
+        <p:cNvGrpSpPr/>
+        <p:nvPr/>
+      </p:nvGrpSpPr>
+      <p:grpSpPr>
+        <a:xfrm>
+          <a:off x="0" y="0"/>
+          <a:ext cx="0" cy="0"/>
+          <a:chOff x="0" y="0"/>
+          <a:chExt cx="0" cy="0"/>
+        </a:xfrm>
+      </p:grpSpPr>
+      <p:sp>
+        <p:nvSpPr>
+          <p:cNvPr id="1031" name="Rect 0"/>
+          <p:cNvSpPr txBox="1">
+            <a:spLocks/>
+          </p:cNvSpPr>
+          <p:nvPr/>
+        </p:nvSpPr>
+        <p:spPr>
+          <a:xfrm rot="0">
+            <a:off x="4595495" y="551180"/>
+            <a:ext cx="3002915" cy="554990"/>
+          </a:xfrm>
+          <a:prstGeom prst="rect"/>
+          <a:noFill/>
+          <a:ln w="0">
+            <a:noFill/>
+            <a:prstDash/>
+          </a:ln>
+        </p:spPr>
+        <p:txBody>
+          <a:bodyPr wrap="square" lIns="89535" tIns="46355" rIns="89535" bIns="46355" numCol="1" vert="horz" anchor="t">
+            <a:spAutoFit/>
+          </a:bodyPr>
+          <a:lstStyle/>
+          <a:p>
+            <a:pPr marL="0" indent="0" algn="l" latinLnBrk="0">
+              <a:buFontTx/>
+              <a:buNone/>
+            </a:pPr>
+            <a:r>
+              <a:rPr lang="ko-KR" altLang="en-US" sz="3000" b="1">
+                <a:solidFill>
+                  <a:schemeClr val="tx1"/>
+                </a:solidFill>
+                <a:latin typeface="맑은 고딕" charset="0"/>
+                <a:ea typeface="맑은 고딕" charset="0"/>
+              </a:rPr>
+              <a:t>Managed Heap</a:t>
+            </a:r>
+            <a:endParaRPr lang="ko-KR" altLang="en-US" sz="3000" b="1">
+              <a:solidFill>
+                <a:schemeClr val="tx1"/>
+              </a:solidFill>
+              <a:latin typeface="맑은 고딕" charset="0"/>
+              <a:ea typeface="맑은 고딕" charset="0"/>
+            </a:endParaRPr>
+          </a:p>
+        </p:txBody>
+      </p:sp>
+      <p:sp>
+        <p:nvSpPr>
+          <p:cNvPr id="1101" name="Rect 0"/>
+          <p:cNvSpPr txBox="1">
+            <a:spLocks/>
+          </p:cNvSpPr>
+          <p:nvPr/>
+        </p:nvSpPr>
+        <p:spPr>
+          <a:xfrm rot="0">
+            <a:off x="1047750" y="1619885"/>
+            <a:ext cx="4308475" cy="923925"/>
+          </a:xfrm>
+          <a:prstGeom prst="rect"/>
+          <a:noFill/>
+          <a:ln w="0">
+            <a:noFill/>
+            <a:prstDash/>
+          </a:ln>
+        </p:spPr>
+        <p:txBody>
+          <a:bodyPr wrap="square" lIns="89535" tIns="46355" rIns="89535" bIns="46355" numCol="1" vert="horz" anchor="t">
+            <a:spAutoFit/>
+          </a:bodyPr>
+          <a:lstStyle/>
+          <a:p>
+            <a:pPr marL="0" indent="0" algn="l" latinLnBrk="0" hangingPunct="1">
+              <a:buFontTx/>
+              <a:buNone/>
+            </a:pPr>
+            <a:r>
+              <a:rPr lang="ko-KR" sz="1800">
+                <a:latin typeface="맑은 고딕" charset="0"/>
+                <a:ea typeface="맑은 고딕" charset="0"/>
+              </a:rPr>
+              <a:t>관리되는 힙이란?</a:t>
+            </a:r>
+            <a:endParaRPr lang="ko-KR" altLang="en-US" sz="1800">
+              <a:latin typeface="맑은 고딕" charset="0"/>
+              <a:ea typeface="맑은 고딕" charset="0"/>
+            </a:endParaRPr>
+          </a:p>
+          <a:p>
+            <a:pPr marL="0" indent="0" algn="l" latinLnBrk="0" hangingPunct="1">
+              <a:buFontTx/>
+              <a:buNone/>
+            </a:pPr>
+            <a:r>
+              <a:rPr lang="ko-KR" sz="1800">
+                <a:latin typeface="맑은 고딕" charset="0"/>
+                <a:ea typeface="맑은 고딕" charset="0"/>
+              </a:rPr>
+              <a:t>메모리 관리자에 의해 자동으로 관리되는 메모리 영역입니다.</a:t>
+            </a:r>
+            <a:endParaRPr lang="ko-KR" altLang="en-US" sz="1800">
+              <a:latin typeface="맑은 고딕" charset="0"/>
+              <a:ea typeface="맑은 고딕" charset="0"/>
+            </a:endParaRPr>
+          </a:p>
+        </p:txBody>
+      </p:sp>
+      <p:sp>
+        <p:nvSpPr>
+          <p:cNvPr id="1109" name="Rect 0"/>
+          <p:cNvSpPr txBox="1">
+            <a:spLocks/>
+          </p:cNvSpPr>
+          <p:nvPr/>
+        </p:nvSpPr>
+        <p:spPr>
+          <a:xfrm rot="0">
+            <a:off x="6809105" y="5132705"/>
+            <a:ext cx="4146550" cy="923925"/>
+          </a:xfrm>
+          <a:prstGeom prst="rect"/>
+          <a:noFill/>
+          <a:ln w="0">
+            <a:noFill/>
+            <a:prstDash/>
+          </a:ln>
+        </p:spPr>
+        <p:txBody>
+          <a:bodyPr wrap="square" lIns="89535" tIns="46355" rIns="89535" bIns="46355" numCol="1" vert="horz" anchor="t">
+            <a:spAutoFit/>
+          </a:bodyPr>
+          <a:lstStyle/>
+          <a:p>
+            <a:pPr marL="0" indent="0" algn="l" latinLnBrk="0" hangingPunct="1">
+              <a:buFontTx/>
+              <a:buNone/>
+            </a:pPr>
+            <a:r>
+              <a:rPr lang="ko-KR" sz="1800">
+                <a:latin typeface="맑은 고딕" charset="0"/>
+                <a:ea typeface="맑은 고딕" charset="0"/>
+              </a:rPr>
+              <a:t>관리되는 힙의 경우 더 이상 할당할 메모리 공간이 없다면 메모리 공간의 크기를 2배로 확장합니다.</a:t>
+            </a:r>
+            <a:endParaRPr lang="ko-KR" altLang="en-US" sz="1800">
+              <a:latin typeface="맑은 고딕" charset="0"/>
+              <a:ea typeface="맑은 고딕" charset="0"/>
+            </a:endParaRPr>
+          </a:p>
+        </p:txBody>
+      </p:sp>
+      <p:sp>
+        <p:nvSpPr>
+          <p:cNvPr id="1112" name="텍스트 상자 4"/>
+          <p:cNvSpPr txBox="1">
+            <a:spLocks/>
+          </p:cNvSpPr>
+          <p:nvPr/>
+        </p:nvSpPr>
+        <p:spPr>
+          <a:xfrm rot="0">
+            <a:off x="1047750" y="4859020"/>
+            <a:ext cx="4308475" cy="1200785"/>
+          </a:xfrm>
+          <a:prstGeom prst="rect"/>
+          <a:noFill/>
+          <a:ln w="0">
+            <a:noFill/>
+            <a:prstDash/>
+          </a:ln>
+        </p:spPr>
+        <p:txBody>
+          <a:bodyPr wrap="square" lIns="89535" tIns="46355" rIns="89535" bIns="46355" numCol="1" vert="horz" anchor="t">
+            <a:spAutoFit/>
+          </a:bodyPr>
+          <a:lstStyle/>
+          <a:p>
+            <a:pPr marL="0" indent="0" algn="l" latinLnBrk="0" hangingPunct="1">
+              <a:buFontTx/>
+              <a:buNone/>
+            </a:pPr>
+            <a:r>
+              <a:rPr lang="ko-KR" sz="1800">
+                <a:latin typeface="맑은 고딕" charset="0"/>
+                <a:ea typeface="맑은 고딕" charset="0"/>
+              </a:rPr>
+              <a:t>Unity의 가비지 컬렉터는 Boehm GC 알고리즘을 사용하므로, 세대 기반 가비지 컬렉터 방식을 지원하지 않습니다.</a:t>
+            </a:r>
+            <a:endParaRPr lang="ko-KR" altLang="en-US" sz="1800">
+              <a:latin typeface="맑은 고딕" charset="0"/>
+              <a:ea typeface="맑은 고딕" charset="0"/>
+            </a:endParaRPr>
+          </a:p>
+        </p:txBody>
+      </p:sp>
+      <p:pic>
+        <p:nvPicPr>
+          <p:cNvPr id="1113" name="그림 5" descr="C:/Users/Admin1/AppData/Roaming/PolarisOffice/ETemp/9904_9743256/fImage3562528841.jpeg"/>
+          <p:cNvPicPr>
+            <a:picLocks noChangeAspect="1"/>
+          </p:cNvPicPr>
+          <p:nvPr/>
+        </p:nvPicPr>
+        <p:blipFill rotWithShape="1">
+          <a:blip r:embed="rId2" cstate="print">
+            <a:extLst>
+              <a:ext uri="{28A0092B-C50C-407E-A947-70E740481C1C}">
+                <a14:useLocalDpi xmlns:a14="http://schemas.microsoft.com/office/drawing/2010/main" val="0"/>
+              </a:ext>
+            </a:extLst>
+          </a:blip>
+          <a:stretch>
+            <a:fillRect/>
+          </a:stretch>
+        </p:blipFill>
+        <p:spPr>
+          <a:xfrm rot="0">
+            <a:off x="1047750" y="2730500"/>
+            <a:ext cx="4318635" cy="1955165"/>
+          </a:xfrm>
+          <a:prstGeom prst="roundRect"/>
+          <a:solidFill>
+            <a:srgbClr val="EDEDED"/>
+          </a:solidFill>
+        </p:spPr>
+      </p:pic>
+      <p:pic>
+        <p:nvPicPr>
+          <p:cNvPr id="1114" name="그림 11" descr="C:/Users/Admin1/AppData/Roaming/PolarisOffice/ETemp/9904_9743256/fImage1233862918467.png"/>
+          <p:cNvPicPr>
+            <a:picLocks noChangeAspect="1"/>
+          </p:cNvPicPr>
+          <p:nvPr/>
+        </p:nvPicPr>
+        <p:blipFill rotWithShape="1">
+          <a:blip r:embed="rId3" cstate="print">
+            <a:extLst>
+              <a:ext uri="{28A0092B-C50C-407E-A947-70E740481C1C}">
+                <a14:useLocalDpi xmlns:a14="http://schemas.microsoft.com/office/drawing/2010/main" val="0"/>
+              </a:ext>
+            </a:extLst>
+          </a:blip>
+          <a:stretch>
+            <a:fillRect/>
+          </a:stretch>
+        </p:blipFill>
+        <p:spPr>
+          <a:xfrm rot="0">
+            <a:off x="6810375" y="1627505"/>
+            <a:ext cx="4144010" cy="3326130"/>
           </a:xfrm>
           <a:prstGeom prst="roundRect"/>
           <a:solidFill>
@@ -10542,7 +10986,7 @@
       </p:pic>
       <p:pic>
         <p:nvPicPr>
-          <p:cNvPr id="1036" name="그림 13" descr="C:/Users/Admin1/AppData/Roaming/PolarisOffice/ETemp/16484_18744056/fImage463742776334.png"/>
+          <p:cNvPr id="1036" name="그림 13"/>
           <p:cNvPicPr>
             <a:picLocks noChangeAspect="1"/>
           </p:cNvPicPr>
@@ -10785,7 +11229,7 @@
       </p:sp>
       <p:pic>
         <p:nvPicPr>
-          <p:cNvPr id="1062" name="그림 10" descr="C:/Users/Admin1/AppData/Roaming/PolarisOffice/ETemp/16484_18744056/fImage1877317641.png"/>
+          <p:cNvPr id="1062" name="그림 10"/>
           <p:cNvPicPr>
             <a:picLocks noChangeAspect="1"/>
           </p:cNvPicPr>
@@ -10901,7 +11345,7 @@
       </p:pic>
       <p:pic>
         <p:nvPicPr>
-          <p:cNvPr id="1065" name="그림 16" descr="C:/Users/Admin1/AppData/Roaming/PolarisOffice/ETemp/16484_18744056/fImage445402786500.png"/>
+          <p:cNvPr id="1065" name="그림 16"/>
           <p:cNvPicPr>
             <a:picLocks noChangeAspect="1"/>
           </p:cNvPicPr>
@@ -11293,7 +11737,7 @@
       </p:sp>
       <p:pic>
         <p:nvPicPr>
-          <p:cNvPr id="1044" name="그림 145" descr="C:/Users/Admin1/AppData/Roaming/PolarisOffice/ETemp/16484_18744056/fImage688723905436.png"/>
+          <p:cNvPr id="1044" name="그림 145"/>
           <p:cNvPicPr>
             <a:picLocks noChangeAspect="1"/>
           </p:cNvPicPr>
@@ -11550,7 +11994,7 @@
       </p:sp>
       <p:pic>
         <p:nvPicPr>
-          <p:cNvPr id="1034" name="그림 22" descr="C:/Users/Admin1/AppData/Roaming/PolarisOffice/ETemp/16484_18744056/fImage412512959358.png"/>
+          <p:cNvPr id="1034" name="그림 22"/>
           <p:cNvPicPr>
             <a:picLocks noChangeAspect="1"/>
           </p:cNvPicPr>
@@ -11608,7 +12052,7 @@
       </p:pic>
       <p:pic>
         <p:nvPicPr>
-          <p:cNvPr id="1038" name="그림 26" descr="C:/Users/Admin1/AppData/Roaming/PolarisOffice/ETemp/16484_18744056/fImage61361866500.png"/>
+          <p:cNvPr id="1038" name="그림 26"/>
           <p:cNvPicPr>
             <a:picLocks noChangeAspect="1"/>
           </p:cNvPicPr>
@@ -11951,7 +12395,7 @@
       </p:pic>
       <p:pic>
         <p:nvPicPr>
-          <p:cNvPr id="1052" name="그림 21" descr="C:/Users/Admin1/AppData/Roaming/PolarisOffice/ETemp/16484_18744056/fImage1040312976334.png"/>
+          <p:cNvPr id="1052" name="그림 21"/>
           <p:cNvPicPr>
             <a:picLocks noChangeAspect="1"/>
           </p:cNvPicPr>
@@ -12146,7 +12590,7 @@
       </p:sp>
       <p:pic>
         <p:nvPicPr>
-          <p:cNvPr id="1052" name="그림 34" descr="C:/Users/Admin1/AppData/Roaming/PolarisOffice/ETemp/16484_18744056/fImage120161889169.png"/>
+          <p:cNvPr id="1052" name="그림 34"/>
           <p:cNvPicPr>
             <a:picLocks noChangeAspect="1"/>
           </p:cNvPicPr>
@@ -12177,7 +12621,7 @@
       </p:pic>
       <p:pic>
         <p:nvPicPr>
-          <p:cNvPr id="1053" name="그림 37" descr="C:/Users/Admin1/AppData/Roaming/PolarisOffice/ETemp/16484_18744056/fImage122321895724.png"/>
+          <p:cNvPr id="1053" name="그림 37"/>
           <p:cNvPicPr>
             <a:picLocks noChangeAspect="1"/>
           </p:cNvPicPr>
@@ -12746,7 +13190,7 @@
       </p:sp>
       <p:pic>
         <p:nvPicPr>
-          <p:cNvPr id="1034" name="그림 58" descr="C:/Users/Admin1/AppData/Roaming/PolarisOffice/ETemp/16484_18744056/fImage115662033281.png"/>
+          <p:cNvPr id="1034" name="그림 58"/>
           <p:cNvPicPr>
             <a:picLocks noChangeAspect="1"/>
           </p:cNvPicPr>
@@ -12777,7 +13221,7 @@
       </p:pic>
       <p:pic>
         <p:nvPicPr>
-          <p:cNvPr id="1035" name="그림 61" descr="C:/Users/Admin1/AppData/Roaming/PolarisOffice/ETemp/16484_18744056/fImage71352046827.png"/>
+          <p:cNvPr id="1035" name="그림 61"/>
           <p:cNvPicPr>
             <a:picLocks noChangeAspect="1"/>
           </p:cNvPicPr>
@@ -13222,7 +13666,7 @@
       </p:pic>
       <p:pic>
         <p:nvPicPr>
-          <p:cNvPr id="1034" name="그림 10" descr="C:/Users/Admin1/AppData/Roaming/PolarisOffice/ETemp/16484_18744056/fImage77711576500.png"/>
+          <p:cNvPr id="1034" name="그림 10"/>
           <p:cNvPicPr>
             <a:picLocks noChangeAspect="1"/>
           </p:cNvPicPr>

</xml_diff>

<commit_message>
Update Object Pooling PPT Content
- Update object pooling PPT Data

- Set object to be found by game
  object name

- Adding and deleting resource data
</commit_message>
<xml_diff>
--- a/Assets/Class/Instantiate & Destroy/PPT Data/Instatiate and Destroy Example.pptx
+++ b/Assets/Class/Instantiate & Destroy/PPT Data/Instatiate and Destroy Example.pptx
@@ -2,27 +2,27 @@
 <file path=ppt/presentation.xml><?xml version="1.0" encoding="utf-8"?>
 <p:presentation xmlns:a="http://schemas.openxmlformats.org/drawingml/2006/main" xmlns:r="http://schemas.openxmlformats.org/officeDocument/2006/relationships" xmlns:p="http://schemas.openxmlformats.org/presentationml/2006/main" xmlns:p14="http://schemas.microsoft.com/office/powerpoint/2010/main" saveSubsetFonts="1" firstSlideNum="0">
   <p:sldMasterIdLst>
-    <p:sldMasterId id="2147485811" r:id="rId12"/>
+    <p:sldMasterId id="2147485813" r:id="rId12"/>
   </p:sldMasterIdLst>
   <p:notesMasterIdLst>
     <p:notesMasterId r:id="rId14"/>
   </p:notesMasterIdLst>
   <p:sldIdLst>
     <p:sldId id="293" r:id="rId16"/>
-    <p:sldId id="294" r:id="rId17"/>
-    <p:sldId id="295" r:id="rId18"/>
-    <p:sldId id="288" r:id="rId19"/>
-    <p:sldId id="296" r:id="rId20"/>
-    <p:sldId id="289" r:id="rId21"/>
-    <p:sldId id="297" r:id="rId22"/>
-    <p:sldId id="298" r:id="rId23"/>
-    <p:sldId id="299" r:id="rId24"/>
-    <p:sldId id="300" r:id="rId25"/>
-    <p:sldId id="301" r:id="rId26"/>
-    <p:sldId id="287" r:id="rId27"/>
-    <p:sldId id="302" r:id="rId28"/>
-    <p:sldId id="303" r:id="rId29"/>
-    <p:sldId id="304" r:id="rId30"/>
+    <p:sldId id="294" r:id="rId18"/>
+    <p:sldId id="295" r:id="rId20"/>
+    <p:sldId id="288" r:id="rId22"/>
+    <p:sldId id="296" r:id="rId24"/>
+    <p:sldId id="289" r:id="rId26"/>
+    <p:sldId id="297" r:id="rId28"/>
+    <p:sldId id="298" r:id="rId30"/>
+    <p:sldId id="299" r:id="rId31"/>
+    <p:sldId id="300" r:id="rId33"/>
+    <p:sldId id="301" r:id="rId35"/>
+    <p:sldId id="287" r:id="rId37"/>
+    <p:sldId id="302" r:id="rId39"/>
+    <p:sldId id="303" r:id="rId41"/>
+    <p:sldId id="304" r:id="rId43"/>
   </p:sldIdLst>
   <p:sldSz cx="12192000" cy="6858000"/>
   <p:notesSz cx="6858000" cy="9144000"/>
@@ -13190,7 +13190,7 @@
       </p:sp>
       <p:pic>
         <p:nvPicPr>
-          <p:cNvPr id="1034" name="그림 58"/>
+          <p:cNvPr id="1034" name="그림 58" descr="C:/Users/Admin1/AppData/Roaming/PolarisOffice/ETemp/14712_13418472/fImage115662033281.png"/>
           <p:cNvPicPr>
             <a:picLocks noChangeAspect="1"/>
           </p:cNvPicPr>
@@ -13211,7 +13211,7 @@
         <p:spPr>
           <a:xfrm rot="0">
             <a:off x="3009265" y="1402715"/>
-            <a:ext cx="2361565" cy="3677920"/>
+            <a:ext cx="2362200" cy="3678555"/>
           </a:xfrm>
           <a:prstGeom prst="roundRect"/>
           <a:solidFill>

</xml_diff>

<commit_message>
Set to IDE Visual Studio 2022
- Updating each PPT Data

- Change to IDE visual studio 2022

- Disable Visualize on Slider

- Delete resource data
</commit_message>
<xml_diff>
--- a/Assets/Class/Instantiate & Destroy/PPT Data/Instatiate and Destroy Example.pptx
+++ b/Assets/Class/Instantiate & Destroy/PPT Data/Instatiate and Destroy Example.pptx
@@ -2,27 +2,27 @@
 <file path=ppt/presentation.xml><?xml version="1.0" encoding="utf-8"?>
 <p:presentation xmlns:a="http://schemas.openxmlformats.org/drawingml/2006/main" xmlns:r="http://schemas.openxmlformats.org/officeDocument/2006/relationships" xmlns:p="http://schemas.openxmlformats.org/presentationml/2006/main" xmlns:p14="http://schemas.microsoft.com/office/powerpoint/2010/main" saveSubsetFonts="1" firstSlideNum="0">
   <p:sldMasterIdLst>
-    <p:sldMasterId id="2147485813" r:id="rId12"/>
+    <p:sldMasterId id="2147485820" r:id="rId12"/>
   </p:sldMasterIdLst>
   <p:notesMasterIdLst>
     <p:notesMasterId r:id="rId14"/>
   </p:notesMasterIdLst>
   <p:sldIdLst>
     <p:sldId id="293" r:id="rId16"/>
-    <p:sldId id="294" r:id="rId18"/>
-    <p:sldId id="295" r:id="rId20"/>
-    <p:sldId id="288" r:id="rId22"/>
-    <p:sldId id="296" r:id="rId24"/>
-    <p:sldId id="289" r:id="rId26"/>
-    <p:sldId id="297" r:id="rId28"/>
-    <p:sldId id="298" r:id="rId30"/>
+    <p:sldId id="294" r:id="rId17"/>
+    <p:sldId id="295" r:id="rId19"/>
+    <p:sldId id="288" r:id="rId21"/>
+    <p:sldId id="296" r:id="rId23"/>
+    <p:sldId id="289" r:id="rId25"/>
+    <p:sldId id="297" r:id="rId27"/>
+    <p:sldId id="298" r:id="rId29"/>
     <p:sldId id="299" r:id="rId31"/>
     <p:sldId id="300" r:id="rId33"/>
     <p:sldId id="301" r:id="rId35"/>
     <p:sldId id="287" r:id="rId37"/>
-    <p:sldId id="302" r:id="rId39"/>
-    <p:sldId id="303" r:id="rId41"/>
-    <p:sldId id="304" r:id="rId43"/>
+    <p:sldId id="302" r:id="rId38"/>
+    <p:sldId id="303" r:id="rId39"/>
+    <p:sldId id="304" r:id="rId41"/>
   </p:sldIdLst>
   <p:sldSz cx="12192000" cy="6858000"/>
   <p:notesSz cx="6858000" cy="9144000"/>
@@ -7926,9 +7926,9 @@
           <p:nvPr/>
         </p:nvSpPr>
         <p:spPr>
-          <a:xfrm rot="0">
+          <a:xfrm>
             <a:off x="6817995" y="4114800"/>
-            <a:ext cx="4141470" cy="2061845"/>
+            <a:ext cx="4142105" cy="2061845"/>
           </a:xfrm>
           <a:prstGeom prst="rect"/>
           <a:noFill/>
@@ -7999,35 +7999,21 @@
                 <a:latin typeface="맑은 고딕" charset="0"/>
                 <a:ea typeface="맑은 고딕" charset="0"/>
               </a:rPr>
-              <a:t>그러고 나서 </a:t>
+              <a:t>그러고 나서 스크립트를 생성하고 De</a:t>
             </a:r>
             <a:r>
               <a:rPr lang="ko-KR" sz="1800">
                 <a:latin typeface="맑은 고딕" charset="0"/>
                 <a:ea typeface="맑은 고딕" charset="0"/>
               </a:rPr>
-              <a:t>스크립트를 생성하고 </a:t>
+              <a:t>lay</a:t>
             </a:r>
             <a:r>
               <a:rPr lang="ko-KR" sz="1800">
                 <a:latin typeface="맑은 고딕" charset="0"/>
                 <a:ea typeface="맑은 고딕" charset="0"/>
               </a:rPr>
-              <a:t>Delete라는 이름으로 설정한 다음 </a:t>
-            </a:r>
-            <a:r>
-              <a:rPr lang="ko-KR" sz="1800">
-                <a:latin typeface="맑은 고딕" charset="0"/>
-                <a:ea typeface="맑은 고딕" charset="0"/>
-              </a:rPr>
-              <a:t>Generic Create Button</a:t>
-            </a:r>
-            <a:r>
-              <a:rPr lang="ko-KR" sz="1800">
-                <a:latin typeface="맑은 고딕" charset="0"/>
-                <a:ea typeface="맑은 고딕" charset="0"/>
-              </a:rPr>
-              <a:t>에 넣어줍니다.</a:t>
+              <a:t>라는 이름으로 설정한 다음 Generic Create Button에 넣어줍니다.</a:t>
             </a:r>
             <a:endParaRPr lang="ko-KR" altLang="en-US" sz="1800">
               <a:latin typeface="맑은 고딕" charset="0"/>
@@ -9484,8 +9470,8 @@
         </p:nvSpPr>
         <p:spPr>
           <a:xfrm rot="0">
-            <a:off x="6817360" y="4394200"/>
-            <a:ext cx="4145915" cy="1478280"/>
+            <a:off x="6809105" y="4394200"/>
+            <a:ext cx="4146550" cy="1478915"/>
           </a:xfrm>
           <a:prstGeom prst="rect"/>
           <a:noFill/>
@@ -9736,9 +9722,9 @@
           <p:nvPr/>
         </p:nvSpPr>
         <p:spPr>
-          <a:xfrm rot="0">
+          <a:xfrm>
             <a:off x="1220470" y="3073400"/>
-            <a:ext cx="4166235" cy="647065"/>
+            <a:ext cx="4166870" cy="647065"/>
           </a:xfrm>
           <a:prstGeom prst="rect"/>
           <a:noFill/>
@@ -9748,7 +9734,7 @@
           </a:ln>
         </p:spPr>
         <p:txBody>
-          <a:bodyPr wrap="square" lIns="89535" tIns="46355" rIns="89535" bIns="46355" vert="horz" anchor="t">
+          <a:bodyPr wrap="square" lIns="89535" tIns="46355" rIns="89535" bIns="46355" numCol="1" vert="horz" anchor="t">
             <a:spAutoFit/>
           </a:bodyPr>
           <a:lstStyle/>
@@ -9789,7 +9775,35 @@
                 <a:latin typeface="맑은 고딕" charset="0"/>
                 <a:ea typeface="맑은 고딕" charset="0"/>
               </a:rPr>
-              <a:t>그다음 Main Camera 오브젝트의 위치와 회전 값을 설정합니다.</a:t>
+              <a:t>그다음 </a:t>
+            </a:r>
+            <a:r>
+              <a:rPr lang="ko-KR" sz="1800">
+                <a:latin typeface="맑은 고딕" charset="0"/>
+                <a:ea typeface="맑은 고딕" charset="0"/>
+              </a:rPr>
+              <a:t>Plane</a:t>
+            </a:r>
+            <a:r>
+              <a:rPr lang="ko-KR" sz="1800">
+                <a:latin typeface="맑은 고딕" charset="0"/>
+                <a:ea typeface="맑은 고딕" charset="0"/>
+              </a:rPr>
+              <a:t> 오브젝트의 위치와 회전 값을 </a:t>
+            </a:r>
+            <a:r>
+              <a:rPr lang="ko-KR" sz="1800">
+                <a:latin typeface="맑은 고딕" charset="0"/>
+                <a:ea typeface="맑은 고딕" charset="0"/>
+              </a:rPr>
+              <a:t>초기화</a:t>
+            </a:r>
+            <a:r>
+              <a:rPr lang="ko-KR" sz="1800">
+                <a:latin typeface="맑은 고딕" charset="0"/>
+                <a:ea typeface="맑은 고딕" charset="0"/>
+              </a:rPr>
+              <a:t>합니다.</a:t>
             </a:r>
             <a:endParaRPr lang="ko-KR" altLang="en-US" sz="1800">
               <a:latin typeface="맑은 고딕" charset="0"/>
@@ -9798,37 +9812,6 @@
           </a:p>
         </p:txBody>
       </p:sp>
-      <p:pic>
-        <p:nvPicPr>
-          <p:cNvPr id="1104" name="그림 58"/>
-          <p:cNvPicPr>
-            <a:picLocks noChangeAspect="1"/>
-          </p:cNvPicPr>
-          <p:nvPr/>
-        </p:nvPicPr>
-        <p:blipFill rotWithShape="1">
-          <a:blip r:embed="rId2" cstate="hqprint">
-            <a:extLst>
-              <a:ext uri="{28A0092B-C50C-407E-A947-70E740481C1C}">
-                <a14:useLocalDpi xmlns:a14="http://schemas.microsoft.com/office/drawing/2010/main"/>
-              </a:ext>
-            </a:extLst>
-          </a:blip>
-          <a:stretch>
-            <a:fillRect/>
-          </a:stretch>
-        </p:blipFill>
-        <p:spPr>
-          <a:xfrm rot="0">
-            <a:off x="1230630" y="1445895"/>
-            <a:ext cx="4165600" cy="1508125"/>
-          </a:xfrm>
-          <a:prstGeom prst="roundRect"/>
-          <a:solidFill>
-            <a:srgbClr val="EDEDED"/>
-          </a:solidFill>
-        </p:spPr>
-      </p:pic>
       <p:pic>
         <p:nvPicPr>
           <p:cNvPr id="1105" name="그림 61"/>
@@ -10022,6 +10005,37 @@
           </a:xfrm>
           <a:prstGeom prst="rect"/>
           <a:noFill/>
+        </p:spPr>
+      </p:pic>
+      <p:pic>
+        <p:nvPicPr>
+          <p:cNvPr id="1110" name="그림 1" descr="C:/Users/Admin1/AppData/Roaming/PolarisOffice/ETemp/7296_8449768/fImage1125721641.png"/>
+          <p:cNvPicPr>
+            <a:picLocks noChangeAspect="1"/>
+          </p:cNvPicPr>
+          <p:nvPr/>
+        </p:nvPicPr>
+        <p:blipFill rotWithShape="1">
+          <a:blip r:embed="rId7" cstate="print">
+            <a:extLst>
+              <a:ext uri="{28A0092B-C50C-407E-A947-70E740481C1C}">
+                <a14:useLocalDpi xmlns:a14="http://schemas.microsoft.com/office/drawing/2010/main" val="0"/>
+              </a:ext>
+            </a:extLst>
+          </a:blip>
+          <a:stretch>
+            <a:fillRect/>
+          </a:stretch>
+        </p:blipFill>
+        <p:spPr>
+          <a:xfrm rot="0">
+            <a:off x="1223010" y="1455420"/>
+            <a:ext cx="4164330" cy="1513205"/>
+          </a:xfrm>
+          <a:prstGeom prst="roundRect"/>
+          <a:solidFill>
+            <a:srgbClr val="EDEDED"/>
+          </a:solidFill>
         </p:spPr>
       </p:pic>
     </p:spTree>
@@ -10416,7 +10430,7 @@
 </file>
 
 <file path=ppt/slides/slide15.xml><?xml version="1.0" encoding="utf-8"?>
-<p:sld xmlns:a="http://schemas.openxmlformats.org/drawingml/2006/main" xmlns:r="http://schemas.openxmlformats.org/officeDocument/2006/relationships" xmlns:p="http://schemas.openxmlformats.org/presentationml/2006/main">
+<p:sld xmlns:a="http://schemas.openxmlformats.org/drawingml/2006/main" xmlns:r="http://schemas.openxmlformats.org/officeDocument/2006/relationships" xmlns:p="http://schemas.openxmlformats.org/presentationml/2006/main" xmlns:p14="http://schemas.microsoft.com/office/powerpoint/2010/main">
   <p:cSld>
     <p:spTree>
       <p:nvGrpSpPr>
@@ -10443,7 +10457,7 @@
         <p:spPr>
           <a:xfrm rot="0">
             <a:off x="4595495" y="551180"/>
-            <a:ext cx="3002915" cy="554990"/>
+            <a:ext cx="3003550" cy="554990"/>
           </a:xfrm>
           <a:prstGeom prst="rect"/>
           <a:noFill/>
@@ -10553,8 +10567,8 @@
         </p:nvSpPr>
         <p:spPr>
           <a:xfrm rot="0">
-            <a:off x="6809105" y="5132705"/>
-            <a:ext cx="4146550" cy="923925"/>
+            <a:off x="6816725" y="5314950"/>
+            <a:ext cx="4140835" cy="923925"/>
           </a:xfrm>
           <a:prstGeom prst="rect"/>
           <a:noFill/>
@@ -10597,8 +10611,8 @@
         </p:nvSpPr>
         <p:spPr>
           <a:xfrm rot="0">
-            <a:off x="1047750" y="4859020"/>
-            <a:ext cx="4308475" cy="1200785"/>
+            <a:off x="1047750" y="5033645"/>
+            <a:ext cx="4309110" cy="1201420"/>
           </a:xfrm>
           <a:prstGeom prst="rect"/>
           <a:noFill/>
@@ -10633,14 +10647,14 @@
       </p:sp>
       <p:pic>
         <p:nvPicPr>
-          <p:cNvPr id="1113" name="그림 5" descr="C:/Users/Admin1/AppData/Roaming/PolarisOffice/ETemp/9904_9743256/fImage3562528841.jpeg"/>
+          <p:cNvPr id="1115" name="그림 4" descr="C:/Users/Admin1/AppData/Roaming/PolarisOffice/ETemp/7296_8449768/fImage684032178467.png"/>
           <p:cNvPicPr>
             <a:picLocks noChangeAspect="1"/>
           </p:cNvPicPr>
           <p:nvPr/>
         </p:nvPicPr>
         <p:blipFill rotWithShape="1">
-          <a:blip r:embed="rId2" cstate="print">
+          <a:blip r:embed="rId5" cstate="print">
             <a:extLst>
               <a:ext uri="{28A0092B-C50C-407E-A947-70E740481C1C}">
                 <a14:useLocalDpi xmlns:a14="http://schemas.microsoft.com/office/drawing/2010/main" val="0"/>
@@ -10653,8 +10667,8 @@
         </p:blipFill>
         <p:spPr>
           <a:xfrm rot="0">
-            <a:off x="1047750" y="2730500"/>
-            <a:ext cx="4318635" cy="1955165"/>
+            <a:off x="1047115" y="2720340"/>
+            <a:ext cx="4315460" cy="2176780"/>
           </a:xfrm>
           <a:prstGeom prst="roundRect"/>
           <a:solidFill>
@@ -10664,14 +10678,14 @@
       </p:pic>
       <p:pic>
         <p:nvPicPr>
-          <p:cNvPr id="1114" name="그림 11" descr="C:/Users/Admin1/AppData/Roaming/PolarisOffice/ETemp/9904_9743256/fImage1233862918467.png"/>
+          <p:cNvPr id="1116" name="그림 16" descr="C:/Users/Admin1/AppData/Roaming/PolarisOffice/ETemp/7296_8449768/fImage72232226334.png"/>
           <p:cNvPicPr>
             <a:picLocks noChangeAspect="1"/>
           </p:cNvPicPr>
           <p:nvPr/>
         </p:nvPicPr>
         <p:blipFill rotWithShape="1">
-          <a:blip r:embed="rId3" cstate="print">
+          <a:blip r:embed="rId6" cstate="print">
             <a:extLst>
               <a:ext uri="{28A0092B-C50C-407E-A947-70E740481C1C}">
                 <a14:useLocalDpi xmlns:a14="http://schemas.microsoft.com/office/drawing/2010/main" val="0"/>
@@ -10684,13 +10698,11 @@
         </p:blipFill>
         <p:spPr>
           <a:xfrm rot="0">
-            <a:off x="6810375" y="1627505"/>
-            <a:ext cx="4144010" cy="3326130"/>
-          </a:xfrm>
-          <a:prstGeom prst="roundRect"/>
-          <a:solidFill>
-            <a:srgbClr val="EDEDED"/>
-          </a:solidFill>
+            <a:off x="6816725" y="1621155"/>
+            <a:ext cx="4140835" cy="3542030"/>
+          </a:xfrm>
+          <a:prstGeom prst="rect"/>
+          <a:noFill/>
         </p:spPr>
       </p:pic>
     </p:spTree>

</xml_diff>

<commit_message>
Remove Object Pooling Tutorial
- Implement an effect when colliding
  with a specific object by comparing
  game object tags

- NavMesh Obstacle PPT Data
  Update

- Delete resource data
</commit_message>
<xml_diff>
--- a/Assets/Class/Instantiate & Destroy/PPT Data/Instatiate and Destroy Example.pptx
+++ b/Assets/Class/Instantiate & Destroy/PPT Data/Instatiate and Destroy Example.pptx
@@ -2,16 +2,16 @@
 <file path=ppt/presentation.xml><?xml version="1.0" encoding="utf-8"?>
 <p:presentation xmlns:a="http://schemas.openxmlformats.org/drawingml/2006/main" xmlns:r="http://schemas.openxmlformats.org/officeDocument/2006/relationships" xmlns:p="http://schemas.openxmlformats.org/presentationml/2006/main" xmlns:p14="http://schemas.microsoft.com/office/powerpoint/2010/main" saveSubsetFonts="1" firstSlideNum="0">
   <p:sldMasterIdLst>
-    <p:sldMasterId id="2147485820" r:id="rId12"/>
+    <p:sldMasterId id="2147485821" r:id="rId12"/>
   </p:sldMasterIdLst>
   <p:notesMasterIdLst>
     <p:notesMasterId r:id="rId14"/>
   </p:notesMasterIdLst>
   <p:sldIdLst>
     <p:sldId id="293" r:id="rId16"/>
-    <p:sldId id="294" r:id="rId17"/>
-    <p:sldId id="295" r:id="rId19"/>
-    <p:sldId id="288" r:id="rId21"/>
+    <p:sldId id="294" r:id="rId18"/>
+    <p:sldId id="295" r:id="rId20"/>
+    <p:sldId id="288" r:id="rId22"/>
     <p:sldId id="296" r:id="rId23"/>
     <p:sldId id="289" r:id="rId25"/>
     <p:sldId id="297" r:id="rId27"/>
@@ -20,9 +20,9 @@
     <p:sldId id="300" r:id="rId33"/>
     <p:sldId id="301" r:id="rId35"/>
     <p:sldId id="287" r:id="rId37"/>
-    <p:sldId id="302" r:id="rId38"/>
-    <p:sldId id="303" r:id="rId39"/>
-    <p:sldId id="304" r:id="rId41"/>
+    <p:sldId id="302" r:id="rId39"/>
+    <p:sldId id="303" r:id="rId41"/>
+    <p:sldId id="304" r:id="rId43"/>
   </p:sldIdLst>
   <p:sldSz cx="12192000" cy="6858000"/>
   <p:notesSz cx="6858000" cy="9144000"/>
@@ -11749,7 +11749,7 @@
       </p:sp>
       <p:pic>
         <p:nvPicPr>
-          <p:cNvPr id="1044" name="그림 145"/>
+          <p:cNvPr id="1044" name="그림 145" descr="C:/Users/Admin1/AppData/Roaming/PolarisOffice/ETemp/8536_15965928/fImage688723905436.png"/>
           <p:cNvPicPr>
             <a:picLocks noChangeAspect="1"/>
           </p:cNvPicPr>
@@ -11769,8 +11769,8 @@
         </p:blipFill>
         <p:spPr>
           <a:xfrm rot="0">
-            <a:off x="1222375" y="3075305"/>
-            <a:ext cx="4133850" cy="1805940"/>
+            <a:off x="1230630" y="3075305"/>
+            <a:ext cx="4126230" cy="1779905"/>
           </a:xfrm>
           <a:prstGeom prst="rect"/>
           <a:noFill/>

</xml_diff>